<commit_message>
added code sample to presentation
</commit_message>
<xml_diff>
--- a/C# 5.pptx
+++ b/C# 5.pptx
@@ -219,7 +219,7 @@
             <a:fld id="{867741B6-20E1-4219-AC3A-163B52FA3A08}" type="datetime8">
               <a:rPr lang="en-US"/>
               <a:pPr/>
-              <a:t>5/18/2012 10:47 AM</a:t>
+              <a:t>5/18/2012 12:09 PM</a:t>
             </a:fld>
             <a:endParaRPr lang="en-US"/>
           </a:p>
@@ -412,7 +412,7 @@
             <a:fld id="{80DC343A-C7DB-48FF-A81F-D2EFF0311B91}" type="datetime8">
               <a:rPr lang="en-US"/>
               <a:pPr/>
-              <a:t>5/18/2012 10:47 AM</a:t>
+              <a:t>5/18/2012 12:09 PM</a:t>
             </a:fld>
             <a:endParaRPr lang="en-US"/>
           </a:p>
@@ -809,7 +809,7 @@
             <a:fld id="{FE6E691D-9AEE-4359-9871-4FF78429DC86}" type="datetime8">
               <a:rPr lang="en-US"/>
               <a:pPr/>
-              <a:t>5/18/2012 10:47 AM</a:t>
+              <a:t>5/18/2012 12:09 PM</a:t>
             </a:fld>
             <a:endParaRPr lang="en-US"/>
           </a:p>
@@ -934,7 +934,7 @@
             <a:fld id="{AB8F9170-F656-4E08-BDFE-37D587BF0909}" type="datetime8">
               <a:rPr lang="en-US"/>
               <a:pPr/>
-              <a:t>5/18/2012 10:47 AM</a:t>
+              <a:t>5/18/2012 12:09 PM</a:t>
             </a:fld>
             <a:endParaRPr lang="en-US"/>
           </a:p>
@@ -1126,7 +1126,7 @@
             <a:fld id="{80DC343A-C7DB-48FF-A81F-D2EFF0311B91}" type="datetime8">
               <a:rPr lang="en-US" smtClean="0"/>
               <a:pPr/>
-              <a:t>5/18/2012 10:47 AM</a:t>
+              <a:t>5/18/2012 12:09 PM</a:t>
             </a:fld>
             <a:endParaRPr lang="en-US"/>
           </a:p>
@@ -1250,15 +1250,7 @@
             </a:r>
             <a:r>
               <a:rPr lang="en-US" baseline="0" dirty="0" smtClean="0"/>
-              <a:t> </a:t>
-            </a:r>
-            <a:r>
-              <a:rPr lang="en-US" baseline="0" dirty="0" smtClean="0"/>
-              <a:t>too – </a:t>
-            </a:r>
-            <a:r>
-              <a:rPr lang="en-US" baseline="0" dirty="0" smtClean="0"/>
-              <a:t>take a look at </a:t>
+              <a:t> too – take a look at </a:t>
             </a:r>
             <a:r>
               <a:rPr lang="en-US" baseline="0" dirty="0" err="1" smtClean="0"/>
@@ -1266,11 +1258,7 @@
             </a:r>
             <a:r>
               <a:rPr lang="en-US" baseline="0" dirty="0" smtClean="0"/>
-              <a:t> </a:t>
-            </a:r>
-            <a:r>
-              <a:rPr lang="en-US" baseline="0" dirty="0" smtClean="0"/>
-              <a:t>deferred/promise </a:t>
+              <a:t> deferred/promise </a:t>
             </a:r>
             <a:r>
               <a:rPr lang="en-US" baseline="0" dirty="0" err="1" smtClean="0"/>
@@ -1278,11 +1266,7 @@
             </a:r>
             <a:r>
               <a:rPr lang="en-US" baseline="0" dirty="0" smtClean="0"/>
-              <a:t> – </a:t>
-            </a:r>
-            <a:r>
-              <a:rPr lang="en-US" baseline="0" dirty="0" smtClean="0"/>
-              <a:t>that simplify thinks in pretty much the same way that TPL does in .NET.</a:t>
+              <a:t> – that simplify thinks in pretty much the same way that TPL does in .NET.</a:t>
             </a:r>
           </a:p>
           <a:p>
@@ -1441,7 +1425,7 @@
             <a:fld id="{80DC343A-C7DB-48FF-A81F-D2EFF0311B91}" type="datetime8">
               <a:rPr lang="en-US" smtClean="0"/>
               <a:pPr/>
-              <a:t>5/18/2012 10:54 AM</a:t>
+              <a:t>5/18/2012 12:09 PM</a:t>
             </a:fld>
             <a:endParaRPr lang="en-US"/>
           </a:p>
@@ -1585,7 +1569,7 @@
             <a:fld id="{80DC343A-C7DB-48FF-A81F-D2EFF0311B91}" type="datetime8">
               <a:rPr lang="en-US" smtClean="0"/>
               <a:pPr/>
-              <a:t>5/18/2012 11:08 AM</a:t>
+              <a:t>5/18/2012 12:16 PM</a:t>
             </a:fld>
             <a:endParaRPr lang="en-US"/>
           </a:p>
@@ -1660,7 +1644,7 @@
             <a:fld id="{AB8F9170-F656-4E08-BDFE-37D587BF0909}" type="datetime8">
               <a:rPr lang="en-US"/>
               <a:pPr/>
-              <a:t>5/18/2012 10:47 AM</a:t>
+              <a:t>5/18/2012 12:09 PM</a:t>
             </a:fld>
             <a:endParaRPr lang="en-US"/>
           </a:p>
@@ -5316,13 +5300,7 @@
               <a:rPr lang="en-US" sz="2000" dirty="0" smtClean="0">
                 <a:ea typeface="ＭＳ Ｐゴシック" pitchFamily="34" charset="-128"/>
               </a:rPr>
-              <a:t> </a:t>
-            </a:r>
-            <a:r>
-              <a:rPr lang="en-US" sz="2000" dirty="0" smtClean="0">
-                <a:ea typeface="ＭＳ Ｐゴシック" pitchFamily="34" charset="-128"/>
-              </a:rPr>
-              <a:t>statement</a:t>
+              <a:t> statement</a:t>
             </a:r>
           </a:p>
           <a:p>
@@ -5345,9 +5323,6 @@
               </a:rPr>
               <a:t>TPL and Reactive Extension help</a:t>
             </a:r>
-            <a:endParaRPr lang="en-US" sz="2000" dirty="0" smtClean="0">
-              <a:ea typeface="ＭＳ Ｐゴシック" pitchFamily="34" charset="-128"/>
-            </a:endParaRPr>
           </a:p>
           <a:p>
             <a:endParaRPr lang="en-US" dirty="0"/>
@@ -5604,7 +5579,631 @@
           <a:bodyPr/>
           <a:lstStyle/>
           <a:p>
-            <a:endParaRPr lang="en-US" dirty="0"/>
+            <a:pPr>
+              <a:buNone/>
+            </a:pPr>
+            <a:r>
+              <a:rPr lang="en-US" sz="1600" dirty="0" smtClean="0">
+                <a:solidFill>
+                  <a:srgbClr val="0000FF"/>
+                </a:solidFill>
+                <a:highlight>
+                  <a:srgbClr val="FFFFFF"/>
+                </a:highlight>
+                <a:latin typeface="Consolas"/>
+              </a:rPr>
+              <a:t>public</a:t>
+            </a:r>
+            <a:r>
+              <a:rPr lang="en-US" sz="1600" dirty="0" smtClean="0">
+                <a:solidFill>
+                  <a:srgbClr val="000000"/>
+                </a:solidFill>
+                <a:highlight>
+                  <a:srgbClr val="FFFFFF"/>
+                </a:highlight>
+                <a:latin typeface="Consolas"/>
+              </a:rPr>
+              <a:t> </a:t>
+            </a:r>
+            <a:r>
+              <a:rPr lang="en-US" sz="1600" b="1" dirty="0" err="1" smtClean="0">
+                <a:solidFill>
+                  <a:srgbClr val="0000FF"/>
+                </a:solidFill>
+                <a:highlight>
+                  <a:srgbClr val="FFFFFF"/>
+                </a:highlight>
+                <a:latin typeface="Consolas"/>
+              </a:rPr>
+              <a:t>async</a:t>
+            </a:r>
+            <a:r>
+              <a:rPr lang="en-US" sz="1600" dirty="0" smtClean="0">
+                <a:solidFill>
+                  <a:srgbClr val="000000"/>
+                </a:solidFill>
+                <a:highlight>
+                  <a:srgbClr val="FFFFFF"/>
+                </a:highlight>
+                <a:latin typeface="Consolas"/>
+              </a:rPr>
+              <a:t> </a:t>
+            </a:r>
+            <a:r>
+              <a:rPr lang="en-US" sz="1600" dirty="0" smtClean="0">
+                <a:solidFill>
+                  <a:srgbClr val="2B91AF"/>
+                </a:solidFill>
+                <a:highlight>
+                  <a:srgbClr val="FFFFFF"/>
+                </a:highlight>
+                <a:latin typeface="Consolas"/>
+              </a:rPr>
+              <a:t>Task</a:t>
+            </a:r>
+            <a:r>
+              <a:rPr lang="en-US" sz="1600" dirty="0" smtClean="0">
+                <a:solidFill>
+                  <a:srgbClr val="000000"/>
+                </a:solidFill>
+                <a:highlight>
+                  <a:srgbClr val="FFFFFF"/>
+                </a:highlight>
+                <a:latin typeface="Consolas"/>
+              </a:rPr>
+              <a:t>&lt;</a:t>
+            </a:r>
+            <a:r>
+              <a:rPr lang="en-US" sz="1600" dirty="0" smtClean="0">
+                <a:solidFill>
+                  <a:srgbClr val="0000FF"/>
+                </a:solidFill>
+                <a:highlight>
+                  <a:srgbClr val="FFFFFF"/>
+                </a:highlight>
+                <a:latin typeface="Consolas"/>
+              </a:rPr>
+              <a:t>long</a:t>
+            </a:r>
+            <a:r>
+              <a:rPr lang="en-US" sz="1600" dirty="0" smtClean="0">
+                <a:solidFill>
+                  <a:srgbClr val="000000"/>
+                </a:solidFill>
+                <a:highlight>
+                  <a:srgbClr val="FFFFFF"/>
+                </a:highlight>
+                <a:latin typeface="Consolas"/>
+              </a:rPr>
+              <a:t>&gt; </a:t>
+            </a:r>
+            <a:r>
+              <a:rPr lang="en-US" sz="1600" dirty="0" err="1" smtClean="0">
+                <a:solidFill>
+                  <a:srgbClr val="000000"/>
+                </a:solidFill>
+                <a:highlight>
+                  <a:srgbClr val="FFFFFF"/>
+                </a:highlight>
+                <a:latin typeface="Consolas"/>
+              </a:rPr>
+              <a:t>GetLength</a:t>
+            </a:r>
+            <a:r>
+              <a:rPr lang="en-US" sz="1600" dirty="0" smtClean="0">
+                <a:solidFill>
+                  <a:srgbClr val="000000"/>
+                </a:solidFill>
+                <a:highlight>
+                  <a:srgbClr val="FFFFFF"/>
+                </a:highlight>
+                <a:latin typeface="Consolas"/>
+              </a:rPr>
+              <a:t>(</a:t>
+            </a:r>
+            <a:r>
+              <a:rPr lang="en-US" sz="1600" dirty="0" smtClean="0">
+                <a:solidFill>
+                  <a:srgbClr val="0000FF"/>
+                </a:solidFill>
+                <a:highlight>
+                  <a:srgbClr val="FFFFFF"/>
+                </a:highlight>
+                <a:latin typeface="Consolas"/>
+              </a:rPr>
+              <a:t>string</a:t>
+            </a:r>
+            <a:r>
+              <a:rPr lang="en-US" sz="1600" dirty="0" smtClean="0">
+                <a:solidFill>
+                  <a:srgbClr val="000000"/>
+                </a:solidFill>
+                <a:highlight>
+                  <a:srgbClr val="FFFFFF"/>
+                </a:highlight>
+                <a:latin typeface="Consolas"/>
+              </a:rPr>
+              <a:t> address)</a:t>
+            </a:r>
+          </a:p>
+          <a:p>
+            <a:pPr>
+              <a:buNone/>
+            </a:pPr>
+            <a:r>
+              <a:rPr lang="en-US" sz="1600" dirty="0" smtClean="0">
+                <a:solidFill>
+                  <a:srgbClr val="000000"/>
+                </a:solidFill>
+                <a:highlight>
+                  <a:srgbClr val="FFFFFF"/>
+                </a:highlight>
+                <a:latin typeface="Consolas"/>
+              </a:rPr>
+              <a:t>{</a:t>
+            </a:r>
+          </a:p>
+          <a:p>
+            <a:pPr>
+              <a:buNone/>
+            </a:pPr>
+            <a:r>
+              <a:rPr lang="en-US" sz="1600" dirty="0" smtClean="0">
+                <a:solidFill>
+                  <a:srgbClr val="000000"/>
+                </a:solidFill>
+                <a:highlight>
+                  <a:srgbClr val="FFFFFF"/>
+                </a:highlight>
+                <a:latin typeface="Consolas"/>
+              </a:rPr>
+              <a:t>    </a:t>
+            </a:r>
+            <a:r>
+              <a:rPr lang="en-US" sz="1600" dirty="0" smtClean="0">
+                <a:solidFill>
+                  <a:srgbClr val="0000FF"/>
+                </a:solidFill>
+                <a:highlight>
+                  <a:srgbClr val="FFFFFF"/>
+                </a:highlight>
+                <a:latin typeface="Consolas"/>
+              </a:rPr>
+              <a:t>try</a:t>
+            </a:r>
+            <a:endParaRPr lang="en-US" sz="1600" dirty="0" smtClean="0">
+              <a:solidFill>
+                <a:srgbClr val="000000"/>
+              </a:solidFill>
+              <a:highlight>
+                <a:srgbClr val="FFFFFF"/>
+              </a:highlight>
+              <a:latin typeface="Consolas"/>
+            </a:endParaRPr>
+          </a:p>
+          <a:p>
+            <a:pPr>
+              <a:buNone/>
+            </a:pPr>
+            <a:r>
+              <a:rPr lang="en-US" sz="1600" dirty="0" smtClean="0">
+                <a:solidFill>
+                  <a:srgbClr val="000000"/>
+                </a:solidFill>
+                <a:highlight>
+                  <a:srgbClr val="FFFFFF"/>
+                </a:highlight>
+                <a:latin typeface="Consolas"/>
+              </a:rPr>
+              <a:t>    {</a:t>
+            </a:r>
+          </a:p>
+          <a:p>
+            <a:pPr>
+              <a:buNone/>
+            </a:pPr>
+            <a:r>
+              <a:rPr lang="en-US" sz="1600" dirty="0" smtClean="0">
+                <a:solidFill>
+                  <a:srgbClr val="000000"/>
+                </a:solidFill>
+                <a:highlight>
+                  <a:srgbClr val="FFFFFF"/>
+                </a:highlight>
+                <a:latin typeface="Consolas"/>
+              </a:rPr>
+              <a:t>        </a:t>
+            </a:r>
+            <a:r>
+              <a:rPr lang="en-US" sz="1600" dirty="0" err="1" smtClean="0">
+                <a:solidFill>
+                  <a:srgbClr val="0000FF"/>
+                </a:solidFill>
+                <a:highlight>
+                  <a:srgbClr val="FFFFFF"/>
+                </a:highlight>
+                <a:latin typeface="Consolas"/>
+              </a:rPr>
+              <a:t>var</a:t>
+            </a:r>
+            <a:r>
+              <a:rPr lang="en-US" sz="1600" dirty="0" smtClean="0">
+                <a:solidFill>
+                  <a:srgbClr val="000000"/>
+                </a:solidFill>
+                <a:highlight>
+                  <a:srgbClr val="FFFFFF"/>
+                </a:highlight>
+                <a:latin typeface="Consolas"/>
+              </a:rPr>
+              <a:t> request = </a:t>
+            </a:r>
+            <a:r>
+              <a:rPr lang="en-US" sz="1600" dirty="0" err="1" smtClean="0">
+                <a:solidFill>
+                  <a:srgbClr val="2B91AF"/>
+                </a:solidFill>
+                <a:highlight>
+                  <a:srgbClr val="FFFFFF"/>
+                </a:highlight>
+                <a:latin typeface="Consolas"/>
+              </a:rPr>
+              <a:t>WebRequest</a:t>
+            </a:r>
+            <a:r>
+              <a:rPr lang="en-US" sz="1600" dirty="0" err="1" smtClean="0">
+                <a:solidFill>
+                  <a:srgbClr val="000000"/>
+                </a:solidFill>
+                <a:highlight>
+                  <a:srgbClr val="FFFFFF"/>
+                </a:highlight>
+                <a:latin typeface="Consolas"/>
+              </a:rPr>
+              <a:t>.CreateHttp</a:t>
+            </a:r>
+            <a:r>
+              <a:rPr lang="en-US" sz="1600" dirty="0" smtClean="0">
+                <a:solidFill>
+                  <a:srgbClr val="000000"/>
+                </a:solidFill>
+                <a:highlight>
+                  <a:srgbClr val="FFFFFF"/>
+                </a:highlight>
+                <a:latin typeface="Consolas"/>
+              </a:rPr>
+              <a:t>(address);</a:t>
+            </a:r>
+          </a:p>
+          <a:p>
+            <a:pPr>
+              <a:buNone/>
+            </a:pPr>
+            <a:r>
+              <a:rPr lang="en-US" sz="1600" dirty="0" smtClean="0">
+                <a:solidFill>
+                  <a:srgbClr val="000000"/>
+                </a:solidFill>
+                <a:highlight>
+                  <a:srgbClr val="FFFFFF"/>
+                </a:highlight>
+                <a:latin typeface="Consolas"/>
+              </a:rPr>
+              <a:t>        </a:t>
+            </a:r>
+            <a:r>
+              <a:rPr lang="en-US" sz="1600" dirty="0" err="1" smtClean="0">
+                <a:solidFill>
+                  <a:srgbClr val="0000FF"/>
+                </a:solidFill>
+                <a:highlight>
+                  <a:srgbClr val="FFFFFF"/>
+                </a:highlight>
+                <a:latin typeface="Consolas"/>
+              </a:rPr>
+              <a:t>var</a:t>
+            </a:r>
+            <a:r>
+              <a:rPr lang="en-US" sz="1600" dirty="0" smtClean="0">
+                <a:solidFill>
+                  <a:srgbClr val="000000"/>
+                </a:solidFill>
+                <a:highlight>
+                  <a:srgbClr val="FFFFFF"/>
+                </a:highlight>
+                <a:latin typeface="Consolas"/>
+              </a:rPr>
+              <a:t> response = </a:t>
+            </a:r>
+            <a:r>
+              <a:rPr lang="en-US" sz="1600" b="1" dirty="0" smtClean="0">
+                <a:solidFill>
+                  <a:srgbClr val="0000FF"/>
+                </a:solidFill>
+                <a:highlight>
+                  <a:srgbClr val="FFFFFF"/>
+                </a:highlight>
+                <a:latin typeface="Consolas"/>
+              </a:rPr>
+              <a:t>await</a:t>
+            </a:r>
+            <a:r>
+              <a:rPr lang="en-US" sz="1600" dirty="0" smtClean="0">
+                <a:solidFill>
+                  <a:srgbClr val="000000"/>
+                </a:solidFill>
+                <a:highlight>
+                  <a:srgbClr val="FFFFFF"/>
+                </a:highlight>
+                <a:latin typeface="Consolas"/>
+              </a:rPr>
+              <a:t> </a:t>
+            </a:r>
+            <a:r>
+              <a:rPr lang="en-US" sz="1600" dirty="0" err="1" smtClean="0">
+                <a:solidFill>
+                  <a:srgbClr val="000000"/>
+                </a:solidFill>
+                <a:highlight>
+                  <a:srgbClr val="FFFFFF"/>
+                </a:highlight>
+                <a:latin typeface="Consolas"/>
+              </a:rPr>
+              <a:t>request.GetResponseAsync</a:t>
+            </a:r>
+            <a:r>
+              <a:rPr lang="en-US" sz="1600" dirty="0" smtClean="0">
+                <a:solidFill>
+                  <a:srgbClr val="000000"/>
+                </a:solidFill>
+                <a:highlight>
+                  <a:srgbClr val="FFFFFF"/>
+                </a:highlight>
+                <a:latin typeface="Consolas"/>
+              </a:rPr>
+              <a:t>();</a:t>
+            </a:r>
+          </a:p>
+          <a:p>
+            <a:pPr>
+              <a:buNone/>
+            </a:pPr>
+            <a:r>
+              <a:rPr lang="en-US" sz="1600" dirty="0" smtClean="0">
+                <a:solidFill>
+                  <a:srgbClr val="000000"/>
+                </a:solidFill>
+                <a:highlight>
+                  <a:srgbClr val="FFFFFF"/>
+                </a:highlight>
+                <a:latin typeface="Consolas"/>
+              </a:rPr>
+              <a:t>        </a:t>
+            </a:r>
+            <a:r>
+              <a:rPr lang="en-US" sz="1600" dirty="0" smtClean="0">
+                <a:solidFill>
+                  <a:srgbClr val="0000FF"/>
+                </a:solidFill>
+                <a:highlight>
+                  <a:srgbClr val="FFFFFF"/>
+                </a:highlight>
+                <a:latin typeface="Consolas"/>
+              </a:rPr>
+              <a:t>return</a:t>
+            </a:r>
+            <a:r>
+              <a:rPr lang="en-US" sz="1600" dirty="0" smtClean="0">
+                <a:solidFill>
+                  <a:srgbClr val="000000"/>
+                </a:solidFill>
+                <a:highlight>
+                  <a:srgbClr val="FFFFFF"/>
+                </a:highlight>
+                <a:latin typeface="Consolas"/>
+              </a:rPr>
+              <a:t> </a:t>
+            </a:r>
+            <a:r>
+              <a:rPr lang="en-US" sz="1600" dirty="0" err="1" smtClean="0">
+                <a:solidFill>
+                  <a:srgbClr val="000000"/>
+                </a:solidFill>
+                <a:highlight>
+                  <a:srgbClr val="FFFFFF"/>
+                </a:highlight>
+                <a:latin typeface="Consolas"/>
+              </a:rPr>
+              <a:t>response.ContentLength</a:t>
+            </a:r>
+            <a:r>
+              <a:rPr lang="en-US" sz="1600" dirty="0" smtClean="0">
+                <a:solidFill>
+                  <a:srgbClr val="000000"/>
+                </a:solidFill>
+                <a:highlight>
+                  <a:srgbClr val="FFFFFF"/>
+                </a:highlight>
+                <a:latin typeface="Consolas"/>
+              </a:rPr>
+              <a:t>;</a:t>
+            </a:r>
+          </a:p>
+          <a:p>
+            <a:pPr>
+              <a:buNone/>
+            </a:pPr>
+            <a:r>
+              <a:rPr lang="en-US" sz="1600" dirty="0" smtClean="0">
+                <a:solidFill>
+                  <a:srgbClr val="000000"/>
+                </a:solidFill>
+                <a:highlight>
+                  <a:srgbClr val="FFFFFF"/>
+                </a:highlight>
+                <a:latin typeface="Consolas"/>
+              </a:rPr>
+              <a:t>    }</a:t>
+            </a:r>
+          </a:p>
+          <a:p>
+            <a:pPr>
+              <a:buNone/>
+            </a:pPr>
+            <a:r>
+              <a:rPr lang="en-US" sz="1600" dirty="0" smtClean="0">
+                <a:solidFill>
+                  <a:srgbClr val="000000"/>
+                </a:solidFill>
+                <a:highlight>
+                  <a:srgbClr val="FFFFFF"/>
+                </a:highlight>
+                <a:latin typeface="Consolas"/>
+              </a:rPr>
+              <a:t>    </a:t>
+            </a:r>
+            <a:r>
+              <a:rPr lang="en-US" sz="1600" dirty="0" smtClean="0">
+                <a:solidFill>
+                  <a:srgbClr val="0000FF"/>
+                </a:solidFill>
+                <a:highlight>
+                  <a:srgbClr val="FFFFFF"/>
+                </a:highlight>
+                <a:latin typeface="Consolas"/>
+              </a:rPr>
+              <a:t>catch</a:t>
+            </a:r>
+            <a:r>
+              <a:rPr lang="en-US" sz="1600" dirty="0" smtClean="0">
+                <a:solidFill>
+                  <a:srgbClr val="000000"/>
+                </a:solidFill>
+                <a:highlight>
+                  <a:srgbClr val="FFFFFF"/>
+                </a:highlight>
+                <a:latin typeface="Consolas"/>
+              </a:rPr>
+              <a:t> (</a:t>
+            </a:r>
+            <a:r>
+              <a:rPr lang="en-US" sz="1600" dirty="0" smtClean="0">
+                <a:solidFill>
+                  <a:srgbClr val="2B91AF"/>
+                </a:solidFill>
+                <a:highlight>
+                  <a:srgbClr val="FFFFFF"/>
+                </a:highlight>
+                <a:latin typeface="Consolas"/>
+              </a:rPr>
+              <a:t>Exception</a:t>
+            </a:r>
+            <a:r>
+              <a:rPr lang="en-US" sz="1600" dirty="0" smtClean="0">
+                <a:solidFill>
+                  <a:srgbClr val="000000"/>
+                </a:solidFill>
+                <a:highlight>
+                  <a:srgbClr val="FFFFFF"/>
+                </a:highlight>
+                <a:latin typeface="Consolas"/>
+              </a:rPr>
+              <a:t>)</a:t>
+            </a:r>
+          </a:p>
+          <a:p>
+            <a:pPr>
+              <a:buNone/>
+            </a:pPr>
+            <a:r>
+              <a:rPr lang="en-US" sz="1600" dirty="0" smtClean="0">
+                <a:solidFill>
+                  <a:srgbClr val="000000"/>
+                </a:solidFill>
+                <a:highlight>
+                  <a:srgbClr val="FFFFFF"/>
+                </a:highlight>
+                <a:latin typeface="Consolas"/>
+              </a:rPr>
+              <a:t>    {</a:t>
+            </a:r>
+          </a:p>
+          <a:p>
+            <a:pPr>
+              <a:buNone/>
+            </a:pPr>
+            <a:r>
+              <a:rPr lang="en-US" sz="1600" dirty="0" smtClean="0">
+                <a:solidFill>
+                  <a:srgbClr val="000000"/>
+                </a:solidFill>
+                <a:highlight>
+                  <a:srgbClr val="FFFFFF"/>
+                </a:highlight>
+                <a:latin typeface="Consolas"/>
+              </a:rPr>
+              <a:t>        </a:t>
+            </a:r>
+            <a:r>
+              <a:rPr lang="en-US" sz="1600" dirty="0" smtClean="0">
+                <a:solidFill>
+                  <a:srgbClr val="0000FF"/>
+                </a:solidFill>
+                <a:highlight>
+                  <a:srgbClr val="FFFFFF"/>
+                </a:highlight>
+                <a:latin typeface="Consolas"/>
+              </a:rPr>
+              <a:t>return</a:t>
+            </a:r>
+            <a:r>
+              <a:rPr lang="en-US" sz="1600" dirty="0" smtClean="0">
+                <a:solidFill>
+                  <a:srgbClr val="000000"/>
+                </a:solidFill>
+                <a:highlight>
+                  <a:srgbClr val="FFFFFF"/>
+                </a:highlight>
+                <a:latin typeface="Consolas"/>
+              </a:rPr>
+              <a:t> -1;</a:t>
+            </a:r>
+          </a:p>
+          <a:p>
+            <a:pPr>
+              <a:buNone/>
+            </a:pPr>
+            <a:r>
+              <a:rPr lang="en-US" sz="1600" dirty="0" smtClean="0">
+                <a:solidFill>
+                  <a:srgbClr val="000000"/>
+                </a:solidFill>
+                <a:highlight>
+                  <a:srgbClr val="FFFFFF"/>
+                </a:highlight>
+                <a:latin typeface="Consolas"/>
+              </a:rPr>
+              <a:t>    }</a:t>
+            </a:r>
+          </a:p>
+          <a:p>
+            <a:pPr>
+              <a:buNone/>
+            </a:pPr>
+            <a:r>
+              <a:rPr lang="en-US" sz="1600" dirty="0" smtClean="0">
+                <a:solidFill>
+                  <a:srgbClr val="000000"/>
+                </a:solidFill>
+                <a:highlight>
+                  <a:srgbClr val="FFFFFF"/>
+                </a:highlight>
+                <a:latin typeface="Consolas"/>
+              </a:rPr>
+              <a:t>}</a:t>
+            </a:r>
+            <a:endParaRPr lang="en-US" sz="1600" dirty="0"/>
           </a:p>
         </p:txBody>
       </p:sp>
@@ -6798,7 +7397,12 @@
 </file>
 
 <file path=customXml/item1.xml><?xml version="1.0" encoding="utf-8"?>
-<LongProperties xmlns="http://schemas.microsoft.com/office/2006/metadata/longProperties"/>
+<?mso-contentType ?>
+<FormTemplates xmlns="http://schemas.microsoft.com/sharepoint/v3/contenttype/forms">
+  <Display>DocumentLibraryForm</Display>
+  <Edit>DocumentLibraryForm</Edit>
+  <New>DocumentLibraryForm</New>
+</FormTemplates>
 </file>
 
 <file path=customXml/item2.xml><?xml version="1.0" encoding="utf-8"?>
@@ -6862,12 +7466,7 @@
 </file>
 
 <file path=customXml/item3.xml><?xml version="1.0" encoding="utf-8"?>
-<?mso-contentType ?>
-<FormTemplates xmlns="http://schemas.microsoft.com/sharepoint/v3/contenttype/forms">
-  <Display>DocumentLibraryForm</Display>
-  <Edit>DocumentLibraryForm</Edit>
-  <New>DocumentLibraryForm</New>
-</FormTemplates>
+<LongProperties xmlns="http://schemas.microsoft.com/office/2006/metadata/longProperties"/>
 </file>
 
 <file path=customXml/item4.xml><?xml version="1.0" encoding="utf-8"?>
@@ -6879,9 +7478,9 @@
 </file>
 
 <file path=customXml/itemProps1.xml><?xml version="1.0" encoding="utf-8"?>
-<ds:datastoreItem xmlns:ds="http://schemas.openxmlformats.org/officeDocument/2006/customXml" ds:itemID="{9062B6A4-46AE-44BC-B602-351B8E15754D}">
+<ds:datastoreItem xmlns:ds="http://schemas.openxmlformats.org/officeDocument/2006/customXml" ds:itemID="{D3274669-787B-4EFD-8872-69E7B499937A}">
   <ds:schemaRefs>
-    <ds:schemaRef ds:uri="http://schemas.microsoft.com/office/2006/metadata/longProperties"/>
+    <ds:schemaRef ds:uri="http://schemas.microsoft.com/sharepoint/v3/contenttype/forms"/>
   </ds:schemaRefs>
 </ds:datastoreItem>
 </file>
@@ -6904,9 +7503,9 @@
 </file>
 
 <file path=customXml/itemProps3.xml><?xml version="1.0" encoding="utf-8"?>
-<ds:datastoreItem xmlns:ds="http://schemas.openxmlformats.org/officeDocument/2006/customXml" ds:itemID="{D3274669-787B-4EFD-8872-69E7B499937A}">
+<ds:datastoreItem xmlns:ds="http://schemas.openxmlformats.org/officeDocument/2006/customXml" ds:itemID="{9062B6A4-46AE-44BC-B602-351B8E15754D}">
   <ds:schemaRefs>
-    <ds:schemaRef ds:uri="http://schemas.microsoft.com/sharepoint/v3/contenttype/forms"/>
+    <ds:schemaRef ds:uri="http://schemas.microsoft.com/office/2006/metadata/longProperties"/>
   </ds:schemaRefs>
 </ds:datastoreItem>
 </file>

</xml_diff>

<commit_message>
added page about performance
</commit_message>
<xml_diff>
--- a/C# 5.pptx
+++ b/C# 5.pptx
@@ -5,10 +5,10 @@
     <p:sldMasterId id="2147483654" r:id="rId5"/>
   </p:sldMasterIdLst>
   <p:notesMasterIdLst>
-    <p:notesMasterId r:id="rId12"/>
+    <p:notesMasterId r:id="rId13"/>
   </p:notesMasterIdLst>
   <p:handoutMasterIdLst>
-    <p:handoutMasterId r:id="rId13"/>
+    <p:handoutMasterId r:id="rId14"/>
   </p:handoutMasterIdLst>
   <p:sldIdLst>
     <p:sldId id="371" r:id="rId6"/>
@@ -16,7 +16,8 @@
     <p:sldId id="374" r:id="rId8"/>
     <p:sldId id="375" r:id="rId9"/>
     <p:sldId id="376" r:id="rId10"/>
-    <p:sldId id="372" r:id="rId11"/>
+    <p:sldId id="377" r:id="rId11"/>
+    <p:sldId id="372" r:id="rId12"/>
   </p:sldIdLst>
   <p:sldSz cx="9144000" cy="6858000" type="screen4x3"/>
   <p:notesSz cx="7061200" cy="9398000"/>
@@ -1401,7 +1402,11 @@
             </a:r>
             <a:r>
               <a:rPr lang="en-US" baseline="0" dirty="0" err="1" smtClean="0"/>
-              <a:t>ExceptionHandling</a:t>
+              <a:t>DownloadPage.BeingEnd</a:t>
+            </a:r>
+            <a:r>
+              <a:rPr lang="en-US" baseline="0" smtClean="0"/>
+              <a:t>/ DownloadPage.Re</a:t>
             </a:r>
             <a:endParaRPr lang="en-US" dirty="0"/>
           </a:p>
@@ -1541,12 +1546,71 @@
           <a:p>
             <a:r>
               <a:rPr lang="en-US" baseline="0" dirty="0" smtClean="0"/>
-              <a:t>The implementation allows some extensions to be made – we’ll see </a:t>
-            </a:r>
-            <a:r>
-              <a:rPr lang="en-US" baseline="0" smtClean="0"/>
-              <a:t>that later</a:t>
-            </a:r>
+              <a:t>The implementation </a:t>
+            </a:r>
+            <a:r>
+              <a:rPr lang="en-US" baseline="0" dirty="0" smtClean="0"/>
+              <a:t>allows </a:t>
+            </a:r>
+            <a:r>
+              <a:rPr lang="en-US" baseline="0" dirty="0" smtClean="0"/>
+              <a:t>some extensions to be made – we’ll see that </a:t>
+            </a:r>
+            <a:r>
+              <a:rPr lang="en-US" baseline="0" dirty="0" smtClean="0"/>
+              <a:t>later</a:t>
+            </a:r>
+          </a:p>
+          <a:p>
+            <a:endParaRPr lang="en-US" baseline="0" dirty="0" smtClean="0"/>
+          </a:p>
+          <a:p>
+            <a:r>
+              <a:rPr lang="en-US" baseline="0" dirty="0" smtClean="0"/>
+              <a:t>You can await anything that Returns Task</a:t>
+            </a:r>
+          </a:p>
+          <a:p>
+            <a:endParaRPr lang="en-US" baseline="0" dirty="0" smtClean="0"/>
+          </a:p>
+          <a:p>
+            <a:r>
+              <a:rPr lang="en-US" baseline="0" dirty="0" smtClean="0"/>
+              <a:t>The necessary synchronization context passing is done under the cover</a:t>
+            </a:r>
+          </a:p>
+          <a:p>
+            <a:endParaRPr lang="en-US" baseline="0" dirty="0" smtClean="0"/>
+          </a:p>
+          <a:p>
+            <a:pPr marL="58738" marR="0" indent="-58738" algn="l" defTabSz="914400" rtl="0" eaLnBrk="0" fontAlgn="base" latinLnBrk="0" hangingPunct="0">
+              <a:lnSpc>
+                <a:spcPct val="100000"/>
+              </a:lnSpc>
+              <a:spcBef>
+                <a:spcPct val="30000"/>
+              </a:spcBef>
+              <a:spcAft>
+                <a:spcPct val="0"/>
+              </a:spcAft>
+              <a:buClrTx/>
+              <a:buSzPct val="90000"/>
+              <a:buFont typeface="Times" charset="0"/>
+              <a:buChar char="•"/>
+              <a:tabLst/>
+              <a:defRPr/>
+            </a:pPr>
+            <a:r>
+              <a:rPr lang="en-US" baseline="0" dirty="0" smtClean="0"/>
+              <a:t>Code sample </a:t>
+            </a:r>
+            <a:r>
+              <a:rPr lang="en-US" baseline="0" dirty="0" err="1" smtClean="0"/>
+              <a:t>DownloadPage.Async</a:t>
+            </a:r>
+            <a:endParaRPr lang="en-US" dirty="0" smtClean="0"/>
+          </a:p>
+          <a:p>
             <a:endParaRPr lang="en-US" dirty="0"/>
           </a:p>
         </p:txBody>
@@ -1569,7 +1633,7 @@
             <a:fld id="{80DC343A-C7DB-48FF-A81F-D2EFF0311B91}" type="datetime8">
               <a:rPr lang="en-US" smtClean="0"/>
               <a:pPr/>
-              <a:t>5/18/2012 12:16 PM</a:t>
+              <a:t>5/18/2012 12:17 PM</a:t>
             </a:fld>
             <a:endParaRPr lang="en-US"/>
           </a:p>
@@ -1626,6 +1690,285 @@
       </p:grpSpPr>
       <p:sp>
         <p:nvSpPr>
+          <p:cNvPr id="2" name="Slide Image Placeholder 1"/>
+          <p:cNvSpPr>
+            <a:spLocks noGrp="1" noRot="1" noChangeAspect="1"/>
+          </p:cNvSpPr>
+          <p:nvPr>
+            <p:ph type="sldImg"/>
+          </p:nvPr>
+        </p:nvSpPr>
+        <p:spPr/>
+      </p:sp>
+      <p:sp>
+        <p:nvSpPr>
+          <p:cNvPr id="3" name="Notes Placeholder 2"/>
+          <p:cNvSpPr>
+            <a:spLocks noGrp="1"/>
+          </p:cNvSpPr>
+          <p:nvPr>
+            <p:ph type="body" idx="1"/>
+          </p:nvPr>
+        </p:nvSpPr>
+        <p:spPr/>
+        <p:txBody>
+          <a:bodyPr>
+            <a:normAutofit/>
+          </a:bodyPr>
+          <a:lstStyle/>
+          <a:p>
+            <a:pPr marL="58738" marR="0" lvl="1" indent="-58738" algn="l" defTabSz="914400" rtl="0" eaLnBrk="0" fontAlgn="base" latinLnBrk="0" hangingPunct="0">
+              <a:lnSpc>
+                <a:spcPct val="100000"/>
+              </a:lnSpc>
+              <a:spcBef>
+                <a:spcPct val="30000"/>
+              </a:spcBef>
+              <a:spcAft>
+                <a:spcPct val="0"/>
+              </a:spcAft>
+              <a:buClrTx/>
+              <a:buSzPct val="90000"/>
+              <a:buFont typeface="Times" charset="0"/>
+              <a:buChar char="•"/>
+              <a:tabLst/>
+              <a:defRPr/>
+            </a:pPr>
+            <a:r>
+              <a:rPr lang="en-US" dirty="0" smtClean="0"/>
+              <a:t>Asynchronous != parallel </a:t>
+            </a:r>
+          </a:p>
+          <a:p>
+            <a:pPr>
+              <a:buNone/>
+            </a:pPr>
+            <a:r>
+              <a:rPr lang="en-US" dirty="0" smtClean="0"/>
+              <a:t>The fact that method/</a:t>
+            </a:r>
+            <a:r>
+              <a:rPr lang="en-US" dirty="0" err="1" smtClean="0"/>
+              <a:t>api</a:t>
+            </a:r>
+            <a:r>
+              <a:rPr lang="en-US" baseline="0" dirty="0" smtClean="0"/>
+              <a:t> is asynchronous does not imply that program using it is multithreaded, in fact there may be just one thread running at a time or there can may be only 1 thread at all</a:t>
+            </a:r>
+          </a:p>
+          <a:p>
+            <a:pPr>
+              <a:buNone/>
+            </a:pPr>
+            <a:r>
+              <a:rPr lang="en-US" baseline="0" dirty="0" smtClean="0"/>
+              <a:t>We all know this – in </a:t>
+            </a:r>
+            <a:r>
+              <a:rPr lang="en-US" baseline="0" dirty="0" err="1" smtClean="0"/>
+              <a:t>Javascript</a:t>
+            </a:r>
+            <a:r>
+              <a:rPr lang="en-US" baseline="0" dirty="0" smtClean="0"/>
+              <a:t> there is only one thread – but all </a:t>
+            </a:r>
+            <a:r>
+              <a:rPr lang="en-US" baseline="0" dirty="0" err="1" smtClean="0"/>
+              <a:t>ajax</a:t>
+            </a:r>
+            <a:r>
+              <a:rPr lang="en-US" baseline="0" dirty="0" smtClean="0"/>
+              <a:t> calls are asynchronous (event loop)</a:t>
+            </a:r>
+          </a:p>
+          <a:p>
+            <a:pPr>
+              <a:buNone/>
+            </a:pPr>
+            <a:endParaRPr lang="en-US" baseline="0" dirty="0" smtClean="0"/>
+          </a:p>
+          <a:p>
+            <a:pPr>
+              <a:buNone/>
+            </a:pPr>
+            <a:r>
+              <a:rPr lang="en-US" baseline="0" dirty="0" smtClean="0"/>
+              <a:t>Web Applications – if we want to improve </a:t>
+            </a:r>
+            <a:r>
+              <a:rPr lang="en-US" baseline="0" dirty="0" err="1" smtClean="0"/>
+              <a:t>througphut</a:t>
+            </a:r>
+            <a:r>
+              <a:rPr lang="en-US" baseline="0" dirty="0" smtClean="0"/>
+              <a:t> of our asp.net application we may be tempted to perform some operations in parallel (TPL, Parallel LINQ) but it may actually make things worse – thread contention. Most of the web application are IO bound which means that the majority of CPU time is spend waiting/reading/writing for/from/to file system and network.</a:t>
+            </a:r>
+          </a:p>
+          <a:p>
+            <a:pPr>
+              <a:buNone/>
+            </a:pPr>
+            <a:r>
+              <a:rPr lang="en-US" baseline="0" dirty="0" smtClean="0"/>
+              <a:t>If we are in such situation the first thing we should take a look at is how to utilize Windows IO Completion Ports that are dedicated mechanism for IO operations – most of the .NET </a:t>
+            </a:r>
+            <a:r>
+              <a:rPr lang="en-US" baseline="0" dirty="0" err="1" smtClean="0"/>
+              <a:t>async</a:t>
+            </a:r>
+            <a:r>
+              <a:rPr lang="en-US" baseline="0" dirty="0" smtClean="0"/>
+              <a:t> </a:t>
+            </a:r>
+            <a:r>
+              <a:rPr lang="en-US" baseline="0" dirty="0" err="1" smtClean="0"/>
+              <a:t>apis</a:t>
+            </a:r>
+            <a:r>
+              <a:rPr lang="en-US" baseline="0" dirty="0" smtClean="0"/>
+              <a:t> call them under the cover.</a:t>
+            </a:r>
+          </a:p>
+          <a:p>
+            <a:pPr>
+              <a:buNone/>
+            </a:pPr>
+            <a:endParaRPr lang="en-US" baseline="0" dirty="0" smtClean="0"/>
+          </a:p>
+          <a:p>
+            <a:pPr>
+              <a:buNone/>
+            </a:pPr>
+            <a:r>
+              <a:rPr lang="en-US" baseline="0" dirty="0" smtClean="0"/>
+              <a:t>The new </a:t>
+            </a:r>
+            <a:r>
+              <a:rPr lang="en-US" baseline="0" dirty="0" err="1" smtClean="0"/>
+              <a:t>WinRT</a:t>
+            </a:r>
+            <a:r>
+              <a:rPr lang="en-US" baseline="0" dirty="0" smtClean="0"/>
+              <a:t> developer guideline states that if an </a:t>
+            </a:r>
+            <a:r>
+              <a:rPr lang="en-US" baseline="0" dirty="0" err="1" smtClean="0"/>
+              <a:t>api</a:t>
+            </a:r>
+            <a:r>
+              <a:rPr lang="en-US" baseline="0" dirty="0" smtClean="0"/>
+              <a:t> call can take more than 50ms to complete it should be asynchronous</a:t>
+            </a:r>
+          </a:p>
+          <a:p>
+            <a:pPr>
+              <a:buNone/>
+            </a:pPr>
+            <a:endParaRPr lang="en-US" baseline="0" dirty="0" smtClean="0"/>
+          </a:p>
+          <a:p>
+            <a:pPr>
+              <a:buNone/>
+            </a:pPr>
+            <a:endParaRPr lang="en-US" baseline="0" dirty="0" smtClean="0"/>
+          </a:p>
+          <a:p>
+            <a:pPr>
+              <a:buNone/>
+            </a:pPr>
+            <a:r>
+              <a:rPr lang="en-US" baseline="0" dirty="0" smtClean="0"/>
+              <a:t>Sample code – </a:t>
+            </a:r>
+            <a:r>
+              <a:rPr lang="en-US" baseline="0" dirty="0" err="1" smtClean="0"/>
+              <a:t>Preformance</a:t>
+            </a:r>
+            <a:endParaRPr lang="en-US" baseline="0" dirty="0" smtClean="0"/>
+          </a:p>
+          <a:p>
+            <a:pPr>
+              <a:buNone/>
+            </a:pPr>
+            <a:endParaRPr lang="en-US" baseline="0" dirty="0" smtClean="0"/>
+          </a:p>
+        </p:txBody>
+      </p:sp>
+      <p:sp>
+        <p:nvSpPr>
+          <p:cNvPr id="4" name="Date Placeholder 3"/>
+          <p:cNvSpPr>
+            <a:spLocks noGrp="1"/>
+          </p:cNvSpPr>
+          <p:nvPr>
+            <p:ph type="dt" idx="10"/>
+          </p:nvPr>
+        </p:nvSpPr>
+        <p:spPr/>
+        <p:txBody>
+          <a:bodyPr/>
+          <a:lstStyle/>
+          <a:p>
+            <a:fld id="{80DC343A-C7DB-48FF-A81F-D2EFF0311B91}" type="datetime8">
+              <a:rPr lang="en-US" smtClean="0"/>
+              <a:pPr/>
+              <a:t>5/18/2012 12:57 PM</a:t>
+            </a:fld>
+            <a:endParaRPr lang="en-US"/>
+          </a:p>
+        </p:txBody>
+      </p:sp>
+      <p:sp>
+        <p:nvSpPr>
+          <p:cNvPr id="5" name="Slide Number Placeholder 4"/>
+          <p:cNvSpPr>
+            <a:spLocks noGrp="1"/>
+          </p:cNvSpPr>
+          <p:nvPr>
+            <p:ph type="sldNum" sz="quarter" idx="11"/>
+          </p:nvPr>
+        </p:nvSpPr>
+        <p:spPr/>
+        <p:txBody>
+          <a:bodyPr/>
+          <a:lstStyle/>
+          <a:p>
+            <a:fld id="{A0C6CE09-155B-4DAE-A37A-B074B6B02DD4}" type="slidenum">
+              <a:rPr lang="en-US" smtClean="0"/>
+              <a:pPr/>
+              <a:t>6</a:t>
+            </a:fld>
+            <a:endParaRPr lang="en-US"/>
+          </a:p>
+        </p:txBody>
+      </p:sp>
+    </p:spTree>
+  </p:cSld>
+  <p:clrMapOvr>
+    <a:masterClrMapping/>
+  </p:clrMapOvr>
+</p:notes>
+</file>
+
+<file path=ppt/notesSlides/notesSlide7.xml><?xml version="1.0" encoding="utf-8"?>
+<p:notes xmlns:a="http://schemas.openxmlformats.org/drawingml/2006/main" xmlns:r="http://schemas.openxmlformats.org/officeDocument/2006/relationships" xmlns:p="http://schemas.openxmlformats.org/presentationml/2006/main">
+  <p:cSld>
+    <p:spTree>
+      <p:nvGrpSpPr>
+        <p:cNvPr id="1" name=""/>
+        <p:cNvGrpSpPr/>
+        <p:nvPr/>
+      </p:nvGrpSpPr>
+      <p:grpSpPr>
+        <a:xfrm>
+          <a:off x="0" y="0"/>
+          <a:ext cx="0" cy="0"/>
+          <a:chOff x="0" y="0"/>
+          <a:chExt cx="0" cy="0"/>
+        </a:xfrm>
+      </p:grpSpPr>
+      <p:sp>
+        <p:nvSpPr>
           <p:cNvPr id="18433" name="Rectangle 3"/>
           <p:cNvSpPr>
             <a:spLocks noGrp="1" noChangeArrowheads="1"/>
@@ -1670,7 +2013,7 @@
             <a:fld id="{E73A29F1-A36F-4C0F-8D5B-36FFE114B347}" type="slidenum">
               <a:rPr lang="en-US"/>
               <a:pPr/>
-              <a:t>6</a:t>
+              <a:t>7</a:t>
             </a:fld>
             <a:endParaRPr lang="en-US"/>
           </a:p>
@@ -6258,6 +6601,164 @@
       </p:grpSpPr>
       <p:sp>
         <p:nvSpPr>
+          <p:cNvPr id="2" name="Title 1"/>
+          <p:cNvSpPr>
+            <a:spLocks noGrp="1"/>
+          </p:cNvSpPr>
+          <p:nvPr>
+            <p:ph type="title"/>
+          </p:nvPr>
+        </p:nvSpPr>
+        <p:spPr/>
+        <p:txBody>
+          <a:bodyPr/>
+          <a:lstStyle/>
+          <a:p>
+            <a:r>
+              <a:rPr lang="en-US" dirty="0" smtClean="0"/>
+              <a:t>Why does it matter</a:t>
+            </a:r>
+            <a:endParaRPr lang="en-US" dirty="0"/>
+          </a:p>
+        </p:txBody>
+      </p:sp>
+      <p:sp>
+        <p:nvSpPr>
+          <p:cNvPr id="3" name="Content Placeholder 2"/>
+          <p:cNvSpPr>
+            <a:spLocks noGrp="1"/>
+          </p:cNvSpPr>
+          <p:nvPr>
+            <p:ph idx="1"/>
+          </p:nvPr>
+        </p:nvSpPr>
+        <p:spPr/>
+        <p:txBody>
+          <a:bodyPr/>
+          <a:lstStyle/>
+          <a:p>
+            <a:r>
+              <a:rPr lang="en-US" dirty="0" smtClean="0"/>
+              <a:t>Performance - Responsiveness</a:t>
+            </a:r>
+          </a:p>
+          <a:p>
+            <a:pPr lvl="1"/>
+            <a:r>
+              <a:rPr lang="en-US" dirty="0" smtClean="0"/>
+              <a:t>Asynchronous != parallel </a:t>
+            </a:r>
+          </a:p>
+          <a:p>
+            <a:pPr lvl="1"/>
+            <a:r>
+              <a:rPr lang="en-US" dirty="0" smtClean="0"/>
+              <a:t>Blocking UI thread is always a bad thing</a:t>
+            </a:r>
+          </a:p>
+          <a:p>
+            <a:pPr lvl="1">
+              <a:buNone/>
+            </a:pPr>
+            <a:endParaRPr lang="en-US" dirty="0" smtClean="0"/>
+          </a:p>
+          <a:p>
+            <a:r>
+              <a:rPr lang="en-US" dirty="0" smtClean="0"/>
+              <a:t>Resource usage</a:t>
+            </a:r>
+          </a:p>
+          <a:p>
+            <a:pPr lvl="1"/>
+            <a:r>
+              <a:rPr lang="en-US" dirty="0" err="1" smtClean="0"/>
+              <a:t>ThreadPool</a:t>
+            </a:r>
+            <a:r>
+              <a:rPr lang="en-US" dirty="0" smtClean="0"/>
+              <a:t> has a limit on thread count – increasing it may not help </a:t>
+            </a:r>
+          </a:p>
+          <a:p>
+            <a:pPr lvl="1"/>
+            <a:r>
+              <a:rPr lang="en-US" dirty="0" smtClean="0"/>
+              <a:t>Windows has features dedicated to IO operations (remote call, database query, reading a file) </a:t>
+            </a:r>
+          </a:p>
+          <a:p>
+            <a:pPr lvl="1"/>
+            <a:r>
+              <a:rPr lang="en-US" dirty="0" smtClean="0"/>
+              <a:t>You may be able to serve many more requests using </a:t>
+            </a:r>
+            <a:r>
+              <a:rPr lang="en-US" dirty="0" err="1" smtClean="0"/>
+              <a:t>async</a:t>
+            </a:r>
+            <a:r>
+              <a:rPr lang="en-US" dirty="0" smtClean="0"/>
+              <a:t> </a:t>
+            </a:r>
+            <a:r>
+              <a:rPr lang="en-US" dirty="0" err="1" smtClean="0"/>
+              <a:t>api’s</a:t>
+            </a:r>
+            <a:endParaRPr lang="en-US" dirty="0"/>
+          </a:p>
+        </p:txBody>
+      </p:sp>
+      <p:sp>
+        <p:nvSpPr>
+          <p:cNvPr id="4" name="Slide Number Placeholder 3"/>
+          <p:cNvSpPr>
+            <a:spLocks noGrp="1"/>
+          </p:cNvSpPr>
+          <p:nvPr>
+            <p:ph type="sldNum" sz="quarter" idx="10"/>
+          </p:nvPr>
+        </p:nvSpPr>
+        <p:spPr/>
+        <p:txBody>
+          <a:bodyPr/>
+          <a:lstStyle/>
+          <a:p>
+            <a:fld id="{5BA08351-1517-4DDD-96C2-B53AED81A9DF}" type="slidenum">
+              <a:rPr lang="en-US" smtClean="0"/>
+              <a:pPr/>
+              <a:t>6</a:t>
+            </a:fld>
+            <a:endParaRPr lang="en-US"/>
+          </a:p>
+        </p:txBody>
+      </p:sp>
+    </p:spTree>
+  </p:cSld>
+  <p:clrMapOvr>
+    <a:masterClrMapping/>
+  </p:clrMapOvr>
+</p:sld>
+</file>
+
+<file path=ppt/slides/slide7.xml><?xml version="1.0" encoding="utf-8"?>
+<p:sld xmlns:a="http://schemas.openxmlformats.org/drawingml/2006/main" xmlns:r="http://schemas.openxmlformats.org/officeDocument/2006/relationships" xmlns:p="http://schemas.openxmlformats.org/presentationml/2006/main">
+  <p:cSld>
+    <p:spTree>
+      <p:nvGrpSpPr>
+        <p:cNvPr id="1" name=""/>
+        <p:cNvGrpSpPr/>
+        <p:nvPr/>
+      </p:nvGrpSpPr>
+      <p:grpSpPr>
+        <a:xfrm>
+          <a:off x="0" y="0"/>
+          <a:ext cx="0" cy="0"/>
+          <a:chOff x="0" y="0"/>
+          <a:chExt cx="0" cy="0"/>
+        </a:xfrm>
+      </p:grpSpPr>
+      <p:sp>
+        <p:nvSpPr>
           <p:cNvPr id="17409" name="Slide Number Placeholder 3"/>
           <p:cNvSpPr>
             <a:spLocks noGrp="1"/>
@@ -6276,7 +6777,7 @@
             <a:fld id="{B8923B82-4FEA-4C63-961B-70B71B12A787}" type="slidenum">
               <a:rPr lang="en-US"/>
               <a:pPr/>
-              <a:t>6</a:t>
+              <a:t>7</a:t>
             </a:fld>
             <a:endParaRPr lang="en-US"/>
           </a:p>

</xml_diff>

<commit_message>
moving from tools to benchmark
</commit_message>
<xml_diff>
--- a/C# 5.pptx
+++ b/C# 5.pptx
@@ -5,10 +5,10 @@
     <p:sldMasterId id="2147483654" r:id="rId5"/>
   </p:sldMasterIdLst>
   <p:notesMasterIdLst>
-    <p:notesMasterId r:id="rId13"/>
+    <p:notesMasterId r:id="rId14"/>
   </p:notesMasterIdLst>
   <p:handoutMasterIdLst>
-    <p:handoutMasterId r:id="rId14"/>
+    <p:handoutMasterId r:id="rId15"/>
   </p:handoutMasterIdLst>
   <p:sldIdLst>
     <p:sldId id="371" r:id="rId6"/>
@@ -18,6 +18,7 @@
     <p:sldId id="376" r:id="rId10"/>
     <p:sldId id="377" r:id="rId11"/>
     <p:sldId id="372" r:id="rId12"/>
+    <p:sldId id="378" r:id="rId13"/>
   </p:sldIdLst>
   <p:sldSz cx="9144000" cy="6858000" type="screen4x3"/>
   <p:notesSz cx="7061200" cy="9398000"/>
@@ -1901,7 +1902,19 @@
             </a:r>
             <a:r>
               <a:rPr lang="en-US" baseline="0" dirty="0" smtClean="0"/>
-              <a:t> -n 100 -c 100 http://localhost:62562/Expensive/Execute</a:t>
+              <a:t> -n 100 -c </a:t>
+            </a:r>
+            <a:r>
+              <a:rPr lang="pl-PL" baseline="0" dirty="0" smtClean="0"/>
+              <a:t>75</a:t>
+            </a:r>
+            <a:r>
+              <a:rPr lang="en-US" baseline="0" dirty="0" smtClean="0"/>
+              <a:t> </a:t>
+            </a:r>
+            <a:r>
+              <a:rPr lang="en-US" baseline="0" dirty="0" smtClean="0"/>
+              <a:t>http://localhost:62562/Expensive/Execute</a:t>
             </a:r>
           </a:p>
           <a:p>
@@ -1909,7 +1922,7 @@
               <a:buNone/>
             </a:pPr>
             <a:r>
-              <a:rPr lang="en-US" baseline="0" smtClean="0"/>
+              <a:rPr lang="en-US" baseline="0" dirty="0" smtClean="0"/>
               <a:t>Asynchronous</a:t>
             </a:r>
           </a:p>
@@ -2099,6 +2112,156 @@
               <a:latin typeface="Arial" pitchFamily="34" charset="0"/>
               <a:ea typeface="ＭＳ Ｐゴシック" pitchFamily="34" charset="-128"/>
             </a:endParaRPr>
+          </a:p>
+        </p:txBody>
+      </p:sp>
+    </p:spTree>
+  </p:cSld>
+  <p:clrMapOvr>
+    <a:masterClrMapping/>
+  </p:clrMapOvr>
+</p:notes>
+</file>
+
+<file path=ppt/notesSlides/notesSlide8.xml><?xml version="1.0" encoding="utf-8"?>
+<p:notes xmlns:a="http://schemas.openxmlformats.org/drawingml/2006/main" xmlns:r="http://schemas.openxmlformats.org/officeDocument/2006/relationships" xmlns:p="http://schemas.openxmlformats.org/presentationml/2006/main">
+  <p:cSld>
+    <p:spTree>
+      <p:nvGrpSpPr>
+        <p:cNvPr id="1" name=""/>
+        <p:cNvGrpSpPr/>
+        <p:nvPr/>
+      </p:nvGrpSpPr>
+      <p:grpSpPr>
+        <a:xfrm>
+          <a:off x="0" y="0"/>
+          <a:ext cx="0" cy="0"/>
+          <a:chOff x="0" y="0"/>
+          <a:chExt cx="0" cy="0"/>
+        </a:xfrm>
+      </p:grpSpPr>
+      <p:sp>
+        <p:nvSpPr>
+          <p:cNvPr id="2" name="Symbol zastępczy obrazu slajdu 1"/>
+          <p:cNvSpPr>
+            <a:spLocks noGrp="1" noRot="1" noChangeAspect="1"/>
+          </p:cNvSpPr>
+          <p:nvPr>
+            <p:ph type="sldImg"/>
+          </p:nvPr>
+        </p:nvSpPr>
+        <p:spPr/>
+      </p:sp>
+      <p:sp>
+        <p:nvSpPr>
+          <p:cNvPr id="3" name="Symbol zastępczy notatek 2"/>
+          <p:cNvSpPr>
+            <a:spLocks noGrp="1"/>
+          </p:cNvSpPr>
+          <p:nvPr>
+            <p:ph type="body" idx="1"/>
+          </p:nvPr>
+        </p:nvSpPr>
+        <p:spPr/>
+        <p:txBody>
+          <a:bodyPr>
+            <a:normAutofit/>
+          </a:bodyPr>
+          <a:lstStyle/>
+          <a:p>
+            <a:r>
+              <a:rPr lang="pl-PL" dirty="0" err="1" smtClean="0"/>
+              <a:t>Caller</a:t>
+            </a:r>
+            <a:r>
+              <a:rPr lang="pl-PL" dirty="0" smtClean="0"/>
+              <a:t> – </a:t>
+            </a:r>
+            <a:r>
+              <a:rPr lang="pl-PL" dirty="0" err="1" smtClean="0"/>
+              <a:t>Async</a:t>
+            </a:r>
+            <a:r>
+              <a:rPr lang="pl-PL" dirty="0" smtClean="0"/>
+              <a:t> </a:t>
+            </a:r>
+            <a:r>
+              <a:rPr lang="pl-PL" dirty="0" err="1" smtClean="0"/>
+              <a:t>Method</a:t>
+            </a:r>
+            <a:endParaRPr lang="pl-PL" dirty="0" smtClean="0"/>
+          </a:p>
+          <a:p>
+            <a:pPr lvl="1"/>
+            <a:r>
+              <a:rPr lang="pl-PL" dirty="0" smtClean="0"/>
+              <a:t>Rather </a:t>
+            </a:r>
+            <a:r>
+              <a:rPr lang="pl-PL" dirty="0" err="1" smtClean="0"/>
+              <a:t>inflexible</a:t>
+            </a:r>
+            <a:endParaRPr lang="pl-PL" dirty="0" smtClean="0"/>
+          </a:p>
+          <a:p>
+            <a:pPr lvl="1"/>
+            <a:r>
+              <a:rPr lang="pl-PL" dirty="0" err="1" smtClean="0"/>
+              <a:t>You</a:t>
+            </a:r>
+            <a:r>
+              <a:rPr lang="pl-PL" dirty="0" smtClean="0"/>
+              <a:t> </a:t>
+            </a:r>
+            <a:endParaRPr lang="pl-PL" dirty="0"/>
+          </a:p>
+        </p:txBody>
+      </p:sp>
+      <p:sp>
+        <p:nvSpPr>
+          <p:cNvPr id="4" name="Symbol zastępczy daty 3"/>
+          <p:cNvSpPr>
+            <a:spLocks noGrp="1"/>
+          </p:cNvSpPr>
+          <p:nvPr>
+            <p:ph type="dt" idx="10"/>
+          </p:nvPr>
+        </p:nvSpPr>
+        <p:spPr/>
+        <p:txBody>
+          <a:bodyPr/>
+          <a:lstStyle/>
+          <a:p>
+            <a:fld id="{80DC343A-C7DB-48FF-A81F-D2EFF0311B91}" type="datetime8">
+              <a:rPr lang="en-US" smtClean="0"/>
+              <a:pPr/>
+              <a:t>5/19/2012 7:46 PM</a:t>
+            </a:fld>
+            <a:endParaRPr lang="en-US"/>
+          </a:p>
+        </p:txBody>
+      </p:sp>
+      <p:sp>
+        <p:nvSpPr>
+          <p:cNvPr id="5" name="Symbol zastępczy numeru slajdu 4"/>
+          <p:cNvSpPr>
+            <a:spLocks noGrp="1"/>
+          </p:cNvSpPr>
+          <p:nvPr>
+            <p:ph type="sldNum" sz="quarter" idx="11"/>
+          </p:nvPr>
+        </p:nvSpPr>
+        <p:spPr/>
+        <p:txBody>
+          <a:bodyPr/>
+          <a:lstStyle/>
+          <a:p>
+            <a:fld id="{A0C6CE09-155B-4DAE-A37A-B074B6B02DD4}" type="slidenum">
+              <a:rPr lang="en-US" smtClean="0"/>
+              <a:pPr/>
+              <a:t>8</a:t>
+            </a:fld>
+            <a:endParaRPr lang="en-US"/>
           </a:p>
         </p:txBody>
       </p:sp>
@@ -7030,6 +7193,223 @@
       </p:par>
     </p:tnLst>
   </p:timing>
+</p:sld>
+</file>
+
+<file path=ppt/slides/slide8.xml><?xml version="1.0" encoding="utf-8"?>
+<p:sld xmlns:a="http://schemas.openxmlformats.org/drawingml/2006/main" xmlns:r="http://schemas.openxmlformats.org/officeDocument/2006/relationships" xmlns:p="http://schemas.openxmlformats.org/presentationml/2006/main">
+  <p:cSld>
+    <p:spTree>
+      <p:nvGrpSpPr>
+        <p:cNvPr id="1" name=""/>
+        <p:cNvGrpSpPr/>
+        <p:nvPr/>
+      </p:nvGrpSpPr>
+      <p:grpSpPr>
+        <a:xfrm>
+          <a:off x="0" y="0"/>
+          <a:ext cx="0" cy="0"/>
+          <a:chOff x="0" y="0"/>
+          <a:chExt cx="0" cy="0"/>
+        </a:xfrm>
+      </p:grpSpPr>
+      <p:sp>
+        <p:nvSpPr>
+          <p:cNvPr id="2" name="Tytuł 1"/>
+          <p:cNvSpPr>
+            <a:spLocks noGrp="1"/>
+          </p:cNvSpPr>
+          <p:nvPr>
+            <p:ph type="title"/>
+          </p:nvPr>
+        </p:nvSpPr>
+        <p:spPr/>
+        <p:txBody>
+          <a:bodyPr/>
+          <a:lstStyle/>
+          <a:p>
+            <a:r>
+              <a:rPr lang="pl-PL" dirty="0" err="1" smtClean="0"/>
+              <a:t>Async</a:t>
+            </a:r>
+            <a:r>
+              <a:rPr lang="pl-PL" dirty="0" smtClean="0"/>
+              <a:t> – </a:t>
+            </a:r>
+            <a:r>
+              <a:rPr lang="pl-PL" dirty="0" err="1" smtClean="0"/>
+              <a:t>deep</a:t>
+            </a:r>
+            <a:r>
+              <a:rPr lang="pl-PL" dirty="0" smtClean="0"/>
+              <a:t> </a:t>
+            </a:r>
+            <a:r>
+              <a:rPr lang="pl-PL" dirty="0" err="1" smtClean="0"/>
+              <a:t>dive</a:t>
+            </a:r>
+            <a:r>
+              <a:rPr lang="pl-PL" dirty="0" smtClean="0"/>
+              <a:t> – </a:t>
+            </a:r>
+            <a:r>
+              <a:rPr lang="pl-PL" dirty="0" err="1" smtClean="0"/>
+              <a:t>kudos</a:t>
+            </a:r>
+            <a:r>
+              <a:rPr lang="pl-PL" dirty="0" smtClean="0"/>
+              <a:t> to Jon </a:t>
+            </a:r>
+            <a:r>
+              <a:rPr lang="pl-PL" dirty="0" err="1" smtClean="0"/>
+              <a:t>Skeet</a:t>
+            </a:r>
+            <a:endParaRPr lang="pl-PL" dirty="0"/>
+          </a:p>
+        </p:txBody>
+      </p:sp>
+      <p:sp>
+        <p:nvSpPr>
+          <p:cNvPr id="3" name="Symbol zastępczy zawartości 2"/>
+          <p:cNvSpPr>
+            <a:spLocks noGrp="1"/>
+          </p:cNvSpPr>
+          <p:nvPr>
+            <p:ph sz="half" idx="1"/>
+          </p:nvPr>
+        </p:nvSpPr>
+        <p:spPr>
+          <a:xfrm>
+            <a:off x="209550" y="4770120"/>
+            <a:ext cx="8553450" cy="1300480"/>
+          </a:xfrm>
+        </p:spPr>
+        <p:txBody>
+          <a:bodyPr/>
+          <a:lstStyle/>
+          <a:p>
+            <a:r>
+              <a:rPr lang="pl-PL" dirty="0" err="1" smtClean="0"/>
+              <a:t>Caller</a:t>
+            </a:r>
+            <a:r>
+              <a:rPr lang="pl-PL" dirty="0" smtClean="0"/>
+              <a:t> – </a:t>
+            </a:r>
+            <a:r>
+              <a:rPr lang="pl-PL" dirty="0" err="1" smtClean="0"/>
+              <a:t>Async</a:t>
+            </a:r>
+            <a:r>
+              <a:rPr lang="pl-PL" dirty="0" smtClean="0"/>
+              <a:t> </a:t>
+            </a:r>
+            <a:r>
+              <a:rPr lang="pl-PL" dirty="0" err="1" smtClean="0"/>
+              <a:t>Method</a:t>
+            </a:r>
+            <a:endParaRPr lang="pl-PL" dirty="0" smtClean="0"/>
+          </a:p>
+          <a:p>
+            <a:r>
+              <a:rPr lang="pl-PL" dirty="0" err="1" smtClean="0"/>
+              <a:t>Async</a:t>
+            </a:r>
+            <a:r>
+              <a:rPr lang="pl-PL" dirty="0" smtClean="0"/>
+              <a:t> </a:t>
+            </a:r>
+            <a:r>
+              <a:rPr lang="pl-PL" dirty="0" err="1" smtClean="0"/>
+              <a:t>method</a:t>
+            </a:r>
+            <a:r>
+              <a:rPr lang="pl-PL" dirty="0" smtClean="0"/>
+              <a:t> – </a:t>
+            </a:r>
+            <a:r>
+              <a:rPr lang="pl-PL" dirty="0" err="1" smtClean="0"/>
+              <a:t>await</a:t>
+            </a:r>
+            <a:r>
+              <a:rPr lang="pl-PL" dirty="0" smtClean="0"/>
+              <a:t> – </a:t>
+            </a:r>
+            <a:r>
+              <a:rPr lang="pl-PL" dirty="0" err="1" smtClean="0"/>
+              <a:t>Awaitable</a:t>
+            </a:r>
+            <a:r>
+              <a:rPr lang="pl-PL" dirty="0" smtClean="0"/>
+              <a:t> action</a:t>
+            </a:r>
+            <a:endParaRPr lang="pl-PL" dirty="0"/>
+          </a:p>
+        </p:txBody>
+      </p:sp>
+      <p:sp>
+        <p:nvSpPr>
+          <p:cNvPr id="5" name="Symbol zastępczy numeru slajdu 4"/>
+          <p:cNvSpPr>
+            <a:spLocks noGrp="1"/>
+          </p:cNvSpPr>
+          <p:nvPr>
+            <p:ph type="sldNum" sz="quarter" idx="10"/>
+          </p:nvPr>
+        </p:nvSpPr>
+        <p:spPr/>
+        <p:txBody>
+          <a:bodyPr/>
+          <a:lstStyle/>
+          <a:p>
+            <a:fld id="{ADB16C16-69E8-432F-B853-B6E493C1998A}" type="slidenum">
+              <a:rPr lang="en-US" smtClean="0"/>
+              <a:pPr/>
+              <a:t>8</a:t>
+            </a:fld>
+            <a:endParaRPr lang="en-US"/>
+          </a:p>
+        </p:txBody>
+      </p:sp>
+      <p:pic>
+        <p:nvPicPr>
+          <p:cNvPr id="1027" name="Picture 3"/>
+          <p:cNvPicPr>
+            <a:picLocks noGrp="1" noChangeAspect="1" noChangeArrowheads="1"/>
+          </p:cNvPicPr>
+          <p:nvPr>
+            <p:ph sz="half" idx="2"/>
+          </p:nvPr>
+        </p:nvPicPr>
+        <p:blipFill>
+          <a:blip r:embed="rId3" cstate="print"/>
+          <a:srcRect/>
+          <a:stretch>
+            <a:fillRect/>
+          </a:stretch>
+        </p:blipFill>
+        <p:spPr bwMode="auto">
+          <a:xfrm>
+            <a:off x="1724624" y="1455420"/>
+            <a:ext cx="5694753" cy="3084658"/>
+          </a:xfrm>
+          <a:prstGeom prst="rect">
+            <a:avLst/>
+          </a:prstGeom>
+          <a:noFill/>
+          <a:ln w="9525">
+            <a:noFill/>
+            <a:miter lim="800000"/>
+            <a:headEnd/>
+            <a:tailEnd/>
+          </a:ln>
+        </p:spPr>
+      </p:pic>
+    </p:spTree>
+  </p:cSld>
+  <p:clrMapOvr>
+    <a:masterClrMapping/>
+  </p:clrMapOvr>
 </p:sld>
 </file>
 

</xml_diff>

<commit_message>
added deep dive project with 2 examples
</commit_message>
<xml_diff>
--- a/C# 5.pptx
+++ b/C# 5.pptx
@@ -17,8 +17,8 @@
     <p:sldId id="375" r:id="rId9"/>
     <p:sldId id="376" r:id="rId10"/>
     <p:sldId id="377" r:id="rId11"/>
-    <p:sldId id="372" r:id="rId12"/>
-    <p:sldId id="378" r:id="rId13"/>
+    <p:sldId id="378" r:id="rId12"/>
+    <p:sldId id="372" r:id="rId13"/>
   </p:sldIdLst>
   <p:sldSz cx="9144000" cy="6858000" type="screen4x3"/>
   <p:notesSz cx="7061200" cy="9398000"/>
@@ -221,7 +221,7 @@
             <a:fld id="{867741B6-20E1-4219-AC3A-163B52FA3A08}" type="datetime8">
               <a:rPr lang="en-US"/>
               <a:pPr/>
-              <a:t>5/19/2012 6:50 PM</a:t>
+              <a:t>5/19/2012 7:50 PM</a:t>
             </a:fld>
             <a:endParaRPr lang="en-US"/>
           </a:p>
@@ -414,7 +414,7 @@
             <a:fld id="{80DC343A-C7DB-48FF-A81F-D2EFF0311B91}" type="datetime8">
               <a:rPr lang="en-US"/>
               <a:pPr/>
-              <a:t>5/19/2012 6:50 PM</a:t>
+              <a:t>5/19/2012 7:50 PM</a:t>
             </a:fld>
             <a:endParaRPr lang="en-US"/>
           </a:p>
@@ -811,7 +811,7 @@
             <a:fld id="{FE6E691D-9AEE-4359-9871-4FF78429DC86}" type="datetime8">
               <a:rPr lang="en-US"/>
               <a:pPr/>
-              <a:t>5/19/2012 6:50 PM</a:t>
+              <a:t>5/19/2012 7:50 PM</a:t>
             </a:fld>
             <a:endParaRPr lang="en-US"/>
           </a:p>
@@ -936,7 +936,7 @@
             <a:fld id="{AB8F9170-F656-4E08-BDFE-37D587BF0909}" type="datetime8">
               <a:rPr lang="en-US"/>
               <a:pPr/>
-              <a:t>5/19/2012 6:50 PM</a:t>
+              <a:t>5/19/2012 7:50 PM</a:t>
             </a:fld>
             <a:endParaRPr lang="en-US"/>
           </a:p>
@@ -1128,7 +1128,7 @@
             <a:fld id="{80DC343A-C7DB-48FF-A81F-D2EFF0311B91}" type="datetime8">
               <a:rPr lang="en-US" smtClean="0"/>
               <a:pPr/>
-              <a:t>5/19/2012 6:50 PM</a:t>
+              <a:t>5/19/2012 7:50 PM</a:t>
             </a:fld>
             <a:endParaRPr lang="en-US"/>
           </a:p>
@@ -1236,15 +1236,7 @@
             </a:pPr>
             <a:r>
               <a:rPr lang="en-US" baseline="0" dirty="0" smtClean="0"/>
-              <a:t>When using traditional Begin/End asynchronous pattern the program control flow is disturbed </a:t>
-            </a:r>
-            <a:r>
-              <a:rPr lang="en-US" baseline="0" dirty="0" smtClean="0"/>
-              <a:t>(spitted) </a:t>
-            </a:r>
-            <a:r>
-              <a:rPr lang="en-US" baseline="0" dirty="0" smtClean="0"/>
-              <a:t>which makes understanding of code much harder. This is issue in </a:t>
+              <a:t>When using traditional Begin/End asynchronous pattern the program control flow is disturbed (spitted) which makes understanding of code much harder. This is issue in </a:t>
             </a:r>
             <a:r>
               <a:rPr lang="en-US" baseline="0" dirty="0" err="1" smtClean="0"/>
@@ -1435,7 +1427,7 @@
             <a:fld id="{80DC343A-C7DB-48FF-A81F-D2EFF0311B91}" type="datetime8">
               <a:rPr lang="en-US" smtClean="0"/>
               <a:pPr/>
-              <a:t>5/19/2012 6:51 PM</a:t>
+              <a:t>5/19/2012 7:50 PM</a:t>
             </a:fld>
             <a:endParaRPr lang="en-US"/>
           </a:p>
@@ -1626,7 +1618,7 @@
             <a:fld id="{80DC343A-C7DB-48FF-A81F-D2EFF0311B91}" type="datetime8">
               <a:rPr lang="en-US" smtClean="0"/>
               <a:pPr/>
-              <a:t>5/19/2012 6:50 PM</a:t>
+              <a:t>5/19/2012 7:50 PM</a:t>
             </a:fld>
             <a:endParaRPr lang="en-US"/>
           </a:p>
@@ -1910,11 +1902,7 @@
             </a:r>
             <a:r>
               <a:rPr lang="en-US" baseline="0" dirty="0" smtClean="0"/>
-              <a:t> </a:t>
-            </a:r>
-            <a:r>
-              <a:rPr lang="en-US" baseline="0" dirty="0" smtClean="0"/>
-              <a:t>http://localhost:62562/Expensive/Execute</a:t>
+              <a:t> http://localhost:62562/Expensive/Execute</a:t>
             </a:r>
           </a:p>
           <a:p>
@@ -1964,7 +1952,7 @@
             <a:fld id="{80DC343A-C7DB-48FF-A81F-D2EFF0311B91}" type="datetime8">
               <a:rPr lang="en-US" smtClean="0"/>
               <a:pPr/>
-              <a:t>5/19/2012 6:50 PM</a:t>
+              <a:t>5/19/2012 7:50 PM</a:t>
             </a:fld>
             <a:endParaRPr lang="en-US"/>
           </a:p>
@@ -2021,25 +2009,163 @@
       </p:grpSpPr>
       <p:sp>
         <p:nvSpPr>
-          <p:cNvPr id="18433" name="Rectangle 3"/>
-          <p:cNvSpPr>
-            <a:spLocks noGrp="1" noChangeArrowheads="1"/>
-          </p:cNvSpPr>
-          <p:nvPr>
-            <p:ph type="dt" sz="quarter" idx="1"/>
-          </p:nvPr>
-        </p:nvSpPr>
-        <p:spPr>
-          <a:noFill/>
-        </p:spPr>
+          <p:cNvPr id="2" name="Symbol zastępczy obrazu slajdu 1"/>
+          <p:cNvSpPr>
+            <a:spLocks noGrp="1" noRot="1" noChangeAspect="1"/>
+          </p:cNvSpPr>
+          <p:nvPr>
+            <p:ph type="sldImg"/>
+          </p:nvPr>
+        </p:nvSpPr>
+        <p:spPr/>
+      </p:sp>
+      <p:sp>
+        <p:nvSpPr>
+          <p:cNvPr id="3" name="Symbol zastępczy notatek 2"/>
+          <p:cNvSpPr>
+            <a:spLocks noGrp="1"/>
+          </p:cNvSpPr>
+          <p:nvPr>
+            <p:ph type="body" idx="1"/>
+          </p:nvPr>
+        </p:nvSpPr>
+        <p:spPr/>
+        <p:txBody>
+          <a:bodyPr>
+            <a:normAutofit/>
+          </a:bodyPr>
+          <a:lstStyle/>
+          <a:p>
+            <a:r>
+              <a:rPr lang="en-US" noProof="0" dirty="0" smtClean="0"/>
+              <a:t>Caller – </a:t>
+            </a:r>
+            <a:r>
+              <a:rPr lang="en-US" noProof="0" dirty="0" err="1" smtClean="0"/>
+              <a:t>Async</a:t>
+            </a:r>
+            <a:r>
+              <a:rPr lang="en-US" noProof="0" dirty="0" smtClean="0"/>
+              <a:t> Method</a:t>
+            </a:r>
+          </a:p>
+          <a:p>
+            <a:pPr lvl="1"/>
+            <a:r>
+              <a:rPr lang="en-US" noProof="0" dirty="0" smtClean="0"/>
+              <a:t>Rather inflexible</a:t>
+            </a:r>
+          </a:p>
+          <a:p>
+            <a:pPr lvl="1"/>
+            <a:r>
+              <a:rPr lang="en-US" noProof="0" dirty="0" err="1" smtClean="0"/>
+              <a:t>Async</a:t>
+            </a:r>
+            <a:r>
+              <a:rPr lang="en-US" baseline="0" noProof="0" dirty="0" smtClean="0"/>
+              <a:t> method has to return void, Task, or Task&lt;T&gt;</a:t>
+            </a:r>
+          </a:p>
+          <a:p>
+            <a:pPr lvl="0"/>
+            <a:r>
+              <a:rPr lang="en-US" baseline="0" noProof="0" dirty="0" err="1" smtClean="0"/>
+              <a:t>Async</a:t>
+            </a:r>
+            <a:r>
+              <a:rPr lang="en-US" baseline="0" noProof="0" dirty="0" smtClean="0"/>
+              <a:t> Method – await</a:t>
+            </a:r>
+          </a:p>
+          <a:p>
+            <a:pPr lvl="1"/>
+            <a:r>
+              <a:rPr lang="en-US" baseline="0" noProof="0" dirty="0" smtClean="0"/>
+              <a:t>The type on which await is called has to have a public method </a:t>
+            </a:r>
+            <a:r>
+              <a:rPr lang="en-US" baseline="0" noProof="0" dirty="0" err="1" smtClean="0"/>
+              <a:t>GetAwaiter</a:t>
+            </a:r>
+            <a:r>
+              <a:rPr lang="en-US" baseline="0" noProof="0" dirty="0" smtClean="0"/>
+              <a:t>() – it may be an extension method though</a:t>
+            </a:r>
+          </a:p>
+          <a:p>
+            <a:pPr lvl="1"/>
+            <a:r>
+              <a:rPr lang="pl-PL" baseline="0" noProof="0" dirty="0" smtClean="0"/>
+              <a:t> </a:t>
+            </a:r>
+            <a:r>
+              <a:rPr lang="pl-PL" baseline="0" noProof="0" dirty="0" err="1" smtClean="0"/>
+              <a:t>The</a:t>
+            </a:r>
+            <a:r>
+              <a:rPr lang="pl-PL" baseline="0" noProof="0" dirty="0" smtClean="0"/>
+              <a:t> </a:t>
+            </a:r>
+            <a:r>
+              <a:rPr lang="pl-PL" baseline="0" noProof="0" dirty="0" err="1" smtClean="0"/>
+              <a:t>awaitable</a:t>
+            </a:r>
+            <a:r>
+              <a:rPr lang="pl-PL" baseline="0" noProof="0" dirty="0" smtClean="0"/>
+              <a:t> </a:t>
+            </a:r>
+            <a:r>
+              <a:rPr lang="pl-PL" baseline="0" noProof="0" dirty="0" err="1" smtClean="0"/>
+              <a:t>type</a:t>
+            </a:r>
+            <a:r>
+              <a:rPr lang="pl-PL" baseline="0" noProof="0" dirty="0" smtClean="0"/>
+              <a:t> </a:t>
+            </a:r>
+            <a:r>
+              <a:rPr lang="pl-PL" baseline="0" noProof="0" dirty="0" err="1" smtClean="0"/>
+              <a:t>returned</a:t>
+            </a:r>
+            <a:r>
+              <a:rPr lang="pl-PL" baseline="0" noProof="0" dirty="0" smtClean="0"/>
+              <a:t> by </a:t>
+            </a:r>
+            <a:r>
+              <a:rPr lang="pl-PL" baseline="0" noProof="0" dirty="0" err="1" smtClean="0"/>
+              <a:t>GetAwaiter</a:t>
+            </a:r>
+            <a:r>
+              <a:rPr lang="pl-PL" baseline="0" noProof="0" dirty="0" smtClean="0"/>
+              <a:t> </a:t>
+            </a:r>
+            <a:r>
+              <a:rPr lang="pl-PL" baseline="0" noProof="0" dirty="0" err="1" smtClean="0"/>
+              <a:t>method</a:t>
+            </a:r>
+            <a:endParaRPr lang="en-US" baseline="0" noProof="0" dirty="0" smtClean="0"/>
+          </a:p>
+        </p:txBody>
+      </p:sp>
+      <p:sp>
+        <p:nvSpPr>
+          <p:cNvPr id="4" name="Symbol zastępczy daty 3"/>
+          <p:cNvSpPr>
+            <a:spLocks noGrp="1"/>
+          </p:cNvSpPr>
+          <p:nvPr>
+            <p:ph type="dt" idx="10"/>
+          </p:nvPr>
+        </p:nvSpPr>
+        <p:spPr/>
         <p:txBody>
           <a:bodyPr/>
           <a:lstStyle/>
           <a:p>
-            <a:fld id="{AB8F9170-F656-4E08-BDFE-37D587BF0909}" type="datetime8">
-              <a:rPr lang="en-US"/>
+            <a:fld id="{80DC343A-C7DB-48FF-A81F-D2EFF0311B91}" type="datetime8">
+              <a:rPr lang="en-US" smtClean="0"/>
               <a:pPr/>
-              <a:t>5/19/2012 6:50 PM</a:t>
+              <a:t>5/19/2012 7:50 PM</a:t>
             </a:fld>
             <a:endParaRPr lang="en-US"/>
           </a:p>
@@ -2047,71 +2173,25 @@
       </p:sp>
       <p:sp>
         <p:nvSpPr>
-          <p:cNvPr id="18434" name="Rectangle 7"/>
-          <p:cNvSpPr>
-            <a:spLocks noGrp="1" noChangeArrowheads="1"/>
-          </p:cNvSpPr>
-          <p:nvPr>
-            <p:ph type="sldNum" sz="quarter" idx="5"/>
-          </p:nvPr>
-        </p:nvSpPr>
-        <p:spPr>
-          <a:noFill/>
-        </p:spPr>
+          <p:cNvPr id="5" name="Symbol zastępczy numeru slajdu 4"/>
+          <p:cNvSpPr>
+            <a:spLocks noGrp="1"/>
+          </p:cNvSpPr>
+          <p:nvPr>
+            <p:ph type="sldNum" sz="quarter" idx="11"/>
+          </p:nvPr>
+        </p:nvSpPr>
+        <p:spPr/>
         <p:txBody>
           <a:bodyPr/>
           <a:lstStyle/>
           <a:p>
-            <a:fld id="{E73A29F1-A36F-4C0F-8D5B-36FFE114B347}" type="slidenum">
-              <a:rPr lang="en-US"/>
+            <a:fld id="{A0C6CE09-155B-4DAE-A37A-B074B6B02DD4}" type="slidenum">
+              <a:rPr lang="en-US" smtClean="0"/>
               <a:pPr/>
               <a:t>7</a:t>
             </a:fld>
             <a:endParaRPr lang="en-US"/>
-          </a:p>
-        </p:txBody>
-      </p:sp>
-      <p:sp>
-        <p:nvSpPr>
-          <p:cNvPr id="18435" name="Rectangle 2"/>
-          <p:cNvSpPr>
-            <a:spLocks noGrp="1" noRot="1" noChangeAspect="1" noChangeArrowheads="1" noTextEdit="1"/>
-          </p:cNvSpPr>
-          <p:nvPr>
-            <p:ph type="sldImg"/>
-          </p:nvPr>
-        </p:nvSpPr>
-        <p:spPr>
-          <a:ln/>
-        </p:spPr>
-      </p:sp>
-      <p:sp>
-        <p:nvSpPr>
-          <p:cNvPr id="18436" name="Rectangle 3"/>
-          <p:cNvSpPr>
-            <a:spLocks noGrp="1" noChangeArrowheads="1"/>
-          </p:cNvSpPr>
-          <p:nvPr>
-            <p:ph type="body" idx="1"/>
-          </p:nvPr>
-        </p:nvSpPr>
-        <p:spPr>
-          <a:noFill/>
-          <a:ln/>
-        </p:spPr>
-        <p:txBody>
-          <a:bodyPr lIns="93012" tIns="46506" rIns="93012" bIns="46506"/>
-          <a:lstStyle/>
-          <a:p>
-            <a:pPr marL="288925" lvl="1" indent="-174625" eaLnBrk="1" hangingPunct="1">
-              <a:buSzPct val="75000"/>
-              <a:buFont typeface="Times New Roman" pitchFamily="18" charset="0"/>
-              <a:buChar char="—"/>
-            </a:pPr>
-            <a:endParaRPr lang="en-US" sz="1000" dirty="0" smtClean="0">
-              <a:latin typeface="Arial" pitchFamily="34" charset="0"/>
-              <a:ea typeface="ＭＳ Ｐゴシック" pitchFamily="34" charset="-128"/>
-            </a:endParaRPr>
           </a:p>
         </p:txBody>
       </p:sp>
@@ -2142,100 +2222,25 @@
       </p:grpSpPr>
       <p:sp>
         <p:nvSpPr>
-          <p:cNvPr id="2" name="Symbol zastępczy obrazu slajdu 1"/>
-          <p:cNvSpPr>
-            <a:spLocks noGrp="1" noRot="1" noChangeAspect="1"/>
-          </p:cNvSpPr>
-          <p:nvPr>
-            <p:ph type="sldImg"/>
-          </p:nvPr>
-        </p:nvSpPr>
-        <p:spPr/>
-      </p:sp>
-      <p:sp>
-        <p:nvSpPr>
-          <p:cNvPr id="3" name="Symbol zastępczy notatek 2"/>
-          <p:cNvSpPr>
-            <a:spLocks noGrp="1"/>
-          </p:cNvSpPr>
-          <p:nvPr>
-            <p:ph type="body" idx="1"/>
-          </p:nvPr>
-        </p:nvSpPr>
-        <p:spPr/>
-        <p:txBody>
-          <a:bodyPr>
-            <a:normAutofit/>
-          </a:bodyPr>
-          <a:lstStyle/>
-          <a:p>
-            <a:r>
-              <a:rPr lang="pl-PL" dirty="0" err="1" smtClean="0"/>
-              <a:t>Caller</a:t>
-            </a:r>
-            <a:r>
-              <a:rPr lang="pl-PL" dirty="0" smtClean="0"/>
-              <a:t> – </a:t>
-            </a:r>
-            <a:r>
-              <a:rPr lang="pl-PL" dirty="0" err="1" smtClean="0"/>
-              <a:t>Async</a:t>
-            </a:r>
-            <a:r>
-              <a:rPr lang="pl-PL" dirty="0" smtClean="0"/>
-              <a:t> </a:t>
-            </a:r>
-            <a:r>
-              <a:rPr lang="pl-PL" dirty="0" err="1" smtClean="0"/>
-              <a:t>Method</a:t>
-            </a:r>
-            <a:endParaRPr lang="pl-PL" dirty="0" smtClean="0"/>
-          </a:p>
-          <a:p>
-            <a:pPr lvl="1"/>
-            <a:r>
-              <a:rPr lang="pl-PL" dirty="0" smtClean="0"/>
-              <a:t>Rather </a:t>
-            </a:r>
-            <a:r>
-              <a:rPr lang="pl-PL" dirty="0" err="1" smtClean="0"/>
-              <a:t>inflexible</a:t>
-            </a:r>
-            <a:endParaRPr lang="pl-PL" dirty="0" smtClean="0"/>
-          </a:p>
-          <a:p>
-            <a:pPr lvl="1"/>
-            <a:r>
-              <a:rPr lang="pl-PL" dirty="0" err="1" smtClean="0"/>
-              <a:t>You</a:t>
-            </a:r>
-            <a:r>
-              <a:rPr lang="pl-PL" dirty="0" smtClean="0"/>
-              <a:t> </a:t>
-            </a:r>
-            <a:endParaRPr lang="pl-PL" dirty="0"/>
-          </a:p>
-        </p:txBody>
-      </p:sp>
-      <p:sp>
-        <p:nvSpPr>
-          <p:cNvPr id="4" name="Symbol zastępczy daty 3"/>
-          <p:cNvSpPr>
-            <a:spLocks noGrp="1"/>
-          </p:cNvSpPr>
-          <p:nvPr>
-            <p:ph type="dt" idx="10"/>
-          </p:nvPr>
-        </p:nvSpPr>
-        <p:spPr/>
+          <p:cNvPr id="18433" name="Rectangle 3"/>
+          <p:cNvSpPr>
+            <a:spLocks noGrp="1" noChangeArrowheads="1"/>
+          </p:cNvSpPr>
+          <p:nvPr>
+            <p:ph type="dt" sz="quarter" idx="1"/>
+          </p:nvPr>
+        </p:nvSpPr>
+        <p:spPr>
+          <a:noFill/>
+        </p:spPr>
         <p:txBody>
           <a:bodyPr/>
           <a:lstStyle/>
           <a:p>
-            <a:fld id="{80DC343A-C7DB-48FF-A81F-D2EFF0311B91}" type="datetime8">
-              <a:rPr lang="en-US" smtClean="0"/>
+            <a:fld id="{AB8F9170-F656-4E08-BDFE-37D587BF0909}" type="datetime8">
+              <a:rPr lang="en-US"/>
               <a:pPr/>
-              <a:t>5/19/2012 7:46 PM</a:t>
+              <a:t>5/19/2012 7:50 PM</a:t>
             </a:fld>
             <a:endParaRPr lang="en-US"/>
           </a:p>
@@ -2243,25 +2248,71 @@
       </p:sp>
       <p:sp>
         <p:nvSpPr>
-          <p:cNvPr id="5" name="Symbol zastępczy numeru slajdu 4"/>
-          <p:cNvSpPr>
-            <a:spLocks noGrp="1"/>
-          </p:cNvSpPr>
-          <p:nvPr>
-            <p:ph type="sldNum" sz="quarter" idx="11"/>
-          </p:nvPr>
-        </p:nvSpPr>
-        <p:spPr/>
+          <p:cNvPr id="18434" name="Rectangle 7"/>
+          <p:cNvSpPr>
+            <a:spLocks noGrp="1" noChangeArrowheads="1"/>
+          </p:cNvSpPr>
+          <p:nvPr>
+            <p:ph type="sldNum" sz="quarter" idx="5"/>
+          </p:nvPr>
+        </p:nvSpPr>
+        <p:spPr>
+          <a:noFill/>
+        </p:spPr>
         <p:txBody>
           <a:bodyPr/>
           <a:lstStyle/>
           <a:p>
-            <a:fld id="{A0C6CE09-155B-4DAE-A37A-B074B6B02DD4}" type="slidenum">
-              <a:rPr lang="en-US" smtClean="0"/>
+            <a:fld id="{E73A29F1-A36F-4C0F-8D5B-36FFE114B347}" type="slidenum">
+              <a:rPr lang="en-US"/>
               <a:pPr/>
               <a:t>8</a:t>
             </a:fld>
             <a:endParaRPr lang="en-US"/>
+          </a:p>
+        </p:txBody>
+      </p:sp>
+      <p:sp>
+        <p:nvSpPr>
+          <p:cNvPr id="18435" name="Rectangle 2"/>
+          <p:cNvSpPr>
+            <a:spLocks noGrp="1" noRot="1" noChangeAspect="1" noChangeArrowheads="1" noTextEdit="1"/>
+          </p:cNvSpPr>
+          <p:nvPr>
+            <p:ph type="sldImg"/>
+          </p:nvPr>
+        </p:nvSpPr>
+        <p:spPr>
+          <a:ln/>
+        </p:spPr>
+      </p:sp>
+      <p:sp>
+        <p:nvSpPr>
+          <p:cNvPr id="18436" name="Rectangle 3"/>
+          <p:cNvSpPr>
+            <a:spLocks noGrp="1" noChangeArrowheads="1"/>
+          </p:cNvSpPr>
+          <p:nvPr>
+            <p:ph type="body" idx="1"/>
+          </p:nvPr>
+        </p:nvSpPr>
+        <p:spPr>
+          <a:noFill/>
+          <a:ln/>
+        </p:spPr>
+        <p:txBody>
+          <a:bodyPr lIns="93012" tIns="46506" rIns="93012" bIns="46506"/>
+          <a:lstStyle/>
+          <a:p>
+            <a:pPr marL="288925" lvl="1" indent="-174625" eaLnBrk="1" hangingPunct="1">
+              <a:buSzPct val="75000"/>
+              <a:buFont typeface="Times New Roman" pitchFamily="18" charset="0"/>
+              <a:buChar char="—"/>
+            </a:pPr>
+            <a:endParaRPr lang="en-US" sz="1000" dirty="0" smtClean="0">
+              <a:latin typeface="Arial" pitchFamily="34" charset="0"/>
+              <a:ea typeface="ＭＳ Ｐゴシック" pitchFamily="34" charset="-128"/>
+            </a:endParaRPr>
           </a:p>
         </p:txBody>
       </p:sp>
@@ -6127,11 +6178,7 @@
             </a:r>
             <a:r>
               <a:rPr lang="en-US" dirty="0" smtClean="0"/>
-              <a:t> </a:t>
-            </a:r>
-            <a:r>
-              <a:rPr lang="en-US" dirty="0" smtClean="0"/>
-              <a:t>the C# </a:t>
+              <a:t> the C# </a:t>
             </a:r>
             <a:r>
               <a:rPr lang="en-US" dirty="0" err="1" smtClean="0"/>
@@ -6869,11 +6916,7 @@
             </a:r>
             <a:r>
               <a:rPr lang="en-US" dirty="0" smtClean="0"/>
-              <a:t>Why </a:t>
-            </a:r>
-            <a:r>
-              <a:rPr lang="en-US" dirty="0" smtClean="0"/>
-              <a:t>does it matter</a:t>
+              <a:t>Why does it matter</a:t>
             </a:r>
             <a:endParaRPr lang="en-US" dirty="0"/>
           </a:p>
@@ -7016,205 +7059,6 @@
       </p:grpSpPr>
       <p:sp>
         <p:nvSpPr>
-          <p:cNvPr id="17409" name="Slide Number Placeholder 3"/>
-          <p:cNvSpPr>
-            <a:spLocks noGrp="1"/>
-          </p:cNvSpPr>
-          <p:nvPr>
-            <p:ph type="sldNum" sz="quarter" idx="10"/>
-          </p:nvPr>
-        </p:nvSpPr>
-        <p:spPr>
-          <a:noFill/>
-        </p:spPr>
-        <p:txBody>
-          <a:bodyPr/>
-          <a:lstStyle/>
-          <a:p>
-            <a:fld id="{B8923B82-4FEA-4C63-961B-70B71B12A787}" type="slidenum">
-              <a:rPr lang="en-US"/>
-              <a:pPr/>
-              <a:t>7</a:t>
-            </a:fld>
-            <a:endParaRPr lang="en-US"/>
-          </a:p>
-        </p:txBody>
-      </p:sp>
-      <p:sp>
-        <p:nvSpPr>
-          <p:cNvPr id="17410" name="Rectangle 2"/>
-          <p:cNvSpPr>
-            <a:spLocks noGrp="1" noChangeArrowheads="1"/>
-          </p:cNvSpPr>
-          <p:nvPr>
-            <p:ph type="title"/>
-          </p:nvPr>
-        </p:nvSpPr>
-        <p:spPr/>
-        <p:txBody>
-          <a:bodyPr/>
-          <a:lstStyle/>
-          <a:p>
-            <a:pPr eaLnBrk="1" hangingPunct="1"/>
-            <a:r>
-              <a:rPr lang="en-US" dirty="0" smtClean="0">
-                <a:ea typeface="ＭＳ Ｐゴシック" pitchFamily="34" charset="-128"/>
-              </a:rPr>
-              <a:t>Slide Titles are in Title Case Arial 28pt Blue</a:t>
-            </a:r>
-          </a:p>
-        </p:txBody>
-      </p:sp>
-      <p:sp>
-        <p:nvSpPr>
-          <p:cNvPr id="17411" name="Rectangle 3"/>
-          <p:cNvSpPr>
-            <a:spLocks noGrp="1" noChangeArrowheads="1"/>
-          </p:cNvSpPr>
-          <p:nvPr>
-            <p:ph type="body" idx="1"/>
-          </p:nvPr>
-        </p:nvSpPr>
-        <p:spPr/>
-        <p:txBody>
-          <a:bodyPr/>
-          <a:lstStyle/>
-          <a:p>
-            <a:pPr eaLnBrk="1" hangingPunct="1"/>
-            <a:r>
-              <a:rPr lang="en-US" dirty="0" smtClean="0">
-                <a:ea typeface="ＭＳ Ｐゴシック" pitchFamily="34" charset="-128"/>
-              </a:rPr>
-              <a:t>Bullet points are in sentence case Arial 22pt blue.</a:t>
-            </a:r>
-          </a:p>
-          <a:p>
-            <a:pPr lvl="1" eaLnBrk="1" hangingPunct="1"/>
-            <a:r>
-              <a:rPr lang="en-US" dirty="0" smtClean="0">
-                <a:ea typeface="ＭＳ Ｐゴシック" pitchFamily="34" charset="-128"/>
-              </a:rPr>
-              <a:t>Second level bullet points are in sentence case Arial 18pt blue.</a:t>
-            </a:r>
-          </a:p>
-          <a:p>
-            <a:pPr lvl="2" eaLnBrk="1" hangingPunct="1"/>
-            <a:r>
-              <a:rPr lang="en-US" dirty="0" smtClean="0">
-                <a:ea typeface="ＭＳ Ｐゴシック" pitchFamily="34" charset="-128"/>
-              </a:rPr>
-              <a:t>Third level bullet points are in sentence case Arial 16pt blue.</a:t>
-            </a:r>
-          </a:p>
-          <a:p>
-            <a:pPr eaLnBrk="1" hangingPunct="1"/>
-            <a:r>
-              <a:rPr lang="en-US" dirty="0" smtClean="0">
-                <a:ea typeface="ＭＳ Ｐゴシック" pitchFamily="34" charset="-128"/>
-              </a:rPr>
-              <a:t>Bullet points should be short and concise.</a:t>
-            </a:r>
-          </a:p>
-          <a:p>
-            <a:pPr eaLnBrk="1" hangingPunct="1"/>
-            <a:r>
-              <a:rPr lang="en-US" dirty="0" smtClean="0">
-                <a:ea typeface="ＭＳ Ｐゴシック" pitchFamily="34" charset="-128"/>
-              </a:rPr>
-              <a:t>It is recommended that slides should contain no more than 5-8 bulleted items per slide, especially when bullets are longer than one sentence.</a:t>
-            </a:r>
-          </a:p>
-          <a:p>
-            <a:pPr eaLnBrk="1" hangingPunct="1"/>
-            <a:r>
-              <a:rPr lang="en-US" dirty="0" smtClean="0">
-                <a:latin typeface="Arial Black" pitchFamily="34" charset="0"/>
-                <a:ea typeface="ＭＳ Ｐゴシック" pitchFamily="34" charset="-128"/>
-              </a:rPr>
-              <a:t>Highlighted text</a:t>
-            </a:r>
-            <a:r>
-              <a:rPr lang="en-US" dirty="0" smtClean="0">
-                <a:ea typeface="ＭＳ Ｐゴシック" pitchFamily="34" charset="-128"/>
-              </a:rPr>
-              <a:t> is set in Arial Black at the current copy size and should be used only on single words or short phrases.</a:t>
-            </a:r>
-          </a:p>
-          <a:p>
-            <a:pPr eaLnBrk="1" hangingPunct="1"/>
-            <a:r>
-              <a:rPr lang="en-US" dirty="0" smtClean="0">
-                <a:ea typeface="ＭＳ Ｐゴシック" pitchFamily="34" charset="-128"/>
-              </a:rPr>
-              <a:t>Quotes should be </a:t>
-            </a:r>
-            <a:r>
-              <a:rPr lang="ja-JP" altLang="en-US" i="1" smtClean="0">
-                <a:ea typeface="ＭＳ Ｐゴシック" pitchFamily="34" charset="-128"/>
-              </a:rPr>
-              <a:t>“</a:t>
-            </a:r>
-            <a:r>
-              <a:rPr lang="en-US" altLang="ja-JP" i="1" dirty="0" smtClean="0">
-                <a:ea typeface="ＭＳ Ｐゴシック" pitchFamily="34" charset="-128"/>
-              </a:rPr>
-              <a:t>the only copy to use italics</a:t>
-            </a:r>
-            <a:r>
-              <a:rPr lang="ja-JP" altLang="en-US" i="1" smtClean="0">
-                <a:ea typeface="ＭＳ Ｐゴシック" pitchFamily="34" charset="-128"/>
-              </a:rPr>
-              <a:t>”</a:t>
-            </a:r>
-            <a:r>
-              <a:rPr lang="en-US" altLang="ja-JP" dirty="0" smtClean="0">
-                <a:ea typeface="ＭＳ Ｐゴシック" pitchFamily="34" charset="-128"/>
-              </a:rPr>
-              <a:t> </a:t>
-            </a:r>
-            <a:endParaRPr lang="en-US" dirty="0" smtClean="0">
-              <a:ea typeface="ＭＳ Ｐゴシック" pitchFamily="34" charset="-128"/>
-            </a:endParaRPr>
-          </a:p>
-        </p:txBody>
-      </p:sp>
-    </p:spTree>
-  </p:cSld>
-  <p:clrMapOvr>
-    <a:masterClrMapping/>
-  </p:clrMapOvr>
-  <p:transition>
-    <p:wipe dir="r"/>
-  </p:transition>
-  <p:timing>
-    <p:tnLst>
-      <p:par>
-        <p:cTn id="1" dur="indefinite" restart="never" nodeType="tmRoot"/>
-      </p:par>
-    </p:tnLst>
-  </p:timing>
-</p:sld>
-</file>
-
-<file path=ppt/slides/slide8.xml><?xml version="1.0" encoding="utf-8"?>
-<p:sld xmlns:a="http://schemas.openxmlformats.org/drawingml/2006/main" xmlns:r="http://schemas.openxmlformats.org/officeDocument/2006/relationships" xmlns:p="http://schemas.openxmlformats.org/presentationml/2006/main">
-  <p:cSld>
-    <p:spTree>
-      <p:nvGrpSpPr>
-        <p:cNvPr id="1" name=""/>
-        <p:cNvGrpSpPr/>
-        <p:nvPr/>
-      </p:nvGrpSpPr>
-      <p:grpSpPr>
-        <a:xfrm>
-          <a:off x="0" y="0"/>
-          <a:ext cx="0" cy="0"/>
-          <a:chOff x="0" y="0"/>
-          <a:chExt cx="0" cy="0"/>
-        </a:xfrm>
-      </p:grpSpPr>
-      <p:sp>
-        <p:nvSpPr>
           <p:cNvPr id="2" name="Tytuł 1"/>
           <p:cNvSpPr>
             <a:spLocks noGrp="1"/>
@@ -7289,61 +7133,36 @@
           <a:lstStyle/>
           <a:p>
             <a:r>
-              <a:rPr lang="pl-PL" dirty="0" err="1" smtClean="0"/>
-              <a:t>Caller</a:t>
-            </a:r>
-            <a:r>
-              <a:rPr lang="pl-PL" dirty="0" smtClean="0"/>
-              <a:t> – </a:t>
-            </a:r>
-            <a:r>
-              <a:rPr lang="pl-PL" dirty="0" err="1" smtClean="0"/>
+              <a:rPr lang="en-US" dirty="0" smtClean="0"/>
+              <a:t>Caller – </a:t>
+            </a:r>
+            <a:r>
+              <a:rPr lang="en-US" dirty="0" err="1" smtClean="0"/>
               <a:t>Async</a:t>
             </a:r>
             <a:r>
-              <a:rPr lang="pl-PL" dirty="0" smtClean="0"/>
-              <a:t> </a:t>
-            </a:r>
-            <a:r>
-              <a:rPr lang="pl-PL" dirty="0" err="1" smtClean="0"/>
-              <a:t>Method</a:t>
-            </a:r>
-            <a:endParaRPr lang="pl-PL" dirty="0" smtClean="0"/>
-          </a:p>
-          <a:p>
-            <a:r>
-              <a:rPr lang="pl-PL" dirty="0" err="1" smtClean="0"/>
+              <a:rPr lang="en-US" dirty="0" smtClean="0"/>
+              <a:t> Method</a:t>
+            </a:r>
+          </a:p>
+          <a:p>
+            <a:r>
+              <a:rPr lang="en-US" dirty="0" err="1" smtClean="0"/>
               <a:t>Async</a:t>
             </a:r>
             <a:r>
-              <a:rPr lang="pl-PL" dirty="0" smtClean="0"/>
-              <a:t> </a:t>
-            </a:r>
-            <a:r>
-              <a:rPr lang="pl-PL" dirty="0" err="1" smtClean="0"/>
-              <a:t>method</a:t>
-            </a:r>
-            <a:r>
-              <a:rPr lang="pl-PL" dirty="0" smtClean="0"/>
-              <a:t> – </a:t>
-            </a:r>
-            <a:r>
-              <a:rPr lang="pl-PL" dirty="0" err="1" smtClean="0"/>
-              <a:t>await</a:t>
-            </a:r>
-            <a:r>
-              <a:rPr lang="pl-PL" dirty="0" smtClean="0"/>
-              <a:t> – </a:t>
-            </a:r>
-            <a:r>
-              <a:rPr lang="pl-PL" dirty="0" err="1" smtClean="0"/>
+              <a:rPr lang="en-US" dirty="0" smtClean="0"/>
+              <a:t> method – await – </a:t>
+            </a:r>
+            <a:r>
+              <a:rPr lang="en-US" dirty="0" err="1" smtClean="0"/>
               <a:t>Awaitable</a:t>
             </a:r>
             <a:r>
-              <a:rPr lang="pl-PL" dirty="0" smtClean="0"/>
+              <a:rPr lang="en-US" dirty="0" smtClean="0"/>
               <a:t> action</a:t>
             </a:r>
-            <a:endParaRPr lang="pl-PL" dirty="0"/>
+            <a:endParaRPr lang="en-US" dirty="0"/>
           </a:p>
         </p:txBody>
       </p:sp>
@@ -7365,7 +7184,7 @@
             <a:fld id="{ADB16C16-69E8-432F-B853-B6E493C1998A}" type="slidenum">
               <a:rPr lang="en-US" smtClean="0"/>
               <a:pPr/>
-              <a:t>8</a:t>
+              <a:t>7</a:t>
             </a:fld>
             <a:endParaRPr lang="en-US"/>
           </a:p>
@@ -7410,6 +7229,205 @@
   <p:clrMapOvr>
     <a:masterClrMapping/>
   </p:clrMapOvr>
+</p:sld>
+</file>
+
+<file path=ppt/slides/slide8.xml><?xml version="1.0" encoding="utf-8"?>
+<p:sld xmlns:a="http://schemas.openxmlformats.org/drawingml/2006/main" xmlns:r="http://schemas.openxmlformats.org/officeDocument/2006/relationships" xmlns:p="http://schemas.openxmlformats.org/presentationml/2006/main">
+  <p:cSld>
+    <p:spTree>
+      <p:nvGrpSpPr>
+        <p:cNvPr id="1" name=""/>
+        <p:cNvGrpSpPr/>
+        <p:nvPr/>
+      </p:nvGrpSpPr>
+      <p:grpSpPr>
+        <a:xfrm>
+          <a:off x="0" y="0"/>
+          <a:ext cx="0" cy="0"/>
+          <a:chOff x="0" y="0"/>
+          <a:chExt cx="0" cy="0"/>
+        </a:xfrm>
+      </p:grpSpPr>
+      <p:sp>
+        <p:nvSpPr>
+          <p:cNvPr id="17409" name="Slide Number Placeholder 3"/>
+          <p:cNvSpPr>
+            <a:spLocks noGrp="1"/>
+          </p:cNvSpPr>
+          <p:nvPr>
+            <p:ph type="sldNum" sz="quarter" idx="10"/>
+          </p:nvPr>
+        </p:nvSpPr>
+        <p:spPr>
+          <a:noFill/>
+        </p:spPr>
+        <p:txBody>
+          <a:bodyPr/>
+          <a:lstStyle/>
+          <a:p>
+            <a:fld id="{B8923B82-4FEA-4C63-961B-70B71B12A787}" type="slidenum">
+              <a:rPr lang="en-US"/>
+              <a:pPr/>
+              <a:t>8</a:t>
+            </a:fld>
+            <a:endParaRPr lang="en-US"/>
+          </a:p>
+        </p:txBody>
+      </p:sp>
+      <p:sp>
+        <p:nvSpPr>
+          <p:cNvPr id="17410" name="Rectangle 2"/>
+          <p:cNvSpPr>
+            <a:spLocks noGrp="1" noChangeArrowheads="1"/>
+          </p:cNvSpPr>
+          <p:nvPr>
+            <p:ph type="title"/>
+          </p:nvPr>
+        </p:nvSpPr>
+        <p:spPr/>
+        <p:txBody>
+          <a:bodyPr/>
+          <a:lstStyle/>
+          <a:p>
+            <a:pPr eaLnBrk="1" hangingPunct="1"/>
+            <a:r>
+              <a:rPr lang="en-US" dirty="0" smtClean="0">
+                <a:ea typeface="ＭＳ Ｐゴシック" pitchFamily="34" charset="-128"/>
+              </a:rPr>
+              <a:t>Slide Titles are in Title Case Arial 28pt Blue</a:t>
+            </a:r>
+          </a:p>
+        </p:txBody>
+      </p:sp>
+      <p:sp>
+        <p:nvSpPr>
+          <p:cNvPr id="17411" name="Rectangle 3"/>
+          <p:cNvSpPr>
+            <a:spLocks noGrp="1" noChangeArrowheads="1"/>
+          </p:cNvSpPr>
+          <p:nvPr>
+            <p:ph type="body" idx="1"/>
+          </p:nvPr>
+        </p:nvSpPr>
+        <p:spPr/>
+        <p:txBody>
+          <a:bodyPr/>
+          <a:lstStyle/>
+          <a:p>
+            <a:pPr eaLnBrk="1" hangingPunct="1"/>
+            <a:r>
+              <a:rPr lang="en-US" dirty="0" smtClean="0">
+                <a:ea typeface="ＭＳ Ｐゴシック" pitchFamily="34" charset="-128"/>
+              </a:rPr>
+              <a:t>Bullet points are in sentence case Arial 22pt blue.</a:t>
+            </a:r>
+          </a:p>
+          <a:p>
+            <a:pPr lvl="1" eaLnBrk="1" hangingPunct="1"/>
+            <a:r>
+              <a:rPr lang="en-US" dirty="0" smtClean="0">
+                <a:ea typeface="ＭＳ Ｐゴシック" pitchFamily="34" charset="-128"/>
+              </a:rPr>
+              <a:t>Second level bullet points are in sentence case Arial 18pt blue.</a:t>
+            </a:r>
+          </a:p>
+          <a:p>
+            <a:pPr lvl="2" eaLnBrk="1" hangingPunct="1"/>
+            <a:r>
+              <a:rPr lang="en-US" dirty="0" smtClean="0">
+                <a:ea typeface="ＭＳ Ｐゴシック" pitchFamily="34" charset="-128"/>
+              </a:rPr>
+              <a:t>Third level bullet points are in sentence case Arial 16pt blue.</a:t>
+            </a:r>
+          </a:p>
+          <a:p>
+            <a:pPr eaLnBrk="1" hangingPunct="1"/>
+            <a:r>
+              <a:rPr lang="en-US" dirty="0" smtClean="0">
+                <a:ea typeface="ＭＳ Ｐゴシック" pitchFamily="34" charset="-128"/>
+              </a:rPr>
+              <a:t>Bullet points should be short and concise.</a:t>
+            </a:r>
+          </a:p>
+          <a:p>
+            <a:pPr eaLnBrk="1" hangingPunct="1"/>
+            <a:r>
+              <a:rPr lang="en-US" dirty="0" smtClean="0">
+                <a:ea typeface="ＭＳ Ｐゴシック" pitchFamily="34" charset="-128"/>
+              </a:rPr>
+              <a:t>It is recommended that slides should contain no more than 5-8 bulleted items per slide, especially when bullets are longer than one sentence.</a:t>
+            </a:r>
+          </a:p>
+          <a:p>
+            <a:pPr eaLnBrk="1" hangingPunct="1"/>
+            <a:r>
+              <a:rPr lang="en-US" dirty="0" smtClean="0">
+                <a:latin typeface="Arial Black" pitchFamily="34" charset="0"/>
+                <a:ea typeface="ＭＳ Ｐゴシック" pitchFamily="34" charset="-128"/>
+              </a:rPr>
+              <a:t>Highlighted text</a:t>
+            </a:r>
+            <a:r>
+              <a:rPr lang="en-US" dirty="0" smtClean="0">
+                <a:ea typeface="ＭＳ Ｐゴシック" pitchFamily="34" charset="-128"/>
+              </a:rPr>
+              <a:t> is set in Arial Black at the current copy size and should be used only on single words or short phrases.</a:t>
+            </a:r>
+          </a:p>
+          <a:p>
+            <a:pPr eaLnBrk="1" hangingPunct="1"/>
+            <a:r>
+              <a:rPr lang="en-US" dirty="0" smtClean="0">
+                <a:ea typeface="ＭＳ Ｐゴシック" pitchFamily="34" charset="-128"/>
+              </a:rPr>
+              <a:t>Quotes should be </a:t>
+            </a:r>
+            <a:r>
+              <a:rPr lang="ja-JP" altLang="en-US" i="1" smtClean="0">
+                <a:ea typeface="ＭＳ Ｐゴシック" pitchFamily="34" charset="-128"/>
+              </a:rPr>
+              <a:t>“</a:t>
+            </a:r>
+            <a:r>
+              <a:rPr lang="en-US" altLang="ja-JP" i="1" dirty="0" smtClean="0">
+                <a:ea typeface="ＭＳ Ｐゴシック" pitchFamily="34" charset="-128"/>
+              </a:rPr>
+              <a:t>the only copy to use italics</a:t>
+            </a:r>
+            <a:r>
+              <a:rPr lang="ja-JP" altLang="en-US" i="1" smtClean="0">
+                <a:ea typeface="ＭＳ Ｐゴシック" pitchFamily="34" charset="-128"/>
+              </a:rPr>
+              <a:t>”</a:t>
+            </a:r>
+            <a:r>
+              <a:rPr lang="en-US" altLang="ja-JP" dirty="0" smtClean="0">
+                <a:ea typeface="ＭＳ Ｐゴシック" pitchFamily="34" charset="-128"/>
+              </a:rPr>
+              <a:t> </a:t>
+            </a:r>
+            <a:endParaRPr lang="en-US" dirty="0" smtClean="0">
+              <a:ea typeface="ＭＳ Ｐゴシック" pitchFamily="34" charset="-128"/>
+            </a:endParaRPr>
+          </a:p>
+        </p:txBody>
+      </p:sp>
+    </p:spTree>
+  </p:cSld>
+  <p:clrMapOvr>
+    <a:masterClrMapping/>
+  </p:clrMapOvr>
+  <p:transition>
+    <p:wipe dir="r"/>
+  </p:transition>
+  <p:timing>
+    <p:tnLst>
+      <p:par>
+        <p:cTn id="1" dur="indefinite" restart="never" nodeType="tmRoot"/>
+      </p:par>
+    </p:tnLst>
+  </p:timing>
 </p:sld>
 </file>
 
@@ -8372,7 +8390,12 @@
 </file>
 
 <file path=customXml/item1.xml><?xml version="1.0" encoding="utf-8"?>
-<LongProperties xmlns="http://schemas.microsoft.com/office/2006/metadata/longProperties"/>
+<?mso-contentType ?>
+<FormTemplates xmlns="http://schemas.microsoft.com/sharepoint/v3/contenttype/forms">
+  <Display>DocumentLibraryForm</Display>
+  <Edit>DocumentLibraryForm</Edit>
+  <New>DocumentLibraryForm</New>
+</FormTemplates>
 </file>
 
 <file path=customXml/item2.xml><?xml version="1.0" encoding="utf-8"?>
@@ -8436,12 +8459,7 @@
 </file>
 
 <file path=customXml/item3.xml><?xml version="1.0" encoding="utf-8"?>
-<?mso-contentType ?>
-<FormTemplates xmlns="http://schemas.microsoft.com/sharepoint/v3/contenttype/forms">
-  <Display>DocumentLibraryForm</Display>
-  <Edit>DocumentLibraryForm</Edit>
-  <New>DocumentLibraryForm</New>
-</FormTemplates>
+<LongProperties xmlns="http://schemas.microsoft.com/office/2006/metadata/longProperties"/>
 </file>
 
 <file path=customXml/item4.xml><?xml version="1.0" encoding="utf-8"?>
@@ -8453,9 +8471,9 @@
 </file>
 
 <file path=customXml/itemProps1.xml><?xml version="1.0" encoding="utf-8"?>
-<ds:datastoreItem xmlns:ds="http://schemas.openxmlformats.org/officeDocument/2006/customXml" ds:itemID="{9062B6A4-46AE-44BC-B602-351B8E15754D}">
+<ds:datastoreItem xmlns:ds="http://schemas.openxmlformats.org/officeDocument/2006/customXml" ds:itemID="{D3274669-787B-4EFD-8872-69E7B499937A}">
   <ds:schemaRefs>
-    <ds:schemaRef ds:uri="http://schemas.microsoft.com/office/2006/metadata/longProperties"/>
+    <ds:schemaRef ds:uri="http://schemas.microsoft.com/sharepoint/v3/contenttype/forms"/>
   </ds:schemaRefs>
 </ds:datastoreItem>
 </file>
@@ -8478,9 +8496,9 @@
 </file>
 
 <file path=customXml/itemProps3.xml><?xml version="1.0" encoding="utf-8"?>
-<ds:datastoreItem xmlns:ds="http://schemas.openxmlformats.org/officeDocument/2006/customXml" ds:itemID="{D3274669-787B-4EFD-8872-69E7B499937A}">
+<ds:datastoreItem xmlns:ds="http://schemas.openxmlformats.org/officeDocument/2006/customXml" ds:itemID="{9062B6A4-46AE-44BC-B602-351B8E15754D}">
   <ds:schemaRefs>
-    <ds:schemaRef ds:uri="http://schemas.microsoft.com/sharepoint/v3/contenttype/forms"/>
+    <ds:schemaRef ds:uri="http://schemas.microsoft.com/office/2006/metadata/longProperties"/>
   </ds:schemaRefs>
 </ds:datastoreItem>
 </file>

</xml_diff>

<commit_message>
started deep dive in presentation
</commit_message>
<xml_diff>
--- a/C# 5.pptx
+++ b/C# 5.pptx
@@ -2095,10 +2095,6 @@
           </a:p>
           <a:p>
             <a:pPr lvl="1"/>
-            <a:r>
-              <a:rPr lang="pl-PL" baseline="0" noProof="0" dirty="0" smtClean="0"/>
-              <a:t> </a:t>
-            </a:r>
             <a:r>
               <a:rPr lang="pl-PL" baseline="0" noProof="0" dirty="0" err="1" smtClean="0"/>
               <a:t>The</a:t>

</xml_diff>

<commit_message>
added description of coroutines
</commit_message>
<xml_diff>
--- a/C# 5.pptx
+++ b/C# 5.pptx
@@ -5,10 +5,10 @@
     <p:sldMasterId id="2147483654" r:id="rId5"/>
   </p:sldMasterIdLst>
   <p:notesMasterIdLst>
-    <p:notesMasterId r:id="rId14"/>
+    <p:notesMasterId r:id="rId15"/>
   </p:notesMasterIdLst>
   <p:handoutMasterIdLst>
-    <p:handoutMasterId r:id="rId15"/>
+    <p:handoutMasterId r:id="rId16"/>
   </p:handoutMasterIdLst>
   <p:sldIdLst>
     <p:sldId id="371" r:id="rId6"/>
@@ -18,7 +18,8 @@
     <p:sldId id="376" r:id="rId10"/>
     <p:sldId id="377" r:id="rId11"/>
     <p:sldId id="378" r:id="rId12"/>
-    <p:sldId id="372" r:id="rId13"/>
+    <p:sldId id="379" r:id="rId13"/>
+    <p:sldId id="372" r:id="rId14"/>
   </p:sldIdLst>
   <p:sldSz cx="9144000" cy="6858000" type="screen4x3"/>
   <p:notesSz cx="7061200" cy="9398000"/>
@@ -221,9 +222,9 @@
             <a:fld id="{867741B6-20E1-4219-AC3A-163B52FA3A08}" type="datetime8">
               <a:rPr lang="en-US"/>
               <a:pPr/>
-              <a:t>5/19/2012 7:50 PM</a:t>
+              <a:t>5/20/2012 9:22 PM</a:t>
             </a:fld>
-            <a:endParaRPr lang="en-US"/>
+            <a:endParaRPr lang="en-US" dirty="0"/>
           </a:p>
         </p:txBody>
       </p:sp>
@@ -275,7 +276,7 @@
               <a:pPr/>
               <a:t>‹#›</a:t>
             </a:fld>
-            <a:endParaRPr lang="en-US"/>
+            <a:endParaRPr lang="en-US" dirty="0"/>
           </a:p>
         </p:txBody>
       </p:sp>
@@ -311,7 +312,7 @@
           <a:lstStyle/>
           <a:p>
             <a:r>
-              <a:rPr lang="en-US" sz="800">
+              <a:rPr lang="en-US" sz="800" dirty="0">
                 <a:solidFill>
                   <a:schemeClr val="accent1"/>
                 </a:solidFill>
@@ -319,7 +320,7 @@
               <a:t>Copyright </a:t>
             </a:r>
             <a:r>
-              <a:rPr lang="en-US" altLang="ja-JP" sz="800">
+              <a:rPr lang="en-US" altLang="ja-JP" sz="800" dirty="0">
                 <a:solidFill>
                   <a:schemeClr val="accent1"/>
                 </a:solidFill>
@@ -327,7 +328,7 @@
               <a:t>© </a:t>
             </a:r>
             <a:r>
-              <a:rPr lang="en-US" sz="800">
+              <a:rPr lang="en-US" sz="800" dirty="0">
                 <a:solidFill>
                   <a:schemeClr val="accent1"/>
                 </a:solidFill>
@@ -414,9 +415,9 @@
             <a:fld id="{80DC343A-C7DB-48FF-A81F-D2EFF0311B91}" type="datetime8">
               <a:rPr lang="en-US"/>
               <a:pPr/>
-              <a:t>5/19/2012 7:50 PM</a:t>
+              <a:t>5/20/2012 9:22 PM</a:t>
             </a:fld>
-            <a:endParaRPr lang="en-US"/>
+            <a:endParaRPr lang="en-US" dirty="0"/>
           </a:p>
         </p:txBody>
       </p:sp>
@@ -568,7 +569,7 @@
               <a:pPr/>
               <a:t>‹#›</a:t>
             </a:fld>
-            <a:endParaRPr lang="en-US"/>
+            <a:endParaRPr lang="en-US" dirty="0"/>
           </a:p>
         </p:txBody>
       </p:sp>
@@ -604,7 +605,7 @@
           <a:lstStyle/>
           <a:p>
             <a:r>
-              <a:rPr lang="en-US" sz="800">
+              <a:rPr lang="en-US" sz="800" dirty="0">
                 <a:solidFill>
                   <a:schemeClr val="accent1"/>
                 </a:solidFill>
@@ -612,7 +613,7 @@
               <a:t>Copyright </a:t>
             </a:r>
             <a:r>
-              <a:rPr lang="en-US" altLang="ja-JP" sz="800">
+              <a:rPr lang="en-US" altLang="ja-JP" sz="800" dirty="0">
                 <a:solidFill>
                   <a:schemeClr val="accent1"/>
                 </a:solidFill>
@@ -620,7 +621,7 @@
               <a:t>© </a:t>
             </a:r>
             <a:r>
-              <a:rPr lang="en-US" sz="800">
+              <a:rPr lang="en-US" sz="800" dirty="0">
                 <a:solidFill>
                   <a:schemeClr val="accent1"/>
                 </a:solidFill>
@@ -811,7 +812,7 @@
             <a:fld id="{FE6E691D-9AEE-4359-9871-4FF78429DC86}" type="datetime8">
               <a:rPr lang="en-US"/>
               <a:pPr/>
-              <a:t>5/19/2012 7:50 PM</a:t>
+              <a:t>5/20/2012 9:22 PM</a:t>
             </a:fld>
             <a:endParaRPr lang="en-US"/>
           </a:p>
@@ -883,8 +884,10 @@
           <a:bodyPr/>
           <a:lstStyle/>
           <a:p>
-            <a:pPr eaLnBrk="1" hangingPunct="1"/>
-            <a:endParaRPr lang="en-US" altLang="ja-JP" smtClean="0">
+            <a:pPr eaLnBrk="1" hangingPunct="1">
+              <a:buNone/>
+            </a:pPr>
+            <a:endParaRPr lang="en-US" altLang="ja-JP" dirty="0" smtClean="0">
               <a:latin typeface="Arial" pitchFamily="34" charset="0"/>
               <a:ea typeface="ＭＳ Ｐゴシック" pitchFamily="34" charset="-128"/>
             </a:endParaRPr>
@@ -936,7 +939,7 @@
             <a:fld id="{AB8F9170-F656-4E08-BDFE-37D587BF0909}" type="datetime8">
               <a:rPr lang="en-US"/>
               <a:pPr/>
-              <a:t>5/19/2012 7:50 PM</a:t>
+              <a:t>5/20/2012 9:22 PM</a:t>
             </a:fld>
             <a:endParaRPr lang="en-US"/>
           </a:p>
@@ -1128,7 +1131,7 @@
             <a:fld id="{80DC343A-C7DB-48FF-A81F-D2EFF0311B91}" type="datetime8">
               <a:rPr lang="en-US" smtClean="0"/>
               <a:pPr/>
-              <a:t>5/19/2012 7:50 PM</a:t>
+              <a:t>5/20/2012 9:22 PM</a:t>
             </a:fld>
             <a:endParaRPr lang="en-US"/>
           </a:p>
@@ -1427,7 +1430,7 @@
             <a:fld id="{80DC343A-C7DB-48FF-A81F-D2EFF0311B91}" type="datetime8">
               <a:rPr lang="en-US" smtClean="0"/>
               <a:pPr/>
-              <a:t>5/19/2012 7:50 PM</a:t>
+              <a:t>5/20/2012 9:22 PM</a:t>
             </a:fld>
             <a:endParaRPr lang="en-US"/>
           </a:p>
@@ -1618,7 +1621,7 @@
             <a:fld id="{80DC343A-C7DB-48FF-A81F-D2EFF0311B91}" type="datetime8">
               <a:rPr lang="en-US" smtClean="0"/>
               <a:pPr/>
-              <a:t>5/19/2012 7:50 PM</a:t>
+              <a:t>5/20/2012 9:22 PM</a:t>
             </a:fld>
             <a:endParaRPr lang="en-US"/>
           </a:p>
@@ -1952,7 +1955,7 @@
             <a:fld id="{80DC343A-C7DB-48FF-A81F-D2EFF0311B91}" type="datetime8">
               <a:rPr lang="en-US" smtClean="0"/>
               <a:pPr/>
-              <a:t>5/19/2012 7:50 PM</a:t>
+              <a:t>5/20/2012 9:22 PM</a:t>
             </a:fld>
             <a:endParaRPr lang="en-US"/>
           </a:p>
@@ -2037,8 +2040,54 @@
           <a:lstStyle/>
           <a:p>
             <a:r>
+              <a:rPr lang="pl-PL" noProof="0" dirty="0" err="1" smtClean="0"/>
+              <a:t>Sample</a:t>
+            </a:r>
+            <a:r>
+              <a:rPr lang="pl-PL" noProof="0" dirty="0" smtClean="0"/>
+              <a:t> </a:t>
+            </a:r>
+            <a:r>
+              <a:rPr lang="pl-PL" noProof="0" dirty="0" err="1" smtClean="0"/>
+              <a:t>code</a:t>
+            </a:r>
+            <a:r>
+              <a:rPr lang="pl-PL" noProof="0" dirty="0" smtClean="0"/>
+              <a:t>  -</a:t>
+            </a:r>
+            <a:r>
+              <a:rPr lang="pl-PL" baseline="0" noProof="0" dirty="0" smtClean="0"/>
+              <a:t> </a:t>
+            </a:r>
+            <a:r>
+              <a:rPr lang="pl-PL" baseline="0" noProof="0" dirty="0" err="1" smtClean="0"/>
+              <a:t>DeepDive.ProgramFlow</a:t>
+            </a:r>
+            <a:endParaRPr lang="pl-PL" noProof="0" dirty="0" smtClean="0"/>
+          </a:p>
+          <a:p>
+            <a:r>
+              <a:rPr lang="pl-PL" noProof="0" dirty="0" err="1" smtClean="0"/>
+              <a:t>Asynchronous</a:t>
+            </a:r>
+            <a:r>
+              <a:rPr lang="pl-PL" baseline="0" noProof="0" dirty="0" smtClean="0"/>
+              <a:t> != </a:t>
+            </a:r>
+            <a:r>
+              <a:rPr lang="pl-PL" baseline="0" noProof="0" dirty="0" err="1" smtClean="0"/>
+              <a:t>Parallel</a:t>
+            </a:r>
+            <a:endParaRPr lang="pl-PL" noProof="0" dirty="0" smtClean="0"/>
+          </a:p>
+          <a:p>
+            <a:r>
               <a:rPr lang="en-US" noProof="0" dirty="0" smtClean="0"/>
-              <a:t>Caller – </a:t>
+              <a:t>Caller </a:t>
+            </a:r>
+            <a:r>
+              <a:rPr lang="en-US" noProof="0" dirty="0" smtClean="0"/>
+              <a:t>– </a:t>
             </a:r>
             <a:r>
               <a:rPr lang="en-US" noProof="0" dirty="0" err="1" smtClean="0"/>
@@ -2139,7 +2188,385 @@
               <a:rPr lang="pl-PL" baseline="0" noProof="0" dirty="0" err="1" smtClean="0"/>
               <a:t>method</a:t>
             </a:r>
-            <a:endParaRPr lang="en-US" baseline="0" noProof="0" dirty="0" smtClean="0"/>
+            <a:endParaRPr lang="pl-PL" baseline="0" noProof="0" dirty="0" smtClean="0"/>
+          </a:p>
+          <a:p>
+            <a:pPr lvl="2"/>
+            <a:r>
+              <a:rPr lang="pl-PL" baseline="0" noProof="0" dirty="0" smtClean="0"/>
+              <a:t>Has to </a:t>
+            </a:r>
+            <a:r>
+              <a:rPr lang="pl-PL" baseline="0" noProof="0" dirty="0" err="1" smtClean="0"/>
+              <a:t>implement</a:t>
+            </a:r>
+            <a:r>
+              <a:rPr lang="pl-PL" baseline="0" noProof="0" dirty="0" smtClean="0"/>
+              <a:t> </a:t>
+            </a:r>
+            <a:r>
+              <a:rPr lang="en-US" sz="800" kern="1200" dirty="0" err="1" smtClean="0">
+                <a:solidFill>
+                  <a:schemeClr val="bg1"/>
+                </a:solidFill>
+                <a:latin typeface="Arial" charset="0"/>
+                <a:ea typeface="ＭＳ Ｐゴシック" charset="0"/>
+                <a:cs typeface="+mn-cs"/>
+              </a:rPr>
+              <a:t>INotifyCompletion</a:t>
+            </a:r>
+            <a:r>
+              <a:rPr lang="pl-PL" sz="800" kern="1200" dirty="0" smtClean="0">
+                <a:solidFill>
+                  <a:schemeClr val="bg1"/>
+                </a:solidFill>
+                <a:latin typeface="Arial" charset="0"/>
+                <a:ea typeface="ＭＳ Ｐゴシック" charset="0"/>
+                <a:cs typeface="+mn-cs"/>
+              </a:rPr>
+              <a:t> -</a:t>
+            </a:r>
+            <a:r>
+              <a:rPr lang="pl-PL" sz="800" kern="1200" baseline="0" dirty="0" smtClean="0">
+                <a:solidFill>
+                  <a:schemeClr val="bg1"/>
+                </a:solidFill>
+                <a:latin typeface="Arial" charset="0"/>
+                <a:ea typeface="ＭＳ Ｐゴシック" charset="0"/>
+                <a:cs typeface="+mn-cs"/>
+              </a:rPr>
+              <a:t> </a:t>
+            </a:r>
+            <a:r>
+              <a:rPr lang="en-US" sz="800" kern="1200" dirty="0" smtClean="0">
+                <a:solidFill>
+                  <a:schemeClr val="bg1"/>
+                </a:solidFill>
+                <a:latin typeface="Arial" charset="0"/>
+                <a:ea typeface="ＭＳ Ｐゴシック" charset="0"/>
+                <a:cs typeface="+mn-cs"/>
+              </a:rPr>
+              <a:t>void </a:t>
+            </a:r>
+            <a:r>
+              <a:rPr lang="en-US" sz="800" kern="1200" dirty="0" err="1" smtClean="0">
+                <a:solidFill>
+                  <a:schemeClr val="bg1"/>
+                </a:solidFill>
+                <a:latin typeface="Arial" charset="0"/>
+                <a:ea typeface="ＭＳ Ｐゴシック" charset="0"/>
+                <a:cs typeface="+mn-cs"/>
+              </a:rPr>
+              <a:t>OnCompleted</a:t>
+            </a:r>
+            <a:r>
+              <a:rPr lang="en-US" sz="800" kern="1200" dirty="0" smtClean="0">
+                <a:solidFill>
+                  <a:schemeClr val="bg1"/>
+                </a:solidFill>
+                <a:latin typeface="Arial" charset="0"/>
+                <a:ea typeface="ＭＳ Ｐゴシック" charset="0"/>
+                <a:cs typeface="+mn-cs"/>
+              </a:rPr>
+              <a:t>(Action continuation)</a:t>
+            </a:r>
+            <a:endParaRPr lang="pl-PL" sz="800" kern="1200" dirty="0" smtClean="0">
+              <a:solidFill>
+                <a:schemeClr val="bg1"/>
+              </a:solidFill>
+              <a:latin typeface="Arial" charset="0"/>
+              <a:ea typeface="ＭＳ Ｐゴシック" charset="0"/>
+              <a:cs typeface="+mn-cs"/>
+            </a:endParaRPr>
+          </a:p>
+          <a:p>
+            <a:pPr lvl="2"/>
+            <a:r>
+              <a:rPr lang="pl-PL" sz="800" kern="1200" baseline="0" noProof="0" dirty="0" smtClean="0">
+                <a:solidFill>
+                  <a:schemeClr val="bg1"/>
+                </a:solidFill>
+                <a:latin typeface="Arial" charset="0"/>
+                <a:ea typeface="ＭＳ Ｐゴシック" charset="0"/>
+                <a:cs typeface="+mn-cs"/>
+              </a:rPr>
+              <a:t>Has to </a:t>
+            </a:r>
+            <a:r>
+              <a:rPr lang="pl-PL" sz="800" kern="1200" baseline="0" noProof="0" dirty="0" err="1" smtClean="0">
+                <a:solidFill>
+                  <a:schemeClr val="bg1"/>
+                </a:solidFill>
+                <a:latin typeface="Arial" charset="0"/>
+                <a:ea typeface="ＭＳ Ｐゴシック" charset="0"/>
+                <a:cs typeface="+mn-cs"/>
+              </a:rPr>
+              <a:t>have</a:t>
+            </a:r>
+            <a:r>
+              <a:rPr lang="pl-PL" sz="800" kern="1200" baseline="0" noProof="0" dirty="0" smtClean="0">
+                <a:solidFill>
+                  <a:schemeClr val="bg1"/>
+                </a:solidFill>
+                <a:latin typeface="Arial" charset="0"/>
+                <a:ea typeface="ＭＳ Ｐゴシック" charset="0"/>
+                <a:cs typeface="+mn-cs"/>
+              </a:rPr>
+              <a:t> </a:t>
+            </a:r>
+            <a:r>
+              <a:rPr lang="pl-PL" sz="800" kern="1200" baseline="0" noProof="0" dirty="0" err="1" smtClean="0">
+                <a:solidFill>
+                  <a:schemeClr val="bg1"/>
+                </a:solidFill>
+                <a:latin typeface="Arial" charset="0"/>
+                <a:ea typeface="ＭＳ Ｐゴシック" charset="0"/>
+                <a:cs typeface="+mn-cs"/>
+              </a:rPr>
+              <a:t>bool</a:t>
+            </a:r>
+            <a:r>
+              <a:rPr lang="pl-PL" sz="800" kern="1200" baseline="0" noProof="0" dirty="0" smtClean="0">
+                <a:solidFill>
+                  <a:schemeClr val="bg1"/>
+                </a:solidFill>
+                <a:latin typeface="Arial" charset="0"/>
+                <a:ea typeface="ＭＳ Ｐゴシック" charset="0"/>
+                <a:cs typeface="+mn-cs"/>
+              </a:rPr>
+              <a:t> </a:t>
+            </a:r>
+            <a:r>
+              <a:rPr lang="pl-PL" sz="800" kern="1200" baseline="0" noProof="0" dirty="0" err="1" smtClean="0">
+                <a:solidFill>
+                  <a:schemeClr val="bg1"/>
+                </a:solidFill>
+                <a:latin typeface="Arial" charset="0"/>
+                <a:ea typeface="ＭＳ Ｐゴシック" charset="0"/>
+                <a:cs typeface="+mn-cs"/>
+              </a:rPr>
+              <a:t>IsCompleted</a:t>
+            </a:r>
+            <a:r>
+              <a:rPr lang="pl-PL" sz="800" kern="1200" baseline="0" noProof="0" dirty="0" smtClean="0">
+                <a:solidFill>
+                  <a:schemeClr val="bg1"/>
+                </a:solidFill>
+                <a:latin typeface="Arial" charset="0"/>
+                <a:ea typeface="ＭＳ Ｐゴシック" charset="0"/>
+                <a:cs typeface="+mn-cs"/>
+              </a:rPr>
+              <a:t> property</a:t>
+            </a:r>
+          </a:p>
+          <a:p>
+            <a:pPr lvl="2"/>
+            <a:r>
+              <a:rPr lang="pl-PL" sz="800" kern="1200" baseline="0" noProof="0" dirty="0" smtClean="0">
+                <a:solidFill>
+                  <a:schemeClr val="bg1"/>
+                </a:solidFill>
+                <a:latin typeface="Arial" charset="0"/>
+                <a:ea typeface="ＭＳ Ｐゴシック" charset="0"/>
+                <a:cs typeface="+mn-cs"/>
+              </a:rPr>
+              <a:t>Has to </a:t>
+            </a:r>
+            <a:r>
+              <a:rPr lang="pl-PL" sz="800" kern="1200" baseline="0" noProof="0" dirty="0" err="1" smtClean="0">
+                <a:solidFill>
+                  <a:schemeClr val="bg1"/>
+                </a:solidFill>
+                <a:latin typeface="Arial" charset="0"/>
+                <a:ea typeface="ＭＳ Ｐゴシック" charset="0"/>
+                <a:cs typeface="+mn-cs"/>
+              </a:rPr>
+              <a:t>have</a:t>
+            </a:r>
+            <a:r>
+              <a:rPr lang="pl-PL" sz="800" kern="1200" baseline="0" noProof="0" dirty="0" smtClean="0">
+                <a:solidFill>
+                  <a:schemeClr val="bg1"/>
+                </a:solidFill>
+                <a:latin typeface="Arial" charset="0"/>
+                <a:ea typeface="ＭＳ Ｐゴシック" charset="0"/>
+                <a:cs typeface="+mn-cs"/>
+              </a:rPr>
+              <a:t> </a:t>
+            </a:r>
+            <a:r>
+              <a:rPr lang="pl-PL" sz="800" kern="1200" baseline="0" noProof="0" dirty="0" err="1" smtClean="0">
+                <a:solidFill>
+                  <a:schemeClr val="bg1"/>
+                </a:solidFill>
+                <a:latin typeface="Arial" charset="0"/>
+                <a:ea typeface="ＭＳ Ｐゴシック" charset="0"/>
+                <a:cs typeface="+mn-cs"/>
+              </a:rPr>
+              <a:t>GetResults</a:t>
+            </a:r>
+            <a:r>
+              <a:rPr lang="pl-PL" sz="800" kern="1200" baseline="0" noProof="0" dirty="0" smtClean="0">
+                <a:solidFill>
+                  <a:schemeClr val="bg1"/>
+                </a:solidFill>
+                <a:latin typeface="Arial" charset="0"/>
+                <a:ea typeface="ＭＳ Ｐゴシック" charset="0"/>
+                <a:cs typeface="+mn-cs"/>
+              </a:rPr>
+              <a:t> </a:t>
+            </a:r>
+            <a:r>
+              <a:rPr lang="pl-PL" sz="800" kern="1200" baseline="0" noProof="0" dirty="0" err="1" smtClean="0">
+                <a:solidFill>
+                  <a:schemeClr val="bg1"/>
+                </a:solidFill>
+                <a:latin typeface="Arial" charset="0"/>
+                <a:ea typeface="ＭＳ Ｐゴシック" charset="0"/>
+                <a:cs typeface="+mn-cs"/>
+              </a:rPr>
+              <a:t>method</a:t>
+            </a:r>
+            <a:r>
+              <a:rPr lang="pl-PL" sz="800" kern="1200" baseline="0" noProof="0" dirty="0" smtClean="0">
+                <a:solidFill>
+                  <a:schemeClr val="bg1"/>
+                </a:solidFill>
+                <a:latin typeface="Arial" charset="0"/>
+                <a:ea typeface="ＭＳ Ｐゴシック" charset="0"/>
+                <a:cs typeface="+mn-cs"/>
+              </a:rPr>
+              <a:t> </a:t>
+            </a:r>
+            <a:r>
+              <a:rPr lang="pl-PL" sz="800" kern="1200" baseline="0" noProof="0" dirty="0" err="1" smtClean="0">
+                <a:solidFill>
+                  <a:schemeClr val="bg1"/>
+                </a:solidFill>
+                <a:latin typeface="Arial" charset="0"/>
+                <a:ea typeface="ＭＳ Ｐゴシック" charset="0"/>
+                <a:cs typeface="+mn-cs"/>
+              </a:rPr>
+              <a:t>providing</a:t>
+            </a:r>
+            <a:r>
+              <a:rPr lang="pl-PL" sz="800" kern="1200" baseline="0" noProof="0" dirty="0" smtClean="0">
+                <a:solidFill>
+                  <a:schemeClr val="bg1"/>
+                </a:solidFill>
+                <a:latin typeface="Arial" charset="0"/>
+                <a:ea typeface="ＭＳ Ｐゴシック" charset="0"/>
+                <a:cs typeface="+mn-cs"/>
+              </a:rPr>
+              <a:t> </a:t>
+            </a:r>
+            <a:r>
+              <a:rPr lang="pl-PL" sz="800" kern="1200" baseline="0" noProof="0" dirty="0" err="1" smtClean="0">
+                <a:solidFill>
+                  <a:schemeClr val="bg1"/>
+                </a:solidFill>
+                <a:latin typeface="Arial" charset="0"/>
+                <a:ea typeface="ＭＳ Ｐゴシック" charset="0"/>
+                <a:cs typeface="+mn-cs"/>
+              </a:rPr>
+              <a:t>results</a:t>
+            </a:r>
+            <a:r>
+              <a:rPr lang="pl-PL" sz="800" kern="1200" baseline="0" noProof="0" dirty="0" smtClean="0">
+                <a:solidFill>
+                  <a:schemeClr val="bg1"/>
+                </a:solidFill>
+                <a:latin typeface="Arial" charset="0"/>
+                <a:ea typeface="ＭＳ Ｐゴシック" charset="0"/>
+                <a:cs typeface="+mn-cs"/>
+              </a:rPr>
+              <a:t> of </a:t>
+            </a:r>
+            <a:r>
+              <a:rPr lang="pl-PL" sz="800" kern="1200" baseline="0" noProof="0" dirty="0" err="1" smtClean="0">
+                <a:solidFill>
+                  <a:schemeClr val="bg1"/>
+                </a:solidFill>
+                <a:latin typeface="Arial" charset="0"/>
+                <a:ea typeface="ＭＳ Ｐゴシック" charset="0"/>
+                <a:cs typeface="+mn-cs"/>
+              </a:rPr>
+              <a:t>await</a:t>
+            </a:r>
+            <a:endParaRPr lang="pl-PL" sz="800" kern="1200" baseline="0" noProof="0" dirty="0" smtClean="0">
+              <a:solidFill>
+                <a:schemeClr val="bg1"/>
+              </a:solidFill>
+              <a:latin typeface="Arial" charset="0"/>
+              <a:ea typeface="ＭＳ Ｐゴシック" charset="0"/>
+              <a:cs typeface="+mn-cs"/>
+            </a:endParaRPr>
+          </a:p>
+          <a:p>
+            <a:pPr lvl="0"/>
+            <a:r>
+              <a:rPr lang="pl-PL" sz="1000" kern="1200" baseline="0" noProof="0" dirty="0" err="1" smtClean="0">
+                <a:solidFill>
+                  <a:schemeClr val="bg1"/>
+                </a:solidFill>
+                <a:latin typeface="Arial" charset="0"/>
+                <a:ea typeface="ＭＳ Ｐゴシック" charset="0"/>
+                <a:cs typeface="+mn-cs"/>
+              </a:rPr>
+              <a:t>Sample</a:t>
+            </a:r>
+            <a:r>
+              <a:rPr lang="pl-PL" sz="1000" kern="1200" baseline="0" noProof="0" dirty="0" smtClean="0">
+                <a:solidFill>
+                  <a:schemeClr val="bg1"/>
+                </a:solidFill>
+                <a:latin typeface="Arial" charset="0"/>
+                <a:ea typeface="ＭＳ Ｐゴシック" charset="0"/>
+                <a:cs typeface="+mn-cs"/>
+              </a:rPr>
+              <a:t> </a:t>
+            </a:r>
+            <a:r>
+              <a:rPr lang="pl-PL" sz="1000" kern="1200" baseline="0" noProof="0" dirty="0" err="1" smtClean="0">
+                <a:solidFill>
+                  <a:schemeClr val="bg1"/>
+                </a:solidFill>
+                <a:latin typeface="Arial" charset="0"/>
+                <a:ea typeface="ＭＳ Ｐゴシック" charset="0"/>
+                <a:cs typeface="+mn-cs"/>
+              </a:rPr>
+              <a:t>code</a:t>
+            </a:r>
+            <a:r>
+              <a:rPr lang="pl-PL" sz="1000" kern="1200" baseline="0" noProof="0" dirty="0" smtClean="0">
+                <a:solidFill>
+                  <a:schemeClr val="bg1"/>
+                </a:solidFill>
+                <a:latin typeface="Arial" charset="0"/>
+                <a:ea typeface="ＭＳ Ｐゴシック" charset="0"/>
+                <a:cs typeface="+mn-cs"/>
+              </a:rPr>
+              <a:t> </a:t>
+            </a:r>
+            <a:r>
+              <a:rPr lang="pl-PL" sz="1000" kern="1200" baseline="0" noProof="0" dirty="0" err="1" smtClean="0">
+                <a:solidFill>
+                  <a:schemeClr val="bg1"/>
+                </a:solidFill>
+                <a:latin typeface="Arial" charset="0"/>
+                <a:ea typeface="ＭＳ Ｐゴシック" charset="0"/>
+                <a:cs typeface="+mn-cs"/>
+              </a:rPr>
+              <a:t>DeepDive.BasicAwaiterTest</a:t>
+            </a:r>
+            <a:endParaRPr lang="pl-PL" sz="1000" kern="1200" baseline="0" noProof="0" dirty="0" smtClean="0">
+              <a:solidFill>
+                <a:schemeClr val="bg1"/>
+              </a:solidFill>
+              <a:latin typeface="Arial" charset="0"/>
+              <a:ea typeface="ＭＳ Ｐゴシック" charset="0"/>
+              <a:cs typeface="+mn-cs"/>
+            </a:endParaRPr>
           </a:p>
         </p:txBody>
       </p:sp>
@@ -2161,7 +2588,7 @@
             <a:fld id="{80DC343A-C7DB-48FF-A81F-D2EFF0311B91}" type="datetime8">
               <a:rPr lang="en-US" smtClean="0"/>
               <a:pPr/>
-              <a:t>5/19/2012 7:50 PM</a:t>
+              <a:t>5/20/2012 9:23 PM</a:t>
             </a:fld>
             <a:endParaRPr lang="en-US"/>
           </a:p>
@@ -2218,6 +2645,178 @@
       </p:grpSpPr>
       <p:sp>
         <p:nvSpPr>
+          <p:cNvPr id="2" name="Symbol zastępczy obrazu slajdu 1"/>
+          <p:cNvSpPr>
+            <a:spLocks noGrp="1" noRot="1" noChangeAspect="1"/>
+          </p:cNvSpPr>
+          <p:nvPr>
+            <p:ph type="sldImg"/>
+          </p:nvPr>
+        </p:nvSpPr>
+        <p:spPr/>
+      </p:sp>
+      <p:sp>
+        <p:nvSpPr>
+          <p:cNvPr id="3" name="Symbol zastępczy notatek 2"/>
+          <p:cNvSpPr>
+            <a:spLocks noGrp="1"/>
+          </p:cNvSpPr>
+          <p:nvPr>
+            <p:ph type="body" idx="1"/>
+          </p:nvPr>
+        </p:nvSpPr>
+        <p:spPr/>
+        <p:txBody>
+          <a:bodyPr>
+            <a:normAutofit/>
+          </a:bodyPr>
+          <a:lstStyle/>
+          <a:p>
+            <a:r>
+              <a:rPr lang="en-US" noProof="0" dirty="0" smtClean="0"/>
+              <a:t>To be effective</a:t>
+            </a:r>
+            <a:r>
+              <a:rPr lang="en-US" baseline="0" noProof="0" dirty="0" smtClean="0"/>
+              <a:t> needs support from tooling/compiler</a:t>
+            </a:r>
+          </a:p>
+          <a:p>
+            <a:r>
+              <a:rPr lang="en-US" baseline="0" noProof="0" dirty="0" smtClean="0"/>
+              <a:t>Generally speaking the method execution is suspended, and will continue at some point in time, preserving all the state</a:t>
+            </a:r>
+          </a:p>
+          <a:p>
+            <a:r>
+              <a:rPr lang="en-US" baseline="0" noProof="0" dirty="0" smtClean="0"/>
+              <a:t>Some problems are easier to solve/implement using </a:t>
+            </a:r>
+            <a:r>
+              <a:rPr lang="en-US" baseline="0" noProof="0" dirty="0" err="1" smtClean="0"/>
+              <a:t>coroutines</a:t>
+            </a:r>
+            <a:r>
+              <a:rPr lang="en-US" baseline="0" noProof="0" dirty="0" smtClean="0"/>
+              <a:t> – mostly those that are solved with state machines</a:t>
+            </a:r>
+          </a:p>
+          <a:p>
+            <a:r>
+              <a:rPr lang="en-US" baseline="0" noProof="0" dirty="0" smtClean="0"/>
+              <a:t>Extensively used in Python with older generators and newer </a:t>
+            </a:r>
+            <a:r>
+              <a:rPr lang="en-US" baseline="0" noProof="0" dirty="0" err="1" smtClean="0"/>
+              <a:t>coroutines</a:t>
+            </a:r>
+            <a:r>
+              <a:rPr lang="en-US" baseline="0" noProof="0" dirty="0" smtClean="0"/>
+              <a:t> (yield keyword)</a:t>
+            </a:r>
+          </a:p>
+          <a:p>
+            <a:r>
+              <a:rPr lang="en-US" baseline="0" noProof="0" dirty="0" smtClean="0"/>
+              <a:t>Recently implemented in Ruby as </a:t>
+            </a:r>
+            <a:r>
+              <a:rPr lang="en-US" baseline="0" noProof="0" smtClean="0"/>
+              <a:t>Fibres</a:t>
+            </a:r>
+            <a:endParaRPr lang="en-US" baseline="0" noProof="0" dirty="0" smtClean="0"/>
+          </a:p>
+          <a:p>
+            <a:pPr>
+              <a:buNone/>
+            </a:pPr>
+            <a:r>
+              <a:rPr lang="en-US" baseline="0" noProof="0" dirty="0" smtClean="0"/>
+              <a:t>Code Sample </a:t>
+            </a:r>
+            <a:r>
+              <a:rPr lang="en-US" baseline="0" noProof="0" dirty="0" err="1" smtClean="0"/>
+              <a:t>DeepDive.StateMachine</a:t>
+            </a:r>
+            <a:endParaRPr lang="en-US" noProof="0" dirty="0"/>
+          </a:p>
+        </p:txBody>
+      </p:sp>
+      <p:sp>
+        <p:nvSpPr>
+          <p:cNvPr id="4" name="Symbol zastępczy daty 3"/>
+          <p:cNvSpPr>
+            <a:spLocks noGrp="1"/>
+          </p:cNvSpPr>
+          <p:nvPr>
+            <p:ph type="dt" idx="10"/>
+          </p:nvPr>
+        </p:nvSpPr>
+        <p:spPr/>
+        <p:txBody>
+          <a:bodyPr/>
+          <a:lstStyle/>
+          <a:p>
+            <a:fld id="{80DC343A-C7DB-48FF-A81F-D2EFF0311B91}" type="datetime8">
+              <a:rPr lang="en-US" smtClean="0"/>
+              <a:pPr/>
+              <a:t>5/20/2012 9:29 PM</a:t>
+            </a:fld>
+            <a:endParaRPr lang="en-US" dirty="0"/>
+          </a:p>
+        </p:txBody>
+      </p:sp>
+      <p:sp>
+        <p:nvSpPr>
+          <p:cNvPr id="5" name="Symbol zastępczy numeru slajdu 4"/>
+          <p:cNvSpPr>
+            <a:spLocks noGrp="1"/>
+          </p:cNvSpPr>
+          <p:nvPr>
+            <p:ph type="sldNum" sz="quarter" idx="11"/>
+          </p:nvPr>
+        </p:nvSpPr>
+        <p:spPr/>
+        <p:txBody>
+          <a:bodyPr/>
+          <a:lstStyle/>
+          <a:p>
+            <a:fld id="{A0C6CE09-155B-4DAE-A37A-B074B6B02DD4}" type="slidenum">
+              <a:rPr lang="en-US" smtClean="0"/>
+              <a:pPr/>
+              <a:t>8</a:t>
+            </a:fld>
+            <a:endParaRPr lang="en-US" dirty="0"/>
+          </a:p>
+        </p:txBody>
+      </p:sp>
+    </p:spTree>
+  </p:cSld>
+  <p:clrMapOvr>
+    <a:masterClrMapping/>
+  </p:clrMapOvr>
+</p:notes>
+</file>
+
+<file path=ppt/notesSlides/notesSlide9.xml><?xml version="1.0" encoding="utf-8"?>
+<p:notes xmlns:a="http://schemas.openxmlformats.org/drawingml/2006/main" xmlns:r="http://schemas.openxmlformats.org/officeDocument/2006/relationships" xmlns:p="http://schemas.openxmlformats.org/presentationml/2006/main">
+  <p:cSld>
+    <p:spTree>
+      <p:nvGrpSpPr>
+        <p:cNvPr id="1" name=""/>
+        <p:cNvGrpSpPr/>
+        <p:nvPr/>
+      </p:nvGrpSpPr>
+      <p:grpSpPr>
+        <a:xfrm>
+          <a:off x="0" y="0"/>
+          <a:ext cx="0" cy="0"/>
+          <a:chOff x="0" y="0"/>
+          <a:chExt cx="0" cy="0"/>
+        </a:xfrm>
+      </p:grpSpPr>
+      <p:sp>
+        <p:nvSpPr>
           <p:cNvPr id="18433" name="Rectangle 3"/>
           <p:cNvSpPr>
             <a:spLocks noGrp="1" noChangeArrowheads="1"/>
@@ -2236,9 +2835,9 @@
             <a:fld id="{AB8F9170-F656-4E08-BDFE-37D587BF0909}" type="datetime8">
               <a:rPr lang="en-US"/>
               <a:pPr/>
-              <a:t>5/19/2012 7:50 PM</a:t>
+              <a:t>5/20/2012 9:22 PM</a:t>
             </a:fld>
-            <a:endParaRPr lang="en-US"/>
+            <a:endParaRPr lang="en-US" dirty="0"/>
           </a:p>
         </p:txBody>
       </p:sp>
@@ -2262,9 +2861,9 @@
             <a:fld id="{E73A29F1-A36F-4C0F-8D5B-36FFE114B347}" type="slidenum">
               <a:rPr lang="en-US"/>
               <a:pPr/>
-              <a:t>8</a:t>
+              <a:t>9</a:t>
             </a:fld>
-            <a:endParaRPr lang="en-US"/>
+            <a:endParaRPr lang="en-US" dirty="0"/>
           </a:p>
         </p:txBody>
       </p:sp>
@@ -2383,7 +2982,7 @@
             <a:bodyPr/>
             <a:lstStyle/>
             <a:p>
-              <a:endParaRPr lang="en-US"/>
+              <a:endParaRPr lang="en-US" dirty="0"/>
             </a:p>
           </p:txBody>
         </p:sp>
@@ -2652,7 +3251,7 @@
               <a:pPr/>
               <a:t>‹#›</a:t>
             </a:fld>
-            <a:endParaRPr lang="en-US"/>
+            <a:endParaRPr lang="en-US" dirty="0"/>
           </a:p>
         </p:txBody>
       </p:sp>
@@ -2792,7 +3391,7 @@
               <a:pPr/>
               <a:t>‹#›</a:t>
             </a:fld>
-            <a:endParaRPr lang="en-US"/>
+            <a:endParaRPr lang="en-US" dirty="0"/>
           </a:p>
         </p:txBody>
       </p:sp>
@@ -2922,7 +3521,7 @@
               <a:pPr/>
               <a:t>‹#›</a:t>
             </a:fld>
-            <a:endParaRPr lang="en-US"/>
+            <a:endParaRPr lang="en-US" dirty="0"/>
           </a:p>
         </p:txBody>
       </p:sp>
@@ -3074,7 +3673,7 @@
               <a:pPr/>
               <a:t>‹#›</a:t>
             </a:fld>
-            <a:endParaRPr lang="en-US"/>
+            <a:endParaRPr lang="en-US" dirty="0"/>
           </a:p>
         </p:txBody>
       </p:sp>
@@ -3322,7 +3921,7 @@
               <a:pPr/>
               <a:t>‹#›</a:t>
             </a:fld>
-            <a:endParaRPr lang="en-US"/>
+            <a:endParaRPr lang="en-US" dirty="0"/>
           </a:p>
         </p:txBody>
       </p:sp>
@@ -3709,7 +4308,7 @@
               <a:pPr/>
               <a:t>‹#›</a:t>
             </a:fld>
-            <a:endParaRPr lang="en-US"/>
+            <a:endParaRPr lang="en-US" dirty="0"/>
           </a:p>
         </p:txBody>
       </p:sp>
@@ -3787,7 +4386,7 @@
               <a:pPr/>
               <a:t>‹#›</a:t>
             </a:fld>
-            <a:endParaRPr lang="en-US"/>
+            <a:endParaRPr lang="en-US" dirty="0"/>
           </a:p>
         </p:txBody>
       </p:sp>
@@ -3842,7 +4441,7 @@
               <a:pPr/>
               <a:t>‹#›</a:t>
             </a:fld>
-            <a:endParaRPr lang="en-US"/>
+            <a:endParaRPr lang="en-US" dirty="0"/>
           </a:p>
         </p:txBody>
       </p:sp>
@@ -4079,7 +4678,7 @@
               <a:pPr/>
               <a:t>‹#›</a:t>
             </a:fld>
-            <a:endParaRPr lang="en-US"/>
+            <a:endParaRPr lang="en-US" dirty="0"/>
           </a:p>
         </p:txBody>
       </p:sp>
@@ -4199,7 +4798,7 @@
           <a:p>
             <a:pPr lvl="0"/>
             <a:r>
-              <a:rPr lang="en-US" noProof="0" smtClean="0"/>
+              <a:rPr lang="en-US" noProof="0" dirty="0" smtClean="0"/>
               <a:t>Click icon to add picture</a:t>
             </a:r>
           </a:p>
@@ -4296,7 +4895,7 @@
               <a:pPr/>
               <a:t>‹#›</a:t>
             </a:fld>
-            <a:endParaRPr lang="en-US"/>
+            <a:endParaRPr lang="en-US" dirty="0"/>
           </a:p>
         </p:txBody>
       </p:sp>
@@ -4379,7 +4978,7 @@
             <a:bodyPr/>
             <a:lstStyle/>
             <a:p>
-              <a:endParaRPr lang="en-US"/>
+              <a:endParaRPr lang="en-US" dirty="0"/>
             </a:p>
           </p:txBody>
         </p:sp>
@@ -4464,7 +5063,7 @@
               <a:pPr/>
               <a:t>‹#›</a:t>
             </a:fld>
-            <a:endParaRPr lang="en-US"/>
+            <a:endParaRPr lang="en-US" dirty="0"/>
           </a:p>
         </p:txBody>
       </p:sp>
@@ -4612,7 +5211,7 @@
           <a:lstStyle/>
           <a:p>
             <a:r>
-              <a:rPr lang="en-US" sz="800">
+              <a:rPr lang="en-US" sz="800" dirty="0">
                 <a:solidFill>
                   <a:schemeClr val="accent1"/>
                 </a:solidFill>
@@ -4620,7 +5219,7 @@
               <a:t>Copyright </a:t>
             </a:r>
             <a:r>
-              <a:rPr lang="en-US" altLang="ja-JP" sz="800">
+              <a:rPr lang="en-US" altLang="ja-JP" sz="800" dirty="0">
                 <a:solidFill>
                   <a:schemeClr val="accent1"/>
                 </a:solidFill>
@@ -4628,7 +5227,7 @@
               <a:t>© </a:t>
             </a:r>
             <a:r>
-              <a:rPr lang="en-US" sz="800">
+              <a:rPr lang="en-US" sz="800" dirty="0">
                 <a:solidFill>
                   <a:schemeClr val="accent1"/>
                 </a:solidFill>
@@ -4669,7 +5268,7 @@
           <a:lstStyle/>
           <a:p>
             <a:r>
-              <a:rPr lang="en-US" sz="800">
+              <a:rPr lang="en-US" sz="800" dirty="0">
                 <a:solidFill>
                   <a:schemeClr val="accent1"/>
                 </a:solidFill>
@@ -7053,139 +7652,6 @@
           <a:chExt cx="0" cy="0"/>
         </a:xfrm>
       </p:grpSpPr>
-      <p:sp>
-        <p:nvSpPr>
-          <p:cNvPr id="2" name="Tytuł 1"/>
-          <p:cNvSpPr>
-            <a:spLocks noGrp="1"/>
-          </p:cNvSpPr>
-          <p:nvPr>
-            <p:ph type="title"/>
-          </p:nvPr>
-        </p:nvSpPr>
-        <p:spPr/>
-        <p:txBody>
-          <a:bodyPr/>
-          <a:lstStyle/>
-          <a:p>
-            <a:r>
-              <a:rPr lang="pl-PL" dirty="0" err="1" smtClean="0"/>
-              <a:t>Async</a:t>
-            </a:r>
-            <a:r>
-              <a:rPr lang="pl-PL" dirty="0" smtClean="0"/>
-              <a:t> – </a:t>
-            </a:r>
-            <a:r>
-              <a:rPr lang="pl-PL" dirty="0" err="1" smtClean="0"/>
-              <a:t>deep</a:t>
-            </a:r>
-            <a:r>
-              <a:rPr lang="pl-PL" dirty="0" smtClean="0"/>
-              <a:t> </a:t>
-            </a:r>
-            <a:r>
-              <a:rPr lang="pl-PL" dirty="0" err="1" smtClean="0"/>
-              <a:t>dive</a:t>
-            </a:r>
-            <a:r>
-              <a:rPr lang="pl-PL" dirty="0" smtClean="0"/>
-              <a:t> – </a:t>
-            </a:r>
-            <a:r>
-              <a:rPr lang="pl-PL" dirty="0" err="1" smtClean="0"/>
-              <a:t>kudos</a:t>
-            </a:r>
-            <a:r>
-              <a:rPr lang="pl-PL" dirty="0" smtClean="0"/>
-              <a:t> to Jon </a:t>
-            </a:r>
-            <a:r>
-              <a:rPr lang="pl-PL" dirty="0" err="1" smtClean="0"/>
-              <a:t>Skeet</a:t>
-            </a:r>
-            <a:endParaRPr lang="pl-PL" dirty="0"/>
-          </a:p>
-        </p:txBody>
-      </p:sp>
-      <p:sp>
-        <p:nvSpPr>
-          <p:cNvPr id="3" name="Symbol zastępczy zawartości 2"/>
-          <p:cNvSpPr>
-            <a:spLocks noGrp="1"/>
-          </p:cNvSpPr>
-          <p:nvPr>
-            <p:ph sz="half" idx="1"/>
-          </p:nvPr>
-        </p:nvSpPr>
-        <p:spPr>
-          <a:xfrm>
-            <a:off x="209550" y="4770120"/>
-            <a:ext cx="8553450" cy="1300480"/>
-          </a:xfrm>
-        </p:spPr>
-        <p:txBody>
-          <a:bodyPr/>
-          <a:lstStyle/>
-          <a:p>
-            <a:r>
-              <a:rPr lang="en-US" dirty="0" smtClean="0"/>
-              <a:t>Caller – </a:t>
-            </a:r>
-            <a:r>
-              <a:rPr lang="en-US" dirty="0" err="1" smtClean="0"/>
-              <a:t>Async</a:t>
-            </a:r>
-            <a:r>
-              <a:rPr lang="en-US" dirty="0" smtClean="0"/>
-              <a:t> Method</a:t>
-            </a:r>
-          </a:p>
-          <a:p>
-            <a:r>
-              <a:rPr lang="en-US" dirty="0" err="1" smtClean="0"/>
-              <a:t>Async</a:t>
-            </a:r>
-            <a:r>
-              <a:rPr lang="en-US" dirty="0" smtClean="0"/>
-              <a:t> method – await – </a:t>
-            </a:r>
-            <a:r>
-              <a:rPr lang="en-US" dirty="0" err="1" smtClean="0"/>
-              <a:t>Awaitable</a:t>
-            </a:r>
-            <a:r>
-              <a:rPr lang="en-US" dirty="0" smtClean="0"/>
-              <a:t> action</a:t>
-            </a:r>
-            <a:endParaRPr lang="en-US" dirty="0"/>
-          </a:p>
-        </p:txBody>
-      </p:sp>
-      <p:sp>
-        <p:nvSpPr>
-          <p:cNvPr id="5" name="Symbol zastępczy numeru slajdu 4"/>
-          <p:cNvSpPr>
-            <a:spLocks noGrp="1"/>
-          </p:cNvSpPr>
-          <p:nvPr>
-            <p:ph type="sldNum" sz="quarter" idx="10"/>
-          </p:nvPr>
-        </p:nvSpPr>
-        <p:spPr/>
-        <p:txBody>
-          <a:bodyPr/>
-          <a:lstStyle/>
-          <a:p>
-            <a:fld id="{ADB16C16-69E8-432F-B853-B6E493C1998A}" type="slidenum">
-              <a:rPr lang="en-US" smtClean="0"/>
-              <a:pPr/>
-              <a:t>7</a:t>
-            </a:fld>
-            <a:endParaRPr lang="en-US"/>
-          </a:p>
-        </p:txBody>
-      </p:sp>
       <p:pic>
         <p:nvPicPr>
           <p:cNvPr id="1027" name="Picture 3"/>
@@ -7205,8 +7671,8 @@
         </p:blipFill>
         <p:spPr bwMode="auto">
           <a:xfrm>
-            <a:off x="1724624" y="1455420"/>
-            <a:ext cx="5694753" cy="3084658"/>
+            <a:off x="929640" y="1455420"/>
+            <a:ext cx="6850967" cy="3710940"/>
           </a:xfrm>
           <a:prstGeom prst="rect">
             <a:avLst/>
@@ -7220,6 +7686,139 @@
           </a:ln>
         </p:spPr>
       </p:pic>
+      <p:sp>
+        <p:nvSpPr>
+          <p:cNvPr id="2" name="Tytuł 1"/>
+          <p:cNvSpPr>
+            <a:spLocks noGrp="1"/>
+          </p:cNvSpPr>
+          <p:nvPr>
+            <p:ph type="title"/>
+          </p:nvPr>
+        </p:nvSpPr>
+        <p:spPr/>
+        <p:txBody>
+          <a:bodyPr/>
+          <a:lstStyle/>
+          <a:p>
+            <a:r>
+              <a:rPr lang="pl-PL" dirty="0" err="1" smtClean="0"/>
+              <a:t>Async</a:t>
+            </a:r>
+            <a:r>
+              <a:rPr lang="pl-PL" dirty="0" smtClean="0"/>
+              <a:t> – </a:t>
+            </a:r>
+            <a:r>
+              <a:rPr lang="pl-PL" dirty="0" err="1" smtClean="0"/>
+              <a:t>deep</a:t>
+            </a:r>
+            <a:r>
+              <a:rPr lang="pl-PL" dirty="0" smtClean="0"/>
+              <a:t> </a:t>
+            </a:r>
+            <a:r>
+              <a:rPr lang="pl-PL" dirty="0" err="1" smtClean="0"/>
+              <a:t>dive</a:t>
+            </a:r>
+            <a:r>
+              <a:rPr lang="pl-PL" dirty="0" smtClean="0"/>
+              <a:t> – </a:t>
+            </a:r>
+            <a:r>
+              <a:rPr lang="pl-PL" dirty="0" err="1" smtClean="0"/>
+              <a:t>kudos</a:t>
+            </a:r>
+            <a:r>
+              <a:rPr lang="pl-PL" dirty="0" smtClean="0"/>
+              <a:t> to Jon </a:t>
+            </a:r>
+            <a:r>
+              <a:rPr lang="pl-PL" dirty="0" err="1" smtClean="0"/>
+              <a:t>Skeet</a:t>
+            </a:r>
+            <a:endParaRPr lang="pl-PL" dirty="0"/>
+          </a:p>
+        </p:txBody>
+      </p:sp>
+      <p:sp>
+        <p:nvSpPr>
+          <p:cNvPr id="3" name="Symbol zastępczy zawartości 2"/>
+          <p:cNvSpPr>
+            <a:spLocks noGrp="1"/>
+          </p:cNvSpPr>
+          <p:nvPr>
+            <p:ph sz="half" idx="1"/>
+          </p:nvPr>
+        </p:nvSpPr>
+        <p:spPr>
+          <a:xfrm>
+            <a:off x="209550" y="4770120"/>
+            <a:ext cx="8553450" cy="1300480"/>
+          </a:xfrm>
+        </p:spPr>
+        <p:txBody>
+          <a:bodyPr/>
+          <a:lstStyle/>
+          <a:p>
+            <a:r>
+              <a:rPr lang="en-US" dirty="0" smtClean="0"/>
+              <a:t>Caller – </a:t>
+            </a:r>
+            <a:r>
+              <a:rPr lang="en-US" dirty="0" err="1" smtClean="0"/>
+              <a:t>Async</a:t>
+            </a:r>
+            <a:r>
+              <a:rPr lang="en-US" dirty="0" smtClean="0"/>
+              <a:t> Method</a:t>
+            </a:r>
+          </a:p>
+          <a:p>
+            <a:r>
+              <a:rPr lang="en-US" dirty="0" err="1" smtClean="0"/>
+              <a:t>Async</a:t>
+            </a:r>
+            <a:r>
+              <a:rPr lang="en-US" dirty="0" smtClean="0"/>
+              <a:t> method – await – </a:t>
+            </a:r>
+            <a:r>
+              <a:rPr lang="en-US" dirty="0" err="1" smtClean="0"/>
+              <a:t>Awaitable</a:t>
+            </a:r>
+            <a:r>
+              <a:rPr lang="en-US" dirty="0" smtClean="0"/>
+              <a:t> action</a:t>
+            </a:r>
+            <a:endParaRPr lang="en-US" dirty="0"/>
+          </a:p>
+        </p:txBody>
+      </p:sp>
+      <p:sp>
+        <p:nvSpPr>
+          <p:cNvPr id="5" name="Symbol zastępczy numeru slajdu 4"/>
+          <p:cNvSpPr>
+            <a:spLocks noGrp="1"/>
+          </p:cNvSpPr>
+          <p:nvPr>
+            <p:ph type="sldNum" sz="quarter" idx="10"/>
+          </p:nvPr>
+        </p:nvSpPr>
+        <p:spPr/>
+        <p:txBody>
+          <a:bodyPr/>
+          <a:lstStyle/>
+          <a:p>
+            <a:fld id="{ADB16C16-69E8-432F-B853-B6E493C1998A}" type="slidenum">
+              <a:rPr lang="en-US" smtClean="0"/>
+              <a:pPr/>
+              <a:t>7</a:t>
+            </a:fld>
+            <a:endParaRPr lang="en-US"/>
+          </a:p>
+        </p:txBody>
+      </p:sp>
     </p:spTree>
   </p:cSld>
   <p:clrMapOvr>
@@ -7247,27 +7846,156 @@
       </p:grpSpPr>
       <p:sp>
         <p:nvSpPr>
-          <p:cNvPr id="17409" name="Slide Number Placeholder 3"/>
+          <p:cNvPr id="2" name="Tytuł 1"/>
           <p:cNvSpPr>
             <a:spLocks noGrp="1"/>
           </p:cNvSpPr>
           <p:nvPr>
-            <p:ph type="sldNum" sz="quarter" idx="10"/>
-          </p:nvPr>
-        </p:nvSpPr>
-        <p:spPr>
-          <a:noFill/>
-        </p:spPr>
+            <p:ph type="title"/>
+          </p:nvPr>
+        </p:nvSpPr>
+        <p:spPr/>
         <p:txBody>
           <a:bodyPr/>
           <a:lstStyle/>
           <a:p>
-            <a:fld id="{B8923B82-4FEA-4C63-961B-70B71B12A787}" type="slidenum">
-              <a:rPr lang="en-US"/>
+            <a:r>
+              <a:rPr lang="pl-PL" dirty="0" err="1" smtClean="0"/>
+              <a:t>Async</a:t>
+            </a:r>
+            <a:r>
+              <a:rPr lang="pl-PL" dirty="0" smtClean="0"/>
+              <a:t> - </a:t>
+            </a:r>
+            <a:r>
+              <a:rPr lang="pl-PL" dirty="0" err="1" smtClean="0"/>
+              <a:t>coroutines</a:t>
+            </a:r>
+            <a:endParaRPr lang="en-US" dirty="0"/>
+          </a:p>
+        </p:txBody>
+      </p:sp>
+      <p:sp>
+        <p:nvSpPr>
+          <p:cNvPr id="3" name="Symbol zastępczy zawartości 2"/>
+          <p:cNvSpPr>
+            <a:spLocks noGrp="1"/>
+          </p:cNvSpPr>
+          <p:nvPr>
+            <p:ph idx="1"/>
+          </p:nvPr>
+        </p:nvSpPr>
+        <p:spPr/>
+        <p:txBody>
+          <a:bodyPr/>
+          <a:lstStyle/>
+          <a:p>
+            <a:r>
+              <a:rPr lang="en-US" dirty="0" smtClean="0"/>
+              <a:t>Subroutines with </a:t>
+            </a:r>
+            <a:r>
+              <a:rPr lang="en-US" dirty="0" smtClean="0"/>
+              <a:t>allow multiple entry points for suspending and resuming </a:t>
+            </a:r>
+            <a:r>
+              <a:rPr lang="en-US" dirty="0" smtClean="0"/>
+              <a:t>execution</a:t>
+            </a:r>
+          </a:p>
+          <a:p>
+            <a:endParaRPr lang="en-US" dirty="0" smtClean="0"/>
+          </a:p>
+          <a:p>
+            <a:r>
+              <a:rPr lang="en-US" dirty="0" smtClean="0"/>
+              <a:t>C# 2.0 yield keyword</a:t>
+            </a:r>
+          </a:p>
+          <a:p>
+            <a:endParaRPr lang="en-US" dirty="0" smtClean="0"/>
+          </a:p>
+          <a:p>
+            <a:r>
+              <a:rPr lang="en-US" dirty="0" smtClean="0"/>
+              <a:t>Python, Ruby and many other languages implement them in some way</a:t>
+            </a:r>
+            <a:endParaRPr lang="en-US" dirty="0"/>
+          </a:p>
+        </p:txBody>
+      </p:sp>
+      <p:sp>
+        <p:nvSpPr>
+          <p:cNvPr id="4" name="Symbol zastępczy numeru slajdu 3"/>
+          <p:cNvSpPr>
+            <a:spLocks noGrp="1"/>
+          </p:cNvSpPr>
+          <p:nvPr>
+            <p:ph type="sldNum" sz="quarter" idx="10"/>
+          </p:nvPr>
+        </p:nvSpPr>
+        <p:spPr/>
+        <p:txBody>
+          <a:bodyPr/>
+          <a:lstStyle/>
+          <a:p>
+            <a:fld id="{5BA08351-1517-4DDD-96C2-B53AED81A9DF}" type="slidenum">
+              <a:rPr lang="en-US" smtClean="0"/>
               <a:pPr/>
               <a:t>8</a:t>
             </a:fld>
             <a:endParaRPr lang="en-US"/>
+          </a:p>
+        </p:txBody>
+      </p:sp>
+    </p:spTree>
+  </p:cSld>
+  <p:clrMapOvr>
+    <a:masterClrMapping/>
+  </p:clrMapOvr>
+</p:sld>
+</file>
+
+<file path=ppt/slides/slide9.xml><?xml version="1.0" encoding="utf-8"?>
+<p:sld xmlns:a="http://schemas.openxmlformats.org/drawingml/2006/main" xmlns:r="http://schemas.openxmlformats.org/officeDocument/2006/relationships" xmlns:p="http://schemas.openxmlformats.org/presentationml/2006/main">
+  <p:cSld>
+    <p:spTree>
+      <p:nvGrpSpPr>
+        <p:cNvPr id="1" name=""/>
+        <p:cNvGrpSpPr/>
+        <p:nvPr/>
+      </p:nvGrpSpPr>
+      <p:grpSpPr>
+        <a:xfrm>
+          <a:off x="0" y="0"/>
+          <a:ext cx="0" cy="0"/>
+          <a:chOff x="0" y="0"/>
+          <a:chExt cx="0" cy="0"/>
+        </a:xfrm>
+      </p:grpSpPr>
+      <p:sp>
+        <p:nvSpPr>
+          <p:cNvPr id="17409" name="Slide Number Placeholder 3"/>
+          <p:cNvSpPr>
+            <a:spLocks noGrp="1"/>
+          </p:cNvSpPr>
+          <p:nvPr>
+            <p:ph type="sldNum" sz="quarter" idx="10"/>
+          </p:nvPr>
+        </p:nvSpPr>
+        <p:spPr>
+          <a:noFill/>
+        </p:spPr>
+        <p:txBody>
+          <a:bodyPr/>
+          <a:lstStyle/>
+          <a:p>
+            <a:fld id="{B8923B82-4FEA-4C63-961B-70B71B12A787}" type="slidenum">
+              <a:rPr lang="en-US"/>
+              <a:pPr/>
+              <a:t>9</a:t>
+            </a:fld>
+            <a:endParaRPr lang="en-US" dirty="0"/>
           </a:p>
         </p:txBody>
       </p:sp>
@@ -8386,12 +9114,7 @@
 </file>
 
 <file path=customXml/item1.xml><?xml version="1.0" encoding="utf-8"?>
-<?mso-contentType ?>
-<FormTemplates xmlns="http://schemas.microsoft.com/sharepoint/v3/contenttype/forms">
-  <Display>DocumentLibraryForm</Display>
-  <Edit>DocumentLibraryForm</Edit>
-  <New>DocumentLibraryForm</New>
-</FormTemplates>
+<LongProperties xmlns="http://schemas.microsoft.com/office/2006/metadata/longProperties"/>
 </file>
 
 <file path=customXml/item2.xml><?xml version="1.0" encoding="utf-8"?>
@@ -8455,7 +9178,12 @@
 </file>
 
 <file path=customXml/item3.xml><?xml version="1.0" encoding="utf-8"?>
-<LongProperties xmlns="http://schemas.microsoft.com/office/2006/metadata/longProperties"/>
+<?mso-contentType ?>
+<FormTemplates xmlns="http://schemas.microsoft.com/sharepoint/v3/contenttype/forms">
+  <Display>DocumentLibraryForm</Display>
+  <Edit>DocumentLibraryForm</Edit>
+  <New>DocumentLibraryForm</New>
+</FormTemplates>
 </file>
 
 <file path=customXml/item4.xml><?xml version="1.0" encoding="utf-8"?>
@@ -8467,9 +9195,9 @@
 </file>
 
 <file path=customXml/itemProps1.xml><?xml version="1.0" encoding="utf-8"?>
-<ds:datastoreItem xmlns:ds="http://schemas.openxmlformats.org/officeDocument/2006/customXml" ds:itemID="{D3274669-787B-4EFD-8872-69E7B499937A}">
+<ds:datastoreItem xmlns:ds="http://schemas.openxmlformats.org/officeDocument/2006/customXml" ds:itemID="{9062B6A4-46AE-44BC-B602-351B8E15754D}">
   <ds:schemaRefs>
-    <ds:schemaRef ds:uri="http://schemas.microsoft.com/sharepoint/v3/contenttype/forms"/>
+    <ds:schemaRef ds:uri="http://schemas.microsoft.com/office/2006/metadata/longProperties"/>
   </ds:schemaRefs>
 </ds:datastoreItem>
 </file>
@@ -8492,9 +9220,9 @@
 </file>
 
 <file path=customXml/itemProps3.xml><?xml version="1.0" encoding="utf-8"?>
-<ds:datastoreItem xmlns:ds="http://schemas.openxmlformats.org/officeDocument/2006/customXml" ds:itemID="{9062B6A4-46AE-44BC-B602-351B8E15754D}">
+<ds:datastoreItem xmlns:ds="http://schemas.openxmlformats.org/officeDocument/2006/customXml" ds:itemID="{D3274669-787B-4EFD-8872-69E7B499937A}">
   <ds:schemaRefs>
-    <ds:schemaRef ds:uri="http://schemas.microsoft.com/office/2006/metadata/longProperties"/>
+    <ds:schemaRef ds:uri="http://schemas.microsoft.com/sharepoint/v3/contenttype/forms"/>
   </ds:schemaRefs>
 </ds:datastoreItem>
 </file>

</xml_diff>

<commit_message>
added animation of merging routines
</commit_message>
<xml_diff>
--- a/C# 5.pptx
+++ b/C# 5.pptx
@@ -5,10 +5,10 @@
     <p:sldMasterId id="2147483654" r:id="rId5"/>
   </p:sldMasterIdLst>
   <p:notesMasterIdLst>
-    <p:notesMasterId r:id="rId15"/>
+    <p:notesMasterId r:id="rId17"/>
   </p:notesMasterIdLst>
   <p:handoutMasterIdLst>
-    <p:handoutMasterId r:id="rId16"/>
+    <p:handoutMasterId r:id="rId18"/>
   </p:handoutMasterIdLst>
   <p:sldIdLst>
     <p:sldId id="371" r:id="rId6"/>
@@ -19,7 +19,9 @@
     <p:sldId id="377" r:id="rId11"/>
     <p:sldId id="378" r:id="rId12"/>
     <p:sldId id="379" r:id="rId13"/>
-    <p:sldId id="372" r:id="rId14"/>
+    <p:sldId id="380" r:id="rId14"/>
+    <p:sldId id="381" r:id="rId15"/>
+    <p:sldId id="372" r:id="rId16"/>
   </p:sldIdLst>
   <p:sldSz cx="9144000" cy="6858000" type="screen4x3"/>
   <p:notesSz cx="7061200" cy="9398000"/>
@@ -222,7 +224,7 @@
             <a:fld id="{867741B6-20E1-4219-AC3A-163B52FA3A08}" type="datetime8">
               <a:rPr lang="en-US"/>
               <a:pPr/>
-              <a:t>5/20/2012 9:22 PM</a:t>
+              <a:t>5/23/2012 9:21 PM</a:t>
             </a:fld>
             <a:endParaRPr lang="en-US" dirty="0"/>
           </a:p>
@@ -415,7 +417,7 @@
             <a:fld id="{80DC343A-C7DB-48FF-A81F-D2EFF0311B91}" type="datetime8">
               <a:rPr lang="en-US"/>
               <a:pPr/>
-              <a:t>5/20/2012 9:22 PM</a:t>
+              <a:t>5/23/2012 9:21 PM</a:t>
             </a:fld>
             <a:endParaRPr lang="en-US" dirty="0"/>
           </a:p>
@@ -812,7 +814,7 @@
             <a:fld id="{FE6E691D-9AEE-4359-9871-4FF78429DC86}" type="datetime8">
               <a:rPr lang="en-US"/>
               <a:pPr/>
-              <a:t>5/20/2012 9:22 PM</a:t>
+              <a:t>5/23/2012 9:21 PM</a:t>
             </a:fld>
             <a:endParaRPr lang="en-US"/>
           </a:p>
@@ -888,6 +890,127 @@
               <a:buNone/>
             </a:pPr>
             <a:endParaRPr lang="en-US" altLang="ja-JP" dirty="0" smtClean="0">
+              <a:latin typeface="Arial" pitchFamily="34" charset="0"/>
+              <a:ea typeface="ＭＳ Ｐゴシック" pitchFamily="34" charset="-128"/>
+            </a:endParaRPr>
+          </a:p>
+        </p:txBody>
+      </p:sp>
+    </p:spTree>
+  </p:cSld>
+  <p:clrMapOvr>
+    <a:masterClrMapping/>
+  </p:clrMapOvr>
+</p:notes>
+</file>
+
+<file path=ppt/notesSlides/notesSlide10.xml><?xml version="1.0" encoding="utf-8"?>
+<p:notes xmlns:a="http://schemas.openxmlformats.org/drawingml/2006/main" xmlns:r="http://schemas.openxmlformats.org/officeDocument/2006/relationships" xmlns:p="http://schemas.openxmlformats.org/presentationml/2006/main">
+  <p:cSld>
+    <p:spTree>
+      <p:nvGrpSpPr>
+        <p:cNvPr id="1" name=""/>
+        <p:cNvGrpSpPr/>
+        <p:nvPr/>
+      </p:nvGrpSpPr>
+      <p:grpSpPr>
+        <a:xfrm>
+          <a:off x="0" y="0"/>
+          <a:ext cx="0" cy="0"/>
+          <a:chOff x="0" y="0"/>
+          <a:chExt cx="0" cy="0"/>
+        </a:xfrm>
+      </p:grpSpPr>
+      <p:sp>
+        <p:nvSpPr>
+          <p:cNvPr id="18433" name="Rectangle 3"/>
+          <p:cNvSpPr>
+            <a:spLocks noGrp="1" noChangeArrowheads="1"/>
+          </p:cNvSpPr>
+          <p:nvPr>
+            <p:ph type="dt" sz="quarter" idx="1"/>
+          </p:nvPr>
+        </p:nvSpPr>
+        <p:spPr>
+          <a:noFill/>
+        </p:spPr>
+        <p:txBody>
+          <a:bodyPr/>
+          <a:lstStyle/>
+          <a:p>
+            <a:fld id="{AB8F9170-F656-4E08-BDFE-37D587BF0909}" type="datetime8">
+              <a:rPr lang="en-US"/>
+              <a:pPr/>
+              <a:t>5/23/2012 9:21 PM</a:t>
+            </a:fld>
+            <a:endParaRPr lang="en-US" dirty="0"/>
+          </a:p>
+        </p:txBody>
+      </p:sp>
+      <p:sp>
+        <p:nvSpPr>
+          <p:cNvPr id="18434" name="Rectangle 7"/>
+          <p:cNvSpPr>
+            <a:spLocks noGrp="1" noChangeArrowheads="1"/>
+          </p:cNvSpPr>
+          <p:nvPr>
+            <p:ph type="sldNum" sz="quarter" idx="5"/>
+          </p:nvPr>
+        </p:nvSpPr>
+        <p:spPr>
+          <a:noFill/>
+        </p:spPr>
+        <p:txBody>
+          <a:bodyPr/>
+          <a:lstStyle/>
+          <a:p>
+            <a:fld id="{E73A29F1-A36F-4C0F-8D5B-36FFE114B347}" type="slidenum">
+              <a:rPr lang="en-US"/>
+              <a:pPr/>
+              <a:t>11</a:t>
+            </a:fld>
+            <a:endParaRPr lang="en-US" dirty="0"/>
+          </a:p>
+        </p:txBody>
+      </p:sp>
+      <p:sp>
+        <p:nvSpPr>
+          <p:cNvPr id="18435" name="Rectangle 2"/>
+          <p:cNvSpPr>
+            <a:spLocks noGrp="1" noRot="1" noChangeAspect="1" noChangeArrowheads="1" noTextEdit="1"/>
+          </p:cNvSpPr>
+          <p:nvPr>
+            <p:ph type="sldImg"/>
+          </p:nvPr>
+        </p:nvSpPr>
+        <p:spPr>
+          <a:ln/>
+        </p:spPr>
+      </p:sp>
+      <p:sp>
+        <p:nvSpPr>
+          <p:cNvPr id="18436" name="Rectangle 3"/>
+          <p:cNvSpPr>
+            <a:spLocks noGrp="1" noChangeArrowheads="1"/>
+          </p:cNvSpPr>
+          <p:nvPr>
+            <p:ph type="body" idx="1"/>
+          </p:nvPr>
+        </p:nvSpPr>
+        <p:spPr>
+          <a:noFill/>
+          <a:ln/>
+        </p:spPr>
+        <p:txBody>
+          <a:bodyPr lIns="93012" tIns="46506" rIns="93012" bIns="46506"/>
+          <a:lstStyle/>
+          <a:p>
+            <a:pPr marL="288925" lvl="1" indent="-174625" eaLnBrk="1" hangingPunct="1">
+              <a:buSzPct val="75000"/>
+              <a:buFont typeface="Times New Roman" pitchFamily="18" charset="0"/>
+              <a:buChar char="—"/>
+            </a:pPr>
+            <a:endParaRPr lang="en-US" sz="1000" dirty="0" smtClean="0">
               <a:latin typeface="Arial" pitchFamily="34" charset="0"/>
               <a:ea typeface="ＭＳ Ｐゴシック" pitchFamily="34" charset="-128"/>
             </a:endParaRPr>
@@ -939,7 +1062,7 @@
             <a:fld id="{AB8F9170-F656-4E08-BDFE-37D587BF0909}" type="datetime8">
               <a:rPr lang="en-US"/>
               <a:pPr/>
-              <a:t>5/20/2012 9:22 PM</a:t>
+              <a:t>5/23/2012 9:21 PM</a:t>
             </a:fld>
             <a:endParaRPr lang="en-US"/>
           </a:p>
@@ -1131,7 +1254,7 @@
             <a:fld id="{80DC343A-C7DB-48FF-A81F-D2EFF0311B91}" type="datetime8">
               <a:rPr lang="en-US" smtClean="0"/>
               <a:pPr/>
-              <a:t>5/20/2012 9:22 PM</a:t>
+              <a:t>5/23/2012 9:21 PM</a:t>
             </a:fld>
             <a:endParaRPr lang="en-US"/>
           </a:p>
@@ -1430,7 +1553,7 @@
             <a:fld id="{80DC343A-C7DB-48FF-A81F-D2EFF0311B91}" type="datetime8">
               <a:rPr lang="en-US" smtClean="0"/>
               <a:pPr/>
-              <a:t>5/20/2012 9:22 PM</a:t>
+              <a:t>5/23/2012 9:21 PM</a:t>
             </a:fld>
             <a:endParaRPr lang="en-US"/>
           </a:p>
@@ -1621,7 +1744,7 @@
             <a:fld id="{80DC343A-C7DB-48FF-A81F-D2EFF0311B91}" type="datetime8">
               <a:rPr lang="en-US" smtClean="0"/>
               <a:pPr/>
-              <a:t>5/20/2012 9:22 PM</a:t>
+              <a:t>5/23/2012 9:21 PM</a:t>
             </a:fld>
             <a:endParaRPr lang="en-US"/>
           </a:p>
@@ -1955,7 +2078,7 @@
             <a:fld id="{80DC343A-C7DB-48FF-A81F-D2EFF0311B91}" type="datetime8">
               <a:rPr lang="en-US" smtClean="0"/>
               <a:pPr/>
-              <a:t>5/20/2012 9:22 PM</a:t>
+              <a:t>5/23/2012 9:21 PM</a:t>
             </a:fld>
             <a:endParaRPr lang="en-US"/>
           </a:p>
@@ -2083,11 +2206,7 @@
           <a:p>
             <a:r>
               <a:rPr lang="en-US" noProof="0" dirty="0" smtClean="0"/>
-              <a:t>Caller </a:t>
-            </a:r>
-            <a:r>
-              <a:rPr lang="en-US" noProof="0" dirty="0" smtClean="0"/>
-              <a:t>– </a:t>
+              <a:t>Caller – </a:t>
             </a:r>
             <a:r>
               <a:rPr lang="en-US" noProof="0" dirty="0" err="1" smtClean="0"/>
@@ -2588,7 +2707,7 @@
             <a:fld id="{80DC343A-C7DB-48FF-A81F-D2EFF0311B91}" type="datetime8">
               <a:rPr lang="en-US" smtClean="0"/>
               <a:pPr/>
-              <a:t>5/20/2012 9:23 PM</a:t>
+              <a:t>5/23/2012 9:21 PM</a:t>
             </a:fld>
             <a:endParaRPr lang="en-US"/>
           </a:p>
@@ -2760,7 +2879,7 @@
             <a:fld id="{80DC343A-C7DB-48FF-A81F-D2EFF0311B91}" type="datetime8">
               <a:rPr lang="en-US" smtClean="0"/>
               <a:pPr/>
-              <a:t>5/20/2012 9:29 PM</a:t>
+              <a:t>5/23/2012 9:21 PM</a:t>
             </a:fld>
             <a:endParaRPr lang="en-US" dirty="0"/>
           </a:p>
@@ -2817,25 +2936,226 @@
       </p:grpSpPr>
       <p:sp>
         <p:nvSpPr>
-          <p:cNvPr id="18433" name="Rectangle 3"/>
+          <p:cNvPr id="2" name="Symbol zastępczy obrazu slajdu 1"/>
           <p:cNvSpPr>
-            <a:spLocks noGrp="1" noChangeArrowheads="1"/>
+            <a:spLocks noGrp="1" noRot="1" noChangeAspect="1"/>
           </p:cNvSpPr>
           <p:nvPr>
-            <p:ph type="dt" sz="quarter" idx="1"/>
+            <p:ph type="sldImg"/>
           </p:nvPr>
         </p:nvSpPr>
-        <p:spPr>
-          <a:noFill/>
-        </p:spPr>
+        <p:spPr/>
+      </p:sp>
+      <p:sp>
+        <p:nvSpPr>
+          <p:cNvPr id="3" name="Symbol zastępczy notatek 2"/>
+          <p:cNvSpPr>
+            <a:spLocks noGrp="1"/>
+          </p:cNvSpPr>
+          <p:nvPr>
+            <p:ph type="body" idx="1"/>
+          </p:nvPr>
+        </p:nvSpPr>
+        <p:spPr/>
+        <p:txBody>
+          <a:bodyPr>
+            <a:normAutofit/>
+          </a:bodyPr>
+          <a:lstStyle/>
+          <a:p>
+            <a:r>
+              <a:rPr lang="en-US" noProof="0" dirty="0" smtClean="0"/>
+              <a:t>Using</a:t>
+            </a:r>
+            <a:r>
+              <a:rPr lang="en-US" baseline="0" noProof="0" dirty="0" smtClean="0"/>
+              <a:t> one thread to accept many connections in server to avoid costly thread switch operation</a:t>
+            </a:r>
+            <a:r>
+              <a:rPr lang="pl-PL" baseline="0" noProof="0" dirty="0" smtClean="0"/>
+              <a:t>. </a:t>
+            </a:r>
+            <a:r>
+              <a:rPr lang="pl-PL" baseline="0" noProof="0" dirty="0" err="1" smtClean="0"/>
+              <a:t>Sheduling</a:t>
+            </a:r>
+            <a:r>
+              <a:rPr lang="pl-PL" baseline="0" noProof="0" dirty="0" smtClean="0"/>
+              <a:t> </a:t>
+            </a:r>
+            <a:r>
+              <a:rPr lang="pl-PL" baseline="0" noProof="0" dirty="0" err="1" smtClean="0"/>
+              <a:t>is</a:t>
+            </a:r>
+            <a:r>
+              <a:rPr lang="pl-PL" baseline="0" noProof="0" dirty="0" smtClean="0"/>
+              <a:t> </a:t>
+            </a:r>
+            <a:r>
+              <a:rPr lang="pl-PL" baseline="0" noProof="0" dirty="0" err="1" smtClean="0"/>
+              <a:t>done</a:t>
+            </a:r>
+            <a:r>
+              <a:rPr lang="pl-PL" baseline="0" noProof="0" dirty="0" smtClean="0"/>
+              <a:t> </a:t>
+            </a:r>
+            <a:r>
+              <a:rPr lang="pl-PL" baseline="0" noProof="0" dirty="0" err="1" smtClean="0"/>
+              <a:t>using</a:t>
+            </a:r>
+            <a:r>
+              <a:rPr lang="pl-PL" baseline="0" noProof="0" dirty="0" smtClean="0"/>
+              <a:t> </a:t>
+            </a:r>
+            <a:r>
+              <a:rPr lang="pl-PL" baseline="0" noProof="0" dirty="0" err="1" smtClean="0"/>
+              <a:t>coroutines</a:t>
+            </a:r>
+            <a:r>
+              <a:rPr lang="pl-PL" baseline="0" noProof="0" dirty="0" smtClean="0"/>
+              <a:t> </a:t>
+            </a:r>
+            <a:r>
+              <a:rPr lang="pl-PL" baseline="0" noProof="0" dirty="0" err="1" smtClean="0"/>
+              <a:t>each</a:t>
+            </a:r>
+            <a:r>
+              <a:rPr lang="pl-PL" baseline="0" noProof="0" dirty="0" smtClean="0"/>
+              <a:t> </a:t>
+            </a:r>
+            <a:r>
+              <a:rPr lang="pl-PL" baseline="0" noProof="0" dirty="0" err="1" smtClean="0"/>
+              <a:t>taking</a:t>
+            </a:r>
+            <a:r>
+              <a:rPr lang="pl-PL" baseline="0" noProof="0" dirty="0" smtClean="0"/>
+              <a:t> a </a:t>
+            </a:r>
+            <a:r>
+              <a:rPr lang="pl-PL" baseline="0" noProof="0" dirty="0" err="1" smtClean="0"/>
+              <a:t>small</a:t>
+            </a:r>
+            <a:r>
+              <a:rPr lang="pl-PL" baseline="0" noProof="0" dirty="0" smtClean="0"/>
+              <a:t> </a:t>
+            </a:r>
+            <a:r>
+              <a:rPr lang="pl-PL" baseline="0" noProof="0" dirty="0" err="1" smtClean="0"/>
+              <a:t>amout</a:t>
+            </a:r>
+            <a:r>
+              <a:rPr lang="pl-PL" baseline="0" noProof="0" dirty="0" smtClean="0"/>
+              <a:t> of time and </a:t>
+            </a:r>
+            <a:r>
+              <a:rPr lang="pl-PL" baseline="0" noProof="0" dirty="0" err="1" smtClean="0"/>
+              <a:t>then</a:t>
+            </a:r>
+            <a:r>
+              <a:rPr lang="pl-PL" baseline="0" noProof="0" dirty="0" smtClean="0"/>
+              <a:t> </a:t>
+            </a:r>
+            <a:r>
+              <a:rPr lang="pl-PL" baseline="0" noProof="0" dirty="0" err="1" smtClean="0"/>
+              <a:t>yielding</a:t>
+            </a:r>
+            <a:r>
+              <a:rPr lang="pl-PL" baseline="0" noProof="0" dirty="0" smtClean="0"/>
+              <a:t> </a:t>
+            </a:r>
+            <a:r>
+              <a:rPr lang="pl-PL" baseline="0" noProof="0" dirty="0" err="1" smtClean="0"/>
+              <a:t>control</a:t>
+            </a:r>
+            <a:r>
+              <a:rPr lang="pl-PL" baseline="0" noProof="0" dirty="0" smtClean="0"/>
+              <a:t> to </a:t>
+            </a:r>
+            <a:r>
+              <a:rPr lang="pl-PL" baseline="0" noProof="0" dirty="0" err="1" smtClean="0"/>
+              <a:t>some</a:t>
+            </a:r>
+            <a:r>
+              <a:rPr lang="pl-PL" baseline="0" noProof="0" dirty="0" smtClean="0"/>
+              <a:t> sort of </a:t>
+            </a:r>
+            <a:r>
+              <a:rPr lang="pl-PL" baseline="0" noProof="0" dirty="0" err="1" smtClean="0"/>
+              <a:t>coordinator</a:t>
+            </a:r>
+            <a:endParaRPr lang="pl-PL" baseline="0" noProof="0" dirty="0" smtClean="0"/>
+          </a:p>
+          <a:p>
+            <a:endParaRPr lang="pl-PL" baseline="0" noProof="0" dirty="0" smtClean="0"/>
+          </a:p>
+          <a:p>
+            <a:r>
+              <a:rPr lang="en-US" noProof="0" dirty="0" smtClean="0"/>
+              <a:t>As Knuth remarks, it is rather difficult to find short, simple, illustrative examples of applications of </a:t>
+            </a:r>
+            <a:r>
+              <a:rPr lang="en-US" noProof="0" dirty="0" err="1" smtClean="0"/>
+              <a:t>coroutines</a:t>
+            </a:r>
+            <a:r>
+              <a:rPr lang="pl-PL" noProof="0" dirty="0" smtClean="0"/>
+              <a:t>.</a:t>
+            </a:r>
+          </a:p>
+          <a:p>
+            <a:endParaRPr lang="pl-PL" noProof="0" dirty="0" smtClean="0"/>
+          </a:p>
+          <a:p>
+            <a:pPr>
+              <a:buNone/>
+            </a:pPr>
+            <a:r>
+              <a:rPr lang="pl-PL" noProof="0" dirty="0" err="1" smtClean="0"/>
+              <a:t>Code</a:t>
+            </a:r>
+            <a:r>
+              <a:rPr lang="pl-PL" noProof="0" dirty="0" smtClean="0"/>
+              <a:t> </a:t>
+            </a:r>
+            <a:r>
+              <a:rPr lang="pl-PL" noProof="0" dirty="0" err="1" smtClean="0"/>
+              <a:t>Sample</a:t>
+            </a:r>
+            <a:r>
+              <a:rPr lang="pl-PL" noProof="0" dirty="0" smtClean="0"/>
+              <a:t>:</a:t>
+            </a:r>
+            <a:r>
+              <a:rPr lang="pl-PL" baseline="0" noProof="0" dirty="0" smtClean="0"/>
+              <a:t> </a:t>
+            </a:r>
+            <a:r>
+              <a:rPr lang="pl-PL" baseline="0" noProof="0" dirty="0" err="1" smtClean="0"/>
+              <a:t>FifoCoordinator</a:t>
+            </a:r>
+            <a:endParaRPr lang="en-US" noProof="0" dirty="0"/>
+          </a:p>
+        </p:txBody>
+      </p:sp>
+      <p:sp>
+        <p:nvSpPr>
+          <p:cNvPr id="4" name="Symbol zastępczy daty 3"/>
+          <p:cNvSpPr>
+            <a:spLocks noGrp="1"/>
+          </p:cNvSpPr>
+          <p:nvPr>
+            <p:ph type="dt" idx="10"/>
+          </p:nvPr>
+        </p:nvSpPr>
+        <p:spPr/>
         <p:txBody>
           <a:bodyPr/>
           <a:lstStyle/>
           <a:p>
-            <a:fld id="{AB8F9170-F656-4E08-BDFE-37D587BF0909}" type="datetime8">
-              <a:rPr lang="en-US"/>
+            <a:fld id="{80DC343A-C7DB-48FF-A81F-D2EFF0311B91}" type="datetime8">
+              <a:rPr lang="en-US" smtClean="0"/>
               <a:pPr/>
-              <a:t>5/20/2012 9:22 PM</a:t>
+              <a:t>5/23/2012 9:21 PM</a:t>
             </a:fld>
             <a:endParaRPr lang="en-US" dirty="0"/>
           </a:p>
@@ -2843,71 +3163,25 @@
       </p:sp>
       <p:sp>
         <p:nvSpPr>
-          <p:cNvPr id="18434" name="Rectangle 7"/>
+          <p:cNvPr id="5" name="Symbol zastępczy numeru slajdu 4"/>
           <p:cNvSpPr>
-            <a:spLocks noGrp="1" noChangeArrowheads="1"/>
+            <a:spLocks noGrp="1"/>
           </p:cNvSpPr>
           <p:nvPr>
-            <p:ph type="sldNum" sz="quarter" idx="5"/>
+            <p:ph type="sldNum" sz="quarter" idx="11"/>
           </p:nvPr>
         </p:nvSpPr>
-        <p:spPr>
-          <a:noFill/>
-        </p:spPr>
+        <p:spPr/>
         <p:txBody>
           <a:bodyPr/>
           <a:lstStyle/>
           <a:p>
-            <a:fld id="{E73A29F1-A36F-4C0F-8D5B-36FFE114B347}" type="slidenum">
-              <a:rPr lang="en-US"/>
+            <a:fld id="{A0C6CE09-155B-4DAE-A37A-B074B6B02DD4}" type="slidenum">
+              <a:rPr lang="en-US" smtClean="0"/>
               <a:pPr/>
               <a:t>9</a:t>
             </a:fld>
             <a:endParaRPr lang="en-US" dirty="0"/>
-          </a:p>
-        </p:txBody>
-      </p:sp>
-      <p:sp>
-        <p:nvSpPr>
-          <p:cNvPr id="18435" name="Rectangle 2"/>
-          <p:cNvSpPr>
-            <a:spLocks noGrp="1" noRot="1" noChangeAspect="1" noChangeArrowheads="1" noTextEdit="1"/>
-          </p:cNvSpPr>
-          <p:nvPr>
-            <p:ph type="sldImg"/>
-          </p:nvPr>
-        </p:nvSpPr>
-        <p:spPr>
-          <a:ln/>
-        </p:spPr>
-      </p:sp>
-      <p:sp>
-        <p:nvSpPr>
-          <p:cNvPr id="18436" name="Rectangle 3"/>
-          <p:cNvSpPr>
-            <a:spLocks noGrp="1" noChangeArrowheads="1"/>
-          </p:cNvSpPr>
-          <p:nvPr>
-            <p:ph type="body" idx="1"/>
-          </p:nvPr>
-        </p:nvSpPr>
-        <p:spPr>
-          <a:noFill/>
-          <a:ln/>
-        </p:spPr>
-        <p:txBody>
-          <a:bodyPr lIns="93012" tIns="46506" rIns="93012" bIns="46506"/>
-          <a:lstStyle/>
-          <a:p>
-            <a:pPr marL="288925" lvl="1" indent="-174625" eaLnBrk="1" hangingPunct="1">
-              <a:buSzPct val="75000"/>
-              <a:buFont typeface="Times New Roman" pitchFamily="18" charset="0"/>
-              <a:buChar char="—"/>
-            </a:pPr>
-            <a:endParaRPr lang="en-US" sz="1000" dirty="0" smtClean="0">
-              <a:latin typeface="Arial" pitchFamily="34" charset="0"/>
-              <a:ea typeface="ＭＳ Ｐゴシック" pitchFamily="34" charset="-128"/>
-            </a:endParaRPr>
           </a:p>
         </p:txBody>
       </p:sp>
@@ -5861,6 +6135,2265 @@
 </p:sld>
 </file>
 
+<file path=ppt/slides/slide10.xml><?xml version="1.0" encoding="utf-8"?>
+<p:sld xmlns:a="http://schemas.openxmlformats.org/drawingml/2006/main" xmlns:r="http://schemas.openxmlformats.org/officeDocument/2006/relationships" xmlns:p="http://schemas.openxmlformats.org/presentationml/2006/main">
+  <p:cSld>
+    <p:spTree>
+      <p:nvGrpSpPr>
+        <p:cNvPr id="1" name=""/>
+        <p:cNvGrpSpPr/>
+        <p:nvPr/>
+      </p:nvGrpSpPr>
+      <p:grpSpPr>
+        <a:xfrm>
+          <a:off x="0" y="0"/>
+          <a:ext cx="0" cy="0"/>
+          <a:chOff x="0" y="0"/>
+          <a:chExt cx="0" cy="0"/>
+        </a:xfrm>
+      </p:grpSpPr>
+      <p:sp>
+        <p:nvSpPr>
+          <p:cNvPr id="2" name="Tytuł 1"/>
+          <p:cNvSpPr>
+            <a:spLocks noGrp="1"/>
+          </p:cNvSpPr>
+          <p:nvPr>
+            <p:ph type="title"/>
+          </p:nvPr>
+        </p:nvSpPr>
+        <p:spPr/>
+        <p:txBody>
+          <a:bodyPr/>
+          <a:lstStyle/>
+          <a:p>
+            <a:r>
+              <a:rPr lang="en-US" dirty="0" err="1" smtClean="0"/>
+              <a:t>Async</a:t>
+            </a:r>
+            <a:r>
+              <a:rPr lang="en-US" dirty="0" smtClean="0"/>
+              <a:t> – </a:t>
+            </a:r>
+            <a:r>
+              <a:rPr lang="en-US" dirty="0" err="1" smtClean="0"/>
+              <a:t>coroutines</a:t>
+            </a:r>
+            <a:r>
+              <a:rPr lang="en-US" dirty="0" smtClean="0"/>
+              <a:t> – usage - Merge</a:t>
+            </a:r>
+            <a:endParaRPr lang="en-US" dirty="0"/>
+          </a:p>
+        </p:txBody>
+      </p:sp>
+      <p:sp>
+        <p:nvSpPr>
+          <p:cNvPr id="3" name="Symbol zastępczy zawartości 2"/>
+          <p:cNvSpPr>
+            <a:spLocks noGrp="1"/>
+          </p:cNvSpPr>
+          <p:nvPr>
+            <p:ph idx="1"/>
+          </p:nvPr>
+        </p:nvSpPr>
+        <p:spPr>
+          <a:xfrm>
+            <a:off x="209550" y="1562100"/>
+            <a:ext cx="8537575" cy="449580"/>
+          </a:xfrm>
+        </p:spPr>
+        <p:txBody>
+          <a:bodyPr/>
+          <a:lstStyle/>
+          <a:p>
+            <a:r>
+              <a:rPr lang="en-US" dirty="0" smtClean="0"/>
+              <a:t>Merge 2 ordered sequences into 1 ordered sequence</a:t>
+            </a:r>
+            <a:endParaRPr lang="en-US" dirty="0"/>
+          </a:p>
+        </p:txBody>
+      </p:sp>
+      <p:sp>
+        <p:nvSpPr>
+          <p:cNvPr id="4" name="Symbol zastępczy numeru slajdu 3"/>
+          <p:cNvSpPr>
+            <a:spLocks noGrp="1"/>
+          </p:cNvSpPr>
+          <p:nvPr>
+            <p:ph type="sldNum" sz="quarter" idx="10"/>
+          </p:nvPr>
+        </p:nvSpPr>
+        <p:spPr/>
+        <p:txBody>
+          <a:bodyPr/>
+          <a:lstStyle/>
+          <a:p>
+            <a:fld id="{5BA08351-1517-4DDD-96C2-B53AED81A9DF}" type="slidenum">
+              <a:rPr lang="en-US" smtClean="0"/>
+              <a:pPr/>
+              <a:t>10</a:t>
+            </a:fld>
+            <a:endParaRPr lang="en-US" dirty="0"/>
+          </a:p>
+        </p:txBody>
+      </p:sp>
+      <p:sp>
+        <p:nvSpPr>
+          <p:cNvPr id="14" name="Dowolny kształt 13"/>
+          <p:cNvSpPr/>
+          <p:nvPr/>
+        </p:nvSpPr>
+        <p:spPr>
+          <a:xfrm>
+            <a:off x="323871" y="2317443"/>
+            <a:ext cx="2230382" cy="892153"/>
+          </a:xfrm>
+          <a:custGeom>
+            <a:avLst/>
+            <a:gdLst>
+              <a:gd name="connsiteX0" fmla="*/ 0 w 2230382"/>
+              <a:gd name="connsiteY0" fmla="*/ 0 h 892153"/>
+              <a:gd name="connsiteX1" fmla="*/ 1784306 w 2230382"/>
+              <a:gd name="connsiteY1" fmla="*/ 0 h 892153"/>
+              <a:gd name="connsiteX2" fmla="*/ 2230382 w 2230382"/>
+              <a:gd name="connsiteY2" fmla="*/ 446077 h 892153"/>
+              <a:gd name="connsiteX3" fmla="*/ 1784306 w 2230382"/>
+              <a:gd name="connsiteY3" fmla="*/ 892153 h 892153"/>
+              <a:gd name="connsiteX4" fmla="*/ 0 w 2230382"/>
+              <a:gd name="connsiteY4" fmla="*/ 892153 h 892153"/>
+              <a:gd name="connsiteX5" fmla="*/ 446077 w 2230382"/>
+              <a:gd name="connsiteY5" fmla="*/ 446077 h 892153"/>
+              <a:gd name="connsiteX6" fmla="*/ 0 w 2230382"/>
+              <a:gd name="connsiteY6" fmla="*/ 0 h 892153"/>
+            </a:gdLst>
+            <a:ahLst/>
+            <a:cxnLst>
+              <a:cxn ang="0">
+                <a:pos x="connsiteX0" y="connsiteY0"/>
+              </a:cxn>
+              <a:cxn ang="0">
+                <a:pos x="connsiteX1" y="connsiteY1"/>
+              </a:cxn>
+              <a:cxn ang="0">
+                <a:pos x="connsiteX2" y="connsiteY2"/>
+              </a:cxn>
+              <a:cxn ang="0">
+                <a:pos x="connsiteX3" y="connsiteY3"/>
+              </a:cxn>
+              <a:cxn ang="0">
+                <a:pos x="connsiteX4" y="connsiteY4"/>
+              </a:cxn>
+              <a:cxn ang="0">
+                <a:pos x="connsiteX5" y="connsiteY5"/>
+              </a:cxn>
+              <a:cxn ang="0">
+                <a:pos x="connsiteX6" y="connsiteY6"/>
+              </a:cxn>
+            </a:cxnLst>
+            <a:rect l="l" t="t" r="r" b="b"/>
+            <a:pathLst>
+              <a:path w="2230382" h="892153">
+                <a:moveTo>
+                  <a:pt x="0" y="0"/>
+                </a:moveTo>
+                <a:lnTo>
+                  <a:pt x="1784306" y="0"/>
+                </a:lnTo>
+                <a:lnTo>
+                  <a:pt x="2230382" y="446077"/>
+                </a:lnTo>
+                <a:lnTo>
+                  <a:pt x="1784306" y="892153"/>
+                </a:lnTo>
+                <a:lnTo>
+                  <a:pt x="0" y="892153"/>
+                </a:lnTo>
+                <a:lnTo>
+                  <a:pt x="446077" y="446077"/>
+                </a:lnTo>
+                <a:lnTo>
+                  <a:pt x="0" y="0"/>
+                </a:lnTo>
+                <a:close/>
+              </a:path>
+            </a:pathLst>
+          </a:custGeom>
+        </p:spPr>
+        <p:style>
+          <a:lnRef idx="2">
+            <a:schemeClr val="lt1">
+              <a:hueOff val="0"/>
+              <a:satOff val="0"/>
+              <a:lumOff val="0"/>
+              <a:alphaOff val="0"/>
+            </a:schemeClr>
+          </a:lnRef>
+          <a:fillRef idx="1">
+            <a:schemeClr val="accent1">
+              <a:hueOff val="0"/>
+              <a:satOff val="0"/>
+              <a:lumOff val="0"/>
+              <a:alphaOff val="0"/>
+            </a:schemeClr>
+          </a:fillRef>
+          <a:effectRef idx="0">
+            <a:schemeClr val="accent1">
+              <a:hueOff val="0"/>
+              <a:satOff val="0"/>
+              <a:lumOff val="0"/>
+              <a:alphaOff val="0"/>
+            </a:schemeClr>
+          </a:effectRef>
+          <a:fontRef idx="minor">
+            <a:schemeClr val="lt1"/>
+          </a:fontRef>
+        </p:style>
+        <p:txBody>
+          <a:bodyPr spcFirstLastPara="0" vert="horz" wrap="square" lIns="670105" tIns="74676" rIns="520752" bIns="74676" numCol="1" spcCol="1270" anchor="ctr" anchorCtr="0">
+            <a:noAutofit/>
+          </a:bodyPr>
+          <a:lstStyle/>
+          <a:p>
+            <a:pPr lvl="0" algn="ctr" defTabSz="2489200">
+              <a:lnSpc>
+                <a:spcPct val="90000"/>
+              </a:lnSpc>
+              <a:spcBef>
+                <a:spcPct val="0"/>
+              </a:spcBef>
+              <a:spcAft>
+                <a:spcPct val="35000"/>
+              </a:spcAft>
+            </a:pPr>
+            <a:r>
+              <a:rPr lang="pl-PL" sz="5600" kern="1200" dirty="0" smtClean="0"/>
+              <a:t>2</a:t>
+            </a:r>
+            <a:endParaRPr lang="en-US" sz="5600" kern="1200" dirty="0"/>
+          </a:p>
+        </p:txBody>
+      </p:sp>
+      <p:sp>
+        <p:nvSpPr>
+          <p:cNvPr id="15" name="Dowolny kształt 14"/>
+          <p:cNvSpPr/>
+          <p:nvPr/>
+        </p:nvSpPr>
+        <p:spPr>
+          <a:xfrm>
+            <a:off x="2331216" y="2317443"/>
+            <a:ext cx="2230382" cy="892153"/>
+          </a:xfrm>
+          <a:custGeom>
+            <a:avLst/>
+            <a:gdLst>
+              <a:gd name="connsiteX0" fmla="*/ 0 w 2230382"/>
+              <a:gd name="connsiteY0" fmla="*/ 0 h 892153"/>
+              <a:gd name="connsiteX1" fmla="*/ 1784306 w 2230382"/>
+              <a:gd name="connsiteY1" fmla="*/ 0 h 892153"/>
+              <a:gd name="connsiteX2" fmla="*/ 2230382 w 2230382"/>
+              <a:gd name="connsiteY2" fmla="*/ 446077 h 892153"/>
+              <a:gd name="connsiteX3" fmla="*/ 1784306 w 2230382"/>
+              <a:gd name="connsiteY3" fmla="*/ 892153 h 892153"/>
+              <a:gd name="connsiteX4" fmla="*/ 0 w 2230382"/>
+              <a:gd name="connsiteY4" fmla="*/ 892153 h 892153"/>
+              <a:gd name="connsiteX5" fmla="*/ 446077 w 2230382"/>
+              <a:gd name="connsiteY5" fmla="*/ 446077 h 892153"/>
+              <a:gd name="connsiteX6" fmla="*/ 0 w 2230382"/>
+              <a:gd name="connsiteY6" fmla="*/ 0 h 892153"/>
+            </a:gdLst>
+            <a:ahLst/>
+            <a:cxnLst>
+              <a:cxn ang="0">
+                <a:pos x="connsiteX0" y="connsiteY0"/>
+              </a:cxn>
+              <a:cxn ang="0">
+                <a:pos x="connsiteX1" y="connsiteY1"/>
+              </a:cxn>
+              <a:cxn ang="0">
+                <a:pos x="connsiteX2" y="connsiteY2"/>
+              </a:cxn>
+              <a:cxn ang="0">
+                <a:pos x="connsiteX3" y="connsiteY3"/>
+              </a:cxn>
+              <a:cxn ang="0">
+                <a:pos x="connsiteX4" y="connsiteY4"/>
+              </a:cxn>
+              <a:cxn ang="0">
+                <a:pos x="connsiteX5" y="connsiteY5"/>
+              </a:cxn>
+              <a:cxn ang="0">
+                <a:pos x="connsiteX6" y="connsiteY6"/>
+              </a:cxn>
+            </a:cxnLst>
+            <a:rect l="l" t="t" r="r" b="b"/>
+            <a:pathLst>
+              <a:path w="2230382" h="892153">
+                <a:moveTo>
+                  <a:pt x="0" y="0"/>
+                </a:moveTo>
+                <a:lnTo>
+                  <a:pt x="1784306" y="0"/>
+                </a:lnTo>
+                <a:lnTo>
+                  <a:pt x="2230382" y="446077"/>
+                </a:lnTo>
+                <a:lnTo>
+                  <a:pt x="1784306" y="892153"/>
+                </a:lnTo>
+                <a:lnTo>
+                  <a:pt x="0" y="892153"/>
+                </a:lnTo>
+                <a:lnTo>
+                  <a:pt x="446077" y="446077"/>
+                </a:lnTo>
+                <a:lnTo>
+                  <a:pt x="0" y="0"/>
+                </a:lnTo>
+                <a:close/>
+              </a:path>
+            </a:pathLst>
+          </a:custGeom>
+        </p:spPr>
+        <p:style>
+          <a:lnRef idx="2">
+            <a:schemeClr val="lt1">
+              <a:hueOff val="0"/>
+              <a:satOff val="0"/>
+              <a:lumOff val="0"/>
+              <a:alphaOff val="0"/>
+            </a:schemeClr>
+          </a:lnRef>
+          <a:fillRef idx="1">
+            <a:schemeClr val="accent1">
+              <a:hueOff val="0"/>
+              <a:satOff val="0"/>
+              <a:lumOff val="0"/>
+              <a:alphaOff val="0"/>
+            </a:schemeClr>
+          </a:fillRef>
+          <a:effectRef idx="0">
+            <a:schemeClr val="accent1">
+              <a:hueOff val="0"/>
+              <a:satOff val="0"/>
+              <a:lumOff val="0"/>
+              <a:alphaOff val="0"/>
+            </a:schemeClr>
+          </a:effectRef>
+          <a:fontRef idx="minor">
+            <a:schemeClr val="lt1"/>
+          </a:fontRef>
+        </p:style>
+        <p:txBody>
+          <a:bodyPr spcFirstLastPara="0" vert="horz" wrap="square" lIns="670105" tIns="74676" rIns="520752" bIns="74676" numCol="1" spcCol="1270" anchor="ctr" anchorCtr="0">
+            <a:noAutofit/>
+          </a:bodyPr>
+          <a:lstStyle/>
+          <a:p>
+            <a:pPr lvl="0" algn="ctr" defTabSz="2489200">
+              <a:lnSpc>
+                <a:spcPct val="90000"/>
+              </a:lnSpc>
+              <a:spcBef>
+                <a:spcPct val="0"/>
+              </a:spcBef>
+              <a:spcAft>
+                <a:spcPct val="35000"/>
+              </a:spcAft>
+            </a:pPr>
+            <a:r>
+              <a:rPr lang="pl-PL" sz="5600" kern="1200" dirty="0" smtClean="0"/>
+              <a:t>3</a:t>
+            </a:r>
+            <a:endParaRPr lang="en-US" sz="5600" kern="1200" dirty="0"/>
+          </a:p>
+        </p:txBody>
+      </p:sp>
+      <p:sp>
+        <p:nvSpPr>
+          <p:cNvPr id="16" name="Dowolny kształt 15"/>
+          <p:cNvSpPr/>
+          <p:nvPr/>
+        </p:nvSpPr>
+        <p:spPr>
+          <a:xfrm>
+            <a:off x="4338560" y="2317443"/>
+            <a:ext cx="2230382" cy="892153"/>
+          </a:xfrm>
+          <a:custGeom>
+            <a:avLst/>
+            <a:gdLst>
+              <a:gd name="connsiteX0" fmla="*/ 0 w 2230382"/>
+              <a:gd name="connsiteY0" fmla="*/ 0 h 892153"/>
+              <a:gd name="connsiteX1" fmla="*/ 1784306 w 2230382"/>
+              <a:gd name="connsiteY1" fmla="*/ 0 h 892153"/>
+              <a:gd name="connsiteX2" fmla="*/ 2230382 w 2230382"/>
+              <a:gd name="connsiteY2" fmla="*/ 446077 h 892153"/>
+              <a:gd name="connsiteX3" fmla="*/ 1784306 w 2230382"/>
+              <a:gd name="connsiteY3" fmla="*/ 892153 h 892153"/>
+              <a:gd name="connsiteX4" fmla="*/ 0 w 2230382"/>
+              <a:gd name="connsiteY4" fmla="*/ 892153 h 892153"/>
+              <a:gd name="connsiteX5" fmla="*/ 446077 w 2230382"/>
+              <a:gd name="connsiteY5" fmla="*/ 446077 h 892153"/>
+              <a:gd name="connsiteX6" fmla="*/ 0 w 2230382"/>
+              <a:gd name="connsiteY6" fmla="*/ 0 h 892153"/>
+            </a:gdLst>
+            <a:ahLst/>
+            <a:cxnLst>
+              <a:cxn ang="0">
+                <a:pos x="connsiteX0" y="connsiteY0"/>
+              </a:cxn>
+              <a:cxn ang="0">
+                <a:pos x="connsiteX1" y="connsiteY1"/>
+              </a:cxn>
+              <a:cxn ang="0">
+                <a:pos x="connsiteX2" y="connsiteY2"/>
+              </a:cxn>
+              <a:cxn ang="0">
+                <a:pos x="connsiteX3" y="connsiteY3"/>
+              </a:cxn>
+              <a:cxn ang="0">
+                <a:pos x="connsiteX4" y="connsiteY4"/>
+              </a:cxn>
+              <a:cxn ang="0">
+                <a:pos x="connsiteX5" y="connsiteY5"/>
+              </a:cxn>
+              <a:cxn ang="0">
+                <a:pos x="connsiteX6" y="connsiteY6"/>
+              </a:cxn>
+            </a:cxnLst>
+            <a:rect l="l" t="t" r="r" b="b"/>
+            <a:pathLst>
+              <a:path w="2230382" h="892153">
+                <a:moveTo>
+                  <a:pt x="0" y="0"/>
+                </a:moveTo>
+                <a:lnTo>
+                  <a:pt x="1784306" y="0"/>
+                </a:lnTo>
+                <a:lnTo>
+                  <a:pt x="2230382" y="446077"/>
+                </a:lnTo>
+                <a:lnTo>
+                  <a:pt x="1784306" y="892153"/>
+                </a:lnTo>
+                <a:lnTo>
+                  <a:pt x="0" y="892153"/>
+                </a:lnTo>
+                <a:lnTo>
+                  <a:pt x="446077" y="446077"/>
+                </a:lnTo>
+                <a:lnTo>
+                  <a:pt x="0" y="0"/>
+                </a:lnTo>
+                <a:close/>
+              </a:path>
+            </a:pathLst>
+          </a:custGeom>
+        </p:spPr>
+        <p:style>
+          <a:lnRef idx="2">
+            <a:schemeClr val="lt1">
+              <a:hueOff val="0"/>
+              <a:satOff val="0"/>
+              <a:lumOff val="0"/>
+              <a:alphaOff val="0"/>
+            </a:schemeClr>
+          </a:lnRef>
+          <a:fillRef idx="1">
+            <a:schemeClr val="accent1">
+              <a:hueOff val="0"/>
+              <a:satOff val="0"/>
+              <a:lumOff val="0"/>
+              <a:alphaOff val="0"/>
+            </a:schemeClr>
+          </a:fillRef>
+          <a:effectRef idx="0">
+            <a:schemeClr val="accent1">
+              <a:hueOff val="0"/>
+              <a:satOff val="0"/>
+              <a:lumOff val="0"/>
+              <a:alphaOff val="0"/>
+            </a:schemeClr>
+          </a:effectRef>
+          <a:fontRef idx="minor">
+            <a:schemeClr val="lt1"/>
+          </a:fontRef>
+        </p:style>
+        <p:txBody>
+          <a:bodyPr spcFirstLastPara="0" vert="horz" wrap="square" lIns="670105" tIns="74676" rIns="520752" bIns="74676" numCol="1" spcCol="1270" anchor="ctr" anchorCtr="0">
+            <a:noAutofit/>
+          </a:bodyPr>
+          <a:lstStyle/>
+          <a:p>
+            <a:pPr lvl="0" algn="ctr" defTabSz="2489200">
+              <a:lnSpc>
+                <a:spcPct val="90000"/>
+              </a:lnSpc>
+              <a:spcBef>
+                <a:spcPct val="0"/>
+              </a:spcBef>
+              <a:spcAft>
+                <a:spcPct val="35000"/>
+              </a:spcAft>
+            </a:pPr>
+            <a:r>
+              <a:rPr lang="pl-PL" sz="5600" kern="1200" dirty="0" smtClean="0"/>
+              <a:t>4</a:t>
+            </a:r>
+            <a:endParaRPr lang="en-US" sz="5600" kern="1200" dirty="0"/>
+          </a:p>
+        </p:txBody>
+      </p:sp>
+      <p:sp>
+        <p:nvSpPr>
+          <p:cNvPr id="9" name="Dowolny kształt 8"/>
+          <p:cNvSpPr/>
+          <p:nvPr/>
+        </p:nvSpPr>
+        <p:spPr>
+          <a:xfrm>
+            <a:off x="308560" y="4342433"/>
+            <a:ext cx="2189231" cy="875692"/>
+          </a:xfrm>
+          <a:custGeom>
+            <a:avLst/>
+            <a:gdLst>
+              <a:gd name="connsiteX0" fmla="*/ 0 w 2189231"/>
+              <a:gd name="connsiteY0" fmla="*/ 0 h 875692"/>
+              <a:gd name="connsiteX1" fmla="*/ 1751385 w 2189231"/>
+              <a:gd name="connsiteY1" fmla="*/ 0 h 875692"/>
+              <a:gd name="connsiteX2" fmla="*/ 2189231 w 2189231"/>
+              <a:gd name="connsiteY2" fmla="*/ 437846 h 875692"/>
+              <a:gd name="connsiteX3" fmla="*/ 1751385 w 2189231"/>
+              <a:gd name="connsiteY3" fmla="*/ 875692 h 875692"/>
+              <a:gd name="connsiteX4" fmla="*/ 0 w 2189231"/>
+              <a:gd name="connsiteY4" fmla="*/ 875692 h 875692"/>
+              <a:gd name="connsiteX5" fmla="*/ 437846 w 2189231"/>
+              <a:gd name="connsiteY5" fmla="*/ 437846 h 875692"/>
+              <a:gd name="connsiteX6" fmla="*/ 0 w 2189231"/>
+              <a:gd name="connsiteY6" fmla="*/ 0 h 875692"/>
+            </a:gdLst>
+            <a:ahLst/>
+            <a:cxnLst>
+              <a:cxn ang="0">
+                <a:pos x="connsiteX0" y="connsiteY0"/>
+              </a:cxn>
+              <a:cxn ang="0">
+                <a:pos x="connsiteX1" y="connsiteY1"/>
+              </a:cxn>
+              <a:cxn ang="0">
+                <a:pos x="connsiteX2" y="connsiteY2"/>
+              </a:cxn>
+              <a:cxn ang="0">
+                <a:pos x="connsiteX3" y="connsiteY3"/>
+              </a:cxn>
+              <a:cxn ang="0">
+                <a:pos x="connsiteX4" y="connsiteY4"/>
+              </a:cxn>
+              <a:cxn ang="0">
+                <a:pos x="connsiteX5" y="connsiteY5"/>
+              </a:cxn>
+              <a:cxn ang="0">
+                <a:pos x="connsiteX6" y="connsiteY6"/>
+              </a:cxn>
+            </a:cxnLst>
+            <a:rect l="l" t="t" r="r" b="b"/>
+            <a:pathLst>
+              <a:path w="2189231" h="875692">
+                <a:moveTo>
+                  <a:pt x="0" y="0"/>
+                </a:moveTo>
+                <a:lnTo>
+                  <a:pt x="1751385" y="0"/>
+                </a:lnTo>
+                <a:lnTo>
+                  <a:pt x="2189231" y="437846"/>
+                </a:lnTo>
+                <a:lnTo>
+                  <a:pt x="1751385" y="875692"/>
+                </a:lnTo>
+                <a:lnTo>
+                  <a:pt x="0" y="875692"/>
+                </a:lnTo>
+                <a:lnTo>
+                  <a:pt x="437846" y="437846"/>
+                </a:lnTo>
+                <a:lnTo>
+                  <a:pt x="0" y="0"/>
+                </a:lnTo>
+                <a:close/>
+              </a:path>
+            </a:pathLst>
+          </a:custGeom>
+        </p:spPr>
+        <p:style>
+          <a:lnRef idx="2">
+            <a:schemeClr val="lt1">
+              <a:hueOff val="0"/>
+              <a:satOff val="0"/>
+              <a:lumOff val="0"/>
+              <a:alphaOff val="0"/>
+            </a:schemeClr>
+          </a:lnRef>
+          <a:fillRef idx="1">
+            <a:schemeClr val="accent1">
+              <a:hueOff val="0"/>
+              <a:satOff val="0"/>
+              <a:lumOff val="0"/>
+              <a:alphaOff val="0"/>
+            </a:schemeClr>
+          </a:fillRef>
+          <a:effectRef idx="0">
+            <a:schemeClr val="accent1">
+              <a:hueOff val="0"/>
+              <a:satOff val="0"/>
+              <a:lumOff val="0"/>
+              <a:alphaOff val="0"/>
+            </a:schemeClr>
+          </a:effectRef>
+          <a:fontRef idx="minor">
+            <a:schemeClr val="lt1"/>
+          </a:fontRef>
+        </p:style>
+        <p:txBody>
+          <a:bodyPr spcFirstLastPara="0" vert="horz" wrap="square" lIns="657874" tIns="73343" rIns="511189" bIns="73343" numCol="1" spcCol="1270" anchor="ctr" anchorCtr="0">
+            <a:noAutofit/>
+          </a:bodyPr>
+          <a:lstStyle/>
+          <a:p>
+            <a:pPr lvl="0" algn="ctr" defTabSz="2444750">
+              <a:lnSpc>
+                <a:spcPct val="90000"/>
+              </a:lnSpc>
+              <a:spcBef>
+                <a:spcPct val="0"/>
+              </a:spcBef>
+              <a:spcAft>
+                <a:spcPct val="35000"/>
+              </a:spcAft>
+            </a:pPr>
+            <a:r>
+              <a:rPr lang="pl-PL" sz="5500" kern="1200" dirty="0" smtClean="0"/>
+              <a:t>1</a:t>
+            </a:r>
+            <a:endParaRPr lang="en-US" sz="5500" kern="1200" dirty="0"/>
+          </a:p>
+        </p:txBody>
+      </p:sp>
+      <p:sp>
+        <p:nvSpPr>
+          <p:cNvPr id="10" name="Dowolny kształt 9"/>
+          <p:cNvSpPr/>
+          <p:nvPr/>
+        </p:nvSpPr>
+        <p:spPr>
+          <a:xfrm>
+            <a:off x="2278869" y="4342433"/>
+            <a:ext cx="2189231" cy="875692"/>
+          </a:xfrm>
+          <a:custGeom>
+            <a:avLst/>
+            <a:gdLst>
+              <a:gd name="connsiteX0" fmla="*/ 0 w 2189231"/>
+              <a:gd name="connsiteY0" fmla="*/ 0 h 875692"/>
+              <a:gd name="connsiteX1" fmla="*/ 1751385 w 2189231"/>
+              <a:gd name="connsiteY1" fmla="*/ 0 h 875692"/>
+              <a:gd name="connsiteX2" fmla="*/ 2189231 w 2189231"/>
+              <a:gd name="connsiteY2" fmla="*/ 437846 h 875692"/>
+              <a:gd name="connsiteX3" fmla="*/ 1751385 w 2189231"/>
+              <a:gd name="connsiteY3" fmla="*/ 875692 h 875692"/>
+              <a:gd name="connsiteX4" fmla="*/ 0 w 2189231"/>
+              <a:gd name="connsiteY4" fmla="*/ 875692 h 875692"/>
+              <a:gd name="connsiteX5" fmla="*/ 437846 w 2189231"/>
+              <a:gd name="connsiteY5" fmla="*/ 437846 h 875692"/>
+              <a:gd name="connsiteX6" fmla="*/ 0 w 2189231"/>
+              <a:gd name="connsiteY6" fmla="*/ 0 h 875692"/>
+            </a:gdLst>
+            <a:ahLst/>
+            <a:cxnLst>
+              <a:cxn ang="0">
+                <a:pos x="connsiteX0" y="connsiteY0"/>
+              </a:cxn>
+              <a:cxn ang="0">
+                <a:pos x="connsiteX1" y="connsiteY1"/>
+              </a:cxn>
+              <a:cxn ang="0">
+                <a:pos x="connsiteX2" y="connsiteY2"/>
+              </a:cxn>
+              <a:cxn ang="0">
+                <a:pos x="connsiteX3" y="connsiteY3"/>
+              </a:cxn>
+              <a:cxn ang="0">
+                <a:pos x="connsiteX4" y="connsiteY4"/>
+              </a:cxn>
+              <a:cxn ang="0">
+                <a:pos x="connsiteX5" y="connsiteY5"/>
+              </a:cxn>
+              <a:cxn ang="0">
+                <a:pos x="connsiteX6" y="connsiteY6"/>
+              </a:cxn>
+            </a:cxnLst>
+            <a:rect l="l" t="t" r="r" b="b"/>
+            <a:pathLst>
+              <a:path w="2189231" h="875692">
+                <a:moveTo>
+                  <a:pt x="0" y="0"/>
+                </a:moveTo>
+                <a:lnTo>
+                  <a:pt x="1751385" y="0"/>
+                </a:lnTo>
+                <a:lnTo>
+                  <a:pt x="2189231" y="437846"/>
+                </a:lnTo>
+                <a:lnTo>
+                  <a:pt x="1751385" y="875692"/>
+                </a:lnTo>
+                <a:lnTo>
+                  <a:pt x="0" y="875692"/>
+                </a:lnTo>
+                <a:lnTo>
+                  <a:pt x="437846" y="437846"/>
+                </a:lnTo>
+                <a:lnTo>
+                  <a:pt x="0" y="0"/>
+                </a:lnTo>
+                <a:close/>
+              </a:path>
+            </a:pathLst>
+          </a:custGeom>
+        </p:spPr>
+        <p:style>
+          <a:lnRef idx="2">
+            <a:schemeClr val="lt1">
+              <a:hueOff val="0"/>
+              <a:satOff val="0"/>
+              <a:lumOff val="0"/>
+              <a:alphaOff val="0"/>
+            </a:schemeClr>
+          </a:lnRef>
+          <a:fillRef idx="1">
+            <a:schemeClr val="accent1">
+              <a:hueOff val="0"/>
+              <a:satOff val="0"/>
+              <a:lumOff val="0"/>
+              <a:alphaOff val="0"/>
+            </a:schemeClr>
+          </a:fillRef>
+          <a:effectRef idx="0">
+            <a:schemeClr val="accent1">
+              <a:hueOff val="0"/>
+              <a:satOff val="0"/>
+              <a:lumOff val="0"/>
+              <a:alphaOff val="0"/>
+            </a:schemeClr>
+          </a:effectRef>
+          <a:fontRef idx="minor">
+            <a:schemeClr val="lt1"/>
+          </a:fontRef>
+        </p:style>
+        <p:txBody>
+          <a:bodyPr spcFirstLastPara="0" vert="horz" wrap="square" lIns="657874" tIns="73343" rIns="511189" bIns="73343" numCol="1" spcCol="1270" anchor="ctr" anchorCtr="0">
+            <a:noAutofit/>
+          </a:bodyPr>
+          <a:lstStyle/>
+          <a:p>
+            <a:pPr lvl="0" algn="ctr" defTabSz="2444750">
+              <a:lnSpc>
+                <a:spcPct val="90000"/>
+              </a:lnSpc>
+              <a:spcBef>
+                <a:spcPct val="0"/>
+              </a:spcBef>
+              <a:spcAft>
+                <a:spcPct val="35000"/>
+              </a:spcAft>
+            </a:pPr>
+            <a:r>
+              <a:rPr lang="pl-PL" sz="5500" kern="1200" dirty="0" smtClean="0"/>
+              <a:t>3</a:t>
+            </a:r>
+            <a:endParaRPr lang="en-US" sz="5500" kern="1200" dirty="0"/>
+          </a:p>
+        </p:txBody>
+      </p:sp>
+      <p:sp>
+        <p:nvSpPr>
+          <p:cNvPr id="11" name="Dowolny kształt 10"/>
+          <p:cNvSpPr/>
+          <p:nvPr/>
+        </p:nvSpPr>
+        <p:spPr>
+          <a:xfrm>
+            <a:off x="4249178" y="4342433"/>
+            <a:ext cx="2189231" cy="875692"/>
+          </a:xfrm>
+          <a:custGeom>
+            <a:avLst/>
+            <a:gdLst>
+              <a:gd name="connsiteX0" fmla="*/ 0 w 2189231"/>
+              <a:gd name="connsiteY0" fmla="*/ 0 h 875692"/>
+              <a:gd name="connsiteX1" fmla="*/ 1751385 w 2189231"/>
+              <a:gd name="connsiteY1" fmla="*/ 0 h 875692"/>
+              <a:gd name="connsiteX2" fmla="*/ 2189231 w 2189231"/>
+              <a:gd name="connsiteY2" fmla="*/ 437846 h 875692"/>
+              <a:gd name="connsiteX3" fmla="*/ 1751385 w 2189231"/>
+              <a:gd name="connsiteY3" fmla="*/ 875692 h 875692"/>
+              <a:gd name="connsiteX4" fmla="*/ 0 w 2189231"/>
+              <a:gd name="connsiteY4" fmla="*/ 875692 h 875692"/>
+              <a:gd name="connsiteX5" fmla="*/ 437846 w 2189231"/>
+              <a:gd name="connsiteY5" fmla="*/ 437846 h 875692"/>
+              <a:gd name="connsiteX6" fmla="*/ 0 w 2189231"/>
+              <a:gd name="connsiteY6" fmla="*/ 0 h 875692"/>
+            </a:gdLst>
+            <a:ahLst/>
+            <a:cxnLst>
+              <a:cxn ang="0">
+                <a:pos x="connsiteX0" y="connsiteY0"/>
+              </a:cxn>
+              <a:cxn ang="0">
+                <a:pos x="connsiteX1" y="connsiteY1"/>
+              </a:cxn>
+              <a:cxn ang="0">
+                <a:pos x="connsiteX2" y="connsiteY2"/>
+              </a:cxn>
+              <a:cxn ang="0">
+                <a:pos x="connsiteX3" y="connsiteY3"/>
+              </a:cxn>
+              <a:cxn ang="0">
+                <a:pos x="connsiteX4" y="connsiteY4"/>
+              </a:cxn>
+              <a:cxn ang="0">
+                <a:pos x="connsiteX5" y="connsiteY5"/>
+              </a:cxn>
+              <a:cxn ang="0">
+                <a:pos x="connsiteX6" y="connsiteY6"/>
+              </a:cxn>
+            </a:cxnLst>
+            <a:rect l="l" t="t" r="r" b="b"/>
+            <a:pathLst>
+              <a:path w="2189231" h="875692">
+                <a:moveTo>
+                  <a:pt x="0" y="0"/>
+                </a:moveTo>
+                <a:lnTo>
+                  <a:pt x="1751385" y="0"/>
+                </a:lnTo>
+                <a:lnTo>
+                  <a:pt x="2189231" y="437846"/>
+                </a:lnTo>
+                <a:lnTo>
+                  <a:pt x="1751385" y="875692"/>
+                </a:lnTo>
+                <a:lnTo>
+                  <a:pt x="0" y="875692"/>
+                </a:lnTo>
+                <a:lnTo>
+                  <a:pt x="437846" y="437846"/>
+                </a:lnTo>
+                <a:lnTo>
+                  <a:pt x="0" y="0"/>
+                </a:lnTo>
+                <a:close/>
+              </a:path>
+            </a:pathLst>
+          </a:custGeom>
+        </p:spPr>
+        <p:style>
+          <a:lnRef idx="2">
+            <a:schemeClr val="lt1">
+              <a:hueOff val="0"/>
+              <a:satOff val="0"/>
+              <a:lumOff val="0"/>
+              <a:alphaOff val="0"/>
+            </a:schemeClr>
+          </a:lnRef>
+          <a:fillRef idx="1">
+            <a:schemeClr val="accent1">
+              <a:hueOff val="0"/>
+              <a:satOff val="0"/>
+              <a:lumOff val="0"/>
+              <a:alphaOff val="0"/>
+            </a:schemeClr>
+          </a:fillRef>
+          <a:effectRef idx="0">
+            <a:schemeClr val="accent1">
+              <a:hueOff val="0"/>
+              <a:satOff val="0"/>
+              <a:lumOff val="0"/>
+              <a:alphaOff val="0"/>
+            </a:schemeClr>
+          </a:effectRef>
+          <a:fontRef idx="minor">
+            <a:schemeClr val="lt1"/>
+          </a:fontRef>
+        </p:style>
+        <p:txBody>
+          <a:bodyPr spcFirstLastPara="0" vert="horz" wrap="square" lIns="657874" tIns="73343" rIns="511189" bIns="73343" numCol="1" spcCol="1270" anchor="ctr" anchorCtr="0">
+            <a:noAutofit/>
+          </a:bodyPr>
+          <a:lstStyle/>
+          <a:p>
+            <a:pPr lvl="0" algn="ctr" defTabSz="2444750">
+              <a:lnSpc>
+                <a:spcPct val="90000"/>
+              </a:lnSpc>
+              <a:spcBef>
+                <a:spcPct val="0"/>
+              </a:spcBef>
+              <a:spcAft>
+                <a:spcPct val="35000"/>
+              </a:spcAft>
+            </a:pPr>
+            <a:r>
+              <a:rPr lang="pl-PL" sz="5500" kern="1200" dirty="0" smtClean="0"/>
+              <a:t>3</a:t>
+            </a:r>
+            <a:endParaRPr lang="en-US" sz="5500" kern="1200" dirty="0"/>
+          </a:p>
+        </p:txBody>
+      </p:sp>
+      <p:sp>
+        <p:nvSpPr>
+          <p:cNvPr id="12" name="Dowolny kształt 11"/>
+          <p:cNvSpPr/>
+          <p:nvPr/>
+        </p:nvSpPr>
+        <p:spPr>
+          <a:xfrm>
+            <a:off x="6219487" y="4342433"/>
+            <a:ext cx="2189231" cy="875692"/>
+          </a:xfrm>
+          <a:custGeom>
+            <a:avLst/>
+            <a:gdLst>
+              <a:gd name="connsiteX0" fmla="*/ 0 w 2189231"/>
+              <a:gd name="connsiteY0" fmla="*/ 0 h 875692"/>
+              <a:gd name="connsiteX1" fmla="*/ 1751385 w 2189231"/>
+              <a:gd name="connsiteY1" fmla="*/ 0 h 875692"/>
+              <a:gd name="connsiteX2" fmla="*/ 2189231 w 2189231"/>
+              <a:gd name="connsiteY2" fmla="*/ 437846 h 875692"/>
+              <a:gd name="connsiteX3" fmla="*/ 1751385 w 2189231"/>
+              <a:gd name="connsiteY3" fmla="*/ 875692 h 875692"/>
+              <a:gd name="connsiteX4" fmla="*/ 0 w 2189231"/>
+              <a:gd name="connsiteY4" fmla="*/ 875692 h 875692"/>
+              <a:gd name="connsiteX5" fmla="*/ 437846 w 2189231"/>
+              <a:gd name="connsiteY5" fmla="*/ 437846 h 875692"/>
+              <a:gd name="connsiteX6" fmla="*/ 0 w 2189231"/>
+              <a:gd name="connsiteY6" fmla="*/ 0 h 875692"/>
+            </a:gdLst>
+            <a:ahLst/>
+            <a:cxnLst>
+              <a:cxn ang="0">
+                <a:pos x="connsiteX0" y="connsiteY0"/>
+              </a:cxn>
+              <a:cxn ang="0">
+                <a:pos x="connsiteX1" y="connsiteY1"/>
+              </a:cxn>
+              <a:cxn ang="0">
+                <a:pos x="connsiteX2" y="connsiteY2"/>
+              </a:cxn>
+              <a:cxn ang="0">
+                <a:pos x="connsiteX3" y="connsiteY3"/>
+              </a:cxn>
+              <a:cxn ang="0">
+                <a:pos x="connsiteX4" y="connsiteY4"/>
+              </a:cxn>
+              <a:cxn ang="0">
+                <a:pos x="connsiteX5" y="connsiteY5"/>
+              </a:cxn>
+              <a:cxn ang="0">
+                <a:pos x="connsiteX6" y="connsiteY6"/>
+              </a:cxn>
+            </a:cxnLst>
+            <a:rect l="l" t="t" r="r" b="b"/>
+            <a:pathLst>
+              <a:path w="2189231" h="875692">
+                <a:moveTo>
+                  <a:pt x="0" y="0"/>
+                </a:moveTo>
+                <a:lnTo>
+                  <a:pt x="1751385" y="0"/>
+                </a:lnTo>
+                <a:lnTo>
+                  <a:pt x="2189231" y="437846"/>
+                </a:lnTo>
+                <a:lnTo>
+                  <a:pt x="1751385" y="875692"/>
+                </a:lnTo>
+                <a:lnTo>
+                  <a:pt x="0" y="875692"/>
+                </a:lnTo>
+                <a:lnTo>
+                  <a:pt x="437846" y="437846"/>
+                </a:lnTo>
+                <a:lnTo>
+                  <a:pt x="0" y="0"/>
+                </a:lnTo>
+                <a:close/>
+              </a:path>
+            </a:pathLst>
+          </a:custGeom>
+        </p:spPr>
+        <p:style>
+          <a:lnRef idx="2">
+            <a:schemeClr val="lt1">
+              <a:hueOff val="0"/>
+              <a:satOff val="0"/>
+              <a:lumOff val="0"/>
+              <a:alphaOff val="0"/>
+            </a:schemeClr>
+          </a:lnRef>
+          <a:fillRef idx="1">
+            <a:schemeClr val="accent1">
+              <a:hueOff val="0"/>
+              <a:satOff val="0"/>
+              <a:lumOff val="0"/>
+              <a:alphaOff val="0"/>
+            </a:schemeClr>
+          </a:fillRef>
+          <a:effectRef idx="0">
+            <a:schemeClr val="accent1">
+              <a:hueOff val="0"/>
+              <a:satOff val="0"/>
+              <a:lumOff val="0"/>
+              <a:alphaOff val="0"/>
+            </a:schemeClr>
+          </a:effectRef>
+          <a:fontRef idx="minor">
+            <a:schemeClr val="lt1"/>
+          </a:fontRef>
+        </p:style>
+        <p:txBody>
+          <a:bodyPr spcFirstLastPara="0" vert="horz" wrap="square" lIns="657874" tIns="73343" rIns="511189" bIns="73343" numCol="1" spcCol="1270" anchor="ctr" anchorCtr="0">
+            <a:noAutofit/>
+          </a:bodyPr>
+          <a:lstStyle/>
+          <a:p>
+            <a:pPr lvl="0" algn="ctr" defTabSz="2444750">
+              <a:lnSpc>
+                <a:spcPct val="90000"/>
+              </a:lnSpc>
+              <a:spcBef>
+                <a:spcPct val="0"/>
+              </a:spcBef>
+              <a:spcAft>
+                <a:spcPct val="35000"/>
+              </a:spcAft>
+            </a:pPr>
+            <a:r>
+              <a:rPr lang="pl-PL" sz="5500" kern="1200" dirty="0" smtClean="0"/>
+              <a:t>3</a:t>
+            </a:r>
+            <a:endParaRPr lang="en-US" sz="5500" kern="1200" dirty="0"/>
+          </a:p>
+        </p:txBody>
+      </p:sp>
+    </p:spTree>
+  </p:cSld>
+  <p:clrMapOvr>
+    <a:masterClrMapping/>
+  </p:clrMapOvr>
+  <p:timing>
+    <p:tnLst>
+      <p:par>
+        <p:cTn id="1" dur="indefinite" restart="never" nodeType="tmRoot">
+          <p:childTnLst>
+            <p:seq concurrent="1" nextAc="seek">
+              <p:cTn id="2" dur="indefinite" nodeType="mainSeq">
+                <p:childTnLst>
+                  <p:par>
+                    <p:cTn id="3" fill="hold">
+                      <p:stCondLst>
+                        <p:cond delay="indefinite"/>
+                      </p:stCondLst>
+                      <p:childTnLst>
+                        <p:par>
+                          <p:cTn id="4" fill="hold">
+                            <p:stCondLst>
+                              <p:cond delay="0"/>
+                            </p:stCondLst>
+                            <p:childTnLst>
+                              <p:par>
+                                <p:cTn id="5" presetID="1" presetClass="emph" presetSubtype="2" fill="hold" nodeType="clickEffect">
+                                  <p:stCondLst>
+                                    <p:cond delay="0"/>
+                                  </p:stCondLst>
+                                  <p:childTnLst>
+                                    <p:animClr clrSpc="rgb">
+                                      <p:cBhvr>
+                                        <p:cTn id="6" dur="2000" fill="hold"/>
+                                        <p:tgtEl>
+                                          <p:spTgt spid="14"/>
+                                        </p:tgtEl>
+                                        <p:attrNameLst>
+                                          <p:attrName>fillcolor</p:attrName>
+                                        </p:attrNameLst>
+                                      </p:cBhvr>
+                                      <p:to>
+                                        <a:schemeClr val="accent2"/>
+                                      </p:to>
+                                    </p:animClr>
+                                    <p:set>
+                                      <p:cBhvr>
+                                        <p:cTn id="7" dur="2000" fill="hold"/>
+                                        <p:tgtEl>
+                                          <p:spTgt spid="14"/>
+                                        </p:tgtEl>
+                                        <p:attrNameLst>
+                                          <p:attrName>fill.type</p:attrName>
+                                        </p:attrNameLst>
+                                      </p:cBhvr>
+                                      <p:to>
+                                        <p:strVal val="solid"/>
+                                      </p:to>
+                                    </p:set>
+                                    <p:set>
+                                      <p:cBhvr>
+                                        <p:cTn id="8" dur="2000" fill="hold"/>
+                                        <p:tgtEl>
+                                          <p:spTgt spid="14"/>
+                                        </p:tgtEl>
+                                        <p:attrNameLst>
+                                          <p:attrName>fill.on</p:attrName>
+                                        </p:attrNameLst>
+                                      </p:cBhvr>
+                                      <p:to>
+                                        <p:strVal val="true"/>
+                                      </p:to>
+                                    </p:set>
+                                  </p:childTnLst>
+                                </p:cTn>
+                              </p:par>
+                            </p:childTnLst>
+                          </p:cTn>
+                        </p:par>
+                      </p:childTnLst>
+                    </p:cTn>
+                  </p:par>
+                  <p:par>
+                    <p:cTn id="9" fill="hold">
+                      <p:stCondLst>
+                        <p:cond delay="indefinite"/>
+                      </p:stCondLst>
+                      <p:childTnLst>
+                        <p:par>
+                          <p:cTn id="10" fill="hold">
+                            <p:stCondLst>
+                              <p:cond delay="0"/>
+                            </p:stCondLst>
+                            <p:childTnLst>
+                              <p:par>
+                                <p:cTn id="11" presetID="1" presetClass="emph" presetSubtype="2" fill="hold" nodeType="clickEffect">
+                                  <p:stCondLst>
+                                    <p:cond delay="0"/>
+                                  </p:stCondLst>
+                                  <p:childTnLst>
+                                    <p:animClr clrSpc="rgb">
+                                      <p:cBhvr>
+                                        <p:cTn id="12" dur="2000" fill="hold"/>
+                                        <p:tgtEl>
+                                          <p:spTgt spid="9"/>
+                                        </p:tgtEl>
+                                        <p:attrNameLst>
+                                          <p:attrName>fillcolor</p:attrName>
+                                        </p:attrNameLst>
+                                      </p:cBhvr>
+                                      <p:to>
+                                        <a:schemeClr val="accent2"/>
+                                      </p:to>
+                                    </p:animClr>
+                                    <p:set>
+                                      <p:cBhvr>
+                                        <p:cTn id="13" dur="2000" fill="hold"/>
+                                        <p:tgtEl>
+                                          <p:spTgt spid="9"/>
+                                        </p:tgtEl>
+                                        <p:attrNameLst>
+                                          <p:attrName>fill.type</p:attrName>
+                                        </p:attrNameLst>
+                                      </p:cBhvr>
+                                      <p:to>
+                                        <p:strVal val="solid"/>
+                                      </p:to>
+                                    </p:set>
+                                    <p:set>
+                                      <p:cBhvr>
+                                        <p:cTn id="14" dur="2000" fill="hold"/>
+                                        <p:tgtEl>
+                                          <p:spTgt spid="9"/>
+                                        </p:tgtEl>
+                                        <p:attrNameLst>
+                                          <p:attrName>fill.on</p:attrName>
+                                        </p:attrNameLst>
+                                      </p:cBhvr>
+                                      <p:to>
+                                        <p:strVal val="true"/>
+                                      </p:to>
+                                    </p:set>
+                                  </p:childTnLst>
+                                </p:cTn>
+                              </p:par>
+                            </p:childTnLst>
+                          </p:cTn>
+                        </p:par>
+                      </p:childTnLst>
+                    </p:cTn>
+                  </p:par>
+                  <p:par>
+                    <p:cTn id="15" fill="hold">
+                      <p:stCondLst>
+                        <p:cond delay="indefinite"/>
+                      </p:stCondLst>
+                      <p:childTnLst>
+                        <p:par>
+                          <p:cTn id="16" fill="hold">
+                            <p:stCondLst>
+                              <p:cond delay="0"/>
+                            </p:stCondLst>
+                            <p:childTnLst>
+                              <p:par>
+                                <p:cTn id="17" presetID="1" presetClass="emph" presetSubtype="2" fill="hold" nodeType="clickEffect">
+                                  <p:stCondLst>
+                                    <p:cond delay="0"/>
+                                  </p:stCondLst>
+                                  <p:childTnLst>
+                                    <p:animClr clrSpc="rgb">
+                                      <p:cBhvr>
+                                        <p:cTn id="18" dur="2000" fill="hold"/>
+                                        <p:tgtEl>
+                                          <p:spTgt spid="9"/>
+                                        </p:tgtEl>
+                                        <p:attrNameLst>
+                                          <p:attrName>fillcolor</p:attrName>
+                                        </p:attrNameLst>
+                                      </p:cBhvr>
+                                      <p:to>
+                                        <a:srgbClr val="FF2929"/>
+                                      </p:to>
+                                    </p:animClr>
+                                    <p:set>
+                                      <p:cBhvr>
+                                        <p:cTn id="19" dur="2000" fill="hold"/>
+                                        <p:tgtEl>
+                                          <p:spTgt spid="9"/>
+                                        </p:tgtEl>
+                                        <p:attrNameLst>
+                                          <p:attrName>fill.type</p:attrName>
+                                        </p:attrNameLst>
+                                      </p:cBhvr>
+                                      <p:to>
+                                        <p:strVal val="solid"/>
+                                      </p:to>
+                                    </p:set>
+                                    <p:set>
+                                      <p:cBhvr>
+                                        <p:cTn id="20" dur="2000" fill="hold"/>
+                                        <p:tgtEl>
+                                          <p:spTgt spid="9"/>
+                                        </p:tgtEl>
+                                        <p:attrNameLst>
+                                          <p:attrName>fill.on</p:attrName>
+                                        </p:attrNameLst>
+                                      </p:cBhvr>
+                                      <p:to>
+                                        <p:strVal val="true"/>
+                                      </p:to>
+                                    </p:set>
+                                  </p:childTnLst>
+                                </p:cTn>
+                              </p:par>
+                            </p:childTnLst>
+                          </p:cTn>
+                        </p:par>
+                      </p:childTnLst>
+                    </p:cTn>
+                  </p:par>
+                  <p:par>
+                    <p:cTn id="21" fill="hold">
+                      <p:stCondLst>
+                        <p:cond delay="indefinite"/>
+                      </p:stCondLst>
+                      <p:childTnLst>
+                        <p:par>
+                          <p:cTn id="22" fill="hold">
+                            <p:stCondLst>
+                              <p:cond delay="0"/>
+                            </p:stCondLst>
+                            <p:childTnLst>
+                              <p:par>
+                                <p:cTn id="23" presetID="1" presetClass="emph" presetSubtype="2" fill="hold" nodeType="clickEffect">
+                                  <p:stCondLst>
+                                    <p:cond delay="0"/>
+                                  </p:stCondLst>
+                                  <p:childTnLst>
+                                    <p:animClr clrSpc="rgb">
+                                      <p:cBhvr>
+                                        <p:cTn id="24" dur="2000" fill="hold"/>
+                                        <p:tgtEl>
+                                          <p:spTgt spid="10"/>
+                                        </p:tgtEl>
+                                        <p:attrNameLst>
+                                          <p:attrName>fillcolor</p:attrName>
+                                        </p:attrNameLst>
+                                      </p:cBhvr>
+                                      <p:to>
+                                        <a:schemeClr val="accent2"/>
+                                      </p:to>
+                                    </p:animClr>
+                                    <p:set>
+                                      <p:cBhvr>
+                                        <p:cTn id="25" dur="2000" fill="hold"/>
+                                        <p:tgtEl>
+                                          <p:spTgt spid="10"/>
+                                        </p:tgtEl>
+                                        <p:attrNameLst>
+                                          <p:attrName>fill.type</p:attrName>
+                                        </p:attrNameLst>
+                                      </p:cBhvr>
+                                      <p:to>
+                                        <p:strVal val="solid"/>
+                                      </p:to>
+                                    </p:set>
+                                    <p:set>
+                                      <p:cBhvr>
+                                        <p:cTn id="26" dur="2000" fill="hold"/>
+                                        <p:tgtEl>
+                                          <p:spTgt spid="10"/>
+                                        </p:tgtEl>
+                                        <p:attrNameLst>
+                                          <p:attrName>fill.on</p:attrName>
+                                        </p:attrNameLst>
+                                      </p:cBhvr>
+                                      <p:to>
+                                        <p:strVal val="true"/>
+                                      </p:to>
+                                    </p:set>
+                                  </p:childTnLst>
+                                </p:cTn>
+                              </p:par>
+                            </p:childTnLst>
+                          </p:cTn>
+                        </p:par>
+                      </p:childTnLst>
+                    </p:cTn>
+                  </p:par>
+                  <p:par>
+                    <p:cTn id="27" fill="hold">
+                      <p:stCondLst>
+                        <p:cond delay="indefinite"/>
+                      </p:stCondLst>
+                      <p:childTnLst>
+                        <p:par>
+                          <p:cTn id="28" fill="hold">
+                            <p:stCondLst>
+                              <p:cond delay="0"/>
+                            </p:stCondLst>
+                            <p:childTnLst>
+                              <p:par>
+                                <p:cTn id="29" presetID="1" presetClass="emph" presetSubtype="2" fill="hold" nodeType="clickEffect">
+                                  <p:stCondLst>
+                                    <p:cond delay="0"/>
+                                  </p:stCondLst>
+                                  <p:childTnLst>
+                                    <p:animClr clrSpc="rgb">
+                                      <p:cBhvr>
+                                        <p:cTn id="30" dur="2000" fill="hold"/>
+                                        <p:tgtEl>
+                                          <p:spTgt spid="14"/>
+                                        </p:tgtEl>
+                                        <p:attrNameLst>
+                                          <p:attrName>fillcolor</p:attrName>
+                                        </p:attrNameLst>
+                                      </p:cBhvr>
+                                      <p:to>
+                                        <a:srgbClr val="FF2929"/>
+                                      </p:to>
+                                    </p:animClr>
+                                    <p:set>
+                                      <p:cBhvr>
+                                        <p:cTn id="31" dur="2000" fill="hold"/>
+                                        <p:tgtEl>
+                                          <p:spTgt spid="14"/>
+                                        </p:tgtEl>
+                                        <p:attrNameLst>
+                                          <p:attrName>fill.type</p:attrName>
+                                        </p:attrNameLst>
+                                      </p:cBhvr>
+                                      <p:to>
+                                        <p:strVal val="solid"/>
+                                      </p:to>
+                                    </p:set>
+                                    <p:set>
+                                      <p:cBhvr>
+                                        <p:cTn id="32" dur="2000" fill="hold"/>
+                                        <p:tgtEl>
+                                          <p:spTgt spid="14"/>
+                                        </p:tgtEl>
+                                        <p:attrNameLst>
+                                          <p:attrName>fill.on</p:attrName>
+                                        </p:attrNameLst>
+                                      </p:cBhvr>
+                                      <p:to>
+                                        <p:strVal val="true"/>
+                                      </p:to>
+                                    </p:set>
+                                  </p:childTnLst>
+                                </p:cTn>
+                              </p:par>
+                            </p:childTnLst>
+                          </p:cTn>
+                        </p:par>
+                      </p:childTnLst>
+                    </p:cTn>
+                  </p:par>
+                  <p:par>
+                    <p:cTn id="33" fill="hold">
+                      <p:stCondLst>
+                        <p:cond delay="indefinite"/>
+                      </p:stCondLst>
+                      <p:childTnLst>
+                        <p:par>
+                          <p:cTn id="34" fill="hold">
+                            <p:stCondLst>
+                              <p:cond delay="0"/>
+                            </p:stCondLst>
+                            <p:childTnLst>
+                              <p:par>
+                                <p:cTn id="35" presetID="1" presetClass="emph" presetSubtype="2" fill="hold" nodeType="clickEffect">
+                                  <p:stCondLst>
+                                    <p:cond delay="0"/>
+                                  </p:stCondLst>
+                                  <p:childTnLst>
+                                    <p:animClr clrSpc="rgb">
+                                      <p:cBhvr>
+                                        <p:cTn id="36" dur="2000" fill="hold"/>
+                                        <p:tgtEl>
+                                          <p:spTgt spid="15"/>
+                                        </p:tgtEl>
+                                        <p:attrNameLst>
+                                          <p:attrName>fillcolor</p:attrName>
+                                        </p:attrNameLst>
+                                      </p:cBhvr>
+                                      <p:to>
+                                        <a:schemeClr val="accent2"/>
+                                      </p:to>
+                                    </p:animClr>
+                                    <p:set>
+                                      <p:cBhvr>
+                                        <p:cTn id="37" dur="2000" fill="hold"/>
+                                        <p:tgtEl>
+                                          <p:spTgt spid="15"/>
+                                        </p:tgtEl>
+                                        <p:attrNameLst>
+                                          <p:attrName>fill.type</p:attrName>
+                                        </p:attrNameLst>
+                                      </p:cBhvr>
+                                      <p:to>
+                                        <p:strVal val="solid"/>
+                                      </p:to>
+                                    </p:set>
+                                    <p:set>
+                                      <p:cBhvr>
+                                        <p:cTn id="38" dur="2000" fill="hold"/>
+                                        <p:tgtEl>
+                                          <p:spTgt spid="15"/>
+                                        </p:tgtEl>
+                                        <p:attrNameLst>
+                                          <p:attrName>fill.on</p:attrName>
+                                        </p:attrNameLst>
+                                      </p:cBhvr>
+                                      <p:to>
+                                        <p:strVal val="true"/>
+                                      </p:to>
+                                    </p:set>
+                                  </p:childTnLst>
+                                </p:cTn>
+                              </p:par>
+                            </p:childTnLst>
+                          </p:cTn>
+                        </p:par>
+                      </p:childTnLst>
+                    </p:cTn>
+                  </p:par>
+                  <p:par>
+                    <p:cTn id="39" fill="hold">
+                      <p:stCondLst>
+                        <p:cond delay="indefinite"/>
+                      </p:stCondLst>
+                      <p:childTnLst>
+                        <p:par>
+                          <p:cTn id="40" fill="hold">
+                            <p:stCondLst>
+                              <p:cond delay="0"/>
+                            </p:stCondLst>
+                            <p:childTnLst>
+                              <p:par>
+                                <p:cTn id="41" presetID="1" presetClass="emph" presetSubtype="2" fill="hold" nodeType="clickEffect">
+                                  <p:stCondLst>
+                                    <p:cond delay="0"/>
+                                  </p:stCondLst>
+                                  <p:childTnLst>
+                                    <p:animClr clrSpc="rgb">
+                                      <p:cBhvr>
+                                        <p:cTn id="42" dur="2000" fill="hold"/>
+                                        <p:tgtEl>
+                                          <p:spTgt spid="15"/>
+                                        </p:tgtEl>
+                                        <p:attrNameLst>
+                                          <p:attrName>fillcolor</p:attrName>
+                                        </p:attrNameLst>
+                                      </p:cBhvr>
+                                      <p:to>
+                                        <a:srgbClr val="FF2929"/>
+                                      </p:to>
+                                    </p:animClr>
+                                    <p:set>
+                                      <p:cBhvr>
+                                        <p:cTn id="43" dur="2000" fill="hold"/>
+                                        <p:tgtEl>
+                                          <p:spTgt spid="15"/>
+                                        </p:tgtEl>
+                                        <p:attrNameLst>
+                                          <p:attrName>fill.type</p:attrName>
+                                        </p:attrNameLst>
+                                      </p:cBhvr>
+                                      <p:to>
+                                        <p:strVal val="solid"/>
+                                      </p:to>
+                                    </p:set>
+                                    <p:set>
+                                      <p:cBhvr>
+                                        <p:cTn id="44" dur="2000" fill="hold"/>
+                                        <p:tgtEl>
+                                          <p:spTgt spid="15"/>
+                                        </p:tgtEl>
+                                        <p:attrNameLst>
+                                          <p:attrName>fill.on</p:attrName>
+                                        </p:attrNameLst>
+                                      </p:cBhvr>
+                                      <p:to>
+                                        <p:strVal val="true"/>
+                                      </p:to>
+                                    </p:set>
+                                  </p:childTnLst>
+                                </p:cTn>
+                              </p:par>
+                            </p:childTnLst>
+                          </p:cTn>
+                        </p:par>
+                      </p:childTnLst>
+                    </p:cTn>
+                  </p:par>
+                  <p:par>
+                    <p:cTn id="45" fill="hold">
+                      <p:stCondLst>
+                        <p:cond delay="indefinite"/>
+                      </p:stCondLst>
+                      <p:childTnLst>
+                        <p:par>
+                          <p:cTn id="46" fill="hold">
+                            <p:stCondLst>
+                              <p:cond delay="0"/>
+                            </p:stCondLst>
+                            <p:childTnLst>
+                              <p:par>
+                                <p:cTn id="47" presetID="1" presetClass="emph" presetSubtype="2" fill="hold" nodeType="clickEffect">
+                                  <p:stCondLst>
+                                    <p:cond delay="0"/>
+                                  </p:stCondLst>
+                                  <p:childTnLst>
+                                    <p:animClr clrSpc="rgb">
+                                      <p:cBhvr>
+                                        <p:cTn id="48" dur="2000" fill="hold"/>
+                                        <p:tgtEl>
+                                          <p:spTgt spid="16"/>
+                                        </p:tgtEl>
+                                        <p:attrNameLst>
+                                          <p:attrName>fillcolor</p:attrName>
+                                        </p:attrNameLst>
+                                      </p:cBhvr>
+                                      <p:to>
+                                        <a:schemeClr val="accent2"/>
+                                      </p:to>
+                                    </p:animClr>
+                                    <p:set>
+                                      <p:cBhvr>
+                                        <p:cTn id="49" dur="2000" fill="hold"/>
+                                        <p:tgtEl>
+                                          <p:spTgt spid="16"/>
+                                        </p:tgtEl>
+                                        <p:attrNameLst>
+                                          <p:attrName>fill.type</p:attrName>
+                                        </p:attrNameLst>
+                                      </p:cBhvr>
+                                      <p:to>
+                                        <p:strVal val="solid"/>
+                                      </p:to>
+                                    </p:set>
+                                    <p:set>
+                                      <p:cBhvr>
+                                        <p:cTn id="50" dur="2000" fill="hold"/>
+                                        <p:tgtEl>
+                                          <p:spTgt spid="16"/>
+                                        </p:tgtEl>
+                                        <p:attrNameLst>
+                                          <p:attrName>fill.on</p:attrName>
+                                        </p:attrNameLst>
+                                      </p:cBhvr>
+                                      <p:to>
+                                        <p:strVal val="true"/>
+                                      </p:to>
+                                    </p:set>
+                                  </p:childTnLst>
+                                </p:cTn>
+                              </p:par>
+                            </p:childTnLst>
+                          </p:cTn>
+                        </p:par>
+                      </p:childTnLst>
+                    </p:cTn>
+                  </p:par>
+                  <p:par>
+                    <p:cTn id="51" fill="hold">
+                      <p:stCondLst>
+                        <p:cond delay="indefinite"/>
+                      </p:stCondLst>
+                      <p:childTnLst>
+                        <p:par>
+                          <p:cTn id="52" fill="hold">
+                            <p:stCondLst>
+                              <p:cond delay="0"/>
+                            </p:stCondLst>
+                            <p:childTnLst>
+                              <p:par>
+                                <p:cTn id="53" presetID="1" presetClass="emph" presetSubtype="2" fill="hold" nodeType="clickEffect">
+                                  <p:stCondLst>
+                                    <p:cond delay="0"/>
+                                  </p:stCondLst>
+                                  <p:childTnLst>
+                                    <p:animClr clrSpc="rgb">
+                                      <p:cBhvr>
+                                        <p:cTn id="54" dur="2000" fill="hold"/>
+                                        <p:tgtEl>
+                                          <p:spTgt spid="10"/>
+                                        </p:tgtEl>
+                                        <p:attrNameLst>
+                                          <p:attrName>fillcolor</p:attrName>
+                                        </p:attrNameLst>
+                                      </p:cBhvr>
+                                      <p:to>
+                                        <a:srgbClr val="FF2929"/>
+                                      </p:to>
+                                    </p:animClr>
+                                    <p:set>
+                                      <p:cBhvr>
+                                        <p:cTn id="55" dur="2000" fill="hold"/>
+                                        <p:tgtEl>
+                                          <p:spTgt spid="10"/>
+                                        </p:tgtEl>
+                                        <p:attrNameLst>
+                                          <p:attrName>fill.type</p:attrName>
+                                        </p:attrNameLst>
+                                      </p:cBhvr>
+                                      <p:to>
+                                        <p:strVal val="solid"/>
+                                      </p:to>
+                                    </p:set>
+                                    <p:set>
+                                      <p:cBhvr>
+                                        <p:cTn id="56" dur="2000" fill="hold"/>
+                                        <p:tgtEl>
+                                          <p:spTgt spid="10"/>
+                                        </p:tgtEl>
+                                        <p:attrNameLst>
+                                          <p:attrName>fill.on</p:attrName>
+                                        </p:attrNameLst>
+                                      </p:cBhvr>
+                                      <p:to>
+                                        <p:strVal val="true"/>
+                                      </p:to>
+                                    </p:set>
+                                  </p:childTnLst>
+                                </p:cTn>
+                              </p:par>
+                            </p:childTnLst>
+                          </p:cTn>
+                        </p:par>
+                      </p:childTnLst>
+                    </p:cTn>
+                  </p:par>
+                  <p:par>
+                    <p:cTn id="57" fill="hold">
+                      <p:stCondLst>
+                        <p:cond delay="indefinite"/>
+                      </p:stCondLst>
+                      <p:childTnLst>
+                        <p:par>
+                          <p:cTn id="58" fill="hold">
+                            <p:stCondLst>
+                              <p:cond delay="0"/>
+                            </p:stCondLst>
+                            <p:childTnLst>
+                              <p:par>
+                                <p:cTn id="59" presetID="1" presetClass="emph" presetSubtype="2" fill="hold" nodeType="clickEffect">
+                                  <p:stCondLst>
+                                    <p:cond delay="0"/>
+                                  </p:stCondLst>
+                                  <p:childTnLst>
+                                    <p:animClr clrSpc="rgb">
+                                      <p:cBhvr>
+                                        <p:cTn id="60" dur="2000" fill="hold"/>
+                                        <p:tgtEl>
+                                          <p:spTgt spid="11"/>
+                                        </p:tgtEl>
+                                        <p:attrNameLst>
+                                          <p:attrName>fillcolor</p:attrName>
+                                        </p:attrNameLst>
+                                      </p:cBhvr>
+                                      <p:to>
+                                        <a:schemeClr val="accent2"/>
+                                      </p:to>
+                                    </p:animClr>
+                                    <p:set>
+                                      <p:cBhvr>
+                                        <p:cTn id="61" dur="2000" fill="hold"/>
+                                        <p:tgtEl>
+                                          <p:spTgt spid="11"/>
+                                        </p:tgtEl>
+                                        <p:attrNameLst>
+                                          <p:attrName>fill.type</p:attrName>
+                                        </p:attrNameLst>
+                                      </p:cBhvr>
+                                      <p:to>
+                                        <p:strVal val="solid"/>
+                                      </p:to>
+                                    </p:set>
+                                    <p:set>
+                                      <p:cBhvr>
+                                        <p:cTn id="62" dur="2000" fill="hold"/>
+                                        <p:tgtEl>
+                                          <p:spTgt spid="11"/>
+                                        </p:tgtEl>
+                                        <p:attrNameLst>
+                                          <p:attrName>fill.on</p:attrName>
+                                        </p:attrNameLst>
+                                      </p:cBhvr>
+                                      <p:to>
+                                        <p:strVal val="true"/>
+                                      </p:to>
+                                    </p:set>
+                                  </p:childTnLst>
+                                </p:cTn>
+                              </p:par>
+                            </p:childTnLst>
+                          </p:cTn>
+                        </p:par>
+                      </p:childTnLst>
+                    </p:cTn>
+                  </p:par>
+                  <p:par>
+                    <p:cTn id="63" fill="hold">
+                      <p:stCondLst>
+                        <p:cond delay="indefinite"/>
+                      </p:stCondLst>
+                      <p:childTnLst>
+                        <p:par>
+                          <p:cTn id="64" fill="hold">
+                            <p:stCondLst>
+                              <p:cond delay="0"/>
+                            </p:stCondLst>
+                            <p:childTnLst>
+                              <p:par>
+                                <p:cTn id="65" presetID="1" presetClass="emph" presetSubtype="2" fill="hold" nodeType="clickEffect">
+                                  <p:stCondLst>
+                                    <p:cond delay="0"/>
+                                  </p:stCondLst>
+                                  <p:childTnLst>
+                                    <p:animClr clrSpc="rgb">
+                                      <p:cBhvr>
+                                        <p:cTn id="66" dur="2000" fill="hold"/>
+                                        <p:tgtEl>
+                                          <p:spTgt spid="11"/>
+                                        </p:tgtEl>
+                                        <p:attrNameLst>
+                                          <p:attrName>fillcolor</p:attrName>
+                                        </p:attrNameLst>
+                                      </p:cBhvr>
+                                      <p:to>
+                                        <a:srgbClr val="FF2929"/>
+                                      </p:to>
+                                    </p:animClr>
+                                    <p:set>
+                                      <p:cBhvr>
+                                        <p:cTn id="67" dur="2000" fill="hold"/>
+                                        <p:tgtEl>
+                                          <p:spTgt spid="11"/>
+                                        </p:tgtEl>
+                                        <p:attrNameLst>
+                                          <p:attrName>fill.type</p:attrName>
+                                        </p:attrNameLst>
+                                      </p:cBhvr>
+                                      <p:to>
+                                        <p:strVal val="solid"/>
+                                      </p:to>
+                                    </p:set>
+                                    <p:set>
+                                      <p:cBhvr>
+                                        <p:cTn id="68" dur="2000" fill="hold"/>
+                                        <p:tgtEl>
+                                          <p:spTgt spid="11"/>
+                                        </p:tgtEl>
+                                        <p:attrNameLst>
+                                          <p:attrName>fill.on</p:attrName>
+                                        </p:attrNameLst>
+                                      </p:cBhvr>
+                                      <p:to>
+                                        <p:strVal val="true"/>
+                                      </p:to>
+                                    </p:set>
+                                  </p:childTnLst>
+                                </p:cTn>
+                              </p:par>
+                            </p:childTnLst>
+                          </p:cTn>
+                        </p:par>
+                      </p:childTnLst>
+                    </p:cTn>
+                  </p:par>
+                  <p:par>
+                    <p:cTn id="69" fill="hold">
+                      <p:stCondLst>
+                        <p:cond delay="indefinite"/>
+                      </p:stCondLst>
+                      <p:childTnLst>
+                        <p:par>
+                          <p:cTn id="70" fill="hold">
+                            <p:stCondLst>
+                              <p:cond delay="0"/>
+                            </p:stCondLst>
+                            <p:childTnLst>
+                              <p:par>
+                                <p:cTn id="71" presetID="1" presetClass="emph" presetSubtype="2" fill="hold" nodeType="clickEffect">
+                                  <p:stCondLst>
+                                    <p:cond delay="0"/>
+                                  </p:stCondLst>
+                                  <p:childTnLst>
+                                    <p:animClr clrSpc="rgb">
+                                      <p:cBhvr>
+                                        <p:cTn id="72" dur="2000" fill="hold"/>
+                                        <p:tgtEl>
+                                          <p:spTgt spid="12"/>
+                                        </p:tgtEl>
+                                        <p:attrNameLst>
+                                          <p:attrName>fillcolor</p:attrName>
+                                        </p:attrNameLst>
+                                      </p:cBhvr>
+                                      <p:to>
+                                        <a:schemeClr val="accent2"/>
+                                      </p:to>
+                                    </p:animClr>
+                                    <p:set>
+                                      <p:cBhvr>
+                                        <p:cTn id="73" dur="2000" fill="hold"/>
+                                        <p:tgtEl>
+                                          <p:spTgt spid="12"/>
+                                        </p:tgtEl>
+                                        <p:attrNameLst>
+                                          <p:attrName>fill.type</p:attrName>
+                                        </p:attrNameLst>
+                                      </p:cBhvr>
+                                      <p:to>
+                                        <p:strVal val="solid"/>
+                                      </p:to>
+                                    </p:set>
+                                    <p:set>
+                                      <p:cBhvr>
+                                        <p:cTn id="74" dur="2000" fill="hold"/>
+                                        <p:tgtEl>
+                                          <p:spTgt spid="12"/>
+                                        </p:tgtEl>
+                                        <p:attrNameLst>
+                                          <p:attrName>fill.on</p:attrName>
+                                        </p:attrNameLst>
+                                      </p:cBhvr>
+                                      <p:to>
+                                        <p:strVal val="true"/>
+                                      </p:to>
+                                    </p:set>
+                                  </p:childTnLst>
+                                </p:cTn>
+                              </p:par>
+                            </p:childTnLst>
+                          </p:cTn>
+                        </p:par>
+                      </p:childTnLst>
+                    </p:cTn>
+                  </p:par>
+                  <p:par>
+                    <p:cTn id="75" fill="hold">
+                      <p:stCondLst>
+                        <p:cond delay="indefinite"/>
+                      </p:stCondLst>
+                      <p:childTnLst>
+                        <p:par>
+                          <p:cTn id="76" fill="hold">
+                            <p:stCondLst>
+                              <p:cond delay="0"/>
+                            </p:stCondLst>
+                            <p:childTnLst>
+                              <p:par>
+                                <p:cTn id="77" presetID="1" presetClass="emph" presetSubtype="2" fill="hold" nodeType="clickEffect">
+                                  <p:stCondLst>
+                                    <p:cond delay="0"/>
+                                  </p:stCondLst>
+                                  <p:childTnLst>
+                                    <p:animClr clrSpc="rgb">
+                                      <p:cBhvr>
+                                        <p:cTn id="78" dur="2000" fill="hold"/>
+                                        <p:tgtEl>
+                                          <p:spTgt spid="12"/>
+                                        </p:tgtEl>
+                                        <p:attrNameLst>
+                                          <p:attrName>fillcolor</p:attrName>
+                                        </p:attrNameLst>
+                                      </p:cBhvr>
+                                      <p:to>
+                                        <a:srgbClr val="FF2929"/>
+                                      </p:to>
+                                    </p:animClr>
+                                    <p:set>
+                                      <p:cBhvr>
+                                        <p:cTn id="79" dur="2000" fill="hold"/>
+                                        <p:tgtEl>
+                                          <p:spTgt spid="12"/>
+                                        </p:tgtEl>
+                                        <p:attrNameLst>
+                                          <p:attrName>fill.type</p:attrName>
+                                        </p:attrNameLst>
+                                      </p:cBhvr>
+                                      <p:to>
+                                        <p:strVal val="solid"/>
+                                      </p:to>
+                                    </p:set>
+                                    <p:set>
+                                      <p:cBhvr>
+                                        <p:cTn id="80" dur="2000" fill="hold"/>
+                                        <p:tgtEl>
+                                          <p:spTgt spid="12"/>
+                                        </p:tgtEl>
+                                        <p:attrNameLst>
+                                          <p:attrName>fill.on</p:attrName>
+                                        </p:attrNameLst>
+                                      </p:cBhvr>
+                                      <p:to>
+                                        <p:strVal val="true"/>
+                                      </p:to>
+                                    </p:set>
+                                  </p:childTnLst>
+                                </p:cTn>
+                              </p:par>
+                            </p:childTnLst>
+                          </p:cTn>
+                        </p:par>
+                      </p:childTnLst>
+                    </p:cTn>
+                  </p:par>
+                  <p:par>
+                    <p:cTn id="81" fill="hold">
+                      <p:stCondLst>
+                        <p:cond delay="indefinite"/>
+                      </p:stCondLst>
+                      <p:childTnLst>
+                        <p:par>
+                          <p:cTn id="82" fill="hold">
+                            <p:stCondLst>
+                              <p:cond delay="0"/>
+                            </p:stCondLst>
+                            <p:childTnLst>
+                              <p:par>
+                                <p:cTn id="83" presetID="1" presetClass="emph" presetSubtype="2" fill="hold" nodeType="clickEffect">
+                                  <p:stCondLst>
+                                    <p:cond delay="0"/>
+                                  </p:stCondLst>
+                                  <p:childTnLst>
+                                    <p:animClr clrSpc="rgb">
+                                      <p:cBhvr>
+                                        <p:cTn id="84" dur="2000" fill="hold"/>
+                                        <p:tgtEl>
+                                          <p:spTgt spid="16"/>
+                                        </p:tgtEl>
+                                        <p:attrNameLst>
+                                          <p:attrName>fillcolor</p:attrName>
+                                        </p:attrNameLst>
+                                      </p:cBhvr>
+                                      <p:to>
+                                        <a:srgbClr val="FF2929"/>
+                                      </p:to>
+                                    </p:animClr>
+                                    <p:set>
+                                      <p:cBhvr>
+                                        <p:cTn id="85" dur="2000" fill="hold"/>
+                                        <p:tgtEl>
+                                          <p:spTgt spid="16"/>
+                                        </p:tgtEl>
+                                        <p:attrNameLst>
+                                          <p:attrName>fill.type</p:attrName>
+                                        </p:attrNameLst>
+                                      </p:cBhvr>
+                                      <p:to>
+                                        <p:strVal val="solid"/>
+                                      </p:to>
+                                    </p:set>
+                                    <p:set>
+                                      <p:cBhvr>
+                                        <p:cTn id="86" dur="2000" fill="hold"/>
+                                        <p:tgtEl>
+                                          <p:spTgt spid="16"/>
+                                        </p:tgtEl>
+                                        <p:attrNameLst>
+                                          <p:attrName>fill.on</p:attrName>
+                                        </p:attrNameLst>
+                                      </p:cBhvr>
+                                      <p:to>
+                                        <p:strVal val="true"/>
+                                      </p:to>
+                                    </p:set>
+                                  </p:childTnLst>
+                                </p:cTn>
+                              </p:par>
+                            </p:childTnLst>
+                          </p:cTn>
+                        </p:par>
+                      </p:childTnLst>
+                    </p:cTn>
+                  </p:par>
+                </p:childTnLst>
+              </p:cTn>
+              <p:prevCondLst>
+                <p:cond evt="onPrev" delay="0">
+                  <p:tgtEl>
+                    <p:sldTgt/>
+                  </p:tgtEl>
+                </p:cond>
+              </p:prevCondLst>
+              <p:nextCondLst>
+                <p:cond evt="onNext" delay="0">
+                  <p:tgtEl>
+                    <p:sldTgt/>
+                  </p:tgtEl>
+                </p:cond>
+              </p:nextCondLst>
+            </p:seq>
+          </p:childTnLst>
+        </p:cTn>
+      </p:par>
+    </p:tnLst>
+  </p:timing>
+</p:sld>
+</file>
+
+<file path=ppt/slides/slide11.xml><?xml version="1.0" encoding="utf-8"?>
+<p:sld xmlns:a="http://schemas.openxmlformats.org/drawingml/2006/main" xmlns:r="http://schemas.openxmlformats.org/officeDocument/2006/relationships" xmlns:p="http://schemas.openxmlformats.org/presentationml/2006/main">
+  <p:cSld>
+    <p:spTree>
+      <p:nvGrpSpPr>
+        <p:cNvPr id="1" name=""/>
+        <p:cNvGrpSpPr/>
+        <p:nvPr/>
+      </p:nvGrpSpPr>
+      <p:grpSpPr>
+        <a:xfrm>
+          <a:off x="0" y="0"/>
+          <a:ext cx="0" cy="0"/>
+          <a:chOff x="0" y="0"/>
+          <a:chExt cx="0" cy="0"/>
+        </a:xfrm>
+      </p:grpSpPr>
+      <p:sp>
+        <p:nvSpPr>
+          <p:cNvPr id="17409" name="Slide Number Placeholder 3"/>
+          <p:cNvSpPr>
+            <a:spLocks noGrp="1"/>
+          </p:cNvSpPr>
+          <p:nvPr>
+            <p:ph type="sldNum" sz="quarter" idx="10"/>
+          </p:nvPr>
+        </p:nvSpPr>
+        <p:spPr>
+          <a:noFill/>
+        </p:spPr>
+        <p:txBody>
+          <a:bodyPr/>
+          <a:lstStyle/>
+          <a:p>
+            <a:fld id="{B8923B82-4FEA-4C63-961B-70B71B12A787}" type="slidenum">
+              <a:rPr lang="en-US"/>
+              <a:pPr/>
+              <a:t>11</a:t>
+            </a:fld>
+            <a:endParaRPr lang="en-US" dirty="0"/>
+          </a:p>
+        </p:txBody>
+      </p:sp>
+      <p:sp>
+        <p:nvSpPr>
+          <p:cNvPr id="17410" name="Rectangle 2"/>
+          <p:cNvSpPr>
+            <a:spLocks noGrp="1" noChangeArrowheads="1"/>
+          </p:cNvSpPr>
+          <p:nvPr>
+            <p:ph type="title"/>
+          </p:nvPr>
+        </p:nvSpPr>
+        <p:spPr/>
+        <p:txBody>
+          <a:bodyPr/>
+          <a:lstStyle/>
+          <a:p>
+            <a:pPr eaLnBrk="1" hangingPunct="1"/>
+            <a:r>
+              <a:rPr lang="en-US" dirty="0" smtClean="0">
+                <a:ea typeface="ＭＳ Ｐゴシック" pitchFamily="34" charset="-128"/>
+              </a:rPr>
+              <a:t>Slide Titles are in Title Case Arial 28pt Blue</a:t>
+            </a:r>
+          </a:p>
+        </p:txBody>
+      </p:sp>
+      <p:sp>
+        <p:nvSpPr>
+          <p:cNvPr id="17411" name="Rectangle 3"/>
+          <p:cNvSpPr>
+            <a:spLocks noGrp="1" noChangeArrowheads="1"/>
+          </p:cNvSpPr>
+          <p:nvPr>
+            <p:ph type="body" idx="1"/>
+          </p:nvPr>
+        </p:nvSpPr>
+        <p:spPr/>
+        <p:txBody>
+          <a:bodyPr/>
+          <a:lstStyle/>
+          <a:p>
+            <a:pPr eaLnBrk="1" hangingPunct="1"/>
+            <a:r>
+              <a:rPr lang="en-US" dirty="0" smtClean="0">
+                <a:ea typeface="ＭＳ Ｐゴシック" pitchFamily="34" charset="-128"/>
+              </a:rPr>
+              <a:t>Bullet points are in sentence case Arial 22pt blue.</a:t>
+            </a:r>
+          </a:p>
+          <a:p>
+            <a:pPr lvl="1" eaLnBrk="1" hangingPunct="1"/>
+            <a:r>
+              <a:rPr lang="en-US" dirty="0" smtClean="0">
+                <a:ea typeface="ＭＳ Ｐゴシック" pitchFamily="34" charset="-128"/>
+              </a:rPr>
+              <a:t>Second level bullet points are in sentence case Arial 18pt blue.</a:t>
+            </a:r>
+          </a:p>
+          <a:p>
+            <a:pPr lvl="2" eaLnBrk="1" hangingPunct="1"/>
+            <a:r>
+              <a:rPr lang="en-US" dirty="0" smtClean="0">
+                <a:ea typeface="ＭＳ Ｐゴシック" pitchFamily="34" charset="-128"/>
+              </a:rPr>
+              <a:t>Third level bullet points are in sentence case Arial 16pt blue.</a:t>
+            </a:r>
+          </a:p>
+          <a:p>
+            <a:pPr eaLnBrk="1" hangingPunct="1"/>
+            <a:r>
+              <a:rPr lang="en-US" dirty="0" smtClean="0">
+                <a:ea typeface="ＭＳ Ｐゴシック" pitchFamily="34" charset="-128"/>
+              </a:rPr>
+              <a:t>Bullet points should be short and concise.</a:t>
+            </a:r>
+          </a:p>
+          <a:p>
+            <a:pPr eaLnBrk="1" hangingPunct="1"/>
+            <a:r>
+              <a:rPr lang="en-US" dirty="0" smtClean="0">
+                <a:ea typeface="ＭＳ Ｐゴシック" pitchFamily="34" charset="-128"/>
+              </a:rPr>
+              <a:t>It is recommended that slides should contain no more than 5-8 bulleted items per slide, especially when bullets are longer than one sentence.</a:t>
+            </a:r>
+          </a:p>
+          <a:p>
+            <a:pPr eaLnBrk="1" hangingPunct="1"/>
+            <a:r>
+              <a:rPr lang="en-US" dirty="0" smtClean="0">
+                <a:latin typeface="Arial Black" pitchFamily="34" charset="0"/>
+                <a:ea typeface="ＭＳ Ｐゴシック" pitchFamily="34" charset="-128"/>
+              </a:rPr>
+              <a:t>Highlighted text</a:t>
+            </a:r>
+            <a:r>
+              <a:rPr lang="en-US" dirty="0" smtClean="0">
+                <a:ea typeface="ＭＳ Ｐゴシック" pitchFamily="34" charset="-128"/>
+              </a:rPr>
+              <a:t> is set in Arial Black at the current copy size and should be used only on single words or short phrases.</a:t>
+            </a:r>
+          </a:p>
+          <a:p>
+            <a:pPr eaLnBrk="1" hangingPunct="1"/>
+            <a:r>
+              <a:rPr lang="en-US" dirty="0" smtClean="0">
+                <a:ea typeface="ＭＳ Ｐゴシック" pitchFamily="34" charset="-128"/>
+              </a:rPr>
+              <a:t>Quotes should be </a:t>
+            </a:r>
+            <a:r>
+              <a:rPr lang="ja-JP" altLang="en-US" i="1" smtClean="0">
+                <a:ea typeface="ＭＳ Ｐゴシック" pitchFamily="34" charset="-128"/>
+              </a:rPr>
+              <a:t>“</a:t>
+            </a:r>
+            <a:r>
+              <a:rPr lang="en-US" altLang="ja-JP" i="1" dirty="0" smtClean="0">
+                <a:ea typeface="ＭＳ Ｐゴシック" pitchFamily="34" charset="-128"/>
+              </a:rPr>
+              <a:t>the only copy to use italics</a:t>
+            </a:r>
+            <a:r>
+              <a:rPr lang="ja-JP" altLang="en-US" i="1" smtClean="0">
+                <a:ea typeface="ＭＳ Ｐゴシック" pitchFamily="34" charset="-128"/>
+              </a:rPr>
+              <a:t>”</a:t>
+            </a:r>
+            <a:r>
+              <a:rPr lang="en-US" altLang="ja-JP" dirty="0" smtClean="0">
+                <a:ea typeface="ＭＳ Ｐゴシック" pitchFamily="34" charset="-128"/>
+              </a:rPr>
+              <a:t> </a:t>
+            </a:r>
+            <a:endParaRPr lang="en-US" dirty="0" smtClean="0">
+              <a:ea typeface="ＭＳ Ｐゴシック" pitchFamily="34" charset="-128"/>
+            </a:endParaRPr>
+          </a:p>
+        </p:txBody>
+      </p:sp>
+    </p:spTree>
+  </p:cSld>
+  <p:clrMapOvr>
+    <a:masterClrMapping/>
+  </p:clrMapOvr>
+  <p:transition>
+    <p:wipe dir="r"/>
+  </p:transition>
+  <p:timing>
+    <p:tnLst>
+      <p:par>
+        <p:cTn id="1" dur="indefinite" restart="never" nodeType="tmRoot"/>
+      </p:par>
+    </p:tnLst>
+  </p:timing>
+</p:sld>
+</file>
+
 <file path=ppt/slides/slide2.xml><?xml version="1.0" encoding="utf-8"?>
 <p:sld xmlns:a="http://schemas.openxmlformats.org/drawingml/2006/main" xmlns:r="http://schemas.openxmlformats.org/officeDocument/2006/relationships" xmlns:p="http://schemas.openxmlformats.org/presentationml/2006/main">
   <p:cSld>
@@ -7865,11 +10398,15 @@
             </a:r>
             <a:r>
               <a:rPr lang="pl-PL" dirty="0" smtClean="0"/>
-              <a:t> - </a:t>
+              <a:t> – </a:t>
             </a:r>
             <a:r>
               <a:rPr lang="pl-PL" dirty="0" err="1" smtClean="0"/>
               <a:t>coroutines</a:t>
+            </a:r>
+            <a:r>
+              <a:rPr lang="pl-PL" dirty="0" smtClean="0"/>
+              <a:t> </a:t>
             </a:r>
             <a:endParaRPr lang="en-US" dirty="0"/>
           </a:p>
@@ -7892,15 +10429,15 @@
           <a:p>
             <a:r>
               <a:rPr lang="en-US" dirty="0" smtClean="0"/>
-              <a:t>Subroutines with </a:t>
+              <a:t>Subroutines with allow multiple entry points</a:t>
+            </a:r>
+            <a:r>
+              <a:rPr lang="pl-PL" dirty="0" smtClean="0"/>
+              <a:t> </a:t>
             </a:r>
             <a:r>
               <a:rPr lang="en-US" dirty="0" smtClean="0"/>
-              <a:t>allow multiple entry points for suspending and resuming </a:t>
-            </a:r>
-            <a:r>
-              <a:rPr lang="en-US" dirty="0" smtClean="0"/>
-              <a:t>execution</a:t>
+              <a:t>for suspending and resuming execution</a:t>
             </a:r>
           </a:p>
           <a:p>
@@ -7975,7 +10512,145 @@
       </p:grpSpPr>
       <p:sp>
         <p:nvSpPr>
-          <p:cNvPr id="17409" name="Slide Number Placeholder 3"/>
+          <p:cNvPr id="2" name="Tytuł 1"/>
+          <p:cNvSpPr>
+            <a:spLocks noGrp="1"/>
+          </p:cNvSpPr>
+          <p:nvPr>
+            <p:ph type="title"/>
+          </p:nvPr>
+        </p:nvSpPr>
+        <p:spPr/>
+        <p:txBody>
+          <a:bodyPr/>
+          <a:lstStyle/>
+          <a:p>
+            <a:r>
+              <a:rPr lang="en-US" dirty="0" err="1" smtClean="0"/>
+              <a:t>Async</a:t>
+            </a:r>
+            <a:r>
+              <a:rPr lang="en-US" dirty="0" smtClean="0"/>
+              <a:t> – </a:t>
+            </a:r>
+            <a:r>
+              <a:rPr lang="en-US" dirty="0" err="1" smtClean="0"/>
+              <a:t>coroutines</a:t>
+            </a:r>
+            <a:r>
+              <a:rPr lang="en-US" dirty="0" smtClean="0"/>
+              <a:t> – usage </a:t>
+            </a:r>
+            <a:endParaRPr lang="en-US" dirty="0"/>
+          </a:p>
+        </p:txBody>
+      </p:sp>
+      <p:sp>
+        <p:nvSpPr>
+          <p:cNvPr id="3" name="Symbol zastępczy zawartości 2"/>
+          <p:cNvSpPr>
+            <a:spLocks noGrp="1"/>
+          </p:cNvSpPr>
+          <p:nvPr>
+            <p:ph idx="1"/>
+          </p:nvPr>
+        </p:nvSpPr>
+        <p:spPr/>
+        <p:txBody>
+          <a:bodyPr/>
+          <a:lstStyle/>
+          <a:p>
+            <a:r>
+              <a:rPr lang="en-US" dirty="0" smtClean="0"/>
+              <a:t>Asynchronous != Parallel</a:t>
+            </a:r>
+          </a:p>
+          <a:p>
+            <a:endParaRPr lang="en-US" dirty="0" smtClean="0"/>
+          </a:p>
+          <a:p>
+            <a:r>
+              <a:rPr lang="en-US" dirty="0" smtClean="0"/>
+              <a:t>Many tasks executing cooperatively on one thread</a:t>
+            </a:r>
+          </a:p>
+          <a:p>
+            <a:endParaRPr lang="en-US" dirty="0" smtClean="0"/>
+          </a:p>
+          <a:p>
+            <a:r>
+              <a:rPr lang="en-US" dirty="0" smtClean="0"/>
+              <a:t>State machines </a:t>
+            </a:r>
+          </a:p>
+          <a:p>
+            <a:endParaRPr lang="en-US" dirty="0" smtClean="0"/>
+          </a:p>
+          <a:p>
+            <a:r>
+              <a:rPr lang="en-US" dirty="0" smtClean="0"/>
+              <a:t>As</a:t>
+            </a:r>
+            <a:r>
+              <a:rPr lang="pl-PL" dirty="0" smtClean="0"/>
+              <a:t> Donald E.</a:t>
+            </a:r>
+            <a:r>
+              <a:rPr lang="en-US" dirty="0" smtClean="0"/>
+              <a:t> Knuth remarks, it is rather difficult to find short, simple, illustrative examples of applications of </a:t>
+            </a:r>
+            <a:r>
+              <a:rPr lang="en-US" dirty="0" err="1" smtClean="0"/>
+              <a:t>coroutines</a:t>
+            </a:r>
+            <a:r>
+              <a:rPr lang="en-US" dirty="0" smtClean="0"/>
+              <a:t>…</a:t>
+            </a:r>
+          </a:p>
+          <a:p>
+            <a:endParaRPr lang="pl-PL" dirty="0" smtClean="0"/>
+          </a:p>
+          <a:p>
+            <a:r>
+              <a:rPr lang="pl-PL" dirty="0" smtClean="0"/>
+              <a:t>…</a:t>
+            </a:r>
+            <a:r>
+              <a:rPr lang="pl-PL" dirty="0" err="1" smtClean="0"/>
+              <a:t>let</a:t>
+            </a:r>
+            <a:r>
+              <a:rPr lang="pl-PL" dirty="0" smtClean="0"/>
+              <a:t> </a:t>
+            </a:r>
+            <a:r>
+              <a:rPr lang="pl-PL" dirty="0" err="1" smtClean="0"/>
+              <a:t>us</a:t>
+            </a:r>
+            <a:r>
+              <a:rPr lang="pl-PL" dirty="0" smtClean="0"/>
+              <a:t> </a:t>
+            </a:r>
+            <a:r>
+              <a:rPr lang="pl-PL" dirty="0" err="1" smtClean="0"/>
+              <a:t>implement</a:t>
+            </a:r>
+            <a:r>
+              <a:rPr lang="pl-PL" dirty="0" smtClean="0"/>
+              <a:t> a </a:t>
+            </a:r>
+            <a:r>
+              <a:rPr lang="pl-PL" dirty="0" err="1" smtClean="0"/>
+              <a:t>FifoCoorindator</a:t>
+            </a:r>
+            <a:endParaRPr lang="en-US" dirty="0"/>
+          </a:p>
+        </p:txBody>
+      </p:sp>
+      <p:sp>
+        <p:nvSpPr>
+          <p:cNvPr id="4" name="Symbol zastępczy numeru slajdu 3"/>
           <p:cNvSpPr>
             <a:spLocks noGrp="1"/>
           </p:cNvSpPr>
@@ -7983,157 +10658,17 @@
             <p:ph type="sldNum" sz="quarter" idx="10"/>
           </p:nvPr>
         </p:nvSpPr>
-        <p:spPr>
-          <a:noFill/>
-        </p:spPr>
+        <p:spPr/>
         <p:txBody>
           <a:bodyPr/>
           <a:lstStyle/>
           <a:p>
-            <a:fld id="{B8923B82-4FEA-4C63-961B-70B71B12A787}" type="slidenum">
-              <a:rPr lang="en-US"/>
+            <a:fld id="{5BA08351-1517-4DDD-96C2-B53AED81A9DF}" type="slidenum">
+              <a:rPr lang="en-US" smtClean="0"/>
               <a:pPr/>
               <a:t>9</a:t>
             </a:fld>
-            <a:endParaRPr lang="en-US" dirty="0"/>
-          </a:p>
-        </p:txBody>
-      </p:sp>
-      <p:sp>
-        <p:nvSpPr>
-          <p:cNvPr id="17410" name="Rectangle 2"/>
-          <p:cNvSpPr>
-            <a:spLocks noGrp="1" noChangeArrowheads="1"/>
-          </p:cNvSpPr>
-          <p:nvPr>
-            <p:ph type="title"/>
-          </p:nvPr>
-        </p:nvSpPr>
-        <p:spPr/>
-        <p:txBody>
-          <a:bodyPr/>
-          <a:lstStyle/>
-          <a:p>
-            <a:pPr eaLnBrk="1" hangingPunct="1"/>
-            <a:r>
-              <a:rPr lang="en-US" dirty="0" smtClean="0">
-                <a:ea typeface="ＭＳ Ｐゴシック" pitchFamily="34" charset="-128"/>
-              </a:rPr>
-              <a:t>Slide Titles are in Title Case Arial 28pt Blue</a:t>
-            </a:r>
-          </a:p>
-        </p:txBody>
-      </p:sp>
-      <p:sp>
-        <p:nvSpPr>
-          <p:cNvPr id="17411" name="Rectangle 3"/>
-          <p:cNvSpPr>
-            <a:spLocks noGrp="1" noChangeArrowheads="1"/>
-          </p:cNvSpPr>
-          <p:nvPr>
-            <p:ph type="body" idx="1"/>
-          </p:nvPr>
-        </p:nvSpPr>
-        <p:spPr/>
-        <p:txBody>
-          <a:bodyPr/>
-          <a:lstStyle/>
-          <a:p>
-            <a:pPr eaLnBrk="1" hangingPunct="1"/>
-            <a:r>
-              <a:rPr lang="en-US" dirty="0" smtClean="0">
-                <a:ea typeface="ＭＳ Ｐゴシック" pitchFamily="34" charset="-128"/>
-              </a:rPr>
-              <a:t>Bullet points are in sentence case Arial 22pt blue.</a:t>
-            </a:r>
-          </a:p>
-          <a:p>
-            <a:pPr lvl="1" eaLnBrk="1" hangingPunct="1"/>
-            <a:r>
-              <a:rPr lang="en-US" dirty="0" smtClean="0">
-                <a:ea typeface="ＭＳ Ｐゴシック" pitchFamily="34" charset="-128"/>
-              </a:rPr>
-              <a:t>Second level bullet points are in sentence case Arial 18pt blue.</a:t>
-            </a:r>
-          </a:p>
-          <a:p>
-            <a:pPr lvl="2" eaLnBrk="1" hangingPunct="1"/>
-            <a:r>
-              <a:rPr lang="en-US" dirty="0" smtClean="0">
-                <a:ea typeface="ＭＳ Ｐゴシック" pitchFamily="34" charset="-128"/>
-              </a:rPr>
-              <a:t>Third level bullet points are in sentence case Arial 16pt blue.</a:t>
-            </a:r>
-          </a:p>
-          <a:p>
-            <a:pPr eaLnBrk="1" hangingPunct="1"/>
-            <a:r>
-              <a:rPr lang="en-US" dirty="0" smtClean="0">
-                <a:ea typeface="ＭＳ Ｐゴシック" pitchFamily="34" charset="-128"/>
-              </a:rPr>
-              <a:t>Bullet points should be short and concise.</a:t>
-            </a:r>
-          </a:p>
-          <a:p>
-            <a:pPr eaLnBrk="1" hangingPunct="1"/>
-            <a:r>
-              <a:rPr lang="en-US" dirty="0" smtClean="0">
-                <a:ea typeface="ＭＳ Ｐゴシック" pitchFamily="34" charset="-128"/>
-              </a:rPr>
-              <a:t>It is recommended that slides should contain no more than 5-8 bulleted items per slide, especially when bullets are longer than one sentence.</a:t>
-            </a:r>
-          </a:p>
-          <a:p>
-            <a:pPr eaLnBrk="1" hangingPunct="1"/>
-            <a:r>
-              <a:rPr lang="en-US" dirty="0" smtClean="0">
-                <a:latin typeface="Arial Black" pitchFamily="34" charset="0"/>
-                <a:ea typeface="ＭＳ Ｐゴシック" pitchFamily="34" charset="-128"/>
-              </a:rPr>
-              <a:t>Highlighted text</a:t>
-            </a:r>
-            <a:r>
-              <a:rPr lang="en-US" dirty="0" smtClean="0">
-                <a:ea typeface="ＭＳ Ｐゴシック" pitchFamily="34" charset="-128"/>
-              </a:rPr>
-              <a:t> is set in Arial Black at the current copy size and should be used only on single words or short phrases.</a:t>
-            </a:r>
-          </a:p>
-          <a:p>
-            <a:pPr eaLnBrk="1" hangingPunct="1"/>
-            <a:r>
-              <a:rPr lang="en-US" dirty="0" smtClean="0">
-                <a:ea typeface="ＭＳ Ｐゴシック" pitchFamily="34" charset="-128"/>
-              </a:rPr>
-              <a:t>Quotes should be </a:t>
-            </a:r>
-            <a:r>
-              <a:rPr lang="ja-JP" altLang="en-US" i="1" smtClean="0">
-                <a:ea typeface="ＭＳ Ｐゴシック" pitchFamily="34" charset="-128"/>
-              </a:rPr>
-              <a:t>“</a:t>
-            </a:r>
-            <a:r>
-              <a:rPr lang="en-US" altLang="ja-JP" i="1" dirty="0" smtClean="0">
-                <a:ea typeface="ＭＳ Ｐゴシック" pitchFamily="34" charset="-128"/>
-              </a:rPr>
-              <a:t>the only copy to use italics</a:t>
-            </a:r>
-            <a:r>
-              <a:rPr lang="ja-JP" altLang="en-US" i="1" smtClean="0">
-                <a:ea typeface="ＭＳ Ｐゴシック" pitchFamily="34" charset="-128"/>
-              </a:rPr>
-              <a:t>”</a:t>
-            </a:r>
-            <a:r>
-              <a:rPr lang="en-US" altLang="ja-JP" dirty="0" smtClean="0">
-                <a:ea typeface="ＭＳ Ｐゴシック" pitchFamily="34" charset="-128"/>
-              </a:rPr>
-              <a:t> </a:t>
-            </a:r>
-            <a:endParaRPr lang="en-US" dirty="0" smtClean="0">
-              <a:ea typeface="ＭＳ Ｐゴシック" pitchFamily="34" charset="-128"/>
-            </a:endParaRPr>
+            <a:endParaRPr lang="en-US"/>
           </a:p>
         </p:txBody>
       </p:sp>
@@ -8142,16 +10677,6 @@
   <p:clrMapOvr>
     <a:masterClrMapping/>
   </p:clrMapOvr>
-  <p:transition>
-    <p:wipe dir="r"/>
-  </p:transition>
-  <p:timing>
-    <p:tnLst>
-      <p:par>
-        <p:cTn id="1" dur="indefinite" restart="never" nodeType="tmRoot"/>
-      </p:par>
-    </p:tnLst>
-  </p:timing>
 </p:sld>
 </file>
 

</xml_diff>

<commit_message>
added notes to animation
</commit_message>
<xml_diff>
--- a/C# 5.pptx
+++ b/C# 5.pptx
@@ -905,6 +905,184 @@
 </file>
 
 <file path=ppt/notesSlides/notesSlide10.xml><?xml version="1.0" encoding="utf-8"?>
+<p:notes xmlns:a="http://schemas.openxmlformats.org/drawingml/2006/main" xmlns:r="http://schemas.openxmlformats.org/officeDocument/2006/relationships" xmlns:p="http://schemas.openxmlformats.org/presentationml/2006/main">
+  <p:cSld>
+    <p:spTree>
+      <p:nvGrpSpPr>
+        <p:cNvPr id="1" name=""/>
+        <p:cNvGrpSpPr/>
+        <p:nvPr/>
+      </p:nvGrpSpPr>
+      <p:grpSpPr>
+        <a:xfrm>
+          <a:off x="0" y="0"/>
+          <a:ext cx="0" cy="0"/>
+          <a:chOff x="0" y="0"/>
+          <a:chExt cx="0" cy="0"/>
+        </a:xfrm>
+      </p:grpSpPr>
+      <p:sp>
+        <p:nvSpPr>
+          <p:cNvPr id="2" name="Symbol zastępczy obrazu slajdu 1"/>
+          <p:cNvSpPr>
+            <a:spLocks noGrp="1" noRot="1" noChangeAspect="1"/>
+          </p:cNvSpPr>
+          <p:nvPr>
+            <p:ph type="sldImg"/>
+          </p:nvPr>
+        </p:nvSpPr>
+        <p:spPr/>
+      </p:sp>
+      <p:sp>
+        <p:nvSpPr>
+          <p:cNvPr id="3" name="Symbol zastępczy notatek 2"/>
+          <p:cNvSpPr>
+            <a:spLocks noGrp="1"/>
+          </p:cNvSpPr>
+          <p:nvPr>
+            <p:ph type="body" idx="1"/>
+          </p:nvPr>
+        </p:nvSpPr>
+        <p:spPr/>
+        <p:txBody>
+          <a:bodyPr>
+            <a:normAutofit/>
+          </a:bodyPr>
+          <a:lstStyle/>
+          <a:p>
+            <a:r>
+              <a:rPr lang="en-US" noProof="0" dirty="0" smtClean="0"/>
+              <a:t>We’re iterating </a:t>
+            </a:r>
+            <a:r>
+              <a:rPr lang="en-US" noProof="0" dirty="0" err="1" smtClean="0"/>
+              <a:t>throug</a:t>
+            </a:r>
+            <a:r>
+              <a:rPr lang="en-US" noProof="0" dirty="0" smtClean="0"/>
+              <a:t> both sequences at the same time</a:t>
+            </a:r>
+          </a:p>
+          <a:p>
+            <a:r>
+              <a:rPr lang="en-US" noProof="0" dirty="0" smtClean="0"/>
+              <a:t>At each new element we check if its not</a:t>
+            </a:r>
+            <a:r>
+              <a:rPr lang="en-US" baseline="0" noProof="0" dirty="0" smtClean="0"/>
+              <a:t> greater than the other</a:t>
+            </a:r>
+          </a:p>
+          <a:p>
+            <a:r>
+              <a:rPr lang="en-US" baseline="0" noProof="0" dirty="0" smtClean="0"/>
+              <a:t>If the above is true we output the element</a:t>
+            </a:r>
+          </a:p>
+          <a:p>
+            <a:r>
+              <a:rPr lang="en-US" baseline="0" noProof="0" dirty="0" smtClean="0"/>
+              <a:t>If its false we switch to other sequence and continue</a:t>
+            </a:r>
+          </a:p>
+          <a:p>
+            <a:endParaRPr lang="en-US" baseline="0" noProof="0" dirty="0" smtClean="0"/>
+          </a:p>
+          <a:p>
+            <a:r>
+              <a:rPr lang="en-US" baseline="0" noProof="0" dirty="0" smtClean="0"/>
+              <a:t>But how to iterate over to sequences simultaneously – parallel – if you will</a:t>
+            </a:r>
+            <a:endParaRPr lang="pl-PL" baseline="0" noProof="0" dirty="0" smtClean="0"/>
+          </a:p>
+          <a:p>
+            <a:endParaRPr lang="pl-PL" baseline="0" noProof="0" dirty="0" smtClean="0"/>
+          </a:p>
+          <a:p>
+            <a:pPr>
+              <a:buNone/>
+            </a:pPr>
+            <a:r>
+              <a:rPr lang="pl-PL" baseline="0" noProof="0" dirty="0" err="1" smtClean="0"/>
+              <a:t>Sample</a:t>
+            </a:r>
+            <a:r>
+              <a:rPr lang="pl-PL" baseline="0" noProof="0" dirty="0" smtClean="0"/>
+              <a:t> </a:t>
+            </a:r>
+            <a:r>
+              <a:rPr lang="pl-PL" baseline="0" noProof="0" dirty="0" err="1" smtClean="0"/>
+              <a:t>Code</a:t>
+            </a:r>
+            <a:r>
+              <a:rPr lang="pl-PL" baseline="0" noProof="0" dirty="0" smtClean="0"/>
+              <a:t> - </a:t>
+            </a:r>
+            <a:r>
+              <a:rPr lang="pl-PL" baseline="0" noProof="0" smtClean="0"/>
+              <a:t>MergeCoroutine</a:t>
+            </a:r>
+            <a:endParaRPr lang="en-US" noProof="0" dirty="0"/>
+          </a:p>
+        </p:txBody>
+      </p:sp>
+      <p:sp>
+        <p:nvSpPr>
+          <p:cNvPr id="4" name="Symbol zastępczy daty 3"/>
+          <p:cNvSpPr>
+            <a:spLocks noGrp="1"/>
+          </p:cNvSpPr>
+          <p:nvPr>
+            <p:ph type="dt" idx="10"/>
+          </p:nvPr>
+        </p:nvSpPr>
+        <p:spPr/>
+        <p:txBody>
+          <a:bodyPr/>
+          <a:lstStyle/>
+          <a:p>
+            <a:fld id="{80DC343A-C7DB-48FF-A81F-D2EFF0311B91}" type="datetime8">
+              <a:rPr lang="en-US" smtClean="0"/>
+              <a:pPr/>
+              <a:t>5/23/2012 9:50 PM</a:t>
+            </a:fld>
+            <a:endParaRPr lang="en-US" dirty="0"/>
+          </a:p>
+        </p:txBody>
+      </p:sp>
+      <p:sp>
+        <p:nvSpPr>
+          <p:cNvPr id="5" name="Symbol zastępczy numeru slajdu 4"/>
+          <p:cNvSpPr>
+            <a:spLocks noGrp="1"/>
+          </p:cNvSpPr>
+          <p:nvPr>
+            <p:ph type="sldNum" sz="quarter" idx="11"/>
+          </p:nvPr>
+        </p:nvSpPr>
+        <p:spPr/>
+        <p:txBody>
+          <a:bodyPr/>
+          <a:lstStyle/>
+          <a:p>
+            <a:fld id="{A0C6CE09-155B-4DAE-A37A-B074B6B02DD4}" type="slidenum">
+              <a:rPr lang="en-US" smtClean="0"/>
+              <a:pPr/>
+              <a:t>10</a:t>
+            </a:fld>
+            <a:endParaRPr lang="en-US" dirty="0"/>
+          </a:p>
+        </p:txBody>
+      </p:sp>
+    </p:spTree>
+  </p:cSld>
+  <p:clrMapOvr>
+    <a:masterClrMapping/>
+  </p:clrMapOvr>
+</p:notes>
+</file>
+
+<file path=ppt/notesSlides/notesSlide11.xml><?xml version="1.0" encoding="utf-8"?>
 <p:notes xmlns:a="http://schemas.openxmlformats.org/drawingml/2006/main" xmlns:r="http://schemas.openxmlformats.org/officeDocument/2006/relationships" xmlns:p="http://schemas.openxmlformats.org/presentationml/2006/main">
   <p:cSld>
     <p:spTree>

</xml_diff>

<commit_message>
added short slide about winrt
</commit_message>
<xml_diff>
--- a/C# 5.pptx
+++ b/C# 5.pptx
@@ -5,10 +5,10 @@
     <p:sldMasterId id="2147483654" r:id="rId5"/>
   </p:sldMasterIdLst>
   <p:notesMasterIdLst>
-    <p:notesMasterId r:id="rId17"/>
+    <p:notesMasterId r:id="rId20"/>
   </p:notesMasterIdLst>
   <p:handoutMasterIdLst>
-    <p:handoutMasterId r:id="rId18"/>
+    <p:handoutMasterId r:id="rId21"/>
   </p:handoutMasterIdLst>
   <p:sldIdLst>
     <p:sldId id="371" r:id="rId6"/>
@@ -21,7 +21,10 @@
     <p:sldId id="379" r:id="rId13"/>
     <p:sldId id="380" r:id="rId14"/>
     <p:sldId id="381" r:id="rId15"/>
-    <p:sldId id="372" r:id="rId16"/>
+    <p:sldId id="382" r:id="rId16"/>
+    <p:sldId id="383" r:id="rId17"/>
+    <p:sldId id="384" r:id="rId18"/>
+    <p:sldId id="372" r:id="rId19"/>
   </p:sldIdLst>
   <p:sldSz cx="9144000" cy="6858000" type="screen4x3"/>
   <p:notesSz cx="7061200" cy="9398000"/>
@@ -224,7 +227,7 @@
             <a:fld id="{867741B6-20E1-4219-AC3A-163B52FA3A08}" type="datetime8">
               <a:rPr lang="en-US"/>
               <a:pPr/>
-              <a:t>5/23/2012 9:21 PM</a:t>
+              <a:t>5/24/2012 8:34 AM</a:t>
             </a:fld>
             <a:endParaRPr lang="en-US" dirty="0"/>
           </a:p>
@@ -417,7 +420,7 @@
             <a:fld id="{80DC343A-C7DB-48FF-A81F-D2EFF0311B91}" type="datetime8">
               <a:rPr lang="en-US"/>
               <a:pPr/>
-              <a:t>5/23/2012 9:21 PM</a:t>
+              <a:t>5/24/2012 8:34 AM</a:t>
             </a:fld>
             <a:endParaRPr lang="en-US" dirty="0"/>
           </a:p>
@@ -814,7 +817,7 @@
             <a:fld id="{FE6E691D-9AEE-4359-9871-4FF78429DC86}" type="datetime8">
               <a:rPr lang="en-US"/>
               <a:pPr/>
-              <a:t>5/23/2012 9:21 PM</a:t>
+              <a:t>5/24/2012 8:34 AM</a:t>
             </a:fld>
             <a:endParaRPr lang="en-US"/>
           </a:p>
@@ -1044,7 +1047,7 @@
             <a:fld id="{80DC343A-C7DB-48FF-A81F-D2EFF0311B91}" type="datetime8">
               <a:rPr lang="en-US" smtClean="0"/>
               <a:pPr/>
-              <a:t>5/23/2012 9:50 PM</a:t>
+              <a:t>5/24/2012 8:34 AM</a:t>
             </a:fld>
             <a:endParaRPr lang="en-US" dirty="0"/>
           </a:p>
@@ -1101,6 +1104,382 @@
       </p:grpSpPr>
       <p:sp>
         <p:nvSpPr>
+          <p:cNvPr id="2" name="Slide Image Placeholder 1"/>
+          <p:cNvSpPr>
+            <a:spLocks noGrp="1" noRot="1" noChangeAspect="1"/>
+          </p:cNvSpPr>
+          <p:nvPr>
+            <p:ph type="sldImg"/>
+          </p:nvPr>
+        </p:nvSpPr>
+        <p:spPr/>
+      </p:sp>
+      <p:sp>
+        <p:nvSpPr>
+          <p:cNvPr id="3" name="Notes Placeholder 2"/>
+          <p:cNvSpPr>
+            <a:spLocks noGrp="1"/>
+          </p:cNvSpPr>
+          <p:nvPr>
+            <p:ph type="body" idx="1"/>
+          </p:nvPr>
+        </p:nvSpPr>
+        <p:spPr/>
+        <p:txBody>
+          <a:bodyPr>
+            <a:normAutofit/>
+          </a:bodyPr>
+          <a:lstStyle/>
+          <a:p>
+            <a:r>
+              <a:rPr lang="en-US" dirty="0" smtClean="0"/>
+              <a:t>It’s much easier to write and what is even</a:t>
+            </a:r>
+            <a:r>
+              <a:rPr lang="en-US" baseline="0" dirty="0" smtClean="0"/>
+              <a:t> more important reading code that uses </a:t>
+            </a:r>
+            <a:r>
+              <a:rPr lang="en-US" baseline="0" dirty="0" err="1" smtClean="0"/>
+              <a:t>async</a:t>
+            </a:r>
+            <a:r>
+              <a:rPr lang="en-US" baseline="0" dirty="0" smtClean="0"/>
+              <a:t> </a:t>
+            </a:r>
+            <a:r>
+              <a:rPr lang="en-US" baseline="0" dirty="0" err="1" smtClean="0"/>
+              <a:t>apis</a:t>
+            </a:r>
+            <a:r>
+              <a:rPr lang="en-US" baseline="0" dirty="0" smtClean="0"/>
+              <a:t>.</a:t>
+            </a:r>
+          </a:p>
+          <a:p>
+            <a:endParaRPr lang="en-US" baseline="0" dirty="0" smtClean="0"/>
+          </a:p>
+          <a:p>
+            <a:r>
+              <a:rPr lang="en-US" baseline="0" dirty="0" smtClean="0"/>
+              <a:t>It’s a good idea to use </a:t>
+            </a:r>
+            <a:r>
+              <a:rPr lang="en-US" baseline="0" dirty="0" err="1" smtClean="0"/>
+              <a:t>async</a:t>
+            </a:r>
+            <a:r>
+              <a:rPr lang="en-US" baseline="0" dirty="0" smtClean="0"/>
+              <a:t> </a:t>
+            </a:r>
+            <a:r>
+              <a:rPr lang="en-US" baseline="0" dirty="0" err="1" smtClean="0"/>
+              <a:t>apis</a:t>
+            </a:r>
+            <a:r>
+              <a:rPr lang="en-US" baseline="0" dirty="0" smtClean="0"/>
+              <a:t> on each and every IO bound/long running operation while building a desktop application.</a:t>
+            </a:r>
+          </a:p>
+          <a:p>
+            <a:endParaRPr lang="en-US" baseline="0" dirty="0" smtClean="0"/>
+          </a:p>
+          <a:p>
+            <a:r>
+              <a:rPr lang="en-US" baseline="0" dirty="0" smtClean="0"/>
+              <a:t>However, I don’t think the same goes for Server applications. The complexity of code increases slightly so do associated unit tests. </a:t>
+            </a:r>
+          </a:p>
+          <a:p>
+            <a:pPr>
+              <a:buNone/>
+            </a:pPr>
+            <a:r>
+              <a:rPr lang="en-US" sz="1000" b="0" i="0" kern="1200" dirty="0" smtClean="0">
+                <a:solidFill>
+                  <a:schemeClr val="bg1"/>
+                </a:solidFill>
+                <a:latin typeface="Arial" charset="0"/>
+                <a:ea typeface="ＭＳ Ｐゴシック" charset="0"/>
+                <a:cs typeface="+mn-cs"/>
+              </a:rPr>
+              <a:t>“We should forget about small efficiencies, say about 97% of the time: premature optimization is the root of all evil”</a:t>
+            </a:r>
+          </a:p>
+          <a:p>
+            <a:pPr>
+              <a:buNone/>
+            </a:pPr>
+            <a:endParaRPr lang="en-US" sz="1000" b="0" i="0" kern="1200" baseline="0" dirty="0" smtClean="0">
+              <a:solidFill>
+                <a:schemeClr val="bg1"/>
+              </a:solidFill>
+              <a:latin typeface="Arial" charset="0"/>
+              <a:ea typeface="ＭＳ Ｐゴシック" charset="0"/>
+              <a:cs typeface="+mn-cs"/>
+            </a:endParaRPr>
+          </a:p>
+          <a:p>
+            <a:pPr>
+              <a:buNone/>
+            </a:pPr>
+            <a:r>
+              <a:rPr lang="en-US" sz="1000" b="0" i="0" kern="1200" baseline="0" dirty="0" smtClean="0">
+                <a:solidFill>
+                  <a:schemeClr val="bg1"/>
+                </a:solidFill>
+                <a:latin typeface="Arial" charset="0"/>
+                <a:ea typeface="ＭＳ Ｐゴシック" charset="0"/>
+                <a:cs typeface="+mn-cs"/>
+              </a:rPr>
+              <a:t>Still if we’ve proofed, by making appropriate performance tests, that the server is choking due to IO bound operations and we need to increase throughput then using C# 5 await/</a:t>
+            </a:r>
+            <a:r>
+              <a:rPr lang="en-US" sz="1000" b="0" i="0" kern="1200" baseline="0" dirty="0" err="1" smtClean="0">
+                <a:solidFill>
+                  <a:schemeClr val="bg1"/>
+                </a:solidFill>
+                <a:latin typeface="Arial" charset="0"/>
+                <a:ea typeface="ＭＳ Ｐゴシック" charset="0"/>
+                <a:cs typeface="+mn-cs"/>
+              </a:rPr>
+              <a:t>async</a:t>
+            </a:r>
+            <a:r>
+              <a:rPr lang="en-US" sz="1000" b="0" i="0" kern="1200" baseline="0" dirty="0" smtClean="0">
+                <a:solidFill>
+                  <a:schemeClr val="bg1"/>
+                </a:solidFill>
+                <a:latin typeface="Arial" charset="0"/>
+                <a:ea typeface="ＭＳ Ｐゴシック" charset="0"/>
+                <a:cs typeface="+mn-cs"/>
+              </a:rPr>
+              <a:t> will making improvements much easier than before.</a:t>
+            </a:r>
+            <a:endParaRPr lang="en-US" baseline="0" dirty="0" smtClean="0"/>
+          </a:p>
+        </p:txBody>
+      </p:sp>
+      <p:sp>
+        <p:nvSpPr>
+          <p:cNvPr id="4" name="Date Placeholder 3"/>
+          <p:cNvSpPr>
+            <a:spLocks noGrp="1"/>
+          </p:cNvSpPr>
+          <p:nvPr>
+            <p:ph type="dt" idx="10"/>
+          </p:nvPr>
+        </p:nvSpPr>
+        <p:spPr/>
+        <p:txBody>
+          <a:bodyPr/>
+          <a:lstStyle/>
+          <a:p>
+            <a:fld id="{80DC343A-C7DB-48FF-A81F-D2EFF0311B91}" type="datetime8">
+              <a:rPr lang="en-US" smtClean="0"/>
+              <a:pPr/>
+              <a:t>5/24/2012 8:48 AM</a:t>
+            </a:fld>
+            <a:endParaRPr lang="en-US" dirty="0"/>
+          </a:p>
+        </p:txBody>
+      </p:sp>
+      <p:sp>
+        <p:nvSpPr>
+          <p:cNvPr id="5" name="Slide Number Placeholder 4"/>
+          <p:cNvSpPr>
+            <a:spLocks noGrp="1"/>
+          </p:cNvSpPr>
+          <p:nvPr>
+            <p:ph type="sldNum" sz="quarter" idx="11"/>
+          </p:nvPr>
+        </p:nvSpPr>
+        <p:spPr/>
+        <p:txBody>
+          <a:bodyPr/>
+          <a:lstStyle/>
+          <a:p>
+            <a:fld id="{A0C6CE09-155B-4DAE-A37A-B074B6B02DD4}" type="slidenum">
+              <a:rPr lang="en-US" smtClean="0"/>
+              <a:pPr/>
+              <a:t>11</a:t>
+            </a:fld>
+            <a:endParaRPr lang="en-US" dirty="0"/>
+          </a:p>
+        </p:txBody>
+      </p:sp>
+    </p:spTree>
+  </p:cSld>
+  <p:clrMapOvr>
+    <a:masterClrMapping/>
+  </p:clrMapOvr>
+</p:notes>
+</file>
+
+<file path=ppt/notesSlides/notesSlide12.xml><?xml version="1.0" encoding="utf-8"?>
+<p:notes xmlns:a="http://schemas.openxmlformats.org/drawingml/2006/main" xmlns:r="http://schemas.openxmlformats.org/officeDocument/2006/relationships" xmlns:p="http://schemas.openxmlformats.org/presentationml/2006/main">
+  <p:cSld>
+    <p:spTree>
+      <p:nvGrpSpPr>
+        <p:cNvPr id="1" name=""/>
+        <p:cNvGrpSpPr/>
+        <p:nvPr/>
+      </p:nvGrpSpPr>
+      <p:grpSpPr>
+        <a:xfrm>
+          <a:off x="0" y="0"/>
+          <a:ext cx="0" cy="0"/>
+          <a:chOff x="0" y="0"/>
+          <a:chExt cx="0" cy="0"/>
+        </a:xfrm>
+      </p:grpSpPr>
+      <p:sp>
+        <p:nvSpPr>
+          <p:cNvPr id="2" name="Slide Image Placeholder 1"/>
+          <p:cNvSpPr>
+            <a:spLocks noGrp="1" noRot="1" noChangeAspect="1"/>
+          </p:cNvSpPr>
+          <p:nvPr>
+            <p:ph type="sldImg"/>
+          </p:nvPr>
+        </p:nvSpPr>
+        <p:spPr/>
+      </p:sp>
+      <p:sp>
+        <p:nvSpPr>
+          <p:cNvPr id="3" name="Notes Placeholder 2"/>
+          <p:cNvSpPr>
+            <a:spLocks noGrp="1"/>
+          </p:cNvSpPr>
+          <p:nvPr>
+            <p:ph type="body" idx="1"/>
+          </p:nvPr>
+        </p:nvSpPr>
+        <p:spPr/>
+        <p:txBody>
+          <a:bodyPr>
+            <a:normAutofit/>
+          </a:bodyPr>
+          <a:lstStyle/>
+          <a:p>
+            <a:pPr marL="58738" marR="0" indent="-58738" algn="l" defTabSz="914400" rtl="0" eaLnBrk="0" fontAlgn="base" latinLnBrk="0" hangingPunct="0">
+              <a:lnSpc>
+                <a:spcPct val="100000"/>
+              </a:lnSpc>
+              <a:spcBef>
+                <a:spcPct val="30000"/>
+              </a:spcBef>
+              <a:spcAft>
+                <a:spcPct val="0"/>
+              </a:spcAft>
+              <a:buClrTx/>
+              <a:buSzPct val="90000"/>
+              <a:buFont typeface="Times" charset="0"/>
+              <a:buChar char="•"/>
+              <a:tabLst/>
+              <a:defRPr/>
+            </a:pPr>
+            <a:r>
+              <a:rPr lang="en-US" dirty="0" smtClean="0"/>
+              <a:t>We’ve already seen them in samples</a:t>
+            </a:r>
+          </a:p>
+          <a:p>
+            <a:r>
+              <a:rPr lang="en-US" dirty="0" smtClean="0"/>
+              <a:t>This isn’t really a killer new feature and I don’t think there will be much</a:t>
+            </a:r>
+            <a:r>
+              <a:rPr lang="en-US" baseline="0" dirty="0" smtClean="0"/>
+              <a:t> us for them anyway I guess they will be widely used by </a:t>
+            </a:r>
+            <a:r>
+              <a:rPr lang="en-US" baseline="0" dirty="0" err="1" smtClean="0"/>
+              <a:t>.net</a:t>
+            </a:r>
+            <a:r>
+              <a:rPr lang="en-US" baseline="0" dirty="0" smtClean="0"/>
+              <a:t> framework team for tracing and stuff</a:t>
+            </a:r>
+            <a:endParaRPr lang="en-US" dirty="0"/>
+          </a:p>
+        </p:txBody>
+      </p:sp>
+      <p:sp>
+        <p:nvSpPr>
+          <p:cNvPr id="4" name="Date Placeholder 3"/>
+          <p:cNvSpPr>
+            <a:spLocks noGrp="1"/>
+          </p:cNvSpPr>
+          <p:nvPr>
+            <p:ph type="dt" idx="10"/>
+          </p:nvPr>
+        </p:nvSpPr>
+        <p:spPr/>
+        <p:txBody>
+          <a:bodyPr/>
+          <a:lstStyle/>
+          <a:p>
+            <a:fld id="{80DC343A-C7DB-48FF-A81F-D2EFF0311B91}" type="datetime8">
+              <a:rPr lang="en-US" smtClean="0"/>
+              <a:pPr/>
+              <a:t>5/24/2012 10:24 AM</a:t>
+            </a:fld>
+            <a:endParaRPr lang="en-US" dirty="0"/>
+          </a:p>
+        </p:txBody>
+      </p:sp>
+      <p:sp>
+        <p:nvSpPr>
+          <p:cNvPr id="5" name="Slide Number Placeholder 4"/>
+          <p:cNvSpPr>
+            <a:spLocks noGrp="1"/>
+          </p:cNvSpPr>
+          <p:nvPr>
+            <p:ph type="sldNum" sz="quarter" idx="11"/>
+          </p:nvPr>
+        </p:nvSpPr>
+        <p:spPr/>
+        <p:txBody>
+          <a:bodyPr/>
+          <a:lstStyle/>
+          <a:p>
+            <a:fld id="{A0C6CE09-155B-4DAE-A37A-B074B6B02DD4}" type="slidenum">
+              <a:rPr lang="en-US" smtClean="0"/>
+              <a:pPr/>
+              <a:t>12</a:t>
+            </a:fld>
+            <a:endParaRPr lang="en-US" dirty="0"/>
+          </a:p>
+        </p:txBody>
+      </p:sp>
+    </p:spTree>
+  </p:cSld>
+  <p:clrMapOvr>
+    <a:masterClrMapping/>
+  </p:clrMapOvr>
+</p:notes>
+</file>
+
+<file path=ppt/notesSlides/notesSlide13.xml><?xml version="1.0" encoding="utf-8"?>
+<p:notes xmlns:a="http://schemas.openxmlformats.org/drawingml/2006/main" xmlns:r="http://schemas.openxmlformats.org/officeDocument/2006/relationships" xmlns:p="http://schemas.openxmlformats.org/presentationml/2006/main">
+  <p:cSld>
+    <p:spTree>
+      <p:nvGrpSpPr>
+        <p:cNvPr id="1" name=""/>
+        <p:cNvGrpSpPr/>
+        <p:nvPr/>
+      </p:nvGrpSpPr>
+      <p:grpSpPr>
+        <a:xfrm>
+          <a:off x="0" y="0"/>
+          <a:ext cx="0" cy="0"/>
+          <a:chOff x="0" y="0"/>
+          <a:chExt cx="0" cy="0"/>
+        </a:xfrm>
+      </p:grpSpPr>
+      <p:sp>
+        <p:nvSpPr>
           <p:cNvPr id="18433" name="Rectangle 3"/>
           <p:cNvSpPr>
             <a:spLocks noGrp="1" noChangeArrowheads="1"/>
@@ -1119,7 +1498,7 @@
             <a:fld id="{AB8F9170-F656-4E08-BDFE-37D587BF0909}" type="datetime8">
               <a:rPr lang="en-US"/>
               <a:pPr/>
-              <a:t>5/23/2012 9:21 PM</a:t>
+              <a:t>5/24/2012 8:34 AM</a:t>
             </a:fld>
             <a:endParaRPr lang="en-US" dirty="0"/>
           </a:p>
@@ -1145,7 +1524,7 @@
             <a:fld id="{E73A29F1-A36F-4C0F-8D5B-36FFE114B347}" type="slidenum">
               <a:rPr lang="en-US"/>
               <a:pPr/>
-              <a:t>11</a:t>
+              <a:t>14</a:t>
             </a:fld>
             <a:endParaRPr lang="en-US" dirty="0"/>
           </a:p>
@@ -1240,7 +1619,7 @@
             <a:fld id="{AB8F9170-F656-4E08-BDFE-37D587BF0909}" type="datetime8">
               <a:rPr lang="en-US"/>
               <a:pPr/>
-              <a:t>5/23/2012 9:21 PM</a:t>
+              <a:t>5/24/2012 8:34 AM</a:t>
             </a:fld>
             <a:endParaRPr lang="en-US"/>
           </a:p>
@@ -1432,7 +1811,7 @@
             <a:fld id="{80DC343A-C7DB-48FF-A81F-D2EFF0311B91}" type="datetime8">
               <a:rPr lang="en-US" smtClean="0"/>
               <a:pPr/>
-              <a:t>5/23/2012 9:21 PM</a:t>
+              <a:t>5/24/2012 8:34 AM</a:t>
             </a:fld>
             <a:endParaRPr lang="en-US"/>
           </a:p>
@@ -1731,7 +2110,7 @@
             <a:fld id="{80DC343A-C7DB-48FF-A81F-D2EFF0311B91}" type="datetime8">
               <a:rPr lang="en-US" smtClean="0"/>
               <a:pPr/>
-              <a:t>5/23/2012 9:21 PM</a:t>
+              <a:t>5/24/2012 8:34 AM</a:t>
             </a:fld>
             <a:endParaRPr lang="en-US"/>
           </a:p>
@@ -1922,7 +2301,7 @@
             <a:fld id="{80DC343A-C7DB-48FF-A81F-D2EFF0311B91}" type="datetime8">
               <a:rPr lang="en-US" smtClean="0"/>
               <a:pPr/>
-              <a:t>5/23/2012 9:21 PM</a:t>
+              <a:t>5/24/2012 8:34 AM</a:t>
             </a:fld>
             <a:endParaRPr lang="en-US"/>
           </a:p>
@@ -2256,7 +2635,7 @@
             <a:fld id="{80DC343A-C7DB-48FF-A81F-D2EFF0311B91}" type="datetime8">
               <a:rPr lang="en-US" smtClean="0"/>
               <a:pPr/>
-              <a:t>5/23/2012 9:21 PM</a:t>
+              <a:t>5/24/2012 8:34 AM</a:t>
             </a:fld>
             <a:endParaRPr lang="en-US"/>
           </a:p>
@@ -2885,7 +3264,7 @@
             <a:fld id="{80DC343A-C7DB-48FF-A81F-D2EFF0311B91}" type="datetime8">
               <a:rPr lang="en-US" smtClean="0"/>
               <a:pPr/>
-              <a:t>5/23/2012 9:21 PM</a:t>
+              <a:t>5/24/2012 8:34 AM</a:t>
             </a:fld>
             <a:endParaRPr lang="en-US"/>
           </a:p>
@@ -2995,8 +3374,23 @@
             </a:r>
             <a:r>
               <a:rPr lang="en-US" baseline="0" noProof="0" dirty="0" smtClean="0"/>
-              <a:t> – mostly those that are solved with state machines</a:t>
-            </a:r>
+              <a:t> – mostly those that are solved with state </a:t>
+            </a:r>
+            <a:r>
+              <a:rPr lang="en-US" baseline="0" noProof="0" dirty="0" smtClean="0"/>
+              <a:t>machines</a:t>
+            </a:r>
+          </a:p>
+          <a:p>
+            <a:r>
+              <a:rPr lang="en-US" baseline="0" noProof="0" dirty="0" smtClean="0"/>
+              <a:t>Subroutines are a special case of </a:t>
+            </a:r>
+            <a:r>
+              <a:rPr lang="en-US" baseline="0" noProof="0" dirty="0" err="1" smtClean="0"/>
+              <a:t>coroutines</a:t>
+            </a:r>
+            <a:endParaRPr lang="en-US" baseline="0" noProof="0" dirty="0" smtClean="0"/>
           </a:p>
           <a:p>
             <a:r>
@@ -3018,7 +3412,7 @@
               <a:t>Recently implemented in Ruby as </a:t>
             </a:r>
             <a:r>
-              <a:rPr lang="en-US" baseline="0" noProof="0" smtClean="0"/>
+              <a:rPr lang="en-US" baseline="0" noProof="0" dirty="0" err="1" smtClean="0"/>
               <a:t>Fibres</a:t>
             </a:r>
             <a:endParaRPr lang="en-US" baseline="0" noProof="0" dirty="0" smtClean="0"/>
@@ -3057,7 +3451,7 @@
             <a:fld id="{80DC343A-C7DB-48FF-A81F-D2EFF0311B91}" type="datetime8">
               <a:rPr lang="en-US" smtClean="0"/>
               <a:pPr/>
-              <a:t>5/23/2012 9:21 PM</a:t>
+              <a:t>5/24/2012 8:34 AM</a:t>
             </a:fld>
             <a:endParaRPr lang="en-US" dirty="0"/>
           </a:p>
@@ -3333,7 +3727,7 @@
             <a:fld id="{80DC343A-C7DB-48FF-A81F-D2EFF0311B91}" type="datetime8">
               <a:rPr lang="en-US" smtClean="0"/>
               <a:pPr/>
-              <a:t>5/23/2012 9:21 PM</a:t>
+              <a:t>5/24/2012 8:34 AM</a:t>
             </a:fld>
             <a:endParaRPr lang="en-US" dirty="0"/>
           </a:p>
@@ -8392,6 +8786,883 @@
       </p:grpSpPr>
       <p:sp>
         <p:nvSpPr>
+          <p:cNvPr id="2" name="Title 1"/>
+          <p:cNvSpPr>
+            <a:spLocks noGrp="1"/>
+          </p:cNvSpPr>
+          <p:nvPr>
+            <p:ph type="title"/>
+          </p:nvPr>
+        </p:nvSpPr>
+        <p:spPr/>
+        <p:txBody>
+          <a:bodyPr/>
+          <a:lstStyle/>
+          <a:p>
+            <a:r>
+              <a:rPr lang="en-US" dirty="0" err="1" smtClean="0"/>
+              <a:t>Async</a:t>
+            </a:r>
+            <a:r>
+              <a:rPr lang="en-US" dirty="0" smtClean="0"/>
+              <a:t> </a:t>
+            </a:r>
+            <a:r>
+              <a:rPr lang="en-US" dirty="0" smtClean="0"/>
+              <a:t>– summary</a:t>
+            </a:r>
+            <a:endParaRPr lang="en-US" dirty="0"/>
+          </a:p>
+        </p:txBody>
+      </p:sp>
+      <p:sp>
+        <p:nvSpPr>
+          <p:cNvPr id="3" name="Content Placeholder 2"/>
+          <p:cNvSpPr>
+            <a:spLocks noGrp="1"/>
+          </p:cNvSpPr>
+          <p:nvPr>
+            <p:ph idx="1"/>
+          </p:nvPr>
+        </p:nvSpPr>
+        <p:spPr/>
+        <p:txBody>
+          <a:bodyPr/>
+          <a:lstStyle/>
+          <a:p>
+            <a:r>
+              <a:rPr lang="en-US" dirty="0" smtClean="0"/>
+              <a:t>Simplifies complex control flow management</a:t>
+            </a:r>
+          </a:p>
+          <a:p>
+            <a:endParaRPr lang="en-US" dirty="0" smtClean="0"/>
+          </a:p>
+          <a:p>
+            <a:r>
+              <a:rPr lang="en-US" dirty="0" smtClean="0"/>
+              <a:t>The complexity still increases</a:t>
+            </a:r>
+          </a:p>
+          <a:p>
+            <a:endParaRPr lang="en-US" dirty="0" smtClean="0"/>
+          </a:p>
+          <a:p>
+            <a:r>
+              <a:rPr lang="en-US" dirty="0" smtClean="0"/>
+              <a:t>New tool to express complex flows more succinctly  </a:t>
+            </a:r>
+            <a:endParaRPr lang="en-US" dirty="0"/>
+          </a:p>
+        </p:txBody>
+      </p:sp>
+      <p:sp>
+        <p:nvSpPr>
+          <p:cNvPr id="4" name="Slide Number Placeholder 3"/>
+          <p:cNvSpPr>
+            <a:spLocks noGrp="1"/>
+          </p:cNvSpPr>
+          <p:nvPr>
+            <p:ph type="sldNum" sz="quarter" idx="10"/>
+          </p:nvPr>
+        </p:nvSpPr>
+        <p:spPr/>
+        <p:txBody>
+          <a:bodyPr/>
+          <a:lstStyle/>
+          <a:p>
+            <a:fld id="{5BA08351-1517-4DDD-96C2-B53AED81A9DF}" type="slidenum">
+              <a:rPr lang="en-US" smtClean="0"/>
+              <a:pPr/>
+              <a:t>11</a:t>
+            </a:fld>
+            <a:endParaRPr lang="en-US" dirty="0"/>
+          </a:p>
+        </p:txBody>
+      </p:sp>
+    </p:spTree>
+  </p:cSld>
+  <p:clrMapOvr>
+    <a:masterClrMapping/>
+  </p:clrMapOvr>
+</p:sld>
+</file>
+
+<file path=ppt/slides/slide12.xml><?xml version="1.0" encoding="utf-8"?>
+<p:sld xmlns:a="http://schemas.openxmlformats.org/drawingml/2006/main" xmlns:r="http://schemas.openxmlformats.org/officeDocument/2006/relationships" xmlns:p="http://schemas.openxmlformats.org/presentationml/2006/main">
+  <p:cSld>
+    <p:spTree>
+      <p:nvGrpSpPr>
+        <p:cNvPr id="1" name=""/>
+        <p:cNvGrpSpPr/>
+        <p:nvPr/>
+      </p:nvGrpSpPr>
+      <p:grpSpPr>
+        <a:xfrm>
+          <a:off x="0" y="0"/>
+          <a:ext cx="0" cy="0"/>
+          <a:chOff x="0" y="0"/>
+          <a:chExt cx="0" cy="0"/>
+        </a:xfrm>
+      </p:grpSpPr>
+      <p:sp>
+        <p:nvSpPr>
+          <p:cNvPr id="2" name="Title 1"/>
+          <p:cNvSpPr>
+            <a:spLocks noGrp="1"/>
+          </p:cNvSpPr>
+          <p:nvPr>
+            <p:ph type="title"/>
+          </p:nvPr>
+        </p:nvSpPr>
+        <p:spPr/>
+        <p:txBody>
+          <a:bodyPr/>
+          <a:lstStyle/>
+          <a:p>
+            <a:r>
+              <a:rPr lang="en-US" dirty="0" smtClean="0"/>
+              <a:t>Caller info attributes</a:t>
+            </a:r>
+            <a:endParaRPr lang="en-US" dirty="0"/>
+          </a:p>
+        </p:txBody>
+      </p:sp>
+      <p:sp>
+        <p:nvSpPr>
+          <p:cNvPr id="3" name="Content Placeholder 2"/>
+          <p:cNvSpPr>
+            <a:spLocks noGrp="1"/>
+          </p:cNvSpPr>
+          <p:nvPr>
+            <p:ph idx="1"/>
+          </p:nvPr>
+        </p:nvSpPr>
+        <p:spPr/>
+        <p:txBody>
+          <a:bodyPr/>
+          <a:lstStyle/>
+          <a:p>
+            <a:r>
+              <a:rPr lang="en-US" dirty="0" err="1" smtClean="0"/>
+              <a:t>System.Runtime.CompilerServices</a:t>
+            </a:r>
+            <a:endParaRPr lang="en-US" dirty="0" smtClean="0"/>
+          </a:p>
+          <a:p>
+            <a:pPr lvl="1"/>
+            <a:r>
+              <a:rPr lang="en-US" dirty="0" err="1" smtClean="0"/>
+              <a:t>CallerMemberName</a:t>
+            </a:r>
+            <a:endParaRPr lang="en-US" dirty="0" smtClean="0"/>
+          </a:p>
+          <a:p>
+            <a:pPr lvl="1"/>
+            <a:r>
+              <a:rPr lang="en-US" dirty="0" err="1" smtClean="0"/>
+              <a:t>CallerLineNumber</a:t>
+            </a:r>
+            <a:endParaRPr lang="en-US" dirty="0" smtClean="0"/>
+          </a:p>
+          <a:p>
+            <a:pPr lvl="1"/>
+            <a:r>
+              <a:rPr lang="en-US" dirty="0" err="1" smtClean="0"/>
+              <a:t>CallerFilePath</a:t>
+            </a:r>
+            <a:endParaRPr lang="en-US" dirty="0" smtClean="0"/>
+          </a:p>
+          <a:p>
+            <a:endParaRPr lang="en-US" dirty="0" smtClean="0"/>
+          </a:p>
+          <a:p>
+            <a:pPr>
+              <a:buNone/>
+            </a:pPr>
+            <a:r>
+              <a:rPr lang="en-US" sz="1600" dirty="0" smtClean="0">
+                <a:solidFill>
+                  <a:srgbClr val="000000"/>
+                </a:solidFill>
+                <a:highlight>
+                  <a:srgbClr val="FFFFFF"/>
+                </a:highlight>
+                <a:latin typeface="Consolas"/>
+              </a:rPr>
+              <a:t> </a:t>
+            </a:r>
+            <a:r>
+              <a:rPr lang="en-US" sz="1600" dirty="0" smtClean="0">
+                <a:solidFill>
+                  <a:srgbClr val="0000FF"/>
+                </a:solidFill>
+                <a:highlight>
+                  <a:srgbClr val="FFFFFF"/>
+                </a:highlight>
+                <a:latin typeface="Consolas"/>
+              </a:rPr>
+              <a:t>public</a:t>
+            </a:r>
+            <a:r>
+              <a:rPr lang="en-US" sz="1600" dirty="0" smtClean="0">
+                <a:solidFill>
+                  <a:srgbClr val="000000"/>
+                </a:solidFill>
+                <a:highlight>
+                  <a:srgbClr val="FFFFFF"/>
+                </a:highlight>
+                <a:latin typeface="Consolas"/>
+              </a:rPr>
+              <a:t> </a:t>
+            </a:r>
+            <a:r>
+              <a:rPr lang="en-US" sz="1600" dirty="0" smtClean="0">
+                <a:solidFill>
+                  <a:srgbClr val="0000FF"/>
+                </a:solidFill>
+                <a:highlight>
+                  <a:srgbClr val="FFFFFF"/>
+                </a:highlight>
+                <a:latin typeface="Consolas"/>
+              </a:rPr>
+              <a:t>void</a:t>
+            </a:r>
+            <a:r>
+              <a:rPr lang="en-US" sz="1600" dirty="0" smtClean="0">
+                <a:solidFill>
+                  <a:srgbClr val="000000"/>
+                </a:solidFill>
+                <a:highlight>
+                  <a:srgbClr val="FFFFFF"/>
+                </a:highlight>
+                <a:latin typeface="Consolas"/>
+              </a:rPr>
+              <a:t> Log(</a:t>
+            </a:r>
+            <a:r>
+              <a:rPr lang="en-US" sz="1600" dirty="0" smtClean="0">
+                <a:solidFill>
+                  <a:srgbClr val="0000FF"/>
+                </a:solidFill>
+                <a:highlight>
+                  <a:srgbClr val="FFFFFF"/>
+                </a:highlight>
+                <a:latin typeface="Consolas"/>
+              </a:rPr>
+              <a:t>string</a:t>
+            </a:r>
+            <a:r>
+              <a:rPr lang="en-US" sz="1600" dirty="0" smtClean="0">
+                <a:solidFill>
+                  <a:srgbClr val="000000"/>
+                </a:solidFill>
+                <a:highlight>
+                  <a:srgbClr val="FFFFFF"/>
+                </a:highlight>
+                <a:latin typeface="Consolas"/>
+              </a:rPr>
+              <a:t> message, </a:t>
+            </a:r>
+            <a:r>
+              <a:rPr lang="en-US" sz="1600" dirty="0" smtClean="0">
+                <a:solidFill>
+                  <a:srgbClr val="000000"/>
+                </a:solidFill>
+                <a:highlight>
+                  <a:srgbClr val="FFFFFF"/>
+                </a:highlight>
+                <a:latin typeface="Consolas"/>
+              </a:rPr>
+              <a:t>[</a:t>
+            </a:r>
+            <a:r>
+              <a:rPr lang="en-US" sz="1600" dirty="0" err="1" smtClean="0">
+                <a:solidFill>
+                  <a:srgbClr val="2B91AF"/>
+                </a:solidFill>
+                <a:highlight>
+                  <a:srgbClr val="FFFFFF"/>
+                </a:highlight>
+                <a:latin typeface="Consolas"/>
+              </a:rPr>
+              <a:t>CallerMemberName</a:t>
+            </a:r>
+            <a:r>
+              <a:rPr lang="en-US" sz="1600" dirty="0" smtClean="0">
+                <a:solidFill>
+                  <a:srgbClr val="000000"/>
+                </a:solidFill>
+                <a:highlight>
+                  <a:srgbClr val="FFFFFF"/>
+                </a:highlight>
+                <a:latin typeface="Consolas"/>
+              </a:rPr>
+              <a:t>]</a:t>
+            </a:r>
+            <a:r>
+              <a:rPr lang="en-US" sz="1600" dirty="0" smtClean="0">
+                <a:solidFill>
+                  <a:srgbClr val="0000FF"/>
+                </a:solidFill>
+                <a:highlight>
+                  <a:srgbClr val="FFFFFF"/>
+                </a:highlight>
+                <a:latin typeface="Consolas"/>
+              </a:rPr>
+              <a:t>string</a:t>
+            </a:r>
+            <a:r>
+              <a:rPr lang="en-US" sz="1600" dirty="0" smtClean="0">
+                <a:solidFill>
+                  <a:srgbClr val="000000"/>
+                </a:solidFill>
+                <a:highlight>
+                  <a:srgbClr val="FFFFFF"/>
+                </a:highlight>
+                <a:latin typeface="Consolas"/>
+              </a:rPr>
+              <a:t> </a:t>
+            </a:r>
+            <a:r>
+              <a:rPr lang="en-US" sz="1600" dirty="0" err="1" smtClean="0">
+                <a:solidFill>
+                  <a:srgbClr val="000000"/>
+                </a:solidFill>
+                <a:highlight>
+                  <a:srgbClr val="FFFFFF"/>
+                </a:highlight>
+                <a:latin typeface="Consolas"/>
+              </a:rPr>
+              <a:t>memberName</a:t>
+            </a:r>
+            <a:r>
+              <a:rPr lang="en-US" sz="1600" dirty="0" smtClean="0">
+                <a:solidFill>
+                  <a:srgbClr val="000000"/>
+                </a:solidFill>
+                <a:highlight>
+                  <a:srgbClr val="FFFFFF"/>
+                </a:highlight>
+                <a:latin typeface="Consolas"/>
+              </a:rPr>
+              <a:t> = </a:t>
+            </a:r>
+            <a:r>
+              <a:rPr lang="en-US" sz="1600" dirty="0" smtClean="0">
+                <a:solidFill>
+                  <a:srgbClr val="800000"/>
+                </a:solidFill>
+                <a:highlight>
+                  <a:srgbClr val="FFFFFF"/>
+                </a:highlight>
+                <a:latin typeface="Consolas"/>
+              </a:rPr>
+              <a:t>""</a:t>
+            </a:r>
+            <a:r>
+              <a:rPr lang="en-US" sz="1600" dirty="0" smtClean="0">
+                <a:solidFill>
+                  <a:srgbClr val="000000"/>
+                </a:solidFill>
+                <a:highlight>
+                  <a:srgbClr val="FFFFFF"/>
+                </a:highlight>
+                <a:latin typeface="Consolas"/>
+              </a:rPr>
+              <a:t>, [</a:t>
+            </a:r>
+            <a:r>
+              <a:rPr lang="en-US" sz="1600" dirty="0" err="1" smtClean="0">
+                <a:solidFill>
+                  <a:srgbClr val="2B91AF"/>
+                </a:solidFill>
+                <a:highlight>
+                  <a:srgbClr val="FFFFFF"/>
+                </a:highlight>
+                <a:latin typeface="Consolas"/>
+              </a:rPr>
+              <a:t>CallerLineNumber</a:t>
+            </a:r>
+            <a:r>
+              <a:rPr lang="en-US" sz="1600" dirty="0" smtClean="0">
+                <a:solidFill>
+                  <a:srgbClr val="000000"/>
+                </a:solidFill>
+                <a:highlight>
+                  <a:srgbClr val="FFFFFF"/>
+                </a:highlight>
+                <a:latin typeface="Consolas"/>
+              </a:rPr>
+              <a:t>]</a:t>
+            </a:r>
+            <a:r>
+              <a:rPr lang="en-US" sz="1600" dirty="0" err="1" smtClean="0">
+                <a:solidFill>
+                  <a:srgbClr val="0000FF"/>
+                </a:solidFill>
+                <a:highlight>
+                  <a:srgbClr val="FFFFFF"/>
+                </a:highlight>
+                <a:latin typeface="Consolas"/>
+              </a:rPr>
+              <a:t>int</a:t>
+            </a:r>
+            <a:r>
+              <a:rPr lang="en-US" sz="1600" dirty="0" smtClean="0">
+                <a:solidFill>
+                  <a:srgbClr val="000000"/>
+                </a:solidFill>
+                <a:highlight>
+                  <a:srgbClr val="FFFFFF"/>
+                </a:highlight>
+                <a:latin typeface="Consolas"/>
+              </a:rPr>
+              <a:t> </a:t>
+            </a:r>
+            <a:r>
+              <a:rPr lang="en-US" sz="1600" dirty="0" err="1" smtClean="0">
+                <a:solidFill>
+                  <a:srgbClr val="000000"/>
+                </a:solidFill>
+                <a:highlight>
+                  <a:srgbClr val="FFFFFF"/>
+                </a:highlight>
+                <a:latin typeface="Consolas"/>
+              </a:rPr>
+              <a:t>lineNumber</a:t>
+            </a:r>
+            <a:r>
+              <a:rPr lang="en-US" sz="1600" dirty="0" smtClean="0">
+                <a:solidFill>
+                  <a:srgbClr val="000000"/>
+                </a:solidFill>
+                <a:highlight>
+                  <a:srgbClr val="FFFFFF"/>
+                </a:highlight>
+                <a:latin typeface="Consolas"/>
+              </a:rPr>
+              <a:t> = 0)</a:t>
+            </a:r>
+          </a:p>
+          <a:p>
+            <a:pPr>
+              <a:buNone/>
+            </a:pPr>
+            <a:r>
+              <a:rPr lang="en-US" sz="1600" dirty="0" smtClean="0">
+                <a:solidFill>
+                  <a:srgbClr val="000000"/>
+                </a:solidFill>
+                <a:highlight>
+                  <a:srgbClr val="FFFFFF"/>
+                </a:highlight>
+                <a:latin typeface="Consolas"/>
+              </a:rPr>
+              <a:t>        {</a:t>
+            </a:r>
+          </a:p>
+          <a:p>
+            <a:pPr>
+              <a:buNone/>
+            </a:pPr>
+            <a:r>
+              <a:rPr lang="en-US" sz="1600" dirty="0" smtClean="0">
+                <a:solidFill>
+                  <a:srgbClr val="000000"/>
+                </a:solidFill>
+                <a:highlight>
+                  <a:srgbClr val="FFFFFF"/>
+                </a:highlight>
+                <a:latin typeface="Consolas"/>
+              </a:rPr>
+              <a:t>            </a:t>
+            </a:r>
+            <a:r>
+              <a:rPr lang="en-US" sz="1600" dirty="0" err="1" smtClean="0">
+                <a:solidFill>
+                  <a:srgbClr val="2B91AF"/>
+                </a:solidFill>
+                <a:highlight>
+                  <a:srgbClr val="FFFFFF"/>
+                </a:highlight>
+                <a:latin typeface="Consolas"/>
+              </a:rPr>
+              <a:t>Console</a:t>
+            </a:r>
+            <a:r>
+              <a:rPr lang="en-US" sz="1600" dirty="0" err="1" smtClean="0">
+                <a:solidFill>
+                  <a:srgbClr val="000000"/>
+                </a:solidFill>
+                <a:highlight>
+                  <a:srgbClr val="FFFFFF"/>
+                </a:highlight>
+                <a:latin typeface="Consolas"/>
+              </a:rPr>
+              <a:t>.WriteLine</a:t>
+            </a:r>
+            <a:r>
+              <a:rPr lang="en-US" sz="1600" dirty="0" smtClean="0">
+                <a:solidFill>
+                  <a:srgbClr val="000000"/>
+                </a:solidFill>
+                <a:highlight>
+                  <a:srgbClr val="FFFFFF"/>
+                </a:highlight>
+                <a:latin typeface="Consolas"/>
+              </a:rPr>
+              <a:t>(</a:t>
+            </a:r>
+            <a:r>
+              <a:rPr lang="en-US" sz="1600" dirty="0" smtClean="0">
+                <a:solidFill>
+                  <a:srgbClr val="800000"/>
+                </a:solidFill>
+                <a:highlight>
+                  <a:srgbClr val="FFFFFF"/>
+                </a:highlight>
+                <a:latin typeface="Consolas"/>
+              </a:rPr>
+              <a:t>"[</a:t>
+            </a:r>
+            <a:r>
+              <a:rPr lang="en-US" sz="1600" dirty="0" smtClean="0">
+                <a:solidFill>
+                  <a:srgbClr val="3CB371"/>
+                </a:solidFill>
+                <a:highlight>
+                  <a:srgbClr val="FFFFFF"/>
+                </a:highlight>
+                <a:latin typeface="Consolas"/>
+              </a:rPr>
+              <a:t>{</a:t>
+            </a:r>
+            <a:r>
+              <a:rPr lang="en-US" sz="1600" dirty="0" smtClean="0">
+                <a:solidFill>
+                  <a:srgbClr val="3CB371"/>
+                </a:solidFill>
+                <a:highlight>
+                  <a:srgbClr val="FFFFFF"/>
+                </a:highlight>
+                <a:latin typeface="Consolas"/>
+              </a:rPr>
+              <a:t>0}</a:t>
+            </a:r>
+            <a:r>
+              <a:rPr lang="en-US" sz="1600" dirty="0" smtClean="0">
+                <a:solidFill>
+                  <a:srgbClr val="800000"/>
+                </a:solidFill>
+                <a:highlight>
+                  <a:srgbClr val="FFFFFF"/>
+                </a:highlight>
+                <a:latin typeface="Consolas"/>
+              </a:rPr>
+              <a:t>-</a:t>
+            </a:r>
+            <a:r>
+              <a:rPr lang="en-US" sz="1600" dirty="0" smtClean="0">
+                <a:solidFill>
+                  <a:srgbClr val="3CB371"/>
+                </a:solidFill>
+                <a:highlight>
+                  <a:srgbClr val="FFFFFF"/>
+                </a:highlight>
+                <a:latin typeface="Consolas"/>
+              </a:rPr>
+              <a:t>{1}</a:t>
+            </a:r>
+            <a:r>
+              <a:rPr lang="en-US" sz="1600" dirty="0" smtClean="0">
+                <a:solidFill>
+                  <a:srgbClr val="800000"/>
+                </a:solidFill>
+                <a:highlight>
+                  <a:srgbClr val="FFFFFF"/>
+                </a:highlight>
+                <a:latin typeface="Consolas"/>
+              </a:rPr>
+              <a:t>] – </a:t>
+            </a:r>
+            <a:r>
+              <a:rPr lang="en-US" sz="1600" dirty="0" smtClean="0">
+                <a:solidFill>
+                  <a:srgbClr val="3CB371"/>
+                </a:solidFill>
+                <a:highlight>
+                  <a:srgbClr val="FFFFFF"/>
+                </a:highlight>
+                <a:latin typeface="Consolas"/>
+              </a:rPr>
+              <a:t>{2}</a:t>
+            </a:r>
+            <a:r>
+              <a:rPr lang="en-US" sz="1600" dirty="0" smtClean="0">
+                <a:solidFill>
+                  <a:srgbClr val="800000"/>
+                </a:solidFill>
+                <a:highlight>
+                  <a:srgbClr val="FFFFFF"/>
+                </a:highlight>
+                <a:latin typeface="Consolas"/>
+              </a:rPr>
+              <a:t>"</a:t>
+            </a:r>
+            <a:r>
+              <a:rPr lang="en-US" sz="1600" dirty="0" smtClean="0">
+                <a:solidFill>
+                  <a:srgbClr val="000000"/>
+                </a:solidFill>
+                <a:highlight>
+                  <a:srgbClr val="FFFFFF"/>
+                </a:highlight>
+                <a:latin typeface="Consolas"/>
+              </a:rPr>
+              <a:t>, </a:t>
+            </a:r>
+            <a:r>
+              <a:rPr lang="en-US" sz="1600" dirty="0" err="1" smtClean="0">
+                <a:solidFill>
+                  <a:srgbClr val="000000"/>
+                </a:solidFill>
+                <a:highlight>
+                  <a:srgbClr val="FFFFFF"/>
+                </a:highlight>
+                <a:latin typeface="Consolas"/>
+              </a:rPr>
+              <a:t>memberName</a:t>
+            </a:r>
+            <a:r>
+              <a:rPr lang="en-US" sz="1600" dirty="0" smtClean="0">
+                <a:solidFill>
+                  <a:srgbClr val="000000"/>
+                </a:solidFill>
+                <a:highlight>
+                  <a:srgbClr val="FFFFFF"/>
+                </a:highlight>
+                <a:latin typeface="Consolas"/>
+              </a:rPr>
+              <a:t>, </a:t>
+            </a:r>
+            <a:r>
+              <a:rPr lang="en-US" sz="1600" dirty="0" err="1" smtClean="0">
+                <a:solidFill>
+                  <a:srgbClr val="000000"/>
+                </a:solidFill>
+                <a:highlight>
+                  <a:srgbClr val="FFFFFF"/>
+                </a:highlight>
+                <a:latin typeface="Consolas"/>
+              </a:rPr>
+              <a:t>lineNumber</a:t>
+            </a:r>
+            <a:r>
+              <a:rPr lang="en-US" sz="1600" dirty="0" smtClean="0">
+                <a:solidFill>
+                  <a:srgbClr val="000000"/>
+                </a:solidFill>
+                <a:highlight>
+                  <a:srgbClr val="FFFFFF"/>
+                </a:highlight>
+                <a:latin typeface="Consolas"/>
+              </a:rPr>
+              <a:t>, message);            </a:t>
+            </a:r>
+          </a:p>
+          <a:p>
+            <a:pPr>
+              <a:buNone/>
+            </a:pPr>
+            <a:r>
+              <a:rPr lang="en-US" sz="1600" dirty="0" smtClean="0">
+                <a:solidFill>
+                  <a:srgbClr val="000000"/>
+                </a:solidFill>
+                <a:highlight>
+                  <a:srgbClr val="FFFFFF"/>
+                </a:highlight>
+                <a:latin typeface="Consolas"/>
+              </a:rPr>
+              <a:t>        }</a:t>
+            </a:r>
+            <a:endParaRPr lang="en-US" sz="1600" dirty="0" smtClean="0"/>
+          </a:p>
+        </p:txBody>
+      </p:sp>
+      <p:sp>
+        <p:nvSpPr>
+          <p:cNvPr id="4" name="Slide Number Placeholder 3"/>
+          <p:cNvSpPr>
+            <a:spLocks noGrp="1"/>
+          </p:cNvSpPr>
+          <p:nvPr>
+            <p:ph type="sldNum" sz="quarter" idx="10"/>
+          </p:nvPr>
+        </p:nvSpPr>
+        <p:spPr/>
+        <p:txBody>
+          <a:bodyPr/>
+          <a:lstStyle/>
+          <a:p>
+            <a:fld id="{5BA08351-1517-4DDD-96C2-B53AED81A9DF}" type="slidenum">
+              <a:rPr lang="en-US" smtClean="0"/>
+              <a:pPr/>
+              <a:t>12</a:t>
+            </a:fld>
+            <a:endParaRPr lang="en-US" dirty="0"/>
+          </a:p>
+        </p:txBody>
+      </p:sp>
+    </p:spTree>
+  </p:cSld>
+  <p:clrMapOvr>
+    <a:masterClrMapping/>
+  </p:clrMapOvr>
+</p:sld>
+</file>
+
+<file path=ppt/slides/slide13.xml><?xml version="1.0" encoding="utf-8"?>
+<p:sld xmlns:a="http://schemas.openxmlformats.org/drawingml/2006/main" xmlns:r="http://schemas.openxmlformats.org/officeDocument/2006/relationships" xmlns:p="http://schemas.openxmlformats.org/presentationml/2006/main">
+  <p:cSld>
+    <p:spTree>
+      <p:nvGrpSpPr>
+        <p:cNvPr id="1" name=""/>
+        <p:cNvGrpSpPr/>
+        <p:nvPr/>
+      </p:nvGrpSpPr>
+      <p:grpSpPr>
+        <a:xfrm>
+          <a:off x="0" y="0"/>
+          <a:ext cx="0" cy="0"/>
+          <a:chOff x="0" y="0"/>
+          <a:chExt cx="0" cy="0"/>
+        </a:xfrm>
+      </p:grpSpPr>
+      <p:sp>
+        <p:nvSpPr>
+          <p:cNvPr id="2" name="Title 1"/>
+          <p:cNvSpPr>
+            <a:spLocks noGrp="1"/>
+          </p:cNvSpPr>
+          <p:nvPr>
+            <p:ph type="title"/>
+          </p:nvPr>
+        </p:nvSpPr>
+        <p:spPr/>
+        <p:txBody>
+          <a:bodyPr/>
+          <a:lstStyle/>
+          <a:p>
+            <a:r>
+              <a:rPr lang="en-US" dirty="0" err="1" smtClean="0"/>
+              <a:t>WinRT</a:t>
+            </a:r>
+            <a:r>
+              <a:rPr lang="en-US" dirty="0" smtClean="0"/>
+              <a:t> – support 	</a:t>
+            </a:r>
+            <a:endParaRPr lang="en-US" dirty="0"/>
+          </a:p>
+        </p:txBody>
+      </p:sp>
+      <p:sp>
+        <p:nvSpPr>
+          <p:cNvPr id="3" name="Content Placeholder 2"/>
+          <p:cNvSpPr>
+            <a:spLocks noGrp="1"/>
+          </p:cNvSpPr>
+          <p:nvPr>
+            <p:ph idx="1"/>
+          </p:nvPr>
+        </p:nvSpPr>
+        <p:spPr/>
+        <p:txBody>
+          <a:bodyPr/>
+          <a:lstStyle/>
+          <a:p>
+            <a:r>
+              <a:rPr lang="en-US" dirty="0" smtClean="0"/>
+              <a:t>Windows Runtime – a new desktop application runtime</a:t>
+            </a:r>
+          </a:p>
+          <a:p>
+            <a:endParaRPr lang="en-US" dirty="0" smtClean="0"/>
+          </a:p>
+          <a:p>
+            <a:r>
+              <a:rPr lang="en-US" dirty="0" smtClean="0"/>
+              <a:t>More .NET framework support than C# language per se</a:t>
+            </a:r>
+          </a:p>
+          <a:p>
+            <a:endParaRPr lang="en-US" dirty="0" smtClean="0"/>
+          </a:p>
+          <a:p>
+            <a:r>
+              <a:rPr lang="en-US" dirty="0" smtClean="0"/>
+              <a:t>Mix C# components </a:t>
+            </a:r>
+            <a:r>
+              <a:rPr lang="en-US" smtClean="0"/>
+              <a:t>with JavaScript to build Metro Style UI</a:t>
+            </a:r>
+            <a:endParaRPr lang="en-US" dirty="0" smtClean="0"/>
+          </a:p>
+        </p:txBody>
+      </p:sp>
+      <p:sp>
+        <p:nvSpPr>
+          <p:cNvPr id="4" name="Slide Number Placeholder 3"/>
+          <p:cNvSpPr>
+            <a:spLocks noGrp="1"/>
+          </p:cNvSpPr>
+          <p:nvPr>
+            <p:ph type="sldNum" sz="quarter" idx="10"/>
+          </p:nvPr>
+        </p:nvSpPr>
+        <p:spPr/>
+        <p:txBody>
+          <a:bodyPr/>
+          <a:lstStyle/>
+          <a:p>
+            <a:fld id="{5BA08351-1517-4DDD-96C2-B53AED81A9DF}" type="slidenum">
+              <a:rPr lang="en-US" smtClean="0"/>
+              <a:pPr/>
+              <a:t>13</a:t>
+            </a:fld>
+            <a:endParaRPr lang="en-US" dirty="0"/>
+          </a:p>
+        </p:txBody>
+      </p:sp>
+    </p:spTree>
+  </p:cSld>
+  <p:clrMapOvr>
+    <a:masterClrMapping/>
+  </p:clrMapOvr>
+</p:sld>
+</file>
+
+<file path=ppt/slides/slide14.xml><?xml version="1.0" encoding="utf-8"?>
+<p:sld xmlns:a="http://schemas.openxmlformats.org/drawingml/2006/main" xmlns:r="http://schemas.openxmlformats.org/officeDocument/2006/relationships" xmlns:p="http://schemas.openxmlformats.org/presentationml/2006/main">
+  <p:cSld>
+    <p:spTree>
+      <p:nvGrpSpPr>
+        <p:cNvPr id="1" name=""/>
+        <p:cNvGrpSpPr/>
+        <p:nvPr/>
+      </p:nvGrpSpPr>
+      <p:grpSpPr>
+        <a:xfrm>
+          <a:off x="0" y="0"/>
+          <a:ext cx="0" cy="0"/>
+          <a:chOff x="0" y="0"/>
+          <a:chExt cx="0" cy="0"/>
+        </a:xfrm>
+      </p:grpSpPr>
+      <p:sp>
+        <p:nvSpPr>
           <p:cNvPr id="17409" name="Slide Number Placeholder 3"/>
           <p:cNvSpPr>
             <a:spLocks noGrp="1"/>
@@ -8410,7 +9681,7 @@
             <a:fld id="{B8923B82-4FEA-4C63-961B-70B71B12A787}" type="slidenum">
               <a:rPr lang="en-US"/>
               <a:pPr/>
-              <a:t>11</a:t>
+              <a:t>14</a:t>
             </a:fld>
             <a:endParaRPr lang="en-US" dirty="0"/>
           </a:p>
@@ -10343,6 +11614,13 @@
   <p:clrMapOvr>
     <a:masterClrMapping/>
   </p:clrMapOvr>
+  <p:timing>
+    <p:tnLst>
+      <p:par>
+        <p:cTn id="1" dur="indefinite" restart="never" nodeType="tmRoot"/>
+      </p:par>
+    </p:tnLst>
+  </p:timing>
 </p:sld>
 </file>
 
@@ -10535,6 +11813,13 @@
   <p:clrMapOvr>
     <a:masterClrMapping/>
   </p:clrMapOvr>
+  <p:timing>
+    <p:tnLst>
+      <p:par>
+        <p:cTn id="1" dur="indefinite" restart="never" nodeType="tmRoot"/>
+      </p:par>
+    </p:tnLst>
+  </p:timing>
 </p:sld>
 </file>
 
@@ -10607,7 +11892,15 @@
           <a:p>
             <a:r>
               <a:rPr lang="en-US" dirty="0" smtClean="0"/>
-              <a:t>Subroutines with allow multiple entry points</a:t>
+              <a:t>Subroutines </a:t>
+            </a:r>
+            <a:r>
+              <a:rPr lang="en-US" dirty="0" smtClean="0"/>
+              <a:t>which allow </a:t>
+            </a:r>
+            <a:r>
+              <a:rPr lang="en-US" dirty="0" smtClean="0"/>
+              <a:t>multiple entry points</a:t>
             </a:r>
             <a:r>
               <a:rPr lang="pl-PL" dirty="0" smtClean="0"/>
@@ -10668,6 +11961,13 @@
   <p:clrMapOvr>
     <a:masterClrMapping/>
   </p:clrMapOvr>
+  <p:timing>
+    <p:tnLst>
+      <p:par>
+        <p:cTn id="1" dur="indefinite" restart="never" nodeType="tmRoot"/>
+      </p:par>
+    </p:tnLst>
+  </p:timing>
 </p:sld>
 </file>
 
@@ -10855,6 +12155,13 @@
   <p:clrMapOvr>
     <a:masterClrMapping/>
   </p:clrMapOvr>
+  <p:timing>
+    <p:tnLst>
+      <p:par>
+        <p:cTn id="1" dur="indefinite" restart="never" nodeType="tmRoot"/>
+      </p:par>
+    </p:tnLst>
+  </p:timing>
 </p:sld>
 </file>
 
@@ -11817,7 +13124,12 @@
 </file>
 
 <file path=customXml/item1.xml><?xml version="1.0" encoding="utf-8"?>
-<LongProperties xmlns="http://schemas.microsoft.com/office/2006/metadata/longProperties"/>
+<?mso-contentType ?>
+<FormTemplates xmlns="http://schemas.microsoft.com/sharepoint/v3/contenttype/forms">
+  <Display>DocumentLibraryForm</Display>
+  <Edit>DocumentLibraryForm</Edit>
+  <New>DocumentLibraryForm</New>
+</FormTemplates>
 </file>
 
 <file path=customXml/item2.xml><?xml version="1.0" encoding="utf-8"?>
@@ -11881,12 +13193,7 @@
 </file>
 
 <file path=customXml/item3.xml><?xml version="1.0" encoding="utf-8"?>
-<?mso-contentType ?>
-<FormTemplates xmlns="http://schemas.microsoft.com/sharepoint/v3/contenttype/forms">
-  <Display>DocumentLibraryForm</Display>
-  <Edit>DocumentLibraryForm</Edit>
-  <New>DocumentLibraryForm</New>
-</FormTemplates>
+<LongProperties xmlns="http://schemas.microsoft.com/office/2006/metadata/longProperties"/>
 </file>
 
 <file path=customXml/item4.xml><?xml version="1.0" encoding="utf-8"?>
@@ -11898,9 +13205,9 @@
 </file>
 
 <file path=customXml/itemProps1.xml><?xml version="1.0" encoding="utf-8"?>
-<ds:datastoreItem xmlns:ds="http://schemas.openxmlformats.org/officeDocument/2006/customXml" ds:itemID="{9062B6A4-46AE-44BC-B602-351B8E15754D}">
+<ds:datastoreItem xmlns:ds="http://schemas.openxmlformats.org/officeDocument/2006/customXml" ds:itemID="{D3274669-787B-4EFD-8872-69E7B499937A}">
   <ds:schemaRefs>
-    <ds:schemaRef ds:uri="http://schemas.microsoft.com/office/2006/metadata/longProperties"/>
+    <ds:schemaRef ds:uri="http://schemas.microsoft.com/sharepoint/v3/contenttype/forms"/>
   </ds:schemaRefs>
 </ds:datastoreItem>
 </file>
@@ -11923,9 +13230,9 @@
 </file>
 
 <file path=customXml/itemProps3.xml><?xml version="1.0" encoding="utf-8"?>
-<ds:datastoreItem xmlns:ds="http://schemas.openxmlformats.org/officeDocument/2006/customXml" ds:itemID="{D3274669-787B-4EFD-8872-69E7B499937A}">
+<ds:datastoreItem xmlns:ds="http://schemas.openxmlformats.org/officeDocument/2006/customXml" ds:itemID="{9062B6A4-46AE-44BC-B602-351B8E15754D}">
   <ds:schemaRefs>
-    <ds:schemaRef ds:uri="http://schemas.microsoft.com/sharepoint/v3/contenttype/forms"/>
+    <ds:schemaRef ds:uri="http://schemas.microsoft.com/office/2006/metadata/longProperties"/>
   </ds:schemaRefs>
 </ds:datastoreItem>
 </file>

</xml_diff>

<commit_message>
changed TPL async example to use FromAsync constructor
</commit_message>
<xml_diff>
--- a/C# 5.pptx
+++ b/C# 5.pptx
@@ -228,7 +228,7 @@
             <a:fld id="{867741B6-20E1-4219-AC3A-163B52FA3A08}" type="datetime8">
               <a:rPr lang="en-US"/>
               <a:pPr/>
-              <a:t>5/24/2012 8:34 AM</a:t>
+              <a:t>5/29/2012 9:12 AM</a:t>
             </a:fld>
             <a:endParaRPr lang="en-US" dirty="0"/>
           </a:p>
@@ -421,7 +421,7 @@
             <a:fld id="{80DC343A-C7DB-48FF-A81F-D2EFF0311B91}" type="datetime8">
               <a:rPr lang="en-US"/>
               <a:pPr/>
-              <a:t>5/24/2012 8:34 AM</a:t>
+              <a:t>5/29/2012 9:12 AM</a:t>
             </a:fld>
             <a:endParaRPr lang="en-US" dirty="0"/>
           </a:p>
@@ -818,7 +818,7 @@
             <a:fld id="{FE6E691D-9AEE-4359-9871-4FF78429DC86}" type="datetime8">
               <a:rPr lang="en-US"/>
               <a:pPr/>
-              <a:t>5/24/2012 8:34 AM</a:t>
+              <a:t>5/29/2012 9:12 AM</a:t>
             </a:fld>
             <a:endParaRPr lang="en-US"/>
           </a:p>
@@ -1048,7 +1048,7 @@
             <a:fld id="{80DC343A-C7DB-48FF-A81F-D2EFF0311B91}" type="datetime8">
               <a:rPr lang="en-US" smtClean="0"/>
               <a:pPr/>
-              <a:t>5/24/2012 8:34 AM</a:t>
+              <a:t>5/29/2012 9:12 AM</a:t>
             </a:fld>
             <a:endParaRPr lang="en-US" dirty="0"/>
           </a:p>
@@ -1279,7 +1279,7 @@
             <a:fld id="{80DC343A-C7DB-48FF-A81F-D2EFF0311B91}" type="datetime8">
               <a:rPr lang="en-US" smtClean="0"/>
               <a:pPr/>
-              <a:t>5/24/2012 8:48 AM</a:t>
+              <a:t>5/29/2012 9:12 AM</a:t>
             </a:fld>
             <a:endParaRPr lang="en-US" dirty="0"/>
           </a:p>
@@ -1424,7 +1424,7 @@
             <a:fld id="{80DC343A-C7DB-48FF-A81F-D2EFF0311B91}" type="datetime8">
               <a:rPr lang="en-US" smtClean="0"/>
               <a:pPr/>
-              <a:t>5/24/2012 10:24 AM</a:t>
+              <a:t>5/29/2012 9:12 AM</a:t>
             </a:fld>
             <a:endParaRPr lang="en-US" dirty="0"/>
           </a:p>
@@ -1499,7 +1499,7 @@
             <a:fld id="{AB8F9170-F656-4E08-BDFE-37D587BF0909}" type="datetime8">
               <a:rPr lang="en-US"/>
               <a:pPr/>
-              <a:t>5/24/2012 8:34 AM</a:t>
+              <a:t>5/29/2012 9:12 AM</a:t>
             </a:fld>
             <a:endParaRPr lang="en-US" dirty="0"/>
           </a:p>
@@ -1620,7 +1620,7 @@
             <a:fld id="{AB8F9170-F656-4E08-BDFE-37D587BF0909}" type="datetime8">
               <a:rPr lang="en-US"/>
               <a:pPr/>
-              <a:t>5/24/2012 8:34 AM</a:t>
+              <a:t>5/29/2012 9:12 AM</a:t>
             </a:fld>
             <a:endParaRPr lang="en-US"/>
           </a:p>
@@ -1686,10 +1686,123 @@
           <a:p>
             <a:pPr marL="288925" lvl="1" indent="-174625" eaLnBrk="1" hangingPunct="1">
               <a:buSzPct val="75000"/>
-              <a:buFont typeface="Times New Roman" pitchFamily="18" charset="0"/>
-              <a:buChar char="—"/>
             </a:pPr>
-            <a:endParaRPr lang="en-US" sz="1000" smtClean="0">
+            <a:r>
+              <a:rPr lang="en-US" sz="1000" dirty="0" err="1" smtClean="0">
+                <a:latin typeface="Arial" pitchFamily="34" charset="0"/>
+                <a:ea typeface="ＭＳ Ｐゴシック" pitchFamily="34" charset="-128"/>
+              </a:rPr>
+              <a:t>Iterators</a:t>
+            </a:r>
+            <a:r>
+              <a:rPr lang="en-US" sz="1000" dirty="0" smtClean="0">
+                <a:latin typeface="Arial" pitchFamily="34" charset="0"/>
+                <a:ea typeface="ＭＳ Ｐゴシック" pitchFamily="34" charset="-128"/>
+              </a:rPr>
+              <a:t> are similar</a:t>
+            </a:r>
+            <a:r>
+              <a:rPr lang="en-US" sz="1000" baseline="0" dirty="0" smtClean="0">
+                <a:latin typeface="Arial" pitchFamily="34" charset="0"/>
+                <a:ea typeface="ＭＳ Ｐゴシック" pitchFamily="34" charset="-128"/>
+              </a:rPr>
+              <a:t> in nature to the main feature of c# 5</a:t>
+            </a:r>
+          </a:p>
+          <a:p>
+            <a:pPr marL="288925" lvl="1" indent="-174625" eaLnBrk="1" hangingPunct="1">
+              <a:buSzPct val="75000"/>
+            </a:pPr>
+            <a:endParaRPr lang="en-US" sz="1000" baseline="0" dirty="0" smtClean="0">
+              <a:latin typeface="Arial" pitchFamily="34" charset="0"/>
+              <a:ea typeface="ＭＳ Ｐゴシック" pitchFamily="34" charset="-128"/>
+            </a:endParaRPr>
+          </a:p>
+          <a:p>
+            <a:pPr marL="288925" lvl="1" indent="-174625" eaLnBrk="1" hangingPunct="1">
+              <a:buSzPct val="75000"/>
+            </a:pPr>
+            <a:r>
+              <a:rPr lang="en-US" sz="1000" baseline="0" dirty="0" smtClean="0">
+                <a:latin typeface="Arial" pitchFamily="34" charset="0"/>
+                <a:ea typeface="ＭＳ Ｐゴシック" pitchFamily="34" charset="-128"/>
+              </a:rPr>
+              <a:t>C# 4.0 came along with TPL – it’s not strictly a language feature – the CTP was available for </a:t>
+            </a:r>
+            <a:r>
+              <a:rPr lang="en-US" sz="1000" baseline="0" dirty="0" err="1" smtClean="0">
+                <a:latin typeface="Arial" pitchFamily="34" charset="0"/>
+                <a:ea typeface="ＭＳ Ｐゴシック" pitchFamily="34" charset="-128"/>
+              </a:rPr>
+              <a:t>.net</a:t>
+            </a:r>
+            <a:r>
+              <a:rPr lang="en-US" sz="1000" baseline="0" dirty="0" smtClean="0">
+                <a:latin typeface="Arial" pitchFamily="34" charset="0"/>
+                <a:ea typeface="ＭＳ Ｐゴシック" pitchFamily="34" charset="-128"/>
+              </a:rPr>
+              <a:t> 3.5</a:t>
+            </a:r>
+          </a:p>
+          <a:p>
+            <a:pPr marL="288925" lvl="1" indent="-174625" eaLnBrk="1" hangingPunct="1">
+              <a:buSzPct val="75000"/>
+            </a:pPr>
+            <a:r>
+              <a:rPr lang="en-US" sz="1000" baseline="0" dirty="0" smtClean="0">
+                <a:latin typeface="Arial" pitchFamily="34" charset="0"/>
+                <a:ea typeface="ＭＳ Ｐゴシック" pitchFamily="34" charset="-128"/>
+              </a:rPr>
+              <a:t>In fact </a:t>
+            </a:r>
+            <a:r>
+              <a:rPr lang="en-US" sz="1000" baseline="0" dirty="0" err="1" smtClean="0">
+                <a:latin typeface="Arial" pitchFamily="34" charset="0"/>
+                <a:ea typeface="ＭＳ Ｐゴシック" pitchFamily="34" charset="-128"/>
+              </a:rPr>
+              <a:t>withouth</a:t>
+            </a:r>
+            <a:r>
+              <a:rPr lang="en-US" sz="1000" baseline="0" dirty="0" smtClean="0">
+                <a:latin typeface="Arial" pitchFamily="34" charset="0"/>
+                <a:ea typeface="ＭＳ Ｐゴシック" pitchFamily="34" charset="-128"/>
+              </a:rPr>
+              <a:t> TPL the c# 5 new </a:t>
+            </a:r>
+            <a:r>
+              <a:rPr lang="en-US" sz="1000" baseline="0" dirty="0" err="1" smtClean="0">
+                <a:latin typeface="Arial" pitchFamily="34" charset="0"/>
+                <a:ea typeface="ＭＳ Ｐゴシック" pitchFamily="34" charset="-128"/>
+              </a:rPr>
+              <a:t>async</a:t>
+            </a:r>
+            <a:r>
+              <a:rPr lang="en-US" sz="1000" baseline="0" dirty="0" smtClean="0">
+                <a:latin typeface="Arial" pitchFamily="34" charset="0"/>
+                <a:ea typeface="ＭＳ Ｐゴシック" pitchFamily="34" charset="-128"/>
+              </a:rPr>
+              <a:t> keyword would be much harder to implemented what’s more it would gain adoption much slower as it relies heavily on Task and </a:t>
+            </a:r>
+            <a:r>
+              <a:rPr lang="en-US" sz="1000" baseline="0" dirty="0" err="1" smtClean="0">
+                <a:latin typeface="Arial" pitchFamily="34" charset="0"/>
+                <a:ea typeface="ＭＳ Ｐゴシック" pitchFamily="34" charset="-128"/>
+              </a:rPr>
+              <a:t>releted</a:t>
+            </a:r>
+            <a:r>
+              <a:rPr lang="en-US" sz="1000" baseline="0" dirty="0" smtClean="0">
+                <a:latin typeface="Arial" pitchFamily="34" charset="0"/>
+                <a:ea typeface="ＭＳ Ｐゴシック" pitchFamily="34" charset="-128"/>
+              </a:rPr>
+              <a:t> classes</a:t>
+            </a:r>
+          </a:p>
+          <a:p>
+            <a:pPr marL="288925" lvl="1" indent="-174625" eaLnBrk="1" hangingPunct="1">
+              <a:buSzPct val="75000"/>
+            </a:pPr>
+            <a:endParaRPr lang="en-US" sz="1000" baseline="0" dirty="0" smtClean="0">
               <a:latin typeface="Arial" pitchFamily="34" charset="0"/>
               <a:ea typeface="ＭＳ Ｐゴシック" pitchFamily="34" charset="-128"/>
             </a:endParaRPr>
@@ -1812,7 +1925,7 @@
             <a:fld id="{80DC343A-C7DB-48FF-A81F-D2EFF0311B91}" type="datetime8">
               <a:rPr lang="en-US" smtClean="0"/>
               <a:pPr/>
-              <a:t>5/24/2012 8:34 AM</a:t>
+              <a:t>5/29/2012 9:12 AM</a:t>
             </a:fld>
             <a:endParaRPr lang="en-US"/>
           </a:p>
@@ -2111,7 +2224,7 @@
             <a:fld id="{80DC343A-C7DB-48FF-A81F-D2EFF0311B91}" type="datetime8">
               <a:rPr lang="en-US" smtClean="0"/>
               <a:pPr/>
-              <a:t>5/24/2012 8:34 AM</a:t>
+              <a:t>5/29/2012 9:12 AM</a:t>
             </a:fld>
             <a:endParaRPr lang="en-US"/>
           </a:p>
@@ -2302,7 +2415,7 @@
             <a:fld id="{80DC343A-C7DB-48FF-A81F-D2EFF0311B91}" type="datetime8">
               <a:rPr lang="en-US" smtClean="0"/>
               <a:pPr/>
-              <a:t>5/24/2012 8:34 AM</a:t>
+              <a:t>5/29/2012 9:12 AM</a:t>
             </a:fld>
             <a:endParaRPr lang="en-US"/>
           </a:p>
@@ -2636,7 +2749,7 @@
             <a:fld id="{80DC343A-C7DB-48FF-A81F-D2EFF0311B91}" type="datetime8">
               <a:rPr lang="en-US" smtClean="0"/>
               <a:pPr/>
-              <a:t>5/24/2012 8:34 AM</a:t>
+              <a:t>5/29/2012 9:12 AM</a:t>
             </a:fld>
             <a:endParaRPr lang="en-US"/>
           </a:p>
@@ -3265,7 +3378,7 @@
             <a:fld id="{80DC343A-C7DB-48FF-A81F-D2EFF0311B91}" type="datetime8">
               <a:rPr lang="en-US" smtClean="0"/>
               <a:pPr/>
-              <a:t>5/24/2012 8:34 AM</a:t>
+              <a:t>5/29/2012 9:12 AM</a:t>
             </a:fld>
             <a:endParaRPr lang="en-US"/>
           </a:p>
@@ -3375,11 +3488,7 @@
             </a:r>
             <a:r>
               <a:rPr lang="en-US" baseline="0" noProof="0" dirty="0" smtClean="0"/>
-              <a:t> – mostly those that are solved with state </a:t>
-            </a:r>
-            <a:r>
-              <a:rPr lang="en-US" baseline="0" noProof="0" dirty="0" smtClean="0"/>
-              <a:t>machines</a:t>
+              <a:t> – mostly those that are solved with state machines</a:t>
             </a:r>
           </a:p>
           <a:p>
@@ -3452,7 +3561,7 @@
             <a:fld id="{80DC343A-C7DB-48FF-A81F-D2EFF0311B91}" type="datetime8">
               <a:rPr lang="en-US" smtClean="0"/>
               <a:pPr/>
-              <a:t>5/24/2012 8:34 AM</a:t>
+              <a:t>5/29/2012 9:12 AM</a:t>
             </a:fld>
             <a:endParaRPr lang="en-US" dirty="0"/>
           </a:p>
@@ -3728,7 +3837,7 @@
             <a:fld id="{80DC343A-C7DB-48FF-A81F-D2EFF0311B91}" type="datetime8">
               <a:rPr lang="en-US" smtClean="0"/>
               <a:pPr/>
-              <a:t>5/24/2012 8:34 AM</a:t>
+              <a:t>5/29/2012 9:12 AM</a:t>
             </a:fld>
             <a:endParaRPr lang="en-US" dirty="0"/>
           </a:p>
@@ -8806,11 +8915,7 @@
             </a:r>
             <a:r>
               <a:rPr lang="en-US" dirty="0" smtClean="0"/>
-              <a:t> </a:t>
-            </a:r>
-            <a:r>
-              <a:rPr lang="en-US" dirty="0" smtClean="0"/>
-              <a:t>– summary</a:t>
+              <a:t> – summary</a:t>
             </a:r>
             <a:endParaRPr lang="en-US" dirty="0"/>
           </a:p>
@@ -9063,58 +9168,58 @@
                 </a:highlight>
                 <a:latin typeface="Consolas"/>
               </a:rPr>
-              <a:t> message, </a:t>
-            </a:r>
-            <a:r>
-              <a:rPr lang="en-US" sz="1600" dirty="0" smtClean="0">
-                <a:solidFill>
-                  <a:srgbClr val="000000"/>
+              <a:t> message, [</a:t>
+            </a:r>
+            <a:r>
+              <a:rPr lang="en-US" sz="1600" dirty="0" err="1" smtClean="0">
+                <a:solidFill>
+                  <a:srgbClr val="2B91AF"/>
                 </a:solidFill>
                 <a:highlight>
                   <a:srgbClr val="FFFFFF"/>
                 </a:highlight>
                 <a:latin typeface="Consolas"/>
               </a:rPr>
-              <a:t>[</a:t>
-            </a:r>
-            <a:r>
-              <a:rPr lang="en-US" sz="1600" dirty="0" err="1" smtClean="0">
-                <a:solidFill>
-                  <a:srgbClr val="2B91AF"/>
+              <a:t>CallerMemberName</a:t>
+            </a:r>
+            <a:r>
+              <a:rPr lang="en-US" sz="1600" dirty="0" smtClean="0">
+                <a:solidFill>
+                  <a:srgbClr val="000000"/>
                 </a:solidFill>
                 <a:highlight>
                   <a:srgbClr val="FFFFFF"/>
                 </a:highlight>
                 <a:latin typeface="Consolas"/>
               </a:rPr>
-              <a:t>CallerMemberName</a:t>
+              <a:t>]</a:t>
             </a:r>
             <a:r>
               <a:rPr lang="en-US" sz="1600" dirty="0" smtClean="0">
                 <a:solidFill>
-                  <a:srgbClr val="000000"/>
+                  <a:srgbClr val="0000FF"/>
                 </a:solidFill>
                 <a:highlight>
                   <a:srgbClr val="FFFFFF"/>
                 </a:highlight>
                 <a:latin typeface="Consolas"/>
               </a:rPr>
-              <a:t>]</a:t>
+              <a:t>string</a:t>
             </a:r>
             <a:r>
               <a:rPr lang="en-US" sz="1600" dirty="0" smtClean="0">
                 <a:solidFill>
-                  <a:srgbClr val="0000FF"/>
+                  <a:srgbClr val="000000"/>
                 </a:solidFill>
                 <a:highlight>
                   <a:srgbClr val="FFFFFF"/>
                 </a:highlight>
                 <a:latin typeface="Consolas"/>
               </a:rPr>
-              <a:t>string</a:t>
-            </a:r>
-            <a:r>
-              <a:rPr lang="en-US" sz="1600" dirty="0" smtClean="0">
+              <a:t> </a:t>
+            </a:r>
+            <a:r>
+              <a:rPr lang="en-US" sz="1600" dirty="0" err="1" smtClean="0">
                 <a:solidFill>
                   <a:srgbClr val="000000"/>
                 </a:solidFill>
@@ -9123,10 +9228,10 @@
                 </a:highlight>
                 <a:latin typeface="Consolas"/>
               </a:rPr>
-              <a:t> </a:t>
-            </a:r>
-            <a:r>
-              <a:rPr lang="en-US" sz="1600" dirty="0" err="1" smtClean="0">
+              <a:t>memberName</a:t>
+            </a:r>
+            <a:r>
+              <a:rPr lang="en-US" sz="1600" dirty="0" smtClean="0">
                 <a:solidFill>
                   <a:srgbClr val="000000"/>
                 </a:solidFill>
@@ -9135,82 +9240,82 @@
                 </a:highlight>
                 <a:latin typeface="Consolas"/>
               </a:rPr>
-              <a:t>memberName</a:t>
+              <a:t> = </a:t>
             </a:r>
             <a:r>
               <a:rPr lang="en-US" sz="1600" dirty="0" smtClean="0">
                 <a:solidFill>
-                  <a:srgbClr val="000000"/>
+                  <a:srgbClr val="800000"/>
                 </a:solidFill>
                 <a:highlight>
                   <a:srgbClr val="FFFFFF"/>
                 </a:highlight>
                 <a:latin typeface="Consolas"/>
               </a:rPr>
-              <a:t> = </a:t>
+              <a:t>""</a:t>
             </a:r>
             <a:r>
               <a:rPr lang="en-US" sz="1600" dirty="0" smtClean="0">
                 <a:solidFill>
-                  <a:srgbClr val="800000"/>
+                  <a:srgbClr val="000000"/>
                 </a:solidFill>
                 <a:highlight>
                   <a:srgbClr val="FFFFFF"/>
                 </a:highlight>
                 <a:latin typeface="Consolas"/>
               </a:rPr>
-              <a:t>""</a:t>
-            </a:r>
-            <a:r>
-              <a:rPr lang="en-US" sz="1600" dirty="0" smtClean="0">
-                <a:solidFill>
-                  <a:srgbClr val="000000"/>
+              <a:t>, [</a:t>
+            </a:r>
+            <a:r>
+              <a:rPr lang="en-US" sz="1600" dirty="0" err="1" smtClean="0">
+                <a:solidFill>
+                  <a:srgbClr val="2B91AF"/>
                 </a:solidFill>
                 <a:highlight>
                   <a:srgbClr val="FFFFFF"/>
                 </a:highlight>
                 <a:latin typeface="Consolas"/>
               </a:rPr>
-              <a:t>, [</a:t>
-            </a:r>
-            <a:r>
-              <a:rPr lang="en-US" sz="1600" dirty="0" err="1" smtClean="0">
-                <a:solidFill>
-                  <a:srgbClr val="2B91AF"/>
+              <a:t>CallerLineNumber</a:t>
+            </a:r>
+            <a:r>
+              <a:rPr lang="en-US" sz="1600" dirty="0" smtClean="0">
+                <a:solidFill>
+                  <a:srgbClr val="000000"/>
                 </a:solidFill>
                 <a:highlight>
                   <a:srgbClr val="FFFFFF"/>
                 </a:highlight>
                 <a:latin typeface="Consolas"/>
               </a:rPr>
-              <a:t>CallerLineNumber</a:t>
-            </a:r>
-            <a:r>
-              <a:rPr lang="en-US" sz="1600" dirty="0" smtClean="0">
-                <a:solidFill>
-                  <a:srgbClr val="000000"/>
+              <a:t>]</a:t>
+            </a:r>
+            <a:r>
+              <a:rPr lang="en-US" sz="1600" dirty="0" err="1" smtClean="0">
+                <a:solidFill>
+                  <a:srgbClr val="0000FF"/>
                 </a:solidFill>
                 <a:highlight>
                   <a:srgbClr val="FFFFFF"/>
                 </a:highlight>
                 <a:latin typeface="Consolas"/>
               </a:rPr>
-              <a:t>]</a:t>
-            </a:r>
-            <a:r>
-              <a:rPr lang="en-US" sz="1600" dirty="0" err="1" smtClean="0">
-                <a:solidFill>
-                  <a:srgbClr val="0000FF"/>
+              <a:t>int</a:t>
+            </a:r>
+            <a:r>
+              <a:rPr lang="en-US" sz="1600" dirty="0" smtClean="0">
+                <a:solidFill>
+                  <a:srgbClr val="000000"/>
                 </a:solidFill>
                 <a:highlight>
                   <a:srgbClr val="FFFFFF"/>
                 </a:highlight>
                 <a:latin typeface="Consolas"/>
               </a:rPr>
-              <a:t>int</a:t>
-            </a:r>
-            <a:r>
-              <a:rPr lang="en-US" sz="1600" dirty="0" smtClean="0">
+              <a:t> </a:t>
+            </a:r>
+            <a:r>
+              <a:rPr lang="en-US" sz="1600" dirty="0" err="1" smtClean="0">
                 <a:solidFill>
                   <a:srgbClr val="000000"/>
                 </a:solidFill>
@@ -9219,10 +9324,10 @@
                 </a:highlight>
                 <a:latin typeface="Consolas"/>
               </a:rPr>
-              <a:t> </a:t>
-            </a:r>
-            <a:r>
-              <a:rPr lang="en-US" sz="1600" dirty="0" err="1" smtClean="0">
+              <a:t>lineNumber</a:t>
+            </a:r>
+            <a:r>
+              <a:rPr lang="en-US" sz="1600" dirty="0" smtClean="0">
                 <a:solidFill>
                   <a:srgbClr val="000000"/>
                 </a:solidFill>
@@ -9231,8 +9336,13 @@
                 </a:highlight>
                 <a:latin typeface="Consolas"/>
               </a:rPr>
-              <a:t>lineNumber</a:t>
-            </a:r>
+              <a:t> = 0)</a:t>
+            </a:r>
+          </a:p>
+          <a:p>
+            <a:pPr>
+              <a:buNone/>
+            </a:pPr>
             <a:r>
               <a:rPr lang="en-US" sz="1600" dirty="0" smtClean="0">
                 <a:solidFill>
@@ -9243,7 +9353,7 @@
                 </a:highlight>
                 <a:latin typeface="Consolas"/>
               </a:rPr>
-              <a:t> = 0)</a:t>
+              <a:t>        {</a:t>
             </a:r>
           </a:p>
           <a:p>
@@ -9260,39 +9370,34 @@
                 </a:highlight>
                 <a:latin typeface="Consolas"/>
               </a:rPr>
-              <a:t>        {</a:t>
-            </a:r>
-          </a:p>
-          <a:p>
-            <a:pPr>
-              <a:buNone/>
-            </a:pPr>
-            <a:r>
-              <a:rPr lang="en-US" sz="1600" dirty="0" smtClean="0">
-                <a:solidFill>
-                  <a:srgbClr val="000000"/>
+              <a:t>            </a:t>
+            </a:r>
+            <a:r>
+              <a:rPr lang="en-US" sz="1600" dirty="0" err="1" smtClean="0">
+                <a:solidFill>
+                  <a:srgbClr val="2B91AF"/>
                 </a:solidFill>
                 <a:highlight>
                   <a:srgbClr val="FFFFFF"/>
                 </a:highlight>
                 <a:latin typeface="Consolas"/>
               </a:rPr>
-              <a:t>            </a:t>
+              <a:t>Console</a:t>
             </a:r>
             <a:r>
               <a:rPr lang="en-US" sz="1600" dirty="0" err="1" smtClean="0">
                 <a:solidFill>
-                  <a:srgbClr val="2B91AF"/>
+                  <a:srgbClr val="000000"/>
                 </a:solidFill>
                 <a:highlight>
                   <a:srgbClr val="FFFFFF"/>
                 </a:highlight>
                 <a:latin typeface="Consolas"/>
               </a:rPr>
-              <a:t>Console</a:t>
-            </a:r>
-            <a:r>
-              <a:rPr lang="en-US" sz="1600" dirty="0" err="1" smtClean="0">
+              <a:t>.WriteLine</a:t>
+            </a:r>
+            <a:r>
+              <a:rPr lang="en-US" sz="1600" dirty="0" smtClean="0">
                 <a:solidFill>
                   <a:srgbClr val="000000"/>
                 </a:solidFill>
@@ -9301,55 +9406,31 @@
                 </a:highlight>
                 <a:latin typeface="Consolas"/>
               </a:rPr>
-              <a:t>.WriteLine</a:t>
+              <a:t>(</a:t>
             </a:r>
             <a:r>
               <a:rPr lang="en-US" sz="1600" dirty="0" smtClean="0">
                 <a:solidFill>
-                  <a:srgbClr val="000000"/>
+                  <a:srgbClr val="800000"/>
                 </a:solidFill>
                 <a:highlight>
                   <a:srgbClr val="FFFFFF"/>
                 </a:highlight>
                 <a:latin typeface="Consolas"/>
               </a:rPr>
-              <a:t>(</a:t>
+              <a:t>"[</a:t>
             </a:r>
             <a:r>
               <a:rPr lang="en-US" sz="1600" dirty="0" smtClean="0">
                 <a:solidFill>
-                  <a:srgbClr val="800000"/>
+                  <a:srgbClr val="3CB371"/>
                 </a:solidFill>
                 <a:highlight>
                   <a:srgbClr val="FFFFFF"/>
                 </a:highlight>
                 <a:latin typeface="Consolas"/>
               </a:rPr>
-              <a:t>"[</a:t>
-            </a:r>
-            <a:r>
-              <a:rPr lang="en-US" sz="1600" dirty="0" smtClean="0">
-                <a:solidFill>
-                  <a:srgbClr val="3CB371"/>
-                </a:solidFill>
-                <a:highlight>
-                  <a:srgbClr val="FFFFFF"/>
-                </a:highlight>
-                <a:latin typeface="Consolas"/>
-              </a:rPr>
-              <a:t>{</a:t>
-            </a:r>
-            <a:r>
-              <a:rPr lang="en-US" sz="1600" dirty="0" smtClean="0">
-                <a:solidFill>
-                  <a:srgbClr val="3CB371"/>
-                </a:solidFill>
-                <a:highlight>
-                  <a:srgbClr val="FFFFFF"/>
-                </a:highlight>
-                <a:latin typeface="Consolas"/>
-              </a:rPr>
-              <a:t>0}</a:t>
+              <a:t>{0}</a:t>
             </a:r>
             <a:r>
               <a:rPr lang="en-US" sz="1600" dirty="0" smtClean="0">
@@ -10705,7 +10786,7 @@
           <a:p>
             <a:pPr algn="ctr"/>
             <a:r>
-              <a:rPr lang="pl-PL" sz="2800" dirty="0" err="1" smtClean="0">
+              <a:rPr lang="pl-PL" sz="2800" dirty="0" smtClean="0">
                 <a:ln w="18415" cmpd="sng">
                   <a:solidFill>
                     <a:srgbClr val="FFFFFF"/>
@@ -10747,6 +10828,27 @@
               <a:t> </a:t>
             </a:r>
             <a:r>
+              <a:rPr lang="en-US" sz="2800" dirty="0" smtClean="0">
+                <a:ln w="18415" cmpd="sng">
+                  <a:solidFill>
+                    <a:srgbClr val="FFFFFF"/>
+                  </a:solidFill>
+                  <a:prstDash val="solid"/>
+                </a:ln>
+                <a:solidFill>
+                  <a:srgbClr val="FFFFFF"/>
+                </a:solidFill>
+                <a:effectLst>
+                  <a:outerShdw blurRad="63500" dir="3600000" algn="tl" rotWithShape="0">
+                    <a:srgbClr val="000000">
+                      <a:alpha val="70000"/>
+                    </a:srgbClr>
+                  </a:outerShdw>
+                </a:effectLst>
+              </a:rPr>
+              <a:t>old </a:t>
+            </a:r>
+            <a:r>
               <a:rPr lang="en-US" sz="2800" dirty="0" err="1" smtClean="0">
                 <a:ln w="18415" cmpd="sng">
                   <a:solidFill>
@@ -10765,7 +10867,28 @@
                   </a:outerShdw>
                 </a:effectLst>
               </a:rPr>
-              <a:t>async</a:t>
+              <a:t>a</a:t>
+            </a:r>
+            <a:r>
+              <a:rPr lang="en-US" sz="2800" dirty="0" err="1" smtClean="0">
+                <a:ln w="18415" cmpd="sng">
+                  <a:solidFill>
+                    <a:srgbClr val="FFFFFF"/>
+                  </a:solidFill>
+                  <a:prstDash val="solid"/>
+                </a:ln>
+                <a:solidFill>
+                  <a:srgbClr val="FFFFFF"/>
+                </a:solidFill>
+                <a:effectLst>
+                  <a:outerShdw blurRad="63500" dir="3600000" algn="tl" rotWithShape="0">
+                    <a:srgbClr val="000000">
+                      <a:alpha val="70000"/>
+                    </a:srgbClr>
+                  </a:outerShdw>
+                </a:effectLst>
+              </a:rPr>
+              <a:t>sync</a:t>
             </a:r>
             <a:endParaRPr lang="en-US" sz="2800" b="0" cap="none" spc="0" dirty="0" smtClean="0">
               <a:ln w="18415" cmpd="sng">
@@ -12034,15 +12157,7 @@
           <a:p>
             <a:r>
               <a:rPr lang="en-US" dirty="0" smtClean="0"/>
-              <a:t>Subroutines </a:t>
-            </a:r>
-            <a:r>
-              <a:rPr lang="en-US" dirty="0" smtClean="0"/>
-              <a:t>which allow </a:t>
-            </a:r>
-            <a:r>
-              <a:rPr lang="en-US" dirty="0" smtClean="0"/>
-              <a:t>multiple entry points</a:t>
+              <a:t>Subroutines which allow multiple entry points</a:t>
             </a:r>
             <a:r>
               <a:rPr lang="pl-PL" dirty="0" smtClean="0"/>
@@ -13266,12 +13381,7 @@
 </file>
 
 <file path=customXml/item1.xml><?xml version="1.0" encoding="utf-8"?>
-<?mso-contentType ?>
-<FormTemplates xmlns="http://schemas.microsoft.com/sharepoint/v3/contenttype/forms">
-  <Display>DocumentLibraryForm</Display>
-  <Edit>DocumentLibraryForm</Edit>
-  <New>DocumentLibraryForm</New>
-</FormTemplates>
+<LongProperties xmlns="http://schemas.microsoft.com/office/2006/metadata/longProperties"/>
 </file>
 
 <file path=customXml/item2.xml><?xml version="1.0" encoding="utf-8"?>
@@ -13335,7 +13445,12 @@
 </file>
 
 <file path=customXml/item3.xml><?xml version="1.0" encoding="utf-8"?>
-<LongProperties xmlns="http://schemas.microsoft.com/office/2006/metadata/longProperties"/>
+<?mso-contentType ?>
+<FormTemplates xmlns="http://schemas.microsoft.com/sharepoint/v3/contenttype/forms">
+  <Display>DocumentLibraryForm</Display>
+  <Edit>DocumentLibraryForm</Edit>
+  <New>DocumentLibraryForm</New>
+</FormTemplates>
 </file>
 
 <file path=customXml/item4.xml><?xml version="1.0" encoding="utf-8"?>
@@ -13347,9 +13462,9 @@
 </file>
 
 <file path=customXml/itemProps1.xml><?xml version="1.0" encoding="utf-8"?>
-<ds:datastoreItem xmlns:ds="http://schemas.openxmlformats.org/officeDocument/2006/customXml" ds:itemID="{D3274669-787B-4EFD-8872-69E7B499937A}">
+<ds:datastoreItem xmlns:ds="http://schemas.openxmlformats.org/officeDocument/2006/customXml" ds:itemID="{9062B6A4-46AE-44BC-B602-351B8E15754D}">
   <ds:schemaRefs>
-    <ds:schemaRef ds:uri="http://schemas.microsoft.com/sharepoint/v3/contenttype/forms"/>
+    <ds:schemaRef ds:uri="http://schemas.microsoft.com/office/2006/metadata/longProperties"/>
   </ds:schemaRefs>
 </ds:datastoreItem>
 </file>
@@ -13372,9 +13487,9 @@
 </file>
 
 <file path=customXml/itemProps3.xml><?xml version="1.0" encoding="utf-8"?>
-<ds:datastoreItem xmlns:ds="http://schemas.openxmlformats.org/officeDocument/2006/customXml" ds:itemID="{9062B6A4-46AE-44BC-B602-351B8E15754D}">
+<ds:datastoreItem xmlns:ds="http://schemas.openxmlformats.org/officeDocument/2006/customXml" ds:itemID="{D3274669-787B-4EFD-8872-69E7B499937A}">
   <ds:schemaRefs>
-    <ds:schemaRef ds:uri="http://schemas.microsoft.com/office/2006/metadata/longProperties"/>
+    <ds:schemaRef ds:uri="http://schemas.microsoft.com/sharepoint/v3/contenttype/forms"/>
   </ds:schemaRefs>
 </ds:datastoreItem>
 </file>

</xml_diff>

<commit_message>
working on performance chart
</commit_message>
<xml_diff>
--- a/C# 5.pptx
+++ b/C# 5.pptx
@@ -2104,7 +2104,21 @@
             </a:pPr>
             <a:r>
               <a:rPr lang="en-US" b="1" baseline="0" dirty="0" smtClean="0"/>
-              <a:t>Unobserved exception on Task will bring entire app domain down</a:t>
+              <a:t>Unobserved exception on Task will bring entire app domain </a:t>
+            </a:r>
+            <a:r>
+              <a:rPr lang="en-US" b="1" baseline="0" dirty="0" smtClean="0"/>
+              <a:t>down – this is really important while building server based applications since one exception wouldn’t normally bring entire application down</a:t>
+            </a:r>
+            <a:endParaRPr lang="en-US" b="1" baseline="0" dirty="0" smtClean="0"/>
+          </a:p>
+          <a:p>
+            <a:pPr>
+              <a:buNone/>
+            </a:pPr>
+            <a:r>
+              <a:rPr lang="en-US" b="0" baseline="0" dirty="0" smtClean="0"/>
+              <a:t>Yet another thing to consider is that while TPL really helps to simplify multithreaded/parallel programming it essentially uses workers threads to perform operation in near future. Introducing Tasks solely for performance improvements may be fruitless. Especially if our performance problems come from many IO bound operation executing concurrently – we may actually make things worse by increasing thread contention. </a:t>
             </a:r>
           </a:p>
           <a:p>
@@ -2122,12 +2136,12 @@
               <a:t>Reactive extensions on the other hand emphasize the deep </a:t>
             </a:r>
             <a:r>
-              <a:rPr lang="en-US" b="0" baseline="0" dirty="0" err="1" smtClean="0"/>
-              <a:t>releation</a:t>
-            </a:r>
-            <a:r>
               <a:rPr lang="en-US" b="0" baseline="0" dirty="0" smtClean="0"/>
-              <a:t> between asynchronous </a:t>
+              <a:t>relation </a:t>
+            </a:r>
+            <a:r>
+              <a:rPr lang="en-US" b="0" baseline="0" dirty="0" smtClean="0"/>
+              <a:t>between asynchronous </a:t>
             </a:r>
             <a:r>
               <a:rPr lang="en-US" b="0" baseline="0" dirty="0" err="1" smtClean="0"/>
@@ -2167,8 +2181,21 @@
             </a:r>
             <a:r>
               <a:rPr lang="en-US" b="0" baseline="0" dirty="0" smtClean="0"/>
-              <a:t> events. However the logical program flow is still convoluted – it takes some time to get your head around the brilliant concepts introduced by Rx</a:t>
-            </a:r>
+              <a:t> events. However the logical program flow is still convoluted – it takes some time to get your head around the brilliant concepts introduced by </a:t>
+            </a:r>
+            <a:r>
+              <a:rPr lang="en-US" b="0" baseline="0" dirty="0" smtClean="0"/>
+              <a:t>Rx. (Refer to </a:t>
+            </a:r>
+            <a:r>
+              <a:rPr lang="en-US" b="0" baseline="0" dirty="0" err="1" smtClean="0"/>
+              <a:t>Piotr’s</a:t>
+            </a:r>
+            <a:r>
+              <a:rPr lang="en-US" b="0" baseline="0" dirty="0" smtClean="0"/>
+              <a:t> session about Reactive)</a:t>
+            </a:r>
+            <a:endParaRPr lang="en-US" b="0" baseline="0" dirty="0" smtClean="0"/>
           </a:p>
           <a:p>
             <a:pPr>
@@ -2200,7 +2227,11 @@
             </a:r>
             <a:r>
               <a:rPr lang="en-US" baseline="0" dirty="0" err="1" smtClean="0"/>
-              <a:t>DownloadPage.Re</a:t>
+              <a:t>DownloadPage.Reactive</a:t>
+            </a:r>
+            <a:r>
+              <a:rPr lang="en-US" baseline="0" dirty="0" smtClean="0"/>
+              <a:t>/DownloadPage.TPL</a:t>
             </a:r>
             <a:endParaRPr lang="en-US" dirty="0"/>
           </a:p>
@@ -2310,8 +2341,17 @@
           <a:p>
             <a:r>
               <a:rPr lang="en-US" dirty="0" smtClean="0"/>
-              <a:t>The control flow is preserved</a:t>
-            </a:r>
+              <a:t>The control flow is </a:t>
+            </a:r>
+            <a:r>
+              <a:rPr lang="en-US" dirty="0" smtClean="0"/>
+              <a:t>preserved</a:t>
+            </a:r>
+            <a:r>
+              <a:rPr lang="en-US" baseline="0" dirty="0" smtClean="0"/>
+              <a:t> – this while important for someone that writes the code is crucial for the person maintaining the code in future – it’s much easier to read asynchronous flow </a:t>
+            </a:r>
+            <a:endParaRPr lang="en-US" dirty="0" smtClean="0"/>
           </a:p>
           <a:p>
             <a:endParaRPr lang="en-US" dirty="0" smtClean="0"/>
@@ -2331,8 +2371,13 @@
             </a:r>
             <a:r>
               <a:rPr lang="en-US" baseline="0" dirty="0" smtClean="0"/>
-              <a:t> block were introduced (yield)</a:t>
-            </a:r>
+              <a:t> block were introduced (yield</a:t>
+            </a:r>
+            <a:r>
+              <a:rPr lang="en-US" baseline="0" dirty="0" smtClean="0"/>
+              <a:t>)</a:t>
+            </a:r>
+            <a:endParaRPr lang="en-US" baseline="0" dirty="0" smtClean="0"/>
           </a:p>
           <a:p>
             <a:endParaRPr lang="en-US" baseline="0" dirty="0" smtClean="0"/>
@@ -2349,7 +2394,15 @@
           <a:p>
             <a:r>
               <a:rPr lang="en-US" baseline="0" dirty="0" smtClean="0"/>
-              <a:t>You can await anything that Returns Task</a:t>
+              <a:t>You can await </a:t>
+            </a:r>
+            <a:r>
+              <a:rPr lang="en-US" baseline="0" dirty="0" smtClean="0"/>
+              <a:t>any method </a:t>
+            </a:r>
+            <a:r>
+              <a:rPr lang="en-US" baseline="0" dirty="0" smtClean="0"/>
+              <a:t>that Returns Task</a:t>
             </a:r>
           </a:p>
           <a:p>
@@ -2358,8 +2411,21 @@
           <a:p>
             <a:r>
               <a:rPr lang="en-US" baseline="0" dirty="0" smtClean="0"/>
-              <a:t>The necessary synchronization context passing is done under the cover</a:t>
-            </a:r>
+              <a:t>The necessary synchronization context passing is done under the </a:t>
+            </a:r>
+            <a:r>
+              <a:rPr lang="en-US" baseline="0" dirty="0" smtClean="0"/>
+              <a:t>cover (no need to call </a:t>
+            </a:r>
+            <a:r>
+              <a:rPr lang="en-US" baseline="0" dirty="0" err="1" smtClean="0"/>
+              <a:t>Task.FromCurrentSynchronizationContext</a:t>
+            </a:r>
+            <a:r>
+              <a:rPr lang="en-US" baseline="0" dirty="0" smtClean="0"/>
+              <a:t>() anymore)</a:t>
+            </a:r>
+            <a:endParaRPr lang="en-US" baseline="0" dirty="0" smtClean="0"/>
           </a:p>
           <a:p>
             <a:endParaRPr lang="en-US" baseline="0" dirty="0" smtClean="0"/>

</xml_diff>

<commit_message>
removed not used slide
</commit_message>
<xml_diff>
--- a/C# 5.pptx
+++ b/C# 5.pptx
@@ -5,10 +5,10 @@
     <p:sldMasterId id="2147483654" r:id="rId5"/>
   </p:sldMasterIdLst>
   <p:notesMasterIdLst>
-    <p:notesMasterId r:id="rId21"/>
+    <p:notesMasterId r:id="rId20"/>
   </p:notesMasterIdLst>
   <p:handoutMasterIdLst>
-    <p:handoutMasterId r:id="rId22"/>
+    <p:handoutMasterId r:id="rId21"/>
   </p:handoutMasterIdLst>
   <p:sldIdLst>
     <p:sldId id="371" r:id="rId6"/>
@@ -25,7 +25,6 @@
     <p:sldId id="383" r:id="rId17"/>
     <p:sldId id="384" r:id="rId18"/>
     <p:sldId id="385" r:id="rId19"/>
-    <p:sldId id="372" r:id="rId20"/>
   </p:sldIdLst>
   <p:sldSz cx="9144000" cy="6858000" type="screen4x3"/>
   <p:notesSz cx="7061200" cy="9398000"/>
@@ -228,7 +227,7 @@
             <a:fld id="{867741B6-20E1-4219-AC3A-163B52FA3A08}" type="datetime8">
               <a:rPr lang="en-US"/>
               <a:pPr/>
-              <a:t>5/29/2012 9:12 AM</a:t>
+              <a:t>5/30/2012 8:35 AM</a:t>
             </a:fld>
             <a:endParaRPr lang="en-US" dirty="0"/>
           </a:p>
@@ -421,7 +420,7 @@
             <a:fld id="{80DC343A-C7DB-48FF-A81F-D2EFF0311B91}" type="datetime8">
               <a:rPr lang="en-US"/>
               <a:pPr/>
-              <a:t>5/29/2012 9:12 AM</a:t>
+              <a:t>5/30/2012 8:35 AM</a:t>
             </a:fld>
             <a:endParaRPr lang="en-US" dirty="0"/>
           </a:p>
@@ -818,7 +817,7 @@
             <a:fld id="{FE6E691D-9AEE-4359-9871-4FF78429DC86}" type="datetime8">
               <a:rPr lang="en-US"/>
               <a:pPr/>
-              <a:t>5/29/2012 9:12 AM</a:t>
+              <a:t>5/30/2012 8:35 AM</a:t>
             </a:fld>
             <a:endParaRPr lang="en-US"/>
           </a:p>
@@ -1048,7 +1047,7 @@
             <a:fld id="{80DC343A-C7DB-48FF-A81F-D2EFF0311B91}" type="datetime8">
               <a:rPr lang="en-US" smtClean="0"/>
               <a:pPr/>
-              <a:t>5/29/2012 9:12 AM</a:t>
+              <a:t>5/30/2012 8:35 AM</a:t>
             </a:fld>
             <a:endParaRPr lang="en-US" dirty="0"/>
           </a:p>
@@ -1279,7 +1278,7 @@
             <a:fld id="{80DC343A-C7DB-48FF-A81F-D2EFF0311B91}" type="datetime8">
               <a:rPr lang="en-US" smtClean="0"/>
               <a:pPr/>
-              <a:t>5/29/2012 9:12 AM</a:t>
+              <a:t>5/30/2012 8:35 AM</a:t>
             </a:fld>
             <a:endParaRPr lang="en-US" dirty="0"/>
           </a:p>
@@ -1424,7 +1423,7 @@
             <a:fld id="{80DC343A-C7DB-48FF-A81F-D2EFF0311B91}" type="datetime8">
               <a:rPr lang="en-US" smtClean="0"/>
               <a:pPr/>
-              <a:t>5/29/2012 9:12 AM</a:t>
+              <a:t>5/30/2012 8:35 AM</a:t>
             </a:fld>
             <a:endParaRPr lang="en-US" dirty="0"/>
           </a:p>
@@ -1451,127 +1450,6 @@
               <a:t>12</a:t>
             </a:fld>
             <a:endParaRPr lang="en-US" dirty="0"/>
-          </a:p>
-        </p:txBody>
-      </p:sp>
-    </p:spTree>
-  </p:cSld>
-  <p:clrMapOvr>
-    <a:masterClrMapping/>
-  </p:clrMapOvr>
-</p:notes>
-</file>
-
-<file path=ppt/notesSlides/notesSlide13.xml><?xml version="1.0" encoding="utf-8"?>
-<p:notes xmlns:a="http://schemas.openxmlformats.org/drawingml/2006/main" xmlns:r="http://schemas.openxmlformats.org/officeDocument/2006/relationships" xmlns:p="http://schemas.openxmlformats.org/presentationml/2006/main">
-  <p:cSld>
-    <p:spTree>
-      <p:nvGrpSpPr>
-        <p:cNvPr id="1" name=""/>
-        <p:cNvGrpSpPr/>
-        <p:nvPr/>
-      </p:nvGrpSpPr>
-      <p:grpSpPr>
-        <a:xfrm>
-          <a:off x="0" y="0"/>
-          <a:ext cx="0" cy="0"/>
-          <a:chOff x="0" y="0"/>
-          <a:chExt cx="0" cy="0"/>
-        </a:xfrm>
-      </p:grpSpPr>
-      <p:sp>
-        <p:nvSpPr>
-          <p:cNvPr id="18433" name="Rectangle 3"/>
-          <p:cNvSpPr>
-            <a:spLocks noGrp="1" noChangeArrowheads="1"/>
-          </p:cNvSpPr>
-          <p:nvPr>
-            <p:ph type="dt" sz="quarter" idx="1"/>
-          </p:nvPr>
-        </p:nvSpPr>
-        <p:spPr>
-          <a:noFill/>
-        </p:spPr>
-        <p:txBody>
-          <a:bodyPr/>
-          <a:lstStyle/>
-          <a:p>
-            <a:fld id="{AB8F9170-F656-4E08-BDFE-37D587BF0909}" type="datetime8">
-              <a:rPr lang="en-US"/>
-              <a:pPr/>
-              <a:t>5/29/2012 9:12 AM</a:t>
-            </a:fld>
-            <a:endParaRPr lang="en-US" dirty="0"/>
-          </a:p>
-        </p:txBody>
-      </p:sp>
-      <p:sp>
-        <p:nvSpPr>
-          <p:cNvPr id="18434" name="Rectangle 7"/>
-          <p:cNvSpPr>
-            <a:spLocks noGrp="1" noChangeArrowheads="1"/>
-          </p:cNvSpPr>
-          <p:nvPr>
-            <p:ph type="sldNum" sz="quarter" idx="5"/>
-          </p:nvPr>
-        </p:nvSpPr>
-        <p:spPr>
-          <a:noFill/>
-        </p:spPr>
-        <p:txBody>
-          <a:bodyPr/>
-          <a:lstStyle/>
-          <a:p>
-            <a:fld id="{E73A29F1-A36F-4C0F-8D5B-36FFE114B347}" type="slidenum">
-              <a:rPr lang="en-US"/>
-              <a:pPr/>
-              <a:t>15</a:t>
-            </a:fld>
-            <a:endParaRPr lang="en-US" dirty="0"/>
-          </a:p>
-        </p:txBody>
-      </p:sp>
-      <p:sp>
-        <p:nvSpPr>
-          <p:cNvPr id="18435" name="Rectangle 2"/>
-          <p:cNvSpPr>
-            <a:spLocks noGrp="1" noRot="1" noChangeAspect="1" noChangeArrowheads="1" noTextEdit="1"/>
-          </p:cNvSpPr>
-          <p:nvPr>
-            <p:ph type="sldImg"/>
-          </p:nvPr>
-        </p:nvSpPr>
-        <p:spPr>
-          <a:ln/>
-        </p:spPr>
-      </p:sp>
-      <p:sp>
-        <p:nvSpPr>
-          <p:cNvPr id="18436" name="Rectangle 3"/>
-          <p:cNvSpPr>
-            <a:spLocks noGrp="1" noChangeArrowheads="1"/>
-          </p:cNvSpPr>
-          <p:nvPr>
-            <p:ph type="body" idx="1"/>
-          </p:nvPr>
-        </p:nvSpPr>
-        <p:spPr>
-          <a:noFill/>
-          <a:ln/>
-        </p:spPr>
-        <p:txBody>
-          <a:bodyPr lIns="93012" tIns="46506" rIns="93012" bIns="46506"/>
-          <a:lstStyle/>
-          <a:p>
-            <a:pPr marL="288925" lvl="1" indent="-174625" eaLnBrk="1" hangingPunct="1">
-              <a:buSzPct val="75000"/>
-              <a:buFont typeface="Times New Roman" pitchFamily="18" charset="0"/>
-              <a:buChar char="—"/>
-            </a:pPr>
-            <a:endParaRPr lang="en-US" sz="1000" dirty="0" smtClean="0">
-              <a:latin typeface="Arial" pitchFamily="34" charset="0"/>
-              <a:ea typeface="ＭＳ Ｐゴシック" pitchFamily="34" charset="-128"/>
-            </a:endParaRPr>
           </a:p>
         </p:txBody>
       </p:sp>
@@ -1620,7 +1498,7 @@
             <a:fld id="{AB8F9170-F656-4E08-BDFE-37D587BF0909}" type="datetime8">
               <a:rPr lang="en-US"/>
               <a:pPr/>
-              <a:t>5/29/2012 9:12 AM</a:t>
+              <a:t>5/30/2012 8:35 AM</a:t>
             </a:fld>
             <a:endParaRPr lang="en-US"/>
           </a:p>
@@ -1925,7 +1803,7 @@
             <a:fld id="{80DC343A-C7DB-48FF-A81F-D2EFF0311B91}" type="datetime8">
               <a:rPr lang="en-US" smtClean="0"/>
               <a:pPr/>
-              <a:t>5/29/2012 9:12 AM</a:t>
+              <a:t>5/30/2012 8:35 AM</a:t>
             </a:fld>
             <a:endParaRPr lang="en-US"/>
           </a:p>
@@ -2104,13 +1982,8 @@
             </a:pPr>
             <a:r>
               <a:rPr lang="en-US" b="1" baseline="0" dirty="0" smtClean="0"/>
-              <a:t>Unobserved exception on Task will bring entire app domain </a:t>
-            </a:r>
-            <a:r>
-              <a:rPr lang="en-US" b="1" baseline="0" dirty="0" smtClean="0"/>
-              <a:t>down – this is really important while building server based applications since one exception wouldn’t normally bring entire application down</a:t>
-            </a:r>
-            <a:endParaRPr lang="en-US" b="1" baseline="0" dirty="0" smtClean="0"/>
+              <a:t>Unobserved exception on Task will bring entire app domain down – this is really important while building server based applications since one exception wouldn’t normally bring entire application down</a:t>
+            </a:r>
           </a:p>
           <a:p>
             <a:pPr>
@@ -2133,15 +2006,7 @@
             </a:pPr>
             <a:r>
               <a:rPr lang="en-US" b="0" baseline="0" dirty="0" smtClean="0"/>
-              <a:t>Reactive extensions on the other hand emphasize the deep </a:t>
-            </a:r>
-            <a:r>
-              <a:rPr lang="en-US" b="0" baseline="0" dirty="0" smtClean="0"/>
-              <a:t>relation </a:t>
-            </a:r>
-            <a:r>
-              <a:rPr lang="en-US" b="0" baseline="0" dirty="0" smtClean="0"/>
-              <a:t>between asynchronous </a:t>
+              <a:t>Reactive extensions on the other hand emphasize the deep relation between asynchronous </a:t>
             </a:r>
             <a:r>
               <a:rPr lang="en-US" b="0" baseline="0" dirty="0" err="1" smtClean="0"/>
@@ -2181,11 +2046,7 @@
             </a:r>
             <a:r>
               <a:rPr lang="en-US" b="0" baseline="0" dirty="0" smtClean="0"/>
-              <a:t> events. However the logical program flow is still convoluted – it takes some time to get your head around the brilliant concepts introduced by </a:t>
-            </a:r>
-            <a:r>
-              <a:rPr lang="en-US" b="0" baseline="0" dirty="0" smtClean="0"/>
-              <a:t>Rx. (Refer to </a:t>
+              <a:t> events. However the logical program flow is still convoluted – it takes some time to get your head around the brilliant concepts introduced by Rx. (Refer to </a:t>
             </a:r>
             <a:r>
               <a:rPr lang="en-US" b="0" baseline="0" dirty="0" err="1" smtClean="0"/>
@@ -2195,7 +2056,6 @@
               <a:rPr lang="en-US" b="0" baseline="0" dirty="0" smtClean="0"/>
               <a:t> session about Reactive)</a:t>
             </a:r>
-            <a:endParaRPr lang="en-US" b="0" baseline="0" dirty="0" smtClean="0"/>
           </a:p>
           <a:p>
             <a:pPr>
@@ -2255,7 +2115,7 @@
             <a:fld id="{80DC343A-C7DB-48FF-A81F-D2EFF0311B91}" type="datetime8">
               <a:rPr lang="en-US" smtClean="0"/>
               <a:pPr/>
-              <a:t>5/29/2012 9:12 AM</a:t>
+              <a:t>5/30/2012 8:35 AM</a:t>
             </a:fld>
             <a:endParaRPr lang="en-US"/>
           </a:p>
@@ -2341,11 +2201,7 @@
           <a:p>
             <a:r>
               <a:rPr lang="en-US" dirty="0" smtClean="0"/>
-              <a:t>The control flow is </a:t>
-            </a:r>
-            <a:r>
-              <a:rPr lang="en-US" dirty="0" smtClean="0"/>
-              <a:t>preserved</a:t>
+              <a:t>The control flow is preserved</a:t>
             </a:r>
             <a:r>
               <a:rPr lang="en-US" baseline="0" dirty="0" smtClean="0"/>
@@ -2371,13 +2227,8 @@
             </a:r>
             <a:r>
               <a:rPr lang="en-US" baseline="0" dirty="0" smtClean="0"/>
-              <a:t> block were introduced (yield</a:t>
-            </a:r>
-            <a:r>
-              <a:rPr lang="en-US" baseline="0" dirty="0" smtClean="0"/>
-              <a:t>)</a:t>
-            </a:r>
-            <a:endParaRPr lang="en-US" baseline="0" dirty="0" smtClean="0"/>
+              <a:t> block were introduced (yield)</a:t>
+            </a:r>
           </a:p>
           <a:p>
             <a:endParaRPr lang="en-US" baseline="0" dirty="0" smtClean="0"/>
@@ -2394,28 +2245,16 @@
           <a:p>
             <a:r>
               <a:rPr lang="en-US" baseline="0" dirty="0" smtClean="0"/>
-              <a:t>You can await </a:t>
-            </a:r>
+              <a:t>You can await any method that Returns Task</a:t>
+            </a:r>
+          </a:p>
+          <a:p>
+            <a:endParaRPr lang="en-US" baseline="0" dirty="0" smtClean="0"/>
+          </a:p>
+          <a:p>
             <a:r>
               <a:rPr lang="en-US" baseline="0" dirty="0" smtClean="0"/>
-              <a:t>any method </a:t>
-            </a:r>
-            <a:r>
-              <a:rPr lang="en-US" baseline="0" dirty="0" smtClean="0"/>
-              <a:t>that Returns Task</a:t>
-            </a:r>
-          </a:p>
-          <a:p>
-            <a:endParaRPr lang="en-US" baseline="0" dirty="0" smtClean="0"/>
-          </a:p>
-          <a:p>
-            <a:r>
-              <a:rPr lang="en-US" baseline="0" dirty="0" smtClean="0"/>
-              <a:t>The necessary synchronization context passing is done under the </a:t>
-            </a:r>
-            <a:r>
-              <a:rPr lang="en-US" baseline="0" dirty="0" smtClean="0"/>
-              <a:t>cover (no need to call </a:t>
+              <a:t>The necessary synchronization context passing is done under the cover (no need to call </a:t>
             </a:r>
             <a:r>
               <a:rPr lang="en-US" baseline="0" dirty="0" err="1" smtClean="0"/>
@@ -2425,7 +2264,6 @@
               <a:rPr lang="en-US" baseline="0" dirty="0" smtClean="0"/>
               <a:t>() anymore)</a:t>
             </a:r>
-            <a:endParaRPr lang="en-US" baseline="0" dirty="0" smtClean="0"/>
           </a:p>
           <a:p>
             <a:endParaRPr lang="en-US" baseline="0" dirty="0" smtClean="0"/>
@@ -2481,7 +2319,7 @@
             <a:fld id="{80DC343A-C7DB-48FF-A81F-D2EFF0311B91}" type="datetime8">
               <a:rPr lang="en-US" smtClean="0"/>
               <a:pPr/>
-              <a:t>5/29/2012 9:12 AM</a:t>
+              <a:t>5/30/2012 8:35 AM</a:t>
             </a:fld>
             <a:endParaRPr lang="en-US"/>
           </a:p>
@@ -2815,7 +2653,7 @@
             <a:fld id="{80DC343A-C7DB-48FF-A81F-D2EFF0311B91}" type="datetime8">
               <a:rPr lang="en-US" smtClean="0"/>
               <a:pPr/>
-              <a:t>5/29/2012 9:12 AM</a:t>
+              <a:t>5/30/2012 8:35 AM</a:t>
             </a:fld>
             <a:endParaRPr lang="en-US"/>
           </a:p>
@@ -3444,7 +3282,7 @@
             <a:fld id="{80DC343A-C7DB-48FF-A81F-D2EFF0311B91}" type="datetime8">
               <a:rPr lang="en-US" smtClean="0"/>
               <a:pPr/>
-              <a:t>5/29/2012 9:12 AM</a:t>
+              <a:t>5/30/2012 8:35 AM</a:t>
             </a:fld>
             <a:endParaRPr lang="en-US"/>
           </a:p>
@@ -3627,7 +3465,7 @@
             <a:fld id="{80DC343A-C7DB-48FF-A81F-D2EFF0311B91}" type="datetime8">
               <a:rPr lang="en-US" smtClean="0"/>
               <a:pPr/>
-              <a:t>5/29/2012 9:12 AM</a:t>
+              <a:t>5/30/2012 8:35 AM</a:t>
             </a:fld>
             <a:endParaRPr lang="en-US" dirty="0"/>
           </a:p>
@@ -3903,7 +3741,7 @@
             <a:fld id="{80DC343A-C7DB-48FF-A81F-D2EFF0311B91}" type="datetime8">
               <a:rPr lang="en-US" smtClean="0"/>
               <a:pPr/>
-              <a:t>5/29/2012 9:12 AM</a:t>
+              <a:t>5/30/2012 8:35 AM</a:t>
             </a:fld>
             <a:endParaRPr lang="en-US" dirty="0"/>
           </a:p>
@@ -9004,8 +8842,9 @@
           <a:p>
             <a:r>
               <a:rPr lang="en-US" dirty="0" smtClean="0"/>
-              <a:t>Simplifies complex control flow management</a:t>
-            </a:r>
+              <a:t>Asynchronous code easier</a:t>
+            </a:r>
+            <a:endParaRPr lang="en-US" dirty="0" smtClean="0"/>
           </a:p>
           <a:p>
             <a:endParaRPr lang="en-US" dirty="0" smtClean="0"/>
@@ -9022,7 +8861,15 @@
           <a:p>
             <a:r>
               <a:rPr lang="en-US" dirty="0" smtClean="0"/>
-              <a:t>New tool to express complex flows more succinctly  </a:t>
+              <a:t>New tool </a:t>
+            </a:r>
+            <a:r>
+              <a:rPr lang="en-US" dirty="0" smtClean="0"/>
+              <a:t>for </a:t>
+            </a:r>
+            <a:r>
+              <a:rPr lang="en-US" smtClean="0"/>
+              <a:t>framework developers</a:t>
             </a:r>
             <a:endParaRPr lang="en-US" dirty="0"/>
           </a:p>
@@ -9930,205 +9777,6 @@
   <p:clrMapOvr>
     <a:masterClrMapping/>
   </p:clrMapOvr>
-</p:sld>
-</file>
-
-<file path=ppt/slides/slide15.xml><?xml version="1.0" encoding="utf-8"?>
-<p:sld xmlns:a="http://schemas.openxmlformats.org/drawingml/2006/main" xmlns:r="http://schemas.openxmlformats.org/officeDocument/2006/relationships" xmlns:p="http://schemas.openxmlformats.org/presentationml/2006/main">
-  <p:cSld>
-    <p:spTree>
-      <p:nvGrpSpPr>
-        <p:cNvPr id="1" name=""/>
-        <p:cNvGrpSpPr/>
-        <p:nvPr/>
-      </p:nvGrpSpPr>
-      <p:grpSpPr>
-        <a:xfrm>
-          <a:off x="0" y="0"/>
-          <a:ext cx="0" cy="0"/>
-          <a:chOff x="0" y="0"/>
-          <a:chExt cx="0" cy="0"/>
-        </a:xfrm>
-      </p:grpSpPr>
-      <p:sp>
-        <p:nvSpPr>
-          <p:cNvPr id="17409" name="Slide Number Placeholder 3"/>
-          <p:cNvSpPr>
-            <a:spLocks noGrp="1"/>
-          </p:cNvSpPr>
-          <p:nvPr>
-            <p:ph type="sldNum" sz="quarter" idx="10"/>
-          </p:nvPr>
-        </p:nvSpPr>
-        <p:spPr>
-          <a:noFill/>
-        </p:spPr>
-        <p:txBody>
-          <a:bodyPr/>
-          <a:lstStyle/>
-          <a:p>
-            <a:fld id="{B8923B82-4FEA-4C63-961B-70B71B12A787}" type="slidenum">
-              <a:rPr lang="en-US"/>
-              <a:pPr/>
-              <a:t>15</a:t>
-            </a:fld>
-            <a:endParaRPr lang="en-US" dirty="0"/>
-          </a:p>
-        </p:txBody>
-      </p:sp>
-      <p:sp>
-        <p:nvSpPr>
-          <p:cNvPr id="17410" name="Rectangle 2"/>
-          <p:cNvSpPr>
-            <a:spLocks noGrp="1" noChangeArrowheads="1"/>
-          </p:cNvSpPr>
-          <p:nvPr>
-            <p:ph type="title"/>
-          </p:nvPr>
-        </p:nvSpPr>
-        <p:spPr/>
-        <p:txBody>
-          <a:bodyPr/>
-          <a:lstStyle/>
-          <a:p>
-            <a:pPr eaLnBrk="1" hangingPunct="1"/>
-            <a:r>
-              <a:rPr lang="en-US" dirty="0" smtClean="0">
-                <a:ea typeface="ＭＳ Ｐゴシック" pitchFamily="34" charset="-128"/>
-              </a:rPr>
-              <a:t>Slide Titles are in Title Case Arial 28pt Blue</a:t>
-            </a:r>
-          </a:p>
-        </p:txBody>
-      </p:sp>
-      <p:sp>
-        <p:nvSpPr>
-          <p:cNvPr id="17411" name="Rectangle 3"/>
-          <p:cNvSpPr>
-            <a:spLocks noGrp="1" noChangeArrowheads="1"/>
-          </p:cNvSpPr>
-          <p:nvPr>
-            <p:ph type="body" idx="1"/>
-          </p:nvPr>
-        </p:nvSpPr>
-        <p:spPr/>
-        <p:txBody>
-          <a:bodyPr/>
-          <a:lstStyle/>
-          <a:p>
-            <a:pPr eaLnBrk="1" hangingPunct="1"/>
-            <a:r>
-              <a:rPr lang="en-US" dirty="0" smtClean="0">
-                <a:ea typeface="ＭＳ Ｐゴシック" pitchFamily="34" charset="-128"/>
-              </a:rPr>
-              <a:t>Bullet points are in sentence case Arial 22pt blue.</a:t>
-            </a:r>
-          </a:p>
-          <a:p>
-            <a:pPr lvl="1" eaLnBrk="1" hangingPunct="1"/>
-            <a:r>
-              <a:rPr lang="en-US" dirty="0" smtClean="0">
-                <a:ea typeface="ＭＳ Ｐゴシック" pitchFamily="34" charset="-128"/>
-              </a:rPr>
-              <a:t>Second level bullet points are in sentence case Arial 18pt blue.</a:t>
-            </a:r>
-          </a:p>
-          <a:p>
-            <a:pPr lvl="2" eaLnBrk="1" hangingPunct="1"/>
-            <a:r>
-              <a:rPr lang="en-US" dirty="0" smtClean="0">
-                <a:ea typeface="ＭＳ Ｐゴシック" pitchFamily="34" charset="-128"/>
-              </a:rPr>
-              <a:t>Third level bullet points are in sentence case Arial 16pt blue.</a:t>
-            </a:r>
-          </a:p>
-          <a:p>
-            <a:pPr eaLnBrk="1" hangingPunct="1"/>
-            <a:r>
-              <a:rPr lang="en-US" dirty="0" smtClean="0">
-                <a:ea typeface="ＭＳ Ｐゴシック" pitchFamily="34" charset="-128"/>
-              </a:rPr>
-              <a:t>Bullet points should be short and concise.</a:t>
-            </a:r>
-          </a:p>
-          <a:p>
-            <a:pPr eaLnBrk="1" hangingPunct="1"/>
-            <a:r>
-              <a:rPr lang="en-US" dirty="0" smtClean="0">
-                <a:ea typeface="ＭＳ Ｐゴシック" pitchFamily="34" charset="-128"/>
-              </a:rPr>
-              <a:t>It is recommended that slides should contain no more than 5-8 bulleted items per slide, especially when bullets are longer than one sentence.</a:t>
-            </a:r>
-          </a:p>
-          <a:p>
-            <a:pPr eaLnBrk="1" hangingPunct="1"/>
-            <a:r>
-              <a:rPr lang="en-US" dirty="0" smtClean="0">
-                <a:latin typeface="Arial Black" pitchFamily="34" charset="0"/>
-                <a:ea typeface="ＭＳ Ｐゴシック" pitchFamily="34" charset="-128"/>
-              </a:rPr>
-              <a:t>Highlighted text</a:t>
-            </a:r>
-            <a:r>
-              <a:rPr lang="en-US" dirty="0" smtClean="0">
-                <a:ea typeface="ＭＳ Ｐゴシック" pitchFamily="34" charset="-128"/>
-              </a:rPr>
-              <a:t> is set in Arial Black at the current copy size and should be used only on single words or short phrases.</a:t>
-            </a:r>
-          </a:p>
-          <a:p>
-            <a:pPr eaLnBrk="1" hangingPunct="1"/>
-            <a:r>
-              <a:rPr lang="en-US" dirty="0" smtClean="0">
-                <a:ea typeface="ＭＳ Ｐゴシック" pitchFamily="34" charset="-128"/>
-              </a:rPr>
-              <a:t>Quotes should be </a:t>
-            </a:r>
-            <a:r>
-              <a:rPr lang="ja-JP" altLang="en-US" i="1" smtClean="0">
-                <a:ea typeface="ＭＳ Ｐゴシック" pitchFamily="34" charset="-128"/>
-              </a:rPr>
-              <a:t>“</a:t>
-            </a:r>
-            <a:r>
-              <a:rPr lang="en-US" altLang="ja-JP" i="1" dirty="0" smtClean="0">
-                <a:ea typeface="ＭＳ Ｐゴシック" pitchFamily="34" charset="-128"/>
-              </a:rPr>
-              <a:t>the only copy to use italics</a:t>
-            </a:r>
-            <a:r>
-              <a:rPr lang="ja-JP" altLang="en-US" i="1" smtClean="0">
-                <a:ea typeface="ＭＳ Ｐゴシック" pitchFamily="34" charset="-128"/>
-              </a:rPr>
-              <a:t>”</a:t>
-            </a:r>
-            <a:r>
-              <a:rPr lang="en-US" altLang="ja-JP" dirty="0" smtClean="0">
-                <a:ea typeface="ＭＳ Ｐゴシック" pitchFamily="34" charset="-128"/>
-              </a:rPr>
-              <a:t> </a:t>
-            </a:r>
-            <a:endParaRPr lang="en-US" dirty="0" smtClean="0">
-              <a:ea typeface="ＭＳ Ｐゴシック" pitchFamily="34" charset="-128"/>
-            </a:endParaRPr>
-          </a:p>
-        </p:txBody>
-      </p:sp>
-    </p:spTree>
-  </p:cSld>
-  <p:clrMapOvr>
-    <a:masterClrMapping/>
-  </p:clrMapOvr>
-  <p:transition>
-    <p:wipe dir="r"/>
-  </p:transition>
-  <p:timing>
-    <p:tnLst>
-      <p:par>
-        <p:cTn id="1" dur="indefinite" restart="never" nodeType="tmRoot"/>
-      </p:par>
-    </p:tnLst>
-  </p:timing>
 </p:sld>
 </file>
 
@@ -10891,10 +10539,10 @@
                   </a:outerShdw>
                 </a:effectLst>
               </a:rPr>
-              <a:t> </a:t>
-            </a:r>
-            <a:r>
-              <a:rPr lang="en-US" sz="2800" dirty="0" smtClean="0">
+              <a:t> old </a:t>
+            </a:r>
+            <a:r>
+              <a:rPr lang="en-US" sz="2800" dirty="0" err="1" smtClean="0">
                 <a:ln w="18415" cmpd="sng">
                   <a:solidFill>
                     <a:srgbClr val="FFFFFF"/>
@@ -10912,49 +10560,7 @@
                   </a:outerShdw>
                 </a:effectLst>
               </a:rPr>
-              <a:t>old </a:t>
-            </a:r>
-            <a:r>
-              <a:rPr lang="en-US" sz="2800" dirty="0" err="1" smtClean="0">
-                <a:ln w="18415" cmpd="sng">
-                  <a:solidFill>
-                    <a:srgbClr val="FFFFFF"/>
-                  </a:solidFill>
-                  <a:prstDash val="solid"/>
-                </a:ln>
-                <a:solidFill>
-                  <a:srgbClr val="FFFFFF"/>
-                </a:solidFill>
-                <a:effectLst>
-                  <a:outerShdw blurRad="63500" dir="3600000" algn="tl" rotWithShape="0">
-                    <a:srgbClr val="000000">
-                      <a:alpha val="70000"/>
-                    </a:srgbClr>
-                  </a:outerShdw>
-                </a:effectLst>
-              </a:rPr>
-              <a:t>a</a:t>
-            </a:r>
-            <a:r>
-              <a:rPr lang="en-US" sz="2800" dirty="0" err="1" smtClean="0">
-                <a:ln w="18415" cmpd="sng">
-                  <a:solidFill>
-                    <a:srgbClr val="FFFFFF"/>
-                  </a:solidFill>
-                  <a:prstDash val="solid"/>
-                </a:ln>
-                <a:solidFill>
-                  <a:srgbClr val="FFFFFF"/>
-                </a:solidFill>
-                <a:effectLst>
-                  <a:outerShdw blurRad="63500" dir="3600000" algn="tl" rotWithShape="0">
-                    <a:srgbClr val="000000">
-                      <a:alpha val="70000"/>
-                    </a:srgbClr>
-                  </a:outerShdw>
-                </a:effectLst>
-              </a:rPr>
-              <a:t>sync</a:t>
+              <a:t>async</a:t>
             </a:r>
             <a:endParaRPr lang="en-US" sz="2800" b="0" cap="none" spc="0" dirty="0" smtClean="0">
               <a:ln w="18415" cmpd="sng">
@@ -13447,7 +13053,12 @@
 </file>
 
 <file path=customXml/item1.xml><?xml version="1.0" encoding="utf-8"?>
-<LongProperties xmlns="http://schemas.microsoft.com/office/2006/metadata/longProperties"/>
+<?mso-contentType ?>
+<FormTemplates xmlns="http://schemas.microsoft.com/sharepoint/v3/contenttype/forms">
+  <Display>DocumentLibraryForm</Display>
+  <Edit>DocumentLibraryForm</Edit>
+  <New>DocumentLibraryForm</New>
+</FormTemplates>
 </file>
 
 <file path=customXml/item2.xml><?xml version="1.0" encoding="utf-8"?>
@@ -13511,12 +13122,7 @@
 </file>
 
 <file path=customXml/item3.xml><?xml version="1.0" encoding="utf-8"?>
-<?mso-contentType ?>
-<FormTemplates xmlns="http://schemas.microsoft.com/sharepoint/v3/contenttype/forms">
-  <Display>DocumentLibraryForm</Display>
-  <Edit>DocumentLibraryForm</Edit>
-  <New>DocumentLibraryForm</New>
-</FormTemplates>
+<LongProperties xmlns="http://schemas.microsoft.com/office/2006/metadata/longProperties"/>
 </file>
 
 <file path=customXml/item4.xml><?xml version="1.0" encoding="utf-8"?>
@@ -13528,9 +13134,9 @@
 </file>
 
 <file path=customXml/itemProps1.xml><?xml version="1.0" encoding="utf-8"?>
-<ds:datastoreItem xmlns:ds="http://schemas.openxmlformats.org/officeDocument/2006/customXml" ds:itemID="{9062B6A4-46AE-44BC-B602-351B8E15754D}">
+<ds:datastoreItem xmlns:ds="http://schemas.openxmlformats.org/officeDocument/2006/customXml" ds:itemID="{D3274669-787B-4EFD-8872-69E7B499937A}">
   <ds:schemaRefs>
-    <ds:schemaRef ds:uri="http://schemas.microsoft.com/office/2006/metadata/longProperties"/>
+    <ds:schemaRef ds:uri="http://schemas.microsoft.com/sharepoint/v3/contenttype/forms"/>
   </ds:schemaRefs>
 </ds:datastoreItem>
 </file>
@@ -13553,9 +13159,9 @@
 </file>
 
 <file path=customXml/itemProps3.xml><?xml version="1.0" encoding="utf-8"?>
-<ds:datastoreItem xmlns:ds="http://schemas.openxmlformats.org/officeDocument/2006/customXml" ds:itemID="{D3274669-787B-4EFD-8872-69E7B499937A}">
+<ds:datastoreItem xmlns:ds="http://schemas.openxmlformats.org/officeDocument/2006/customXml" ds:itemID="{9062B6A4-46AE-44BC-B602-351B8E15754D}">
   <ds:schemaRefs>
-    <ds:schemaRef ds:uri="http://schemas.microsoft.com/sharepoint/v3/contenttype/forms"/>
+    <ds:schemaRef ds:uri="http://schemas.microsoft.com/office/2006/metadata/longProperties"/>
   </ds:schemaRefs>
 </ds:datastoreItem>
 </file>

</xml_diff>